<commit_message>
Corrected the highlighted size of ramp chart
</commit_message>
<xml_diff>
--- a/docs/diagrams/report-features.pptx
+++ b/docs/diagrams/report-features.pptx
@@ -104,6 +104,11 @@
       </a:defRPr>
     </a:lvl9pPr>
   </p:defaultTextStyle>
+  <p:extLst>
+    <p:ext uri="{EFAFB233-063F-42B5-8137-9DF3F51BA10A}">
+      <p15:sldGuideLst xmlns:p15="http://schemas.microsoft.com/office/powerpoint/2012/main"/>
+    </p:ext>
+  </p:extLst>
 </p:presentation>
 </file>
 
@@ -4476,8 +4481,8 @@
         </p:nvSpPr>
         <p:spPr>
           <a:xfrm>
-            <a:off x="1536192" y="2194560"/>
-            <a:ext cx="4334256" cy="327104"/>
+            <a:off x="1536192" y="2079693"/>
+            <a:ext cx="4334256" cy="441971"/>
           </a:xfrm>
           <a:prstGeom prst="rect">
             <a:avLst/>
@@ -4614,13 +4619,15 @@
               </a:ext>
             </a:extLst>
           </p:cNvPr>
-          <p:cNvCxnSpPr/>
+          <p:cNvCxnSpPr>
+            <a:cxnSpLocks/>
+          </p:cNvCxnSpPr>
           <p:nvPr/>
         </p:nvCxnSpPr>
         <p:spPr>
           <a:xfrm flipV="1">
-            <a:off x="4456176" y="2072640"/>
-            <a:ext cx="361188" cy="292407"/>
+            <a:off x="4456176" y="2012826"/>
+            <a:ext cx="361188" cy="352222"/>
           </a:xfrm>
           <a:prstGeom prst="straightConnector1">
             <a:avLst/>
@@ -4653,13 +4660,15 @@
               </a:ext>
             </a:extLst>
           </p:cNvPr>
-          <p:cNvCxnSpPr/>
+          <p:cNvCxnSpPr>
+            <a:cxnSpLocks/>
+          </p:cNvCxnSpPr>
           <p:nvPr/>
         </p:nvCxnSpPr>
         <p:spPr>
           <a:xfrm flipV="1">
-            <a:off x="4931664" y="2054939"/>
-            <a:ext cx="0" cy="310108"/>
+            <a:off x="4931664" y="2012826"/>
+            <a:ext cx="0" cy="352221"/>
           </a:xfrm>
           <a:prstGeom prst="straightConnector1">
             <a:avLst/>
@@ -4692,13 +4701,15 @@
               </a:ext>
             </a:extLst>
           </p:cNvPr>
-          <p:cNvCxnSpPr/>
+          <p:cNvCxnSpPr>
+            <a:cxnSpLocks/>
+          </p:cNvCxnSpPr>
           <p:nvPr/>
         </p:nvCxnSpPr>
         <p:spPr>
           <a:xfrm flipH="1" flipV="1">
-            <a:off x="5102352" y="2072640"/>
-            <a:ext cx="256032" cy="285472"/>
+            <a:off x="5032249" y="2012826"/>
+            <a:ext cx="326135" cy="345286"/>
           </a:xfrm>
           <a:prstGeom prst="straightConnector1">
             <a:avLst/>
@@ -4736,7 +4747,7 @@
         </p:nvSpPr>
         <p:spPr>
           <a:xfrm>
-            <a:off x="4659900" y="1847750"/>
+            <a:off x="4647057" y="1790096"/>
             <a:ext cx="1019826" cy="276999"/>
           </a:xfrm>
           <a:prstGeom prst="rect">

</xml_diff>

<commit_message>
Update report-feature base pptx and generate new image
</commit_message>
<xml_diff>
--- a/docs/diagrams/report-features.pptx
+++ b/docs/diagrams/report-features.pptx
@@ -261,7 +261,7 @@
           <a:p>
             <a:fld id="{BC643CBC-B76F-46AA-8129-8C84DB44B84D}" type="datetimeFigureOut">
               <a:rPr lang="en-SG" smtClean="0"/>
-              <a:t>23/5/2019</a:t>
+              <a:t>3/7/19</a:t>
             </a:fld>
             <a:endParaRPr lang="en-SG"/>
           </a:p>
@@ -461,7 +461,7 @@
           <a:p>
             <a:fld id="{BC643CBC-B76F-46AA-8129-8C84DB44B84D}" type="datetimeFigureOut">
               <a:rPr lang="en-SG" smtClean="0"/>
-              <a:t>23/5/2019</a:t>
+              <a:t>3/7/19</a:t>
             </a:fld>
             <a:endParaRPr lang="en-SG"/>
           </a:p>
@@ -671,7 +671,7 @@
           <a:p>
             <a:fld id="{BC643CBC-B76F-46AA-8129-8C84DB44B84D}" type="datetimeFigureOut">
               <a:rPr lang="en-SG" smtClean="0"/>
-              <a:t>23/5/2019</a:t>
+              <a:t>3/7/19</a:t>
             </a:fld>
             <a:endParaRPr lang="en-SG"/>
           </a:p>
@@ -871,7 +871,7 @@
           <a:p>
             <a:fld id="{BC643CBC-B76F-46AA-8129-8C84DB44B84D}" type="datetimeFigureOut">
               <a:rPr lang="en-SG" smtClean="0"/>
-              <a:t>23/5/2019</a:t>
+              <a:t>3/7/19</a:t>
             </a:fld>
             <a:endParaRPr lang="en-SG"/>
           </a:p>
@@ -1147,7 +1147,7 @@
           <a:p>
             <a:fld id="{BC643CBC-B76F-46AA-8129-8C84DB44B84D}" type="datetimeFigureOut">
               <a:rPr lang="en-SG" smtClean="0"/>
-              <a:t>23/5/2019</a:t>
+              <a:t>3/7/19</a:t>
             </a:fld>
             <a:endParaRPr lang="en-SG"/>
           </a:p>
@@ -1415,7 +1415,7 @@
           <a:p>
             <a:fld id="{BC643CBC-B76F-46AA-8129-8C84DB44B84D}" type="datetimeFigureOut">
               <a:rPr lang="en-SG" smtClean="0"/>
-              <a:t>23/5/2019</a:t>
+              <a:t>3/7/19</a:t>
             </a:fld>
             <a:endParaRPr lang="en-SG"/>
           </a:p>
@@ -1830,7 +1830,7 @@
           <a:p>
             <a:fld id="{BC643CBC-B76F-46AA-8129-8C84DB44B84D}" type="datetimeFigureOut">
               <a:rPr lang="en-SG" smtClean="0"/>
-              <a:t>23/5/2019</a:t>
+              <a:t>3/7/19</a:t>
             </a:fld>
             <a:endParaRPr lang="en-SG"/>
           </a:p>
@@ -1972,7 +1972,7 @@
           <a:p>
             <a:fld id="{BC643CBC-B76F-46AA-8129-8C84DB44B84D}" type="datetimeFigureOut">
               <a:rPr lang="en-SG" smtClean="0"/>
-              <a:t>23/5/2019</a:t>
+              <a:t>3/7/19</a:t>
             </a:fld>
             <a:endParaRPr lang="en-SG"/>
           </a:p>
@@ -2085,7 +2085,7 @@
           <a:p>
             <a:fld id="{BC643CBC-B76F-46AA-8129-8C84DB44B84D}" type="datetimeFigureOut">
               <a:rPr lang="en-SG" smtClean="0"/>
-              <a:t>23/5/2019</a:t>
+              <a:t>3/7/19</a:t>
             </a:fld>
             <a:endParaRPr lang="en-SG"/>
           </a:p>
@@ -2398,7 +2398,7 @@
           <a:p>
             <a:fld id="{BC643CBC-B76F-46AA-8129-8C84DB44B84D}" type="datetimeFigureOut">
               <a:rPr lang="en-SG" smtClean="0"/>
-              <a:t>23/5/2019</a:t>
+              <a:t>3/7/19</a:t>
             </a:fld>
             <a:endParaRPr lang="en-SG"/>
           </a:p>
@@ -2687,7 +2687,7 @@
           <a:p>
             <a:fld id="{BC643CBC-B76F-46AA-8129-8C84DB44B84D}" type="datetimeFigureOut">
               <a:rPr lang="en-SG" smtClean="0"/>
-              <a:t>23/5/2019</a:t>
+              <a:t>3/7/19</a:t>
             </a:fld>
             <a:endParaRPr lang="en-SG"/>
           </a:p>
@@ -2930,7 +2930,7 @@
           <a:p>
             <a:fld id="{BC643CBC-B76F-46AA-8129-8C84DB44B84D}" type="datetimeFigureOut">
               <a:rPr lang="en-SG" smtClean="0"/>
-              <a:t>23/5/2019</a:t>
+              <a:t>3/7/19</a:t>
             </a:fld>
             <a:endParaRPr lang="en-SG"/>
           </a:p>
@@ -3349,10 +3349,10 @@
       </p:grpSpPr>
       <p:pic>
         <p:nvPicPr>
-          <p:cNvPr id="4" name="Picture 3">
-            <a:extLst>
-              <a:ext uri="{FF2B5EF4-FFF2-40B4-BE49-F238E27FC236}">
-                <a16:creationId xmlns:a16="http://schemas.microsoft.com/office/drawing/2014/main" id="{2CD800D6-8C4D-41BE-A540-7C2FE2CEFAB1}"/>
+          <p:cNvPr id="3" name="Picture 2" descr="A screenshot of a cell phone&#10;&#10;Description automatically generated">
+            <a:extLst>
+              <a:ext uri="{FF2B5EF4-FFF2-40B4-BE49-F238E27FC236}">
+                <a16:creationId xmlns:a16="http://schemas.microsoft.com/office/drawing/2014/main" id="{BD7FEA8C-2EBC-CC4B-BC15-0FC6A9779435}"/>
               </a:ext>
             </a:extLst>
           </p:cNvPr>
@@ -3362,15 +3362,21 @@
           <p:nvPr/>
         </p:nvPicPr>
         <p:blipFill>
-          <a:blip r:embed="rId2"/>
+          <a:blip r:embed="rId2">
+            <a:extLst>
+              <a:ext uri="{28A0092B-C50C-407E-A947-70E740481C1C}">
+                <a14:useLocalDpi xmlns:a14="http://schemas.microsoft.com/office/drawing/2010/main" val="0"/>
+              </a:ext>
+            </a:extLst>
+          </a:blip>
           <a:stretch>
             <a:fillRect/>
           </a:stretch>
         </p:blipFill>
         <p:spPr>
           <a:xfrm>
-            <a:off x="1445895" y="814387"/>
-            <a:ext cx="9296400" cy="5229225"/>
+            <a:off x="1447800" y="796318"/>
+            <a:ext cx="9304401" cy="5269897"/>
           </a:xfrm>
           <a:prstGeom prst="rect">
             <a:avLst/>
@@ -3553,7 +3559,7 @@
         </p:nvSpPr>
         <p:spPr>
           <a:xfrm rot="21372755">
-            <a:off x="8367925" y="1652164"/>
+            <a:off x="8429466" y="1857407"/>
             <a:ext cx="402336" cy="121920"/>
           </a:xfrm>
           <a:prstGeom prst="rightArrow">
@@ -3599,7 +3605,7 @@
         </p:nvSpPr>
         <p:spPr>
           <a:xfrm>
-            <a:off x="8753475" y="1537900"/>
+            <a:off x="8790433" y="1735827"/>
             <a:ext cx="836402" cy="276999"/>
           </a:xfrm>
           <a:prstGeom prst="rect">
@@ -3647,8 +3653,8 @@
         </p:nvSpPr>
         <p:spPr>
           <a:xfrm>
-            <a:off x="8929370" y="2599690"/>
-            <a:ext cx="163830" cy="173355"/>
+            <a:off x="8603087" y="3116629"/>
+            <a:ext cx="154341" cy="163314"/>
           </a:xfrm>
           <a:prstGeom prst="ellipse">
             <a:avLst/>
@@ -3701,7 +3707,7 @@
         </p:nvSpPr>
         <p:spPr>
           <a:xfrm>
-            <a:off x="9237863" y="2303005"/>
+            <a:off x="8777222" y="2719565"/>
             <a:ext cx="921278" cy="276999"/>
           </a:xfrm>
           <a:prstGeom prst="rect">
@@ -3745,8 +3751,8 @@
         </p:nvSpPr>
         <p:spPr>
           <a:xfrm>
-            <a:off x="8753475" y="2595880"/>
-            <a:ext cx="163830" cy="175260"/>
+            <a:off x="8448746" y="3115227"/>
+            <a:ext cx="154341" cy="165109"/>
           </a:xfrm>
           <a:prstGeom prst="ellipse">
             <a:avLst/>
@@ -3799,7 +3805,7 @@
         </p:nvSpPr>
         <p:spPr>
           <a:xfrm rot="19492286">
-            <a:off x="9090416" y="2521203"/>
+            <a:off x="8747796" y="2993386"/>
             <a:ext cx="236436" cy="97790"/>
           </a:xfrm>
           <a:prstGeom prst="rightArrow">
@@ -3844,8 +3850,8 @@
           <p:nvPr/>
         </p:nvSpPr>
         <p:spPr>
-          <a:xfrm rot="13469073">
-            <a:off x="8626401" y="2489612"/>
+          <a:xfrm rot="18900000">
+            <a:off x="8286583" y="3318450"/>
             <a:ext cx="158874" cy="97790"/>
           </a:xfrm>
           <a:prstGeom prst="rightArrow">
@@ -3891,7 +3897,7 @@
         </p:nvSpPr>
         <p:spPr>
           <a:xfrm>
-            <a:off x="8079281" y="2244665"/>
+            <a:off x="7475403" y="3406828"/>
             <a:ext cx="973343" cy="276999"/>
           </a:xfrm>
           <a:prstGeom prst="rect">
@@ -4130,7 +4136,7 @@
         </p:nvSpPr>
         <p:spPr>
           <a:xfrm>
-            <a:off x="2164080" y="2661285"/>
+            <a:off x="2464522" y="2454206"/>
             <a:ext cx="142875" cy="133350"/>
           </a:xfrm>
           <a:prstGeom prst="ellipse">
@@ -4184,7 +4190,7 @@
         </p:nvSpPr>
         <p:spPr>
           <a:xfrm rot="21204583">
-            <a:off x="2315664" y="2678721"/>
+            <a:off x="2661847" y="2453845"/>
             <a:ext cx="142378" cy="66676"/>
           </a:xfrm>
           <a:prstGeom prst="rightArrow">
@@ -4230,7 +4236,7 @@
         </p:nvSpPr>
         <p:spPr>
           <a:xfrm>
-            <a:off x="2407539" y="2570098"/>
+            <a:off x="2760090" y="2361561"/>
             <a:ext cx="1400175" cy="246221"/>
           </a:xfrm>
           <a:prstGeom prst="rect">
@@ -4274,8 +4280,8 @@
         </p:nvSpPr>
         <p:spPr>
           <a:xfrm>
-            <a:off x="2032635" y="3209925"/>
-            <a:ext cx="142875" cy="133350"/>
+            <a:off x="2230032" y="3000667"/>
+            <a:ext cx="130499" cy="133350"/>
           </a:xfrm>
           <a:prstGeom prst="ellipse">
             <a:avLst/>
@@ -4328,7 +4334,7 @@
         </p:nvSpPr>
         <p:spPr>
           <a:xfrm>
-            <a:off x="2146935" y="3152775"/>
+            <a:off x="2281147" y="2943385"/>
             <a:ext cx="243840" cy="62865"/>
           </a:xfrm>
           <a:prstGeom prst="bentArrow">
@@ -4383,7 +4389,7 @@
         </p:nvSpPr>
         <p:spPr>
           <a:xfrm>
-            <a:off x="2319337" y="3059213"/>
+            <a:off x="2493500" y="2870443"/>
             <a:ext cx="1902143" cy="246221"/>
           </a:xfrm>
           <a:prstGeom prst="rect">
@@ -4481,8 +4487,8 @@
         </p:nvSpPr>
         <p:spPr>
           <a:xfrm>
-            <a:off x="1536192" y="2079693"/>
-            <a:ext cx="4334256" cy="441971"/>
+            <a:off x="1504949" y="2067663"/>
+            <a:ext cx="4482463" cy="276999"/>
           </a:xfrm>
           <a:prstGeom prst="rect">
             <a:avLst/>
@@ -4535,8 +4541,8 @@
         </p:nvSpPr>
         <p:spPr>
           <a:xfrm>
-            <a:off x="1188140" y="2194560"/>
-            <a:ext cx="348052" cy="327104"/>
+            <a:off x="1098796" y="2084176"/>
+            <a:ext cx="348052" cy="237053"/>
           </a:xfrm>
           <a:prstGeom prst="leftBrace">
             <a:avLst/>
@@ -4584,7 +4590,7 @@
         </p:nvSpPr>
         <p:spPr>
           <a:xfrm>
-            <a:off x="478481" y="2134215"/>
+            <a:off x="460520" y="1991112"/>
             <a:ext cx="723900" cy="461665"/>
           </a:xfrm>
           <a:prstGeom prst="rect">
@@ -4626,8 +4632,8 @@
         </p:nvCxnSpPr>
         <p:spPr>
           <a:xfrm flipV="1">
-            <a:off x="4456176" y="2012826"/>
-            <a:ext cx="361188" cy="352222"/>
+            <a:off x="4181285" y="3764584"/>
+            <a:ext cx="291556" cy="382919"/>
           </a:xfrm>
           <a:prstGeom prst="straightConnector1">
             <a:avLst/>
@@ -4667,8 +4673,8 @@
         </p:nvCxnSpPr>
         <p:spPr>
           <a:xfrm flipV="1">
-            <a:off x="4931664" y="2012826"/>
-            <a:ext cx="0" cy="352221"/>
+            <a:off x="4623058" y="3764584"/>
+            <a:ext cx="0" cy="389178"/>
           </a:xfrm>
           <a:prstGeom prst="straightConnector1">
             <a:avLst/>
@@ -4708,8 +4714,8 @@
         </p:nvCxnSpPr>
         <p:spPr>
           <a:xfrm flipH="1" flipV="1">
-            <a:off x="5032249" y="2012826"/>
-            <a:ext cx="326135" cy="345286"/>
+            <a:off x="4731644" y="3764584"/>
+            <a:ext cx="297080" cy="405596"/>
           </a:xfrm>
           <a:prstGeom prst="straightConnector1">
             <a:avLst/>
@@ -4747,7 +4753,7 @@
         </p:nvSpPr>
         <p:spPr>
           <a:xfrm>
-            <a:off x="4647057" y="1790096"/>
+            <a:off x="4319174" y="3497779"/>
             <a:ext cx="1019826" cy="276999"/>
           </a:xfrm>
           <a:prstGeom prst="rect">
@@ -4791,8 +4797,8 @@
         </p:nvSpPr>
         <p:spPr>
           <a:xfrm>
-            <a:off x="1504950" y="3608069"/>
-            <a:ext cx="1733550" cy="96793"/>
+            <a:off x="1526181" y="3880858"/>
+            <a:ext cx="4482462" cy="96793"/>
           </a:xfrm>
           <a:prstGeom prst="rect">
             <a:avLst/>
@@ -4845,7 +4851,7 @@
         </p:nvSpPr>
         <p:spPr>
           <a:xfrm>
-            <a:off x="1146992" y="3608068"/>
+            <a:off x="1133943" y="3880858"/>
             <a:ext cx="348052" cy="96793"/>
           </a:xfrm>
           <a:prstGeom prst="leftArrow">
@@ -4891,7 +4897,7 @@
         </p:nvSpPr>
         <p:spPr>
           <a:xfrm>
-            <a:off x="187670" y="3425631"/>
+            <a:off x="181614" y="3716589"/>
             <a:ext cx="1014711" cy="461665"/>
           </a:xfrm>
           <a:prstGeom prst="rect">
@@ -4928,8 +4934,8 @@
         </p:nvSpPr>
         <p:spPr>
           <a:xfrm>
-            <a:off x="6202680" y="1564729"/>
-            <a:ext cx="2151751" cy="349415"/>
+            <a:off x="6202680" y="1861062"/>
+            <a:ext cx="2151751" cy="276999"/>
           </a:xfrm>
           <a:prstGeom prst="rect">
             <a:avLst/>

</xml_diff>

<commit_message>
[#312] CodeView: reduce space taken by toggle icon (#773)
The toggle icon that separates between untouched and touched code 
segments within the CodeView takes up significant amount of extra space.

The extra white space causes the code to be in a different layout than 
its actual layout.

Let's place the toggle icon on the side of the code to not disrupt the 
layout of the code while saving the extra space taken by the current
toggle icon.
</commit_message>
<xml_diff>
--- a/docs/diagrams/report-features.pptx
+++ b/docs/diagrams/report-features.pptx
@@ -261,7 +261,7 @@
           <a:p>
             <a:fld id="{BC643CBC-B76F-46AA-8129-8C84DB44B84D}" type="datetimeFigureOut">
               <a:rPr lang="en-SG" smtClean="0"/>
-              <a:t>23/5/2019</a:t>
+              <a:t>3/7/19</a:t>
             </a:fld>
             <a:endParaRPr lang="en-SG"/>
           </a:p>
@@ -461,7 +461,7 @@
           <a:p>
             <a:fld id="{BC643CBC-B76F-46AA-8129-8C84DB44B84D}" type="datetimeFigureOut">
               <a:rPr lang="en-SG" smtClean="0"/>
-              <a:t>23/5/2019</a:t>
+              <a:t>3/7/19</a:t>
             </a:fld>
             <a:endParaRPr lang="en-SG"/>
           </a:p>
@@ -671,7 +671,7 @@
           <a:p>
             <a:fld id="{BC643CBC-B76F-46AA-8129-8C84DB44B84D}" type="datetimeFigureOut">
               <a:rPr lang="en-SG" smtClean="0"/>
-              <a:t>23/5/2019</a:t>
+              <a:t>3/7/19</a:t>
             </a:fld>
             <a:endParaRPr lang="en-SG"/>
           </a:p>
@@ -871,7 +871,7 @@
           <a:p>
             <a:fld id="{BC643CBC-B76F-46AA-8129-8C84DB44B84D}" type="datetimeFigureOut">
               <a:rPr lang="en-SG" smtClean="0"/>
-              <a:t>23/5/2019</a:t>
+              <a:t>3/7/19</a:t>
             </a:fld>
             <a:endParaRPr lang="en-SG"/>
           </a:p>
@@ -1147,7 +1147,7 @@
           <a:p>
             <a:fld id="{BC643CBC-B76F-46AA-8129-8C84DB44B84D}" type="datetimeFigureOut">
               <a:rPr lang="en-SG" smtClean="0"/>
-              <a:t>23/5/2019</a:t>
+              <a:t>3/7/19</a:t>
             </a:fld>
             <a:endParaRPr lang="en-SG"/>
           </a:p>
@@ -1415,7 +1415,7 @@
           <a:p>
             <a:fld id="{BC643CBC-B76F-46AA-8129-8C84DB44B84D}" type="datetimeFigureOut">
               <a:rPr lang="en-SG" smtClean="0"/>
-              <a:t>23/5/2019</a:t>
+              <a:t>3/7/19</a:t>
             </a:fld>
             <a:endParaRPr lang="en-SG"/>
           </a:p>
@@ -1830,7 +1830,7 @@
           <a:p>
             <a:fld id="{BC643CBC-B76F-46AA-8129-8C84DB44B84D}" type="datetimeFigureOut">
               <a:rPr lang="en-SG" smtClean="0"/>
-              <a:t>23/5/2019</a:t>
+              <a:t>3/7/19</a:t>
             </a:fld>
             <a:endParaRPr lang="en-SG"/>
           </a:p>
@@ -1972,7 +1972,7 @@
           <a:p>
             <a:fld id="{BC643CBC-B76F-46AA-8129-8C84DB44B84D}" type="datetimeFigureOut">
               <a:rPr lang="en-SG" smtClean="0"/>
-              <a:t>23/5/2019</a:t>
+              <a:t>3/7/19</a:t>
             </a:fld>
             <a:endParaRPr lang="en-SG"/>
           </a:p>
@@ -2085,7 +2085,7 @@
           <a:p>
             <a:fld id="{BC643CBC-B76F-46AA-8129-8C84DB44B84D}" type="datetimeFigureOut">
               <a:rPr lang="en-SG" smtClean="0"/>
-              <a:t>23/5/2019</a:t>
+              <a:t>3/7/19</a:t>
             </a:fld>
             <a:endParaRPr lang="en-SG"/>
           </a:p>
@@ -2398,7 +2398,7 @@
           <a:p>
             <a:fld id="{BC643CBC-B76F-46AA-8129-8C84DB44B84D}" type="datetimeFigureOut">
               <a:rPr lang="en-SG" smtClean="0"/>
-              <a:t>23/5/2019</a:t>
+              <a:t>3/7/19</a:t>
             </a:fld>
             <a:endParaRPr lang="en-SG"/>
           </a:p>
@@ -2687,7 +2687,7 @@
           <a:p>
             <a:fld id="{BC643CBC-B76F-46AA-8129-8C84DB44B84D}" type="datetimeFigureOut">
               <a:rPr lang="en-SG" smtClean="0"/>
-              <a:t>23/5/2019</a:t>
+              <a:t>3/7/19</a:t>
             </a:fld>
             <a:endParaRPr lang="en-SG"/>
           </a:p>
@@ -2930,7 +2930,7 @@
           <a:p>
             <a:fld id="{BC643CBC-B76F-46AA-8129-8C84DB44B84D}" type="datetimeFigureOut">
               <a:rPr lang="en-SG" smtClean="0"/>
-              <a:t>23/5/2019</a:t>
+              <a:t>3/7/19</a:t>
             </a:fld>
             <a:endParaRPr lang="en-SG"/>
           </a:p>
@@ -3349,10 +3349,10 @@
       </p:grpSpPr>
       <p:pic>
         <p:nvPicPr>
-          <p:cNvPr id="4" name="Picture 3">
-            <a:extLst>
-              <a:ext uri="{FF2B5EF4-FFF2-40B4-BE49-F238E27FC236}">
-                <a16:creationId xmlns:a16="http://schemas.microsoft.com/office/drawing/2014/main" id="{2CD800D6-8C4D-41BE-A540-7C2FE2CEFAB1}"/>
+          <p:cNvPr id="3" name="Picture 2" descr="A screenshot of a cell phone&#10;&#10;Description automatically generated">
+            <a:extLst>
+              <a:ext uri="{FF2B5EF4-FFF2-40B4-BE49-F238E27FC236}">
+                <a16:creationId xmlns:a16="http://schemas.microsoft.com/office/drawing/2014/main" id="{BD7FEA8C-2EBC-CC4B-BC15-0FC6A9779435}"/>
               </a:ext>
             </a:extLst>
           </p:cNvPr>
@@ -3362,15 +3362,21 @@
           <p:nvPr/>
         </p:nvPicPr>
         <p:blipFill>
-          <a:blip r:embed="rId2"/>
+          <a:blip r:embed="rId2">
+            <a:extLst>
+              <a:ext uri="{28A0092B-C50C-407E-A947-70E740481C1C}">
+                <a14:useLocalDpi xmlns:a14="http://schemas.microsoft.com/office/drawing/2010/main" val="0"/>
+              </a:ext>
+            </a:extLst>
+          </a:blip>
           <a:stretch>
             <a:fillRect/>
           </a:stretch>
         </p:blipFill>
         <p:spPr>
           <a:xfrm>
-            <a:off x="1445895" y="814387"/>
-            <a:ext cx="9296400" cy="5229225"/>
+            <a:off x="1447800" y="796318"/>
+            <a:ext cx="9304401" cy="5269897"/>
           </a:xfrm>
           <a:prstGeom prst="rect">
             <a:avLst/>
@@ -3553,7 +3559,7 @@
         </p:nvSpPr>
         <p:spPr>
           <a:xfrm rot="21372755">
-            <a:off x="8367925" y="1652164"/>
+            <a:off x="8429466" y="1857407"/>
             <a:ext cx="402336" cy="121920"/>
           </a:xfrm>
           <a:prstGeom prst="rightArrow">
@@ -3599,7 +3605,7 @@
         </p:nvSpPr>
         <p:spPr>
           <a:xfrm>
-            <a:off x="8753475" y="1537900"/>
+            <a:off x="8790433" y="1735827"/>
             <a:ext cx="836402" cy="276999"/>
           </a:xfrm>
           <a:prstGeom prst="rect">
@@ -3647,8 +3653,8 @@
         </p:nvSpPr>
         <p:spPr>
           <a:xfrm>
-            <a:off x="8929370" y="2599690"/>
-            <a:ext cx="163830" cy="173355"/>
+            <a:off x="8603087" y="3116629"/>
+            <a:ext cx="154341" cy="163314"/>
           </a:xfrm>
           <a:prstGeom prst="ellipse">
             <a:avLst/>
@@ -3701,7 +3707,7 @@
         </p:nvSpPr>
         <p:spPr>
           <a:xfrm>
-            <a:off x="9237863" y="2303005"/>
+            <a:off x="8777222" y="2719565"/>
             <a:ext cx="921278" cy="276999"/>
           </a:xfrm>
           <a:prstGeom prst="rect">
@@ -3745,8 +3751,8 @@
         </p:nvSpPr>
         <p:spPr>
           <a:xfrm>
-            <a:off x="8753475" y="2595880"/>
-            <a:ext cx="163830" cy="175260"/>
+            <a:off x="8448746" y="3115227"/>
+            <a:ext cx="154341" cy="165109"/>
           </a:xfrm>
           <a:prstGeom prst="ellipse">
             <a:avLst/>
@@ -3799,7 +3805,7 @@
         </p:nvSpPr>
         <p:spPr>
           <a:xfrm rot="19492286">
-            <a:off x="9090416" y="2521203"/>
+            <a:off x="8747796" y="2993386"/>
             <a:ext cx="236436" cy="97790"/>
           </a:xfrm>
           <a:prstGeom prst="rightArrow">
@@ -3844,8 +3850,8 @@
           <p:nvPr/>
         </p:nvSpPr>
         <p:spPr>
-          <a:xfrm rot="13469073">
-            <a:off x="8626401" y="2489612"/>
+          <a:xfrm rot="18900000">
+            <a:off x="8286583" y="3318450"/>
             <a:ext cx="158874" cy="97790"/>
           </a:xfrm>
           <a:prstGeom prst="rightArrow">
@@ -3891,7 +3897,7 @@
         </p:nvSpPr>
         <p:spPr>
           <a:xfrm>
-            <a:off x="8079281" y="2244665"/>
+            <a:off x="7475403" y="3406828"/>
             <a:ext cx="973343" cy="276999"/>
           </a:xfrm>
           <a:prstGeom prst="rect">
@@ -4130,7 +4136,7 @@
         </p:nvSpPr>
         <p:spPr>
           <a:xfrm>
-            <a:off x="2164080" y="2661285"/>
+            <a:off x="2464522" y="2454206"/>
             <a:ext cx="142875" cy="133350"/>
           </a:xfrm>
           <a:prstGeom prst="ellipse">
@@ -4184,7 +4190,7 @@
         </p:nvSpPr>
         <p:spPr>
           <a:xfrm rot="21204583">
-            <a:off x="2315664" y="2678721"/>
+            <a:off x="2661847" y="2453845"/>
             <a:ext cx="142378" cy="66676"/>
           </a:xfrm>
           <a:prstGeom prst="rightArrow">
@@ -4230,7 +4236,7 @@
         </p:nvSpPr>
         <p:spPr>
           <a:xfrm>
-            <a:off x="2407539" y="2570098"/>
+            <a:off x="2760090" y="2361561"/>
             <a:ext cx="1400175" cy="246221"/>
           </a:xfrm>
           <a:prstGeom prst="rect">
@@ -4274,8 +4280,8 @@
         </p:nvSpPr>
         <p:spPr>
           <a:xfrm>
-            <a:off x="2032635" y="3209925"/>
-            <a:ext cx="142875" cy="133350"/>
+            <a:off x="2230032" y="3000667"/>
+            <a:ext cx="130499" cy="133350"/>
           </a:xfrm>
           <a:prstGeom prst="ellipse">
             <a:avLst/>
@@ -4328,7 +4334,7 @@
         </p:nvSpPr>
         <p:spPr>
           <a:xfrm>
-            <a:off x="2146935" y="3152775"/>
+            <a:off x="2281147" y="2943385"/>
             <a:ext cx="243840" cy="62865"/>
           </a:xfrm>
           <a:prstGeom prst="bentArrow">
@@ -4383,7 +4389,7 @@
         </p:nvSpPr>
         <p:spPr>
           <a:xfrm>
-            <a:off x="2319337" y="3059213"/>
+            <a:off x="2493500" y="2870443"/>
             <a:ext cx="1902143" cy="246221"/>
           </a:xfrm>
           <a:prstGeom prst="rect">
@@ -4481,8 +4487,8 @@
         </p:nvSpPr>
         <p:spPr>
           <a:xfrm>
-            <a:off x="1536192" y="2079693"/>
-            <a:ext cx="4334256" cy="441971"/>
+            <a:off x="1504949" y="2067663"/>
+            <a:ext cx="4482463" cy="276999"/>
           </a:xfrm>
           <a:prstGeom prst="rect">
             <a:avLst/>
@@ -4535,8 +4541,8 @@
         </p:nvSpPr>
         <p:spPr>
           <a:xfrm>
-            <a:off x="1188140" y="2194560"/>
-            <a:ext cx="348052" cy="327104"/>
+            <a:off x="1098796" y="2084176"/>
+            <a:ext cx="348052" cy="237053"/>
           </a:xfrm>
           <a:prstGeom prst="leftBrace">
             <a:avLst/>
@@ -4584,7 +4590,7 @@
         </p:nvSpPr>
         <p:spPr>
           <a:xfrm>
-            <a:off x="478481" y="2134215"/>
+            <a:off x="460520" y="1991112"/>
             <a:ext cx="723900" cy="461665"/>
           </a:xfrm>
           <a:prstGeom prst="rect">
@@ -4626,8 +4632,8 @@
         </p:nvCxnSpPr>
         <p:spPr>
           <a:xfrm flipV="1">
-            <a:off x="4456176" y="2012826"/>
-            <a:ext cx="361188" cy="352222"/>
+            <a:off x="4181285" y="3764584"/>
+            <a:ext cx="291556" cy="382919"/>
           </a:xfrm>
           <a:prstGeom prst="straightConnector1">
             <a:avLst/>
@@ -4667,8 +4673,8 @@
         </p:nvCxnSpPr>
         <p:spPr>
           <a:xfrm flipV="1">
-            <a:off x="4931664" y="2012826"/>
-            <a:ext cx="0" cy="352221"/>
+            <a:off x="4623058" y="3764584"/>
+            <a:ext cx="0" cy="389178"/>
           </a:xfrm>
           <a:prstGeom prst="straightConnector1">
             <a:avLst/>
@@ -4708,8 +4714,8 @@
         </p:nvCxnSpPr>
         <p:spPr>
           <a:xfrm flipH="1" flipV="1">
-            <a:off x="5032249" y="2012826"/>
-            <a:ext cx="326135" cy="345286"/>
+            <a:off x="4731644" y="3764584"/>
+            <a:ext cx="297080" cy="405596"/>
           </a:xfrm>
           <a:prstGeom prst="straightConnector1">
             <a:avLst/>
@@ -4747,7 +4753,7 @@
         </p:nvSpPr>
         <p:spPr>
           <a:xfrm>
-            <a:off x="4647057" y="1790096"/>
+            <a:off x="4319174" y="3497779"/>
             <a:ext cx="1019826" cy="276999"/>
           </a:xfrm>
           <a:prstGeom prst="rect">
@@ -4791,8 +4797,8 @@
         </p:nvSpPr>
         <p:spPr>
           <a:xfrm>
-            <a:off x="1504950" y="3608069"/>
-            <a:ext cx="1733550" cy="96793"/>
+            <a:off x="1526181" y="3880858"/>
+            <a:ext cx="4482462" cy="96793"/>
           </a:xfrm>
           <a:prstGeom prst="rect">
             <a:avLst/>
@@ -4845,7 +4851,7 @@
         </p:nvSpPr>
         <p:spPr>
           <a:xfrm>
-            <a:off x="1146992" y="3608068"/>
+            <a:off x="1133943" y="3880858"/>
             <a:ext cx="348052" cy="96793"/>
           </a:xfrm>
           <a:prstGeom prst="leftArrow">
@@ -4891,7 +4897,7 @@
         </p:nvSpPr>
         <p:spPr>
           <a:xfrm>
-            <a:off x="187670" y="3425631"/>
+            <a:off x="181614" y="3716589"/>
             <a:ext cx="1014711" cy="461665"/>
           </a:xfrm>
           <a:prstGeom prst="rect">
@@ -4928,8 +4934,8 @@
         </p:nvSpPr>
         <p:spPr>
           <a:xfrm>
-            <a:off x="6202680" y="1564729"/>
-            <a:ext cx="2151751" cy="349415"/>
+            <a:off x="6202680" y="1861062"/>
+            <a:ext cx="2151751" cy="276999"/>
           </a:xfrm>
           <a:prstGeom prst="rect">
             <a:avLst/>

</xml_diff>

<commit_message>
Update DG and images
</commit_message>
<xml_diff>
--- a/docs/diagrams/report-features.pptx
+++ b/docs/diagrams/report-features.pptx
@@ -262,7 +262,7 @@
           <a:p>
             <a:fld id="{BC643CBC-B76F-46AA-8129-8C84DB44B84D}" type="datetimeFigureOut">
               <a:rPr lang="en-SG" smtClean="0"/>
-              <a:t>24/7/2019</a:t>
+              <a:t>29/7/2019</a:t>
             </a:fld>
             <a:endParaRPr lang="en-SG"/>
           </a:p>
@@ -462,7 +462,7 @@
           <a:p>
             <a:fld id="{BC643CBC-B76F-46AA-8129-8C84DB44B84D}" type="datetimeFigureOut">
               <a:rPr lang="en-SG" smtClean="0"/>
-              <a:t>24/7/2019</a:t>
+              <a:t>29/7/2019</a:t>
             </a:fld>
             <a:endParaRPr lang="en-SG"/>
           </a:p>
@@ -672,7 +672,7 @@
           <a:p>
             <a:fld id="{BC643CBC-B76F-46AA-8129-8C84DB44B84D}" type="datetimeFigureOut">
               <a:rPr lang="en-SG" smtClean="0"/>
-              <a:t>24/7/2019</a:t>
+              <a:t>29/7/2019</a:t>
             </a:fld>
             <a:endParaRPr lang="en-SG"/>
           </a:p>
@@ -872,7 +872,7 @@
           <a:p>
             <a:fld id="{BC643CBC-B76F-46AA-8129-8C84DB44B84D}" type="datetimeFigureOut">
               <a:rPr lang="en-SG" smtClean="0"/>
-              <a:t>24/7/2019</a:t>
+              <a:t>29/7/2019</a:t>
             </a:fld>
             <a:endParaRPr lang="en-SG"/>
           </a:p>
@@ -1148,7 +1148,7 @@
           <a:p>
             <a:fld id="{BC643CBC-B76F-46AA-8129-8C84DB44B84D}" type="datetimeFigureOut">
               <a:rPr lang="en-SG" smtClean="0"/>
-              <a:t>24/7/2019</a:t>
+              <a:t>29/7/2019</a:t>
             </a:fld>
             <a:endParaRPr lang="en-SG"/>
           </a:p>
@@ -1416,7 +1416,7 @@
           <a:p>
             <a:fld id="{BC643CBC-B76F-46AA-8129-8C84DB44B84D}" type="datetimeFigureOut">
               <a:rPr lang="en-SG" smtClean="0"/>
-              <a:t>24/7/2019</a:t>
+              <a:t>29/7/2019</a:t>
             </a:fld>
             <a:endParaRPr lang="en-SG"/>
           </a:p>
@@ -1831,7 +1831,7 @@
           <a:p>
             <a:fld id="{BC643CBC-B76F-46AA-8129-8C84DB44B84D}" type="datetimeFigureOut">
               <a:rPr lang="en-SG" smtClean="0"/>
-              <a:t>24/7/2019</a:t>
+              <a:t>29/7/2019</a:t>
             </a:fld>
             <a:endParaRPr lang="en-SG"/>
           </a:p>
@@ -1973,7 +1973,7 @@
           <a:p>
             <a:fld id="{BC643CBC-B76F-46AA-8129-8C84DB44B84D}" type="datetimeFigureOut">
               <a:rPr lang="en-SG" smtClean="0"/>
-              <a:t>24/7/2019</a:t>
+              <a:t>29/7/2019</a:t>
             </a:fld>
             <a:endParaRPr lang="en-SG"/>
           </a:p>
@@ -2086,7 +2086,7 @@
           <a:p>
             <a:fld id="{BC643CBC-B76F-46AA-8129-8C84DB44B84D}" type="datetimeFigureOut">
               <a:rPr lang="en-SG" smtClean="0"/>
-              <a:t>24/7/2019</a:t>
+              <a:t>29/7/2019</a:t>
             </a:fld>
             <a:endParaRPr lang="en-SG"/>
           </a:p>
@@ -2399,7 +2399,7 @@
           <a:p>
             <a:fld id="{BC643CBC-B76F-46AA-8129-8C84DB44B84D}" type="datetimeFigureOut">
               <a:rPr lang="en-SG" smtClean="0"/>
-              <a:t>24/7/2019</a:t>
+              <a:t>29/7/2019</a:t>
             </a:fld>
             <a:endParaRPr lang="en-SG"/>
           </a:p>
@@ -2688,7 +2688,7 @@
           <a:p>
             <a:fld id="{BC643CBC-B76F-46AA-8129-8C84DB44B84D}" type="datetimeFigureOut">
               <a:rPr lang="en-SG" smtClean="0"/>
-              <a:t>24/7/2019</a:t>
+              <a:t>29/7/2019</a:t>
             </a:fld>
             <a:endParaRPr lang="en-SG"/>
           </a:p>
@@ -2931,7 +2931,7 @@
           <a:p>
             <a:fld id="{BC643CBC-B76F-46AA-8129-8C84DB44B84D}" type="datetimeFigureOut">
               <a:rPr lang="en-SG" smtClean="0"/>
-              <a:t>24/7/2019</a:t>
+              <a:t>29/7/2019</a:t>
             </a:fld>
             <a:endParaRPr lang="en-SG"/>
           </a:p>
@@ -3348,36 +3348,155 @@
           <a:chExt cx="0" cy="0"/>
         </a:xfrm>
       </p:grpSpPr>
-      <p:pic>
-        <p:nvPicPr>
-          <p:cNvPr id="51" name="Picture 50">
-            <a:extLst>
-              <a:ext uri="{FF2B5EF4-FFF2-40B4-BE49-F238E27FC236}">
-                <a16:creationId xmlns:a16="http://schemas.microsoft.com/office/drawing/2014/main" id="{43940CE2-443C-4D03-B021-D0729CD68F89}"/>
-              </a:ext>
-            </a:extLst>
-          </p:cNvPr>
-          <p:cNvPicPr>
-            <a:picLocks noChangeAspect="1"/>
-          </p:cNvPicPr>
+      <p:grpSp>
+        <p:nvGrpSpPr>
+          <p:cNvPr id="3" name="Group 2">
+            <a:extLst>
+              <a:ext uri="{FF2B5EF4-FFF2-40B4-BE49-F238E27FC236}">
+                <a16:creationId xmlns:a16="http://schemas.microsoft.com/office/drawing/2014/main" id="{39C8E79E-29B9-4920-9818-61F14E57D617}"/>
+              </a:ext>
+            </a:extLst>
+          </p:cNvPr>
+          <p:cNvGrpSpPr/>
           <p:nvPr/>
-        </p:nvPicPr>
-        <p:blipFill>
-          <a:blip r:embed="rId2"/>
-          <a:stretch>
-            <a:fillRect/>
-          </a:stretch>
-        </p:blipFill>
-        <p:spPr>
+        </p:nvGrpSpPr>
+        <p:grpSpPr>
           <a:xfrm>
             <a:off x="1491428" y="841241"/>
             <a:ext cx="9201025" cy="5175576"/>
+            <a:chOff x="1491428" y="841241"/>
+            <a:chExt cx="9201025" cy="5175576"/>
           </a:xfrm>
-          <a:prstGeom prst="rect">
-            <a:avLst/>
-          </a:prstGeom>
-        </p:spPr>
-      </p:pic>
+        </p:grpSpPr>
+        <p:pic>
+          <p:nvPicPr>
+            <p:cNvPr id="51" name="Picture 50">
+              <a:extLst>
+                <a:ext uri="{FF2B5EF4-FFF2-40B4-BE49-F238E27FC236}">
+                  <a16:creationId xmlns:a16="http://schemas.microsoft.com/office/drawing/2014/main" id="{43940CE2-443C-4D03-B021-D0729CD68F89}"/>
+                </a:ext>
+              </a:extLst>
+            </p:cNvPr>
+            <p:cNvPicPr>
+              <a:picLocks noChangeAspect="1"/>
+            </p:cNvPicPr>
+            <p:nvPr/>
+          </p:nvPicPr>
+          <p:blipFill>
+            <a:blip r:embed="rId2"/>
+            <a:stretch>
+              <a:fillRect/>
+            </a:stretch>
+          </p:blipFill>
+          <p:spPr>
+            <a:xfrm>
+              <a:off x="1491428" y="841241"/>
+              <a:ext cx="9201025" cy="5175576"/>
+            </a:xfrm>
+            <a:prstGeom prst="rect">
+              <a:avLst/>
+            </a:prstGeom>
+          </p:spPr>
+        </p:pic>
+        <p:sp>
+          <p:nvSpPr>
+            <p:cNvPr id="44" name="TextBox 43">
+              <a:extLst>
+                <a:ext uri="{FF2B5EF4-FFF2-40B4-BE49-F238E27FC236}">
+                  <a16:creationId xmlns:a16="http://schemas.microsoft.com/office/drawing/2014/main" id="{4DB4692F-5627-4F26-AA17-560705B6CBA1}"/>
+                </a:ext>
+              </a:extLst>
+            </p:cNvPr>
+            <p:cNvSpPr txBox="1"/>
+            <p:nvPr/>
+          </p:nvSpPr>
+          <p:spPr>
+            <a:xfrm>
+              <a:off x="3946269" y="5051399"/>
+              <a:ext cx="1019826" cy="276999"/>
+            </a:xfrm>
+            <a:prstGeom prst="rect">
+              <a:avLst/>
+            </a:prstGeom>
+            <a:noFill/>
+          </p:spPr>
+          <p:txBody>
+            <a:bodyPr wrap="square" rtlCol="0">
+              <a:spAutoFit/>
+            </a:bodyPr>
+            <a:lstStyle/>
+            <a:p>
+              <a:r>
+                <a:rPr lang="en-US" sz="1200" dirty="0">
+                  <a:solidFill>
+                    <a:schemeClr val="accent1"/>
+                  </a:solidFill>
+                </a:rPr>
+                <a:t>Ramps</a:t>
+              </a:r>
+              <a:endParaRPr lang="en-SG" sz="1200" dirty="0">
+                <a:solidFill>
+                  <a:schemeClr val="accent1"/>
+                </a:solidFill>
+              </a:endParaRPr>
+            </a:p>
+          </p:txBody>
+        </p:sp>
+        <p:sp>
+          <p:nvSpPr>
+            <p:cNvPr id="2" name="Oval 1">
+              <a:extLst>
+                <a:ext uri="{FF2B5EF4-FFF2-40B4-BE49-F238E27FC236}">
+                  <a16:creationId xmlns:a16="http://schemas.microsoft.com/office/drawing/2014/main" id="{7CBF2F7E-DF4B-4937-B579-9A5191DFED6B}"/>
+                </a:ext>
+              </a:extLst>
+            </p:cNvPr>
+            <p:cNvSpPr/>
+            <p:nvPr/>
+          </p:nvSpPr>
+          <p:spPr>
+            <a:xfrm>
+              <a:off x="4121944" y="5331619"/>
+              <a:ext cx="161925" cy="342900"/>
+            </a:xfrm>
+            <a:prstGeom prst="ellipse">
+              <a:avLst/>
+            </a:prstGeom>
+            <a:noFill/>
+            <a:ln w="9525" cap="flat" cmpd="sng" algn="ctr">
+              <a:solidFill>
+                <a:schemeClr val="accent1"/>
+              </a:solidFill>
+              <a:prstDash val="solid"/>
+              <a:round/>
+              <a:headEnd type="none" w="med" len="med"/>
+              <a:tailEnd type="none" w="med" len="med"/>
+            </a:ln>
+          </p:spPr>
+          <p:style>
+            <a:lnRef idx="0">
+              <a:scrgbClr r="0" g="0" b="0"/>
+            </a:lnRef>
+            <a:fillRef idx="0">
+              <a:scrgbClr r="0" g="0" b="0"/>
+            </a:fillRef>
+            <a:effectRef idx="0">
+              <a:scrgbClr r="0" g="0" b="0"/>
+            </a:effectRef>
+            <a:fontRef idx="minor">
+              <a:schemeClr val="accent1"/>
+            </a:fontRef>
+          </p:style>
+          <p:txBody>
+            <a:bodyPr rtlCol="0" anchor="ctr"/>
+            <a:lstStyle/>
+            <a:p>
+              <a:pPr algn="ctr"/>
+              <a:endParaRPr lang="en-US"/>
+            </a:p>
+          </p:txBody>
+        </p:sp>
+      </p:grpSp>
       <p:grpSp>
         <p:nvGrpSpPr>
           <p:cNvPr id="40" name="Group 39">
@@ -4681,194 +4800,6 @@
                 </a:rPr>
                 <a:t>Ramp Chart</a:t>
               </a:r>
-            </a:p>
-          </p:txBody>
-        </p:sp>
-      </p:grpSp>
-      <p:grpSp>
-        <p:nvGrpSpPr>
-          <p:cNvPr id="45" name="Group 44">
-            <a:extLst>
-              <a:ext uri="{FF2B5EF4-FFF2-40B4-BE49-F238E27FC236}">
-                <a16:creationId xmlns:a16="http://schemas.microsoft.com/office/drawing/2014/main" id="{A3EDE96A-E762-454E-915E-E31F3E6BD7AB}"/>
-              </a:ext>
-            </a:extLst>
-          </p:cNvPr>
-          <p:cNvGrpSpPr/>
-          <p:nvPr/>
-        </p:nvGrpSpPr>
-        <p:grpSpPr>
-          <a:xfrm>
-            <a:off x="4850928" y="3842053"/>
-            <a:ext cx="1157715" cy="672401"/>
-            <a:chOff x="4181285" y="3497779"/>
-            <a:chExt cx="1157715" cy="672401"/>
-          </a:xfrm>
-        </p:grpSpPr>
-        <p:cxnSp>
-          <p:nvCxnSpPr>
-            <p:cNvPr id="39" name="Straight Arrow Connector 38">
-              <a:extLst>
-                <a:ext uri="{FF2B5EF4-FFF2-40B4-BE49-F238E27FC236}">
-                  <a16:creationId xmlns:a16="http://schemas.microsoft.com/office/drawing/2014/main" id="{B342102E-EAF2-4DC0-B960-4F7846016550}"/>
-                </a:ext>
-              </a:extLst>
-            </p:cNvPr>
-            <p:cNvCxnSpPr>
-              <a:cxnSpLocks/>
-            </p:cNvCxnSpPr>
-            <p:nvPr/>
-          </p:nvCxnSpPr>
-          <p:spPr>
-            <a:xfrm flipV="1">
-              <a:off x="4181285" y="3764584"/>
-              <a:ext cx="291556" cy="382919"/>
-            </a:xfrm>
-            <a:prstGeom prst="straightConnector1">
-              <a:avLst/>
-            </a:prstGeom>
-            <a:ln>
-              <a:tailEnd type="triangle"/>
-            </a:ln>
-          </p:spPr>
-          <p:style>
-            <a:lnRef idx="3">
-              <a:schemeClr val="accent4"/>
-            </a:lnRef>
-            <a:fillRef idx="0">
-              <a:schemeClr val="accent4"/>
-            </a:fillRef>
-            <a:effectRef idx="2">
-              <a:schemeClr val="accent4"/>
-            </a:effectRef>
-            <a:fontRef idx="minor">
-              <a:schemeClr val="tx1"/>
-            </a:fontRef>
-          </p:style>
-        </p:cxnSp>
-        <p:cxnSp>
-          <p:nvCxnSpPr>
-            <p:cNvPr id="41" name="Straight Arrow Connector 40">
-              <a:extLst>
-                <a:ext uri="{FF2B5EF4-FFF2-40B4-BE49-F238E27FC236}">
-                  <a16:creationId xmlns:a16="http://schemas.microsoft.com/office/drawing/2014/main" id="{54A0E17B-CC65-450A-8DA3-6E665798ACA3}"/>
-                </a:ext>
-              </a:extLst>
-            </p:cNvPr>
-            <p:cNvCxnSpPr>
-              <a:cxnSpLocks/>
-            </p:cNvCxnSpPr>
-            <p:nvPr/>
-          </p:nvCxnSpPr>
-          <p:spPr>
-            <a:xfrm flipV="1">
-              <a:off x="4529328" y="3764584"/>
-              <a:ext cx="93730" cy="378010"/>
-            </a:xfrm>
-            <a:prstGeom prst="straightConnector1">
-              <a:avLst/>
-            </a:prstGeom>
-            <a:ln>
-              <a:tailEnd type="triangle"/>
-            </a:ln>
-          </p:spPr>
-          <p:style>
-            <a:lnRef idx="3">
-              <a:schemeClr val="accent4"/>
-            </a:lnRef>
-            <a:fillRef idx="0">
-              <a:schemeClr val="accent4"/>
-            </a:fillRef>
-            <a:effectRef idx="2">
-              <a:schemeClr val="accent4"/>
-            </a:effectRef>
-            <a:fontRef idx="minor">
-              <a:schemeClr val="tx1"/>
-            </a:fontRef>
-          </p:style>
-        </p:cxnSp>
-        <p:cxnSp>
-          <p:nvCxnSpPr>
-            <p:cNvPr id="43" name="Straight Arrow Connector 42">
-              <a:extLst>
-                <a:ext uri="{FF2B5EF4-FFF2-40B4-BE49-F238E27FC236}">
-                  <a16:creationId xmlns:a16="http://schemas.microsoft.com/office/drawing/2014/main" id="{859A842E-D51F-4106-BF0A-90048A2FAC0A}"/>
-                </a:ext>
-              </a:extLst>
-            </p:cNvPr>
-            <p:cNvCxnSpPr>
-              <a:cxnSpLocks/>
-            </p:cNvCxnSpPr>
-            <p:nvPr/>
-          </p:nvCxnSpPr>
-          <p:spPr>
-            <a:xfrm flipH="1" flipV="1">
-              <a:off x="4731644" y="3764584"/>
-              <a:ext cx="297080" cy="405596"/>
-            </a:xfrm>
-            <a:prstGeom prst="straightConnector1">
-              <a:avLst/>
-            </a:prstGeom>
-            <a:ln>
-              <a:tailEnd type="triangle"/>
-            </a:ln>
-          </p:spPr>
-          <p:style>
-            <a:lnRef idx="3">
-              <a:schemeClr val="accent4"/>
-            </a:lnRef>
-            <a:fillRef idx="0">
-              <a:schemeClr val="accent4"/>
-            </a:fillRef>
-            <a:effectRef idx="2">
-              <a:schemeClr val="accent4"/>
-            </a:effectRef>
-            <a:fontRef idx="minor">
-              <a:schemeClr val="tx1"/>
-            </a:fontRef>
-          </p:style>
-        </p:cxnSp>
-        <p:sp>
-          <p:nvSpPr>
-            <p:cNvPr id="44" name="TextBox 43">
-              <a:extLst>
-                <a:ext uri="{FF2B5EF4-FFF2-40B4-BE49-F238E27FC236}">
-                  <a16:creationId xmlns:a16="http://schemas.microsoft.com/office/drawing/2014/main" id="{4DB4692F-5627-4F26-AA17-560705B6CBA1}"/>
-                </a:ext>
-              </a:extLst>
-            </p:cNvPr>
-            <p:cNvSpPr txBox="1"/>
-            <p:nvPr/>
-          </p:nvSpPr>
-          <p:spPr>
-            <a:xfrm>
-              <a:off x="4319174" y="3497779"/>
-              <a:ext cx="1019826" cy="276999"/>
-            </a:xfrm>
-            <a:prstGeom prst="rect">
-              <a:avLst/>
-            </a:prstGeom>
-            <a:noFill/>
-          </p:spPr>
-          <p:txBody>
-            <a:bodyPr wrap="square" rtlCol="0">
-              <a:spAutoFit/>
-            </a:bodyPr>
-            <a:lstStyle/>
-            <a:p>
-              <a:r>
-                <a:rPr lang="en-US" sz="1200" dirty="0">
-                  <a:solidFill>
-                    <a:srgbClr val="FFC000"/>
-                  </a:solidFill>
-                </a:rPr>
-                <a:t>Ramps</a:t>
-              </a:r>
-              <a:endParaRPr lang="en-SG" sz="1200" dirty="0">
-                <a:solidFill>
-                  <a:srgbClr val="FFC000"/>
-                </a:solidFill>
-              </a:endParaRPr>
             </a:p>
           </p:txBody>
         </p:sp>

</xml_diff>

<commit_message>
[#808, #815] Docs: update documentation (#822)
With the recently merged pull requests, UI and behavioral changes in 
the report view are not reflected in the documentation.

Users who want to view an author's codes or expand the codes that 
were untouched by an author, may not understand how to do so as the 
user guide relating to these features is outdated.

Let's update the user guide to reflect the changes made to the summary 
and code panel. Let's also take this chance to update components in  
the developer guide that are outdated and can cause confusion with the 
new developers.
</commit_message>
<xml_diff>
--- a/docs/diagrams/report-features.pptx
+++ b/docs/diagrams/report-features.pptx
@@ -261,7 +261,7 @@
           <a:p>
             <a:fld id="{BC643CBC-B76F-46AA-8129-8C84DB44B84D}" type="datetimeFigureOut">
               <a:rPr lang="en-SG" smtClean="0"/>
-              <a:t>3/7/19</a:t>
+              <a:t>31/7/2019</a:t>
             </a:fld>
             <a:endParaRPr lang="en-SG"/>
           </a:p>
@@ -461,7 +461,7 @@
           <a:p>
             <a:fld id="{BC643CBC-B76F-46AA-8129-8C84DB44B84D}" type="datetimeFigureOut">
               <a:rPr lang="en-SG" smtClean="0"/>
-              <a:t>3/7/19</a:t>
+              <a:t>31/7/2019</a:t>
             </a:fld>
             <a:endParaRPr lang="en-SG"/>
           </a:p>
@@ -671,7 +671,7 @@
           <a:p>
             <a:fld id="{BC643CBC-B76F-46AA-8129-8C84DB44B84D}" type="datetimeFigureOut">
               <a:rPr lang="en-SG" smtClean="0"/>
-              <a:t>3/7/19</a:t>
+              <a:t>31/7/2019</a:t>
             </a:fld>
             <a:endParaRPr lang="en-SG"/>
           </a:p>
@@ -871,7 +871,7 @@
           <a:p>
             <a:fld id="{BC643CBC-B76F-46AA-8129-8C84DB44B84D}" type="datetimeFigureOut">
               <a:rPr lang="en-SG" smtClean="0"/>
-              <a:t>3/7/19</a:t>
+              <a:t>31/7/2019</a:t>
             </a:fld>
             <a:endParaRPr lang="en-SG"/>
           </a:p>
@@ -1147,7 +1147,7 @@
           <a:p>
             <a:fld id="{BC643CBC-B76F-46AA-8129-8C84DB44B84D}" type="datetimeFigureOut">
               <a:rPr lang="en-SG" smtClean="0"/>
-              <a:t>3/7/19</a:t>
+              <a:t>31/7/2019</a:t>
             </a:fld>
             <a:endParaRPr lang="en-SG"/>
           </a:p>
@@ -1415,7 +1415,7 @@
           <a:p>
             <a:fld id="{BC643CBC-B76F-46AA-8129-8C84DB44B84D}" type="datetimeFigureOut">
               <a:rPr lang="en-SG" smtClean="0"/>
-              <a:t>3/7/19</a:t>
+              <a:t>31/7/2019</a:t>
             </a:fld>
             <a:endParaRPr lang="en-SG"/>
           </a:p>
@@ -1830,7 +1830,7 @@
           <a:p>
             <a:fld id="{BC643CBC-B76F-46AA-8129-8C84DB44B84D}" type="datetimeFigureOut">
               <a:rPr lang="en-SG" smtClean="0"/>
-              <a:t>3/7/19</a:t>
+              <a:t>31/7/2019</a:t>
             </a:fld>
             <a:endParaRPr lang="en-SG"/>
           </a:p>
@@ -1972,7 +1972,7 @@
           <a:p>
             <a:fld id="{BC643CBC-B76F-46AA-8129-8C84DB44B84D}" type="datetimeFigureOut">
               <a:rPr lang="en-SG" smtClean="0"/>
-              <a:t>3/7/19</a:t>
+              <a:t>31/7/2019</a:t>
             </a:fld>
             <a:endParaRPr lang="en-SG"/>
           </a:p>
@@ -2085,7 +2085,7 @@
           <a:p>
             <a:fld id="{BC643CBC-B76F-46AA-8129-8C84DB44B84D}" type="datetimeFigureOut">
               <a:rPr lang="en-SG" smtClean="0"/>
-              <a:t>3/7/19</a:t>
+              <a:t>31/7/2019</a:t>
             </a:fld>
             <a:endParaRPr lang="en-SG"/>
           </a:p>
@@ -2398,7 +2398,7 @@
           <a:p>
             <a:fld id="{BC643CBC-B76F-46AA-8129-8C84DB44B84D}" type="datetimeFigureOut">
               <a:rPr lang="en-SG" smtClean="0"/>
-              <a:t>3/7/19</a:t>
+              <a:t>31/7/2019</a:t>
             </a:fld>
             <a:endParaRPr lang="en-SG"/>
           </a:p>
@@ -2687,7 +2687,7 @@
           <a:p>
             <a:fld id="{BC643CBC-B76F-46AA-8129-8C84DB44B84D}" type="datetimeFigureOut">
               <a:rPr lang="en-SG" smtClean="0"/>
-              <a:t>3/7/19</a:t>
+              <a:t>31/7/2019</a:t>
             </a:fld>
             <a:endParaRPr lang="en-SG"/>
           </a:p>
@@ -2930,7 +2930,7 @@
           <a:p>
             <a:fld id="{BC643CBC-B76F-46AA-8129-8C84DB44B84D}" type="datetimeFigureOut">
               <a:rPr lang="en-SG" smtClean="0"/>
-              <a:t>3/7/19</a:t>
+              <a:t>31/7/2019</a:t>
             </a:fld>
             <a:endParaRPr lang="en-SG"/>
           </a:p>
@@ -3349,10 +3349,10 @@
       </p:grpSpPr>
       <p:pic>
         <p:nvPicPr>
-          <p:cNvPr id="3" name="Picture 2" descr="A screenshot of a cell phone&#10;&#10;Description automatically generated">
-            <a:extLst>
-              <a:ext uri="{FF2B5EF4-FFF2-40B4-BE49-F238E27FC236}">
-                <a16:creationId xmlns:a16="http://schemas.microsoft.com/office/drawing/2014/main" id="{BD7FEA8C-2EBC-CC4B-BC15-0FC6A9779435}"/>
+          <p:cNvPr id="47" name="Picture 46">
+            <a:extLst>
+              <a:ext uri="{FF2B5EF4-FFF2-40B4-BE49-F238E27FC236}">
+                <a16:creationId xmlns:a16="http://schemas.microsoft.com/office/drawing/2014/main" id="{93313844-D6A5-4663-BFA6-6614735A1446}"/>
               </a:ext>
             </a:extLst>
           </p:cNvPr>
@@ -3362,1618 +3362,1939 @@
           <p:nvPr/>
         </p:nvPicPr>
         <p:blipFill>
-          <a:blip r:embed="rId2">
-            <a:extLst>
-              <a:ext uri="{28A0092B-C50C-407E-A947-70E740481C1C}">
-                <a14:useLocalDpi xmlns:a14="http://schemas.microsoft.com/office/drawing/2010/main" val="0"/>
-              </a:ext>
-            </a:extLst>
-          </a:blip>
+          <a:blip r:embed="rId2"/>
           <a:stretch>
             <a:fillRect/>
           </a:stretch>
         </p:blipFill>
         <p:spPr>
           <a:xfrm>
-            <a:off x="1447800" y="796318"/>
-            <a:ext cx="9304401" cy="5269897"/>
+            <a:off x="1447797" y="841021"/>
+            <a:ext cx="9268452" cy="5213504"/>
           </a:xfrm>
           <a:prstGeom prst="rect">
             <a:avLst/>
           </a:prstGeom>
         </p:spPr>
       </p:pic>
-      <p:sp>
-        <p:nvSpPr>
-          <p:cNvPr id="8" name="Right Brace 7">
-            <a:extLst>
-              <a:ext uri="{FF2B5EF4-FFF2-40B4-BE49-F238E27FC236}">
-                <a16:creationId xmlns:a16="http://schemas.microsoft.com/office/drawing/2014/main" id="{C05B2C6F-DCA4-45F9-94E5-345EC17842DB}"/>
-              </a:ext>
-            </a:extLst>
-          </p:cNvPr>
-          <p:cNvSpPr/>
+      <p:grpSp>
+        <p:nvGrpSpPr>
+          <p:cNvPr id="4" name="Group 3">
+            <a:extLst>
+              <a:ext uri="{FF2B5EF4-FFF2-40B4-BE49-F238E27FC236}">
+                <a16:creationId xmlns:a16="http://schemas.microsoft.com/office/drawing/2014/main" id="{F0D58C48-0153-4B14-BF07-F967F1B7F730}"/>
+              </a:ext>
+            </a:extLst>
+          </p:cNvPr>
+          <p:cNvGrpSpPr/>
           <p:nvPr/>
-        </p:nvSpPr>
-        <p:spPr>
-          <a:xfrm rot="16200000">
-            <a:off x="3599688" y="-1681925"/>
-            <a:ext cx="344424" cy="4648200"/>
+        </p:nvGrpSpPr>
+        <p:grpSpPr>
+          <a:xfrm>
+            <a:off x="3876419" y="5090769"/>
+            <a:ext cx="1019826" cy="623120"/>
+            <a:chOff x="3946269" y="5051399"/>
+            <a:chExt cx="1019826" cy="623120"/>
           </a:xfrm>
-          <a:prstGeom prst="rightBrace">
-            <a:avLst/>
-          </a:prstGeom>
-        </p:spPr>
-        <p:style>
-          <a:lnRef idx="3">
-            <a:schemeClr val="accent1"/>
-          </a:lnRef>
-          <a:fillRef idx="0">
-            <a:schemeClr val="accent1"/>
-          </a:fillRef>
-          <a:effectRef idx="2">
-            <a:schemeClr val="accent1"/>
-          </a:effectRef>
-          <a:fontRef idx="minor">
-            <a:schemeClr val="tx1"/>
-          </a:fontRef>
-        </p:style>
-        <p:txBody>
-          <a:bodyPr rtlCol="0" anchor="ctr"/>
-          <a:lstStyle/>
-          <a:p>
-            <a:pPr algn="ctr"/>
-            <a:endParaRPr lang="en-SG"/>
-          </a:p>
-        </p:txBody>
-      </p:sp>
-      <p:sp>
-        <p:nvSpPr>
-          <p:cNvPr id="9" name="TextBox 8">
-            <a:extLst>
-              <a:ext uri="{FF2B5EF4-FFF2-40B4-BE49-F238E27FC236}">
-                <a16:creationId xmlns:a16="http://schemas.microsoft.com/office/drawing/2014/main" id="{64E7039B-00EC-4DDC-B348-58F4C75F63AF}"/>
-              </a:ext>
-            </a:extLst>
-          </p:cNvPr>
-          <p:cNvSpPr txBox="1"/>
+        </p:grpSpPr>
+        <p:sp>
+          <p:nvSpPr>
+            <p:cNvPr id="44" name="TextBox 43">
+              <a:extLst>
+                <a:ext uri="{FF2B5EF4-FFF2-40B4-BE49-F238E27FC236}">
+                  <a16:creationId xmlns:a16="http://schemas.microsoft.com/office/drawing/2014/main" id="{4DB4692F-5627-4F26-AA17-560705B6CBA1}"/>
+                </a:ext>
+              </a:extLst>
+            </p:cNvPr>
+            <p:cNvSpPr txBox="1"/>
+            <p:nvPr/>
+          </p:nvSpPr>
+          <p:spPr>
+            <a:xfrm>
+              <a:off x="3946269" y="5051399"/>
+              <a:ext cx="1019826" cy="276999"/>
+            </a:xfrm>
+            <a:prstGeom prst="rect">
+              <a:avLst/>
+            </a:prstGeom>
+            <a:noFill/>
+          </p:spPr>
+          <p:txBody>
+            <a:bodyPr wrap="square" rtlCol="0">
+              <a:spAutoFit/>
+            </a:bodyPr>
+            <a:lstStyle/>
+            <a:p>
+              <a:r>
+                <a:rPr lang="en-US" sz="1200" dirty="0">
+                  <a:solidFill>
+                    <a:schemeClr val="accent1"/>
+                  </a:solidFill>
+                </a:rPr>
+                <a:t>Ramps</a:t>
+              </a:r>
+              <a:endParaRPr lang="en-SG" sz="1200" dirty="0">
+                <a:solidFill>
+                  <a:schemeClr val="accent1"/>
+                </a:solidFill>
+              </a:endParaRPr>
+            </a:p>
+          </p:txBody>
+        </p:sp>
+        <p:sp>
+          <p:nvSpPr>
+            <p:cNvPr id="2" name="Oval 1">
+              <a:extLst>
+                <a:ext uri="{FF2B5EF4-FFF2-40B4-BE49-F238E27FC236}">
+                  <a16:creationId xmlns:a16="http://schemas.microsoft.com/office/drawing/2014/main" id="{7CBF2F7E-DF4B-4937-B579-9A5191DFED6B}"/>
+                </a:ext>
+              </a:extLst>
+            </p:cNvPr>
+            <p:cNvSpPr/>
+            <p:nvPr/>
+          </p:nvSpPr>
+          <p:spPr>
+            <a:xfrm>
+              <a:off x="4121944" y="5331619"/>
+              <a:ext cx="161925" cy="342900"/>
+            </a:xfrm>
+            <a:prstGeom prst="ellipse">
+              <a:avLst/>
+            </a:prstGeom>
+            <a:noFill/>
+            <a:ln w="9525" cap="flat" cmpd="sng" algn="ctr">
+              <a:solidFill>
+                <a:schemeClr val="accent1"/>
+              </a:solidFill>
+              <a:prstDash val="solid"/>
+              <a:round/>
+              <a:headEnd type="none" w="med" len="med"/>
+              <a:tailEnd type="none" w="med" len="med"/>
+            </a:ln>
+          </p:spPr>
+          <p:style>
+            <a:lnRef idx="0">
+              <a:scrgbClr r="0" g="0" b="0"/>
+            </a:lnRef>
+            <a:fillRef idx="0">
+              <a:scrgbClr r="0" g="0" b="0"/>
+            </a:fillRef>
+            <a:effectRef idx="0">
+              <a:scrgbClr r="0" g="0" b="0"/>
+            </a:effectRef>
+            <a:fontRef idx="minor">
+              <a:schemeClr val="accent1"/>
+            </a:fontRef>
+          </p:style>
+          <p:txBody>
+            <a:bodyPr rtlCol="0" anchor="ctr"/>
+            <a:lstStyle/>
+            <a:p>
+              <a:pPr algn="ctr"/>
+              <a:endParaRPr lang="en-US"/>
+            </a:p>
+          </p:txBody>
+        </p:sp>
+      </p:grpSp>
+      <p:grpSp>
+        <p:nvGrpSpPr>
+          <p:cNvPr id="40" name="Group 39">
+            <a:extLst>
+              <a:ext uri="{FF2B5EF4-FFF2-40B4-BE49-F238E27FC236}">
+                <a16:creationId xmlns:a16="http://schemas.microsoft.com/office/drawing/2014/main" id="{355B37A5-8EA6-41FF-AE7C-7F8A4FFA63AA}"/>
+              </a:ext>
+            </a:extLst>
+          </p:cNvPr>
+          <p:cNvGrpSpPr/>
           <p:nvPr/>
-        </p:nvSpPr>
-        <p:spPr>
+        </p:nvGrpSpPr>
+        <p:grpSpPr>
           <a:xfrm>
-            <a:off x="2726436" y="79248"/>
-            <a:ext cx="2090928" cy="276999"/>
+            <a:off x="9723023" y="3098194"/>
+            <a:ext cx="1095413" cy="560378"/>
+            <a:chOff x="8603087" y="2719565"/>
+            <a:chExt cx="1095413" cy="560378"/>
           </a:xfrm>
-          <a:prstGeom prst="rect">
-            <a:avLst/>
-          </a:prstGeom>
-          <a:noFill/>
-        </p:spPr>
-        <p:txBody>
-          <a:bodyPr wrap="square" rtlCol="0">
-            <a:spAutoFit/>
-          </a:bodyPr>
-          <a:lstStyle/>
-          <a:p>
-            <a:pPr algn="ctr"/>
-            <a:r>
-              <a:rPr lang="en-US" sz="1200" dirty="0"/>
-              <a:t>Chart Panel</a:t>
-            </a:r>
-            <a:endParaRPr lang="en-SG" sz="1200" dirty="0"/>
-          </a:p>
-        </p:txBody>
-      </p:sp>
-      <p:sp>
-        <p:nvSpPr>
-          <p:cNvPr id="10" name="Right Brace 9">
-            <a:extLst>
-              <a:ext uri="{FF2B5EF4-FFF2-40B4-BE49-F238E27FC236}">
-                <a16:creationId xmlns:a16="http://schemas.microsoft.com/office/drawing/2014/main" id="{195D0920-5C1C-411D-A43A-B7FB72C2CF80}"/>
-              </a:ext>
-            </a:extLst>
-          </p:cNvPr>
-          <p:cNvSpPr/>
+        </p:grpSpPr>
+        <p:sp>
+          <p:nvSpPr>
+            <p:cNvPr id="16" name="Oval 15">
+              <a:extLst>
+                <a:ext uri="{FF2B5EF4-FFF2-40B4-BE49-F238E27FC236}">
+                  <a16:creationId xmlns:a16="http://schemas.microsoft.com/office/drawing/2014/main" id="{0FA3B7FA-4DB5-4EB3-9614-C6246C535AC6}"/>
+                </a:ext>
+              </a:extLst>
+            </p:cNvPr>
+            <p:cNvSpPr/>
+            <p:nvPr/>
+          </p:nvSpPr>
+          <p:spPr>
+            <a:xfrm>
+              <a:off x="8603087" y="3116629"/>
+              <a:ext cx="154341" cy="163314"/>
+            </a:xfrm>
+            <a:prstGeom prst="ellipse">
+              <a:avLst/>
+            </a:prstGeom>
+            <a:noFill/>
+            <a:ln w="9525" cap="flat" cmpd="sng" algn="ctr">
+              <a:solidFill>
+                <a:schemeClr val="accent5"/>
+              </a:solidFill>
+              <a:prstDash val="solid"/>
+              <a:round/>
+              <a:headEnd type="none" w="med" len="med"/>
+              <a:tailEnd type="none" w="med" len="med"/>
+            </a:ln>
+          </p:spPr>
+          <p:style>
+            <a:lnRef idx="0">
+              <a:scrgbClr r="0" g="0" b="0"/>
+            </a:lnRef>
+            <a:fillRef idx="0">
+              <a:scrgbClr r="0" g="0" b="0"/>
+            </a:fillRef>
+            <a:effectRef idx="0">
+              <a:scrgbClr r="0" g="0" b="0"/>
+            </a:effectRef>
+            <a:fontRef idx="minor">
+              <a:schemeClr val="accent5"/>
+            </a:fontRef>
+          </p:style>
+          <p:txBody>
+            <a:bodyPr rtlCol="0" anchor="ctr"/>
+            <a:lstStyle/>
+            <a:p>
+              <a:pPr algn="ctr"/>
+              <a:endParaRPr lang="en-SG"/>
+            </a:p>
+          </p:txBody>
+        </p:sp>
+        <p:sp>
+          <p:nvSpPr>
+            <p:cNvPr id="17" name="TextBox 16">
+              <a:extLst>
+                <a:ext uri="{FF2B5EF4-FFF2-40B4-BE49-F238E27FC236}">
+                  <a16:creationId xmlns:a16="http://schemas.microsoft.com/office/drawing/2014/main" id="{0213D02D-4396-4437-B87F-870EECAA3F68}"/>
+                </a:ext>
+              </a:extLst>
+            </p:cNvPr>
+            <p:cNvSpPr txBox="1"/>
+            <p:nvPr/>
+          </p:nvSpPr>
+          <p:spPr>
+            <a:xfrm>
+              <a:off x="8777222" y="2719565"/>
+              <a:ext cx="921278" cy="276999"/>
+            </a:xfrm>
+            <a:prstGeom prst="rect">
+              <a:avLst/>
+            </a:prstGeom>
+            <a:noFill/>
+          </p:spPr>
+          <p:txBody>
+            <a:bodyPr wrap="none" rtlCol="0">
+              <a:spAutoFit/>
+            </a:bodyPr>
+            <a:lstStyle/>
+            <a:p>
+              <a:r>
+                <a:rPr lang="en-US" sz="1200" dirty="0">
+                  <a:solidFill>
+                    <a:schemeClr val="accent1"/>
+                  </a:solidFill>
+                </a:rPr>
+                <a:t>Blame View</a:t>
+              </a:r>
+              <a:endParaRPr lang="en-SG" sz="1200" dirty="0">
+                <a:solidFill>
+                  <a:schemeClr val="accent1"/>
+                </a:solidFill>
+              </a:endParaRPr>
+            </a:p>
+          </p:txBody>
+        </p:sp>
+        <p:sp>
+          <p:nvSpPr>
+            <p:cNvPr id="19" name="Arrow: Right 18">
+              <a:extLst>
+                <a:ext uri="{FF2B5EF4-FFF2-40B4-BE49-F238E27FC236}">
+                  <a16:creationId xmlns:a16="http://schemas.microsoft.com/office/drawing/2014/main" id="{A85A5DB4-65AD-4483-B496-640C742923A0}"/>
+                </a:ext>
+              </a:extLst>
+            </p:cNvPr>
+            <p:cNvSpPr/>
+            <p:nvPr/>
+          </p:nvSpPr>
+          <p:spPr>
+            <a:xfrm rot="19492286">
+              <a:off x="8747796" y="2993386"/>
+              <a:ext cx="236436" cy="97790"/>
+            </a:xfrm>
+            <a:prstGeom prst="rightArrow">
+              <a:avLst/>
+            </a:prstGeom>
+          </p:spPr>
+          <p:style>
+            <a:lnRef idx="2">
+              <a:schemeClr val="accent1">
+                <a:shade val="50000"/>
+              </a:schemeClr>
+            </a:lnRef>
+            <a:fillRef idx="1">
+              <a:schemeClr val="accent1"/>
+            </a:fillRef>
+            <a:effectRef idx="0">
+              <a:schemeClr val="accent1"/>
+            </a:effectRef>
+            <a:fontRef idx="minor">
+              <a:schemeClr val="lt1"/>
+            </a:fontRef>
+          </p:style>
+          <p:txBody>
+            <a:bodyPr rtlCol="0" anchor="ctr"/>
+            <a:lstStyle/>
+            <a:p>
+              <a:pPr algn="ctr"/>
+              <a:endParaRPr lang="en-SG"/>
+            </a:p>
+          </p:txBody>
+        </p:sp>
+      </p:grpSp>
+      <p:grpSp>
+        <p:nvGrpSpPr>
+          <p:cNvPr id="38" name="Group 37">
+            <a:extLst>
+              <a:ext uri="{FF2B5EF4-FFF2-40B4-BE49-F238E27FC236}">
+                <a16:creationId xmlns:a16="http://schemas.microsoft.com/office/drawing/2014/main" id="{E8CB930F-3742-4BA6-BECD-C54762D6B43C}"/>
+              </a:ext>
+            </a:extLst>
+          </p:cNvPr>
+          <p:cNvGrpSpPr/>
           <p:nvPr/>
-        </p:nvSpPr>
-        <p:spPr>
-          <a:xfrm rot="16200000">
-            <a:off x="8298180" y="-1631634"/>
-            <a:ext cx="344424" cy="4547616"/>
+        </p:nvGrpSpPr>
+        <p:grpSpPr>
+          <a:xfrm>
+            <a:off x="8625163" y="2688150"/>
+            <a:ext cx="1127684" cy="568600"/>
+            <a:chOff x="7475403" y="3115227"/>
+            <a:chExt cx="1127684" cy="568600"/>
           </a:xfrm>
-          <a:prstGeom prst="rightBrace">
-            <a:avLst/>
-          </a:prstGeom>
-        </p:spPr>
-        <p:style>
-          <a:lnRef idx="3">
-            <a:schemeClr val="accent2"/>
-          </a:lnRef>
-          <a:fillRef idx="0">
-            <a:schemeClr val="accent2"/>
-          </a:fillRef>
-          <a:effectRef idx="2">
-            <a:schemeClr val="accent2"/>
-          </a:effectRef>
-          <a:fontRef idx="minor">
-            <a:schemeClr val="tx1"/>
-          </a:fontRef>
-        </p:style>
-        <p:txBody>
-          <a:bodyPr rtlCol="0" anchor="ctr"/>
-          <a:lstStyle/>
-          <a:p>
-            <a:pPr algn="ctr"/>
-            <a:endParaRPr lang="en-SG"/>
-          </a:p>
-        </p:txBody>
-      </p:sp>
-      <p:sp>
-        <p:nvSpPr>
-          <p:cNvPr id="11" name="TextBox 10">
-            <a:extLst>
-              <a:ext uri="{FF2B5EF4-FFF2-40B4-BE49-F238E27FC236}">
-                <a16:creationId xmlns:a16="http://schemas.microsoft.com/office/drawing/2014/main" id="{08293D95-459E-4730-BC16-CD778BC8DE8A}"/>
-              </a:ext>
-            </a:extLst>
-          </p:cNvPr>
-          <p:cNvSpPr txBox="1"/>
+        </p:grpSpPr>
+        <p:sp>
+          <p:nvSpPr>
+            <p:cNvPr id="18" name="Oval 17">
+              <a:extLst>
+                <a:ext uri="{FF2B5EF4-FFF2-40B4-BE49-F238E27FC236}">
+                  <a16:creationId xmlns:a16="http://schemas.microsoft.com/office/drawing/2014/main" id="{3698720C-0C2B-463A-B70A-97FF666889C2}"/>
+                </a:ext>
+              </a:extLst>
+            </p:cNvPr>
+            <p:cNvSpPr/>
+            <p:nvPr/>
+          </p:nvSpPr>
+          <p:spPr>
+            <a:xfrm>
+              <a:off x="8448746" y="3115227"/>
+              <a:ext cx="154341" cy="165109"/>
+            </a:xfrm>
+            <a:prstGeom prst="ellipse">
+              <a:avLst/>
+            </a:prstGeom>
+            <a:noFill/>
+            <a:ln w="9525" cap="flat" cmpd="sng" algn="ctr">
+              <a:solidFill>
+                <a:schemeClr val="accent2"/>
+              </a:solidFill>
+              <a:prstDash val="solid"/>
+              <a:round/>
+              <a:headEnd type="none" w="med" len="med"/>
+              <a:tailEnd type="none" w="med" len="med"/>
+            </a:ln>
+          </p:spPr>
+          <p:style>
+            <a:lnRef idx="0">
+              <a:scrgbClr r="0" g="0" b="0"/>
+            </a:lnRef>
+            <a:fillRef idx="0">
+              <a:scrgbClr r="0" g="0" b="0"/>
+            </a:fillRef>
+            <a:effectRef idx="0">
+              <a:scrgbClr r="0" g="0" b="0"/>
+            </a:effectRef>
+            <a:fontRef idx="minor">
+              <a:schemeClr val="accent2"/>
+            </a:fontRef>
+          </p:style>
+          <p:txBody>
+            <a:bodyPr rtlCol="0" anchor="ctr"/>
+            <a:lstStyle/>
+            <a:p>
+              <a:pPr algn="ctr"/>
+              <a:endParaRPr lang="en-SG"/>
+            </a:p>
+          </p:txBody>
+        </p:sp>
+        <p:sp>
+          <p:nvSpPr>
+            <p:cNvPr id="20" name="Arrow: Right 19">
+              <a:extLst>
+                <a:ext uri="{FF2B5EF4-FFF2-40B4-BE49-F238E27FC236}">
+                  <a16:creationId xmlns:a16="http://schemas.microsoft.com/office/drawing/2014/main" id="{620CEC16-4148-4C61-AC47-F7DFED9FDB71}"/>
+                </a:ext>
+              </a:extLst>
+            </p:cNvPr>
+            <p:cNvSpPr/>
+            <p:nvPr/>
+          </p:nvSpPr>
+          <p:spPr>
+            <a:xfrm rot="18900000">
+              <a:off x="8286583" y="3318450"/>
+              <a:ext cx="158874" cy="97790"/>
+            </a:xfrm>
+            <a:prstGeom prst="rightArrow">
+              <a:avLst/>
+            </a:prstGeom>
+          </p:spPr>
+          <p:style>
+            <a:lnRef idx="2">
+              <a:schemeClr val="accent2">
+                <a:shade val="50000"/>
+              </a:schemeClr>
+            </a:lnRef>
+            <a:fillRef idx="1">
+              <a:schemeClr val="accent2"/>
+            </a:fillRef>
+            <a:effectRef idx="0">
+              <a:schemeClr val="accent2"/>
+            </a:effectRef>
+            <a:fontRef idx="minor">
+              <a:schemeClr val="lt1"/>
+            </a:fontRef>
+          </p:style>
+          <p:txBody>
+            <a:bodyPr rtlCol="0" anchor="ctr"/>
+            <a:lstStyle/>
+            <a:p>
+              <a:pPr algn="ctr"/>
+              <a:endParaRPr lang="en-SG"/>
+            </a:p>
+          </p:txBody>
+        </p:sp>
+        <p:sp>
+          <p:nvSpPr>
+            <p:cNvPr id="21" name="TextBox 20">
+              <a:extLst>
+                <a:ext uri="{FF2B5EF4-FFF2-40B4-BE49-F238E27FC236}">
+                  <a16:creationId xmlns:a16="http://schemas.microsoft.com/office/drawing/2014/main" id="{D1178780-E5C8-40A3-866C-F0D48D349217}"/>
+                </a:ext>
+              </a:extLst>
+            </p:cNvPr>
+            <p:cNvSpPr txBox="1"/>
+            <p:nvPr/>
+          </p:nvSpPr>
+          <p:spPr>
+            <a:xfrm>
+              <a:off x="7475403" y="3406828"/>
+              <a:ext cx="973343" cy="276999"/>
+            </a:xfrm>
+            <a:prstGeom prst="rect">
+              <a:avLst/>
+            </a:prstGeom>
+            <a:noFill/>
+          </p:spPr>
+          <p:txBody>
+            <a:bodyPr wrap="none" rtlCol="0">
+              <a:spAutoFit/>
+            </a:bodyPr>
+            <a:lstStyle/>
+            <a:p>
+              <a:r>
+                <a:rPr lang="en-US" sz="1200" dirty="0">
+                  <a:solidFill>
+                    <a:schemeClr val="accent2"/>
+                  </a:solidFill>
+                </a:rPr>
+                <a:t>History View</a:t>
+              </a:r>
+              <a:endParaRPr lang="en-SG" sz="1200" dirty="0">
+                <a:solidFill>
+                  <a:schemeClr val="accent2"/>
+                </a:solidFill>
+              </a:endParaRPr>
+            </a:p>
+          </p:txBody>
+        </p:sp>
+      </p:grpSp>
+      <p:grpSp>
+        <p:nvGrpSpPr>
+          <p:cNvPr id="15" name="Group 14">
+            <a:extLst>
+              <a:ext uri="{FF2B5EF4-FFF2-40B4-BE49-F238E27FC236}">
+                <a16:creationId xmlns:a16="http://schemas.microsoft.com/office/drawing/2014/main" id="{63E15A1F-3E59-4DDC-A66B-A3347279DE71}"/>
+              </a:ext>
+            </a:extLst>
+          </p:cNvPr>
+          <p:cNvGrpSpPr/>
           <p:nvPr/>
-        </p:nvSpPr>
-        <p:spPr>
+        </p:nvGrpSpPr>
+        <p:grpSpPr>
           <a:xfrm>
-            <a:off x="7424928" y="79248"/>
-            <a:ext cx="2090928" cy="276999"/>
+            <a:off x="1443990" y="79248"/>
+            <a:ext cx="4652010" cy="5964363"/>
+            <a:chOff x="1443990" y="79248"/>
+            <a:chExt cx="4652010" cy="5964363"/>
           </a:xfrm>
-          <a:prstGeom prst="rect">
-            <a:avLst/>
-          </a:prstGeom>
-          <a:noFill/>
-        </p:spPr>
-        <p:txBody>
-          <a:bodyPr wrap="square" rtlCol="0">
-            <a:spAutoFit/>
-          </a:bodyPr>
-          <a:lstStyle/>
-          <a:p>
-            <a:pPr algn="ctr"/>
-            <a:r>
-              <a:rPr lang="en-US" sz="1200" dirty="0"/>
-              <a:t>Code Panel</a:t>
-            </a:r>
-            <a:endParaRPr lang="en-SG" sz="1200" dirty="0"/>
-          </a:p>
-        </p:txBody>
-      </p:sp>
-      <p:sp>
-        <p:nvSpPr>
-          <p:cNvPr id="12" name="Arrow: Right 11">
-            <a:extLst>
-              <a:ext uri="{FF2B5EF4-FFF2-40B4-BE49-F238E27FC236}">
-                <a16:creationId xmlns:a16="http://schemas.microsoft.com/office/drawing/2014/main" id="{88177BEA-4D65-45B7-A56C-6FBD7CF8C471}"/>
-              </a:ext>
-            </a:extLst>
-          </p:cNvPr>
-          <p:cNvSpPr/>
+        </p:grpSpPr>
+        <p:sp>
+          <p:nvSpPr>
+            <p:cNvPr id="8" name="Right Brace 7">
+              <a:extLst>
+                <a:ext uri="{FF2B5EF4-FFF2-40B4-BE49-F238E27FC236}">
+                  <a16:creationId xmlns:a16="http://schemas.microsoft.com/office/drawing/2014/main" id="{C05B2C6F-DCA4-45F9-94E5-345EC17842DB}"/>
+                </a:ext>
+              </a:extLst>
+            </p:cNvPr>
+            <p:cNvSpPr/>
+            <p:nvPr/>
+          </p:nvSpPr>
+          <p:spPr>
+            <a:xfrm rot="16200000">
+              <a:off x="3599688" y="-1681925"/>
+              <a:ext cx="344424" cy="4648200"/>
+            </a:xfrm>
+            <a:prstGeom prst="rightBrace">
+              <a:avLst/>
+            </a:prstGeom>
+          </p:spPr>
+          <p:style>
+            <a:lnRef idx="3">
+              <a:schemeClr val="accent1"/>
+            </a:lnRef>
+            <a:fillRef idx="0">
+              <a:schemeClr val="accent1"/>
+            </a:fillRef>
+            <a:effectRef idx="2">
+              <a:schemeClr val="accent1"/>
+            </a:effectRef>
+            <a:fontRef idx="minor">
+              <a:schemeClr val="tx1"/>
+            </a:fontRef>
+          </p:style>
+          <p:txBody>
+            <a:bodyPr rtlCol="0" anchor="ctr"/>
+            <a:lstStyle/>
+            <a:p>
+              <a:pPr algn="ctr"/>
+              <a:endParaRPr lang="en-SG"/>
+            </a:p>
+          </p:txBody>
+        </p:sp>
+        <p:sp>
+          <p:nvSpPr>
+            <p:cNvPr id="9" name="TextBox 8">
+              <a:extLst>
+                <a:ext uri="{FF2B5EF4-FFF2-40B4-BE49-F238E27FC236}">
+                  <a16:creationId xmlns:a16="http://schemas.microsoft.com/office/drawing/2014/main" id="{64E7039B-00EC-4DDC-B348-58F4C75F63AF}"/>
+                </a:ext>
+              </a:extLst>
+            </p:cNvPr>
+            <p:cNvSpPr txBox="1"/>
+            <p:nvPr/>
+          </p:nvSpPr>
+          <p:spPr>
+            <a:xfrm>
+              <a:off x="2726436" y="79248"/>
+              <a:ext cx="2090928" cy="276999"/>
+            </a:xfrm>
+            <a:prstGeom prst="rect">
+              <a:avLst/>
+            </a:prstGeom>
+            <a:noFill/>
+          </p:spPr>
+          <p:txBody>
+            <a:bodyPr wrap="square" rtlCol="0">
+              <a:spAutoFit/>
+            </a:bodyPr>
+            <a:lstStyle/>
+            <a:p>
+              <a:pPr algn="ctr"/>
+              <a:r>
+                <a:rPr lang="en-US" sz="1200" dirty="0"/>
+                <a:t>Chart Panel</a:t>
+              </a:r>
+              <a:endParaRPr lang="en-SG" sz="1200" dirty="0"/>
+            </a:p>
+          </p:txBody>
+        </p:sp>
+        <p:sp>
+          <p:nvSpPr>
+            <p:cNvPr id="23" name="Rectangle 22">
+              <a:extLst>
+                <a:ext uri="{FF2B5EF4-FFF2-40B4-BE49-F238E27FC236}">
+                  <a16:creationId xmlns:a16="http://schemas.microsoft.com/office/drawing/2014/main" id="{6D6AB3E9-494B-45F6-B9FF-736F40C71E04}"/>
+                </a:ext>
+              </a:extLst>
+            </p:cNvPr>
+            <p:cNvSpPr/>
+            <p:nvPr/>
+          </p:nvSpPr>
+          <p:spPr>
+            <a:xfrm>
+              <a:off x="1443990" y="814386"/>
+              <a:ext cx="4607814" cy="5229225"/>
+            </a:xfrm>
+            <a:prstGeom prst="rect">
+              <a:avLst/>
+            </a:prstGeom>
+            <a:noFill/>
+            <a:ln w="57150" cap="flat" cmpd="sng" algn="ctr">
+              <a:solidFill>
+                <a:schemeClr val="accent1"/>
+              </a:solidFill>
+              <a:prstDash val="solid"/>
+              <a:round/>
+              <a:headEnd type="none" w="med" len="med"/>
+              <a:tailEnd type="none" w="med" len="med"/>
+            </a:ln>
+          </p:spPr>
+          <p:style>
+            <a:lnRef idx="0">
+              <a:scrgbClr r="0" g="0" b="0"/>
+            </a:lnRef>
+            <a:fillRef idx="0">
+              <a:scrgbClr r="0" g="0" b="0"/>
+            </a:fillRef>
+            <a:effectRef idx="0">
+              <a:scrgbClr r="0" g="0" b="0"/>
+            </a:effectRef>
+            <a:fontRef idx="minor">
+              <a:schemeClr val="accent1"/>
+            </a:fontRef>
+          </p:style>
+          <p:txBody>
+            <a:bodyPr rtlCol="0" anchor="ctr"/>
+            <a:lstStyle/>
+            <a:p>
+              <a:pPr algn="ctr"/>
+              <a:endParaRPr lang="en-SG"/>
+            </a:p>
+          </p:txBody>
+        </p:sp>
+      </p:grpSp>
+      <p:grpSp>
+        <p:nvGrpSpPr>
+          <p:cNvPr id="7" name="Group 6">
+            <a:extLst>
+              <a:ext uri="{FF2B5EF4-FFF2-40B4-BE49-F238E27FC236}">
+                <a16:creationId xmlns:a16="http://schemas.microsoft.com/office/drawing/2014/main" id="{136E2079-5E0D-4506-AFAA-58961257A6DD}"/>
+              </a:ext>
+            </a:extLst>
+          </p:cNvPr>
+          <p:cNvGrpSpPr/>
           <p:nvPr/>
-        </p:nvSpPr>
-        <p:spPr>
-          <a:xfrm rot="21372755">
-            <a:off x="8429466" y="1857407"/>
-            <a:ext cx="402336" cy="121920"/>
+        </p:nvGrpSpPr>
+        <p:grpSpPr>
+          <a:xfrm>
+            <a:off x="544590" y="945870"/>
+            <a:ext cx="5327890" cy="869029"/>
+            <a:chOff x="823377" y="945870"/>
+            <a:chExt cx="4742922" cy="869029"/>
           </a:xfrm>
-          <a:prstGeom prst="rightArrow">
-            <a:avLst/>
-          </a:prstGeom>
-        </p:spPr>
-        <p:style>
-          <a:lnRef idx="2">
-            <a:schemeClr val="accent6">
-              <a:shade val="50000"/>
-            </a:schemeClr>
-          </a:lnRef>
-          <a:fillRef idx="1">
-            <a:schemeClr val="accent6"/>
-          </a:fillRef>
-          <a:effectRef idx="0">
-            <a:schemeClr val="accent6"/>
-          </a:effectRef>
-          <a:fontRef idx="minor">
-            <a:schemeClr val="lt1"/>
-          </a:fontRef>
-        </p:style>
-        <p:txBody>
-          <a:bodyPr rtlCol="0" anchor="ctr"/>
-          <a:lstStyle/>
-          <a:p>
-            <a:pPr algn="ctr"/>
-            <a:endParaRPr lang="en-SG"/>
-          </a:p>
-        </p:txBody>
-      </p:sp>
-      <p:sp>
-        <p:nvSpPr>
-          <p:cNvPr id="13" name="TextBox 12">
-            <a:extLst>
-              <a:ext uri="{FF2B5EF4-FFF2-40B4-BE49-F238E27FC236}">
-                <a16:creationId xmlns:a16="http://schemas.microsoft.com/office/drawing/2014/main" id="{C135F275-4477-467B-8D51-84AA5700DE35}"/>
-              </a:ext>
-            </a:extLst>
-          </p:cNvPr>
-          <p:cNvSpPr txBox="1"/>
+        </p:grpSpPr>
+        <p:sp>
+          <p:nvSpPr>
+            <p:cNvPr id="22" name="Left Brace 21">
+              <a:extLst>
+                <a:ext uri="{FF2B5EF4-FFF2-40B4-BE49-F238E27FC236}">
+                  <a16:creationId xmlns:a16="http://schemas.microsoft.com/office/drawing/2014/main" id="{C4A07B1E-02AC-4689-807B-B2620194B508}"/>
+                </a:ext>
+              </a:extLst>
+            </p:cNvPr>
+            <p:cNvSpPr/>
+            <p:nvPr/>
+          </p:nvSpPr>
+          <p:spPr>
+            <a:xfrm>
+              <a:off x="1548971" y="945870"/>
+              <a:ext cx="310965" cy="869029"/>
+            </a:xfrm>
+            <a:prstGeom prst="leftBrace">
+              <a:avLst>
+                <a:gd name="adj1" fmla="val 14462"/>
+                <a:gd name="adj2" fmla="val 48831"/>
+              </a:avLst>
+            </a:prstGeom>
+          </p:spPr>
+          <p:style>
+            <a:lnRef idx="3">
+              <a:schemeClr val="accent6"/>
+            </a:lnRef>
+            <a:fillRef idx="0">
+              <a:schemeClr val="accent6"/>
+            </a:fillRef>
+            <a:effectRef idx="2">
+              <a:schemeClr val="accent6"/>
+            </a:effectRef>
+            <a:fontRef idx="minor">
+              <a:schemeClr val="tx1"/>
+            </a:fontRef>
+          </p:style>
+          <p:txBody>
+            <a:bodyPr rtlCol="0" anchor="ctr"/>
+            <a:lstStyle/>
+            <a:p>
+              <a:pPr algn="ctr"/>
+              <a:endParaRPr lang="en-SG"/>
+            </a:p>
+          </p:txBody>
+        </p:sp>
+        <p:sp>
+          <p:nvSpPr>
+            <p:cNvPr id="24" name="TextBox 23">
+              <a:extLst>
+                <a:ext uri="{FF2B5EF4-FFF2-40B4-BE49-F238E27FC236}">
+                  <a16:creationId xmlns:a16="http://schemas.microsoft.com/office/drawing/2014/main" id="{ACDC6C00-2DF8-42EF-B108-6D30BD3CBE76}"/>
+                </a:ext>
+              </a:extLst>
+            </p:cNvPr>
+            <p:cNvSpPr txBox="1"/>
+            <p:nvPr/>
+          </p:nvSpPr>
+          <p:spPr>
+            <a:xfrm>
+              <a:off x="823377" y="1208184"/>
+              <a:ext cx="723900" cy="276999"/>
+            </a:xfrm>
+            <a:prstGeom prst="rect">
+              <a:avLst/>
+            </a:prstGeom>
+            <a:noFill/>
+          </p:spPr>
+          <p:txBody>
+            <a:bodyPr wrap="square" rtlCol="0">
+              <a:spAutoFit/>
+            </a:bodyPr>
+            <a:lstStyle/>
+            <a:p>
+              <a:pPr algn="ctr"/>
+              <a:r>
+                <a:rPr lang="en-US" sz="1200" dirty="0">
+                  <a:solidFill>
+                    <a:schemeClr val="accent6"/>
+                  </a:solidFill>
+                </a:rPr>
+                <a:t>Toolbar</a:t>
+              </a:r>
+            </a:p>
+          </p:txBody>
+        </p:sp>
+        <p:sp>
+          <p:nvSpPr>
+            <p:cNvPr id="25" name="Rectangle 24">
+              <a:extLst>
+                <a:ext uri="{FF2B5EF4-FFF2-40B4-BE49-F238E27FC236}">
+                  <a16:creationId xmlns:a16="http://schemas.microsoft.com/office/drawing/2014/main" id="{38234176-8BB8-4114-96C5-171C66ECDE3F}"/>
+                </a:ext>
+              </a:extLst>
+            </p:cNvPr>
+            <p:cNvSpPr/>
+            <p:nvPr/>
+          </p:nvSpPr>
+          <p:spPr>
+            <a:xfrm>
+              <a:off x="1859936" y="945870"/>
+              <a:ext cx="3706363" cy="869029"/>
+            </a:xfrm>
+            <a:prstGeom prst="rect">
+              <a:avLst/>
+            </a:prstGeom>
+            <a:noFill/>
+            <a:ln w="9525" cap="flat" cmpd="sng" algn="ctr">
+              <a:solidFill>
+                <a:schemeClr val="accent6"/>
+              </a:solidFill>
+              <a:prstDash val="solid"/>
+              <a:round/>
+              <a:headEnd type="none" w="med" len="med"/>
+              <a:tailEnd type="none" w="med" len="med"/>
+            </a:ln>
+          </p:spPr>
+          <p:style>
+            <a:lnRef idx="0">
+              <a:scrgbClr r="0" g="0" b="0"/>
+            </a:lnRef>
+            <a:fillRef idx="0">
+              <a:scrgbClr r="0" g="0" b="0"/>
+            </a:fillRef>
+            <a:effectRef idx="0">
+              <a:scrgbClr r="0" g="0" b="0"/>
+            </a:effectRef>
+            <a:fontRef idx="minor">
+              <a:schemeClr val="accent6"/>
+            </a:fontRef>
+          </p:style>
+          <p:txBody>
+            <a:bodyPr rtlCol="0" anchor="ctr"/>
+            <a:lstStyle/>
+            <a:p>
+              <a:pPr algn="ctr"/>
+              <a:endParaRPr lang="en-SG"/>
+            </a:p>
+          </p:txBody>
+        </p:sp>
+      </p:grpSp>
+      <p:grpSp>
+        <p:nvGrpSpPr>
+          <p:cNvPr id="5" name="Group 4">
+            <a:extLst>
+              <a:ext uri="{FF2B5EF4-FFF2-40B4-BE49-F238E27FC236}">
+                <a16:creationId xmlns:a16="http://schemas.microsoft.com/office/drawing/2014/main" id="{4FF72358-8A89-4AE0-983B-BB094CC4E4D9}"/>
+              </a:ext>
+            </a:extLst>
+          </p:cNvPr>
+          <p:cNvGrpSpPr/>
           <p:nvPr/>
-        </p:nvSpPr>
-        <p:spPr>
+        </p:nvGrpSpPr>
+        <p:grpSpPr>
           <a:xfrm>
-            <a:off x="8790433" y="1735827"/>
-            <a:ext cx="836402" cy="276999"/>
+            <a:off x="2754415" y="3135977"/>
+            <a:ext cx="1695743" cy="246221"/>
+            <a:chOff x="2464522" y="2361561"/>
+            <a:chExt cx="1695743" cy="246221"/>
           </a:xfrm>
-          <a:prstGeom prst="rect">
-            <a:avLst/>
-          </a:prstGeom>
-          <a:noFill/>
-        </p:spPr>
-        <p:txBody>
-          <a:bodyPr wrap="square" rtlCol="0">
-            <a:spAutoFit/>
-          </a:bodyPr>
-          <a:lstStyle/>
-          <a:p>
-            <a:r>
-              <a:rPr lang="en-US" sz="1200" dirty="0">
+        </p:grpSpPr>
+        <p:sp>
+          <p:nvSpPr>
+            <p:cNvPr id="26" name="Oval 25">
+              <a:extLst>
+                <a:ext uri="{FF2B5EF4-FFF2-40B4-BE49-F238E27FC236}">
+                  <a16:creationId xmlns:a16="http://schemas.microsoft.com/office/drawing/2014/main" id="{1173C975-EBB3-439F-8872-826D3DAF91EB}"/>
+                </a:ext>
+              </a:extLst>
+            </p:cNvPr>
+            <p:cNvSpPr/>
+            <p:nvPr/>
+          </p:nvSpPr>
+          <p:spPr>
+            <a:xfrm>
+              <a:off x="2464522" y="2454206"/>
+              <a:ext cx="142875" cy="133350"/>
+            </a:xfrm>
+            <a:prstGeom prst="ellipse">
+              <a:avLst/>
+            </a:prstGeom>
+            <a:noFill/>
+            <a:ln w="9525" cap="flat" cmpd="sng" algn="ctr">
+              <a:solidFill>
+                <a:schemeClr val="accent2"/>
+              </a:solidFill>
+              <a:prstDash val="solid"/>
+              <a:round/>
+              <a:headEnd type="none" w="med" len="med"/>
+              <a:tailEnd type="none" w="med" len="med"/>
+            </a:ln>
+          </p:spPr>
+          <p:style>
+            <a:lnRef idx="0">
+              <a:scrgbClr r="0" g="0" b="0"/>
+            </a:lnRef>
+            <a:fillRef idx="0">
+              <a:scrgbClr r="0" g="0" b="0"/>
+            </a:fillRef>
+            <a:effectRef idx="0">
+              <a:scrgbClr r="0" g="0" b="0"/>
+            </a:effectRef>
+            <a:fontRef idx="minor">
+              <a:schemeClr val="accent2"/>
+            </a:fontRef>
+          </p:style>
+          <p:txBody>
+            <a:bodyPr rtlCol="0" anchor="ctr"/>
+            <a:lstStyle/>
+            <a:p>
+              <a:pPr algn="ctr"/>
+              <a:endParaRPr lang="en-SG"/>
+            </a:p>
+          </p:txBody>
+        </p:sp>
+        <p:sp>
+          <p:nvSpPr>
+            <p:cNvPr id="27" name="Arrow: Right 26">
+              <a:extLst>
+                <a:ext uri="{FF2B5EF4-FFF2-40B4-BE49-F238E27FC236}">
+                  <a16:creationId xmlns:a16="http://schemas.microsoft.com/office/drawing/2014/main" id="{A58405F1-EAAD-4099-A00D-F41C9263239F}"/>
+                </a:ext>
+              </a:extLst>
+            </p:cNvPr>
+            <p:cNvSpPr/>
+            <p:nvPr/>
+          </p:nvSpPr>
+          <p:spPr>
+            <a:xfrm rot="21204583">
+              <a:off x="2661847" y="2453845"/>
+              <a:ext cx="142378" cy="66676"/>
+            </a:xfrm>
+            <a:prstGeom prst="rightArrow">
+              <a:avLst/>
+            </a:prstGeom>
+          </p:spPr>
+          <p:style>
+            <a:lnRef idx="2">
+              <a:schemeClr val="accent2">
+                <a:shade val="50000"/>
+              </a:schemeClr>
+            </a:lnRef>
+            <a:fillRef idx="1">
+              <a:schemeClr val="accent2"/>
+            </a:fillRef>
+            <a:effectRef idx="0">
+              <a:schemeClr val="accent2"/>
+            </a:effectRef>
+            <a:fontRef idx="minor">
+              <a:schemeClr val="lt1"/>
+            </a:fontRef>
+          </p:style>
+          <p:txBody>
+            <a:bodyPr rtlCol="0" anchor="ctr"/>
+            <a:lstStyle/>
+            <a:p>
+              <a:pPr algn="ctr"/>
+              <a:endParaRPr lang="en-SG"/>
+            </a:p>
+          </p:txBody>
+        </p:sp>
+        <p:sp>
+          <p:nvSpPr>
+            <p:cNvPr id="28" name="TextBox 27">
+              <a:extLst>
+                <a:ext uri="{FF2B5EF4-FFF2-40B4-BE49-F238E27FC236}">
+                  <a16:creationId xmlns:a16="http://schemas.microsoft.com/office/drawing/2014/main" id="{34AE8672-B518-45E4-9DE5-A05EE9D1C6F3}"/>
+                </a:ext>
+              </a:extLst>
+            </p:cNvPr>
+            <p:cNvSpPr txBox="1"/>
+            <p:nvPr/>
+          </p:nvSpPr>
+          <p:spPr>
+            <a:xfrm>
+              <a:off x="2760090" y="2361561"/>
+              <a:ext cx="1400175" cy="246221"/>
+            </a:xfrm>
+            <a:prstGeom prst="rect">
+              <a:avLst/>
+            </a:prstGeom>
+            <a:noFill/>
+          </p:spPr>
+          <p:txBody>
+            <a:bodyPr wrap="square" rtlCol="0">
+              <a:spAutoFit/>
+            </a:bodyPr>
+            <a:lstStyle/>
+            <a:p>
+              <a:r>
+                <a:rPr lang="en-US" sz="1000" dirty="0">
+                  <a:solidFill>
+                    <a:schemeClr val="accent2"/>
+                  </a:solidFill>
+                </a:rPr>
+                <a:t>Link to repository</a:t>
+              </a:r>
+              <a:endParaRPr lang="en-SG" sz="1000" dirty="0">
+                <a:solidFill>
+                  <a:schemeClr val="accent2"/>
+                </a:solidFill>
+              </a:endParaRPr>
+            </a:p>
+          </p:txBody>
+        </p:sp>
+      </p:grpSp>
+      <p:grpSp>
+        <p:nvGrpSpPr>
+          <p:cNvPr id="6" name="Group 5">
+            <a:extLst>
+              <a:ext uri="{FF2B5EF4-FFF2-40B4-BE49-F238E27FC236}">
+                <a16:creationId xmlns:a16="http://schemas.microsoft.com/office/drawing/2014/main" id="{71B6EB53-FA00-4D6F-8B6D-CFC7C368353A}"/>
+              </a:ext>
+            </a:extLst>
+          </p:cNvPr>
+          <p:cNvGrpSpPr/>
+          <p:nvPr/>
+        </p:nvGrpSpPr>
+        <p:grpSpPr>
+          <a:xfrm>
+            <a:off x="2775084" y="2520611"/>
+            <a:ext cx="2165611" cy="263574"/>
+            <a:chOff x="2230032" y="2870443"/>
+            <a:chExt cx="2165611" cy="263574"/>
+          </a:xfrm>
+        </p:grpSpPr>
+        <p:sp>
+          <p:nvSpPr>
+            <p:cNvPr id="29" name="Oval 28">
+              <a:extLst>
+                <a:ext uri="{FF2B5EF4-FFF2-40B4-BE49-F238E27FC236}">
+                  <a16:creationId xmlns:a16="http://schemas.microsoft.com/office/drawing/2014/main" id="{2206B7BC-33E8-473B-84CD-DA37BCD06CDF}"/>
+                </a:ext>
+              </a:extLst>
+            </p:cNvPr>
+            <p:cNvSpPr/>
+            <p:nvPr/>
+          </p:nvSpPr>
+          <p:spPr>
+            <a:xfrm>
+              <a:off x="2230032" y="3000667"/>
+              <a:ext cx="130499" cy="133350"/>
+            </a:xfrm>
+            <a:prstGeom prst="ellipse">
+              <a:avLst/>
+            </a:prstGeom>
+            <a:noFill/>
+            <a:ln w="9525" cap="flat" cmpd="sng" algn="ctr">
+              <a:solidFill>
+                <a:schemeClr val="accent6"/>
+              </a:solidFill>
+              <a:prstDash val="solid"/>
+              <a:round/>
+              <a:headEnd type="none" w="med" len="med"/>
+              <a:tailEnd type="none" w="med" len="med"/>
+            </a:ln>
+          </p:spPr>
+          <p:style>
+            <a:lnRef idx="0">
+              <a:scrgbClr r="0" g="0" b="0"/>
+            </a:lnRef>
+            <a:fillRef idx="0">
+              <a:scrgbClr r="0" g="0" b="0"/>
+            </a:fillRef>
+            <a:effectRef idx="0">
+              <a:scrgbClr r="0" g="0" b="0"/>
+            </a:effectRef>
+            <a:fontRef idx="minor">
+              <a:schemeClr val="accent6"/>
+            </a:fontRef>
+          </p:style>
+          <p:txBody>
+            <a:bodyPr rtlCol="0" anchor="ctr"/>
+            <a:lstStyle/>
+            <a:p>
+              <a:pPr algn="ctr"/>
+              <a:endParaRPr lang="en-SG"/>
+            </a:p>
+          </p:txBody>
+        </p:sp>
+        <p:sp>
+          <p:nvSpPr>
+            <p:cNvPr id="30" name="Arrow: Bent 29">
+              <a:extLst>
+                <a:ext uri="{FF2B5EF4-FFF2-40B4-BE49-F238E27FC236}">
+                  <a16:creationId xmlns:a16="http://schemas.microsoft.com/office/drawing/2014/main" id="{DFCFA230-CA83-4084-9F6D-71E51B2037DE}"/>
+                </a:ext>
+              </a:extLst>
+            </p:cNvPr>
+            <p:cNvSpPr/>
+            <p:nvPr/>
+          </p:nvSpPr>
+          <p:spPr>
+            <a:xfrm>
+              <a:off x="2281147" y="2943385"/>
+              <a:ext cx="243840" cy="62865"/>
+            </a:xfrm>
+            <a:prstGeom prst="bentArrow">
+              <a:avLst>
+                <a:gd name="adj1" fmla="val 25000"/>
+                <a:gd name="adj2" fmla="val 26516"/>
+                <a:gd name="adj3" fmla="val 25000"/>
+                <a:gd name="adj4" fmla="val 43750"/>
+              </a:avLst>
+            </a:prstGeom>
+          </p:spPr>
+          <p:style>
+            <a:lnRef idx="2">
+              <a:schemeClr val="accent6">
+                <a:shade val="50000"/>
+              </a:schemeClr>
+            </a:lnRef>
+            <a:fillRef idx="1">
+              <a:schemeClr val="accent6"/>
+            </a:fillRef>
+            <a:effectRef idx="0">
+              <a:schemeClr val="accent6"/>
+            </a:effectRef>
+            <a:fontRef idx="minor">
+              <a:schemeClr val="lt1"/>
+            </a:fontRef>
+          </p:style>
+          <p:txBody>
+            <a:bodyPr rtlCol="0" anchor="ctr"/>
+            <a:lstStyle/>
+            <a:p>
+              <a:pPr algn="ctr"/>
+              <a:endParaRPr lang="en-SG">
+                <a:solidFill>
+                  <a:schemeClr val="tx1"/>
+                </a:solidFill>
+              </a:endParaRPr>
+            </a:p>
+          </p:txBody>
+        </p:sp>
+        <p:sp>
+          <p:nvSpPr>
+            <p:cNvPr id="31" name="TextBox 30">
+              <a:extLst>
+                <a:ext uri="{FF2B5EF4-FFF2-40B4-BE49-F238E27FC236}">
+                  <a16:creationId xmlns:a16="http://schemas.microsoft.com/office/drawing/2014/main" id="{FD5681D1-EF5F-4AB0-9C45-DF91004DFCC2}"/>
+                </a:ext>
+              </a:extLst>
+            </p:cNvPr>
+            <p:cNvSpPr txBox="1"/>
+            <p:nvPr/>
+          </p:nvSpPr>
+          <p:spPr>
+            <a:xfrm>
+              <a:off x="2493500" y="2870443"/>
+              <a:ext cx="1902143" cy="246221"/>
+            </a:xfrm>
+            <a:prstGeom prst="rect">
+              <a:avLst/>
+            </a:prstGeom>
+            <a:noFill/>
+          </p:spPr>
+          <p:txBody>
+            <a:bodyPr wrap="square" rtlCol="0">
+              <a:spAutoFit/>
+            </a:bodyPr>
+            <a:lstStyle/>
+            <a:p>
+              <a:r>
+                <a:rPr lang="en-US" sz="1000" dirty="0">
+                  <a:solidFill>
+                    <a:schemeClr val="accent6"/>
+                  </a:solidFill>
+                </a:rPr>
+                <a:t>View author’s committed codes</a:t>
+              </a:r>
+              <a:endParaRPr lang="en-SG" sz="1000" dirty="0">
+                <a:solidFill>
+                  <a:schemeClr val="accent6"/>
+                </a:solidFill>
+              </a:endParaRPr>
+            </a:p>
+          </p:txBody>
+        </p:sp>
+      </p:grpSp>
+      <p:grpSp>
+        <p:nvGrpSpPr>
+          <p:cNvPr id="36" name="Group 35">
+            <a:extLst>
+              <a:ext uri="{FF2B5EF4-FFF2-40B4-BE49-F238E27FC236}">
+                <a16:creationId xmlns:a16="http://schemas.microsoft.com/office/drawing/2014/main" id="{A7AFB063-FD92-44F4-BCAE-B42330D96AE2}"/>
+              </a:ext>
+            </a:extLst>
+          </p:cNvPr>
+          <p:cNvGrpSpPr/>
+          <p:nvPr/>
+        </p:nvGrpSpPr>
+        <p:grpSpPr>
+          <a:xfrm>
+            <a:off x="6140186" y="79248"/>
+            <a:ext cx="4612015" cy="5964363"/>
+            <a:chOff x="6196584" y="79248"/>
+            <a:chExt cx="4555617" cy="5964363"/>
+          </a:xfrm>
+        </p:grpSpPr>
+        <p:sp>
+          <p:nvSpPr>
+            <p:cNvPr id="10" name="Right Brace 9">
+              <a:extLst>
+                <a:ext uri="{FF2B5EF4-FFF2-40B4-BE49-F238E27FC236}">
+                  <a16:creationId xmlns:a16="http://schemas.microsoft.com/office/drawing/2014/main" id="{195D0920-5C1C-411D-A43A-B7FB72C2CF80}"/>
+                </a:ext>
+              </a:extLst>
+            </p:cNvPr>
+            <p:cNvSpPr/>
+            <p:nvPr/>
+          </p:nvSpPr>
+          <p:spPr>
+            <a:xfrm rot="16200000">
+              <a:off x="8298180" y="-1631634"/>
+              <a:ext cx="344424" cy="4547616"/>
+            </a:xfrm>
+            <a:prstGeom prst="rightBrace">
+              <a:avLst/>
+            </a:prstGeom>
+          </p:spPr>
+          <p:style>
+            <a:lnRef idx="3">
+              <a:schemeClr val="accent2"/>
+            </a:lnRef>
+            <a:fillRef idx="0">
+              <a:schemeClr val="accent2"/>
+            </a:fillRef>
+            <a:effectRef idx="2">
+              <a:schemeClr val="accent2"/>
+            </a:effectRef>
+            <a:fontRef idx="minor">
+              <a:schemeClr val="tx1"/>
+            </a:fontRef>
+          </p:style>
+          <p:txBody>
+            <a:bodyPr rtlCol="0" anchor="ctr"/>
+            <a:lstStyle/>
+            <a:p>
+              <a:pPr algn="ctr"/>
+              <a:endParaRPr lang="en-SG"/>
+            </a:p>
+          </p:txBody>
+        </p:sp>
+        <p:sp>
+          <p:nvSpPr>
+            <p:cNvPr id="11" name="TextBox 10">
+              <a:extLst>
+                <a:ext uri="{FF2B5EF4-FFF2-40B4-BE49-F238E27FC236}">
+                  <a16:creationId xmlns:a16="http://schemas.microsoft.com/office/drawing/2014/main" id="{08293D95-459E-4730-BC16-CD778BC8DE8A}"/>
+                </a:ext>
+              </a:extLst>
+            </p:cNvPr>
+            <p:cNvSpPr txBox="1"/>
+            <p:nvPr/>
+          </p:nvSpPr>
+          <p:spPr>
+            <a:xfrm>
+              <a:off x="7424928" y="79248"/>
+              <a:ext cx="2090928" cy="276999"/>
+            </a:xfrm>
+            <a:prstGeom prst="rect">
+              <a:avLst/>
+            </a:prstGeom>
+            <a:noFill/>
+          </p:spPr>
+          <p:txBody>
+            <a:bodyPr wrap="square" rtlCol="0">
+              <a:spAutoFit/>
+            </a:bodyPr>
+            <a:lstStyle/>
+            <a:p>
+              <a:pPr algn="ctr"/>
+              <a:r>
+                <a:rPr lang="en-US" sz="1200" dirty="0"/>
+                <a:t>Code Panel</a:t>
+              </a:r>
+              <a:endParaRPr lang="en-SG" sz="1200" dirty="0"/>
+            </a:p>
+          </p:txBody>
+        </p:sp>
+        <p:sp>
+          <p:nvSpPr>
+            <p:cNvPr id="32" name="Rectangle 31">
+              <a:extLst>
+                <a:ext uri="{FF2B5EF4-FFF2-40B4-BE49-F238E27FC236}">
+                  <a16:creationId xmlns:a16="http://schemas.microsoft.com/office/drawing/2014/main" id="{78349196-1F24-461D-AD8C-4AD1D6A0E5B6}"/>
+                </a:ext>
+              </a:extLst>
+            </p:cNvPr>
+            <p:cNvSpPr/>
+            <p:nvPr/>
+          </p:nvSpPr>
+          <p:spPr>
+            <a:xfrm>
+              <a:off x="6204585" y="814386"/>
+              <a:ext cx="4547616" cy="5229225"/>
+            </a:xfrm>
+            <a:prstGeom prst="rect">
+              <a:avLst/>
+            </a:prstGeom>
+            <a:noFill/>
+            <a:ln w="57150" cap="flat" cmpd="sng" algn="ctr">
+              <a:solidFill>
+                <a:schemeClr val="accent2"/>
+              </a:solidFill>
+              <a:prstDash val="solid"/>
+              <a:round/>
+              <a:headEnd type="none" w="med" len="med"/>
+              <a:tailEnd type="none" w="med" len="med"/>
+            </a:ln>
+          </p:spPr>
+          <p:style>
+            <a:lnRef idx="0">
+              <a:scrgbClr r="0" g="0" b="0"/>
+            </a:lnRef>
+            <a:fillRef idx="0">
+              <a:scrgbClr r="0" g="0" b="0"/>
+            </a:fillRef>
+            <a:effectRef idx="0">
+              <a:scrgbClr r="0" g="0" b="0"/>
+            </a:effectRef>
+            <a:fontRef idx="minor">
+              <a:schemeClr val="accent1"/>
+            </a:fontRef>
+          </p:style>
+          <p:txBody>
+            <a:bodyPr rtlCol="0" anchor="ctr"/>
+            <a:lstStyle/>
+            <a:p>
+              <a:pPr algn="ctr"/>
+              <a:endParaRPr lang="en-SG"/>
+            </a:p>
+          </p:txBody>
+        </p:sp>
+      </p:grpSp>
+      <p:grpSp>
+        <p:nvGrpSpPr>
+          <p:cNvPr id="14" name="Group 13">
+            <a:extLst>
+              <a:ext uri="{FF2B5EF4-FFF2-40B4-BE49-F238E27FC236}">
+                <a16:creationId xmlns:a16="http://schemas.microsoft.com/office/drawing/2014/main" id="{F0680E85-D3A9-48B1-B089-8B49261F1BEF}"/>
+              </a:ext>
+            </a:extLst>
+          </p:cNvPr>
+          <p:cNvGrpSpPr/>
+          <p:nvPr/>
+        </p:nvGrpSpPr>
+        <p:grpSpPr>
+          <a:xfrm>
+            <a:off x="440200" y="2158326"/>
+            <a:ext cx="5526892" cy="461665"/>
+            <a:chOff x="460520" y="1991112"/>
+            <a:chExt cx="5526892" cy="461665"/>
+          </a:xfrm>
+        </p:grpSpPr>
+        <p:sp>
+          <p:nvSpPr>
+            <p:cNvPr id="33" name="Rectangle 32">
+              <a:extLst>
+                <a:ext uri="{FF2B5EF4-FFF2-40B4-BE49-F238E27FC236}">
+                  <a16:creationId xmlns:a16="http://schemas.microsoft.com/office/drawing/2014/main" id="{0C689E94-04DA-4405-AE79-8BC095FCC283}"/>
+                </a:ext>
+              </a:extLst>
+            </p:cNvPr>
+            <p:cNvSpPr/>
+            <p:nvPr/>
+          </p:nvSpPr>
+          <p:spPr>
+            <a:xfrm>
+              <a:off x="1504949" y="2067663"/>
+              <a:ext cx="4482463" cy="276999"/>
+            </a:xfrm>
+            <a:prstGeom prst="rect">
+              <a:avLst/>
+            </a:prstGeom>
+            <a:noFill/>
+            <a:ln w="28575" cap="flat" cmpd="sng" algn="ctr">
+              <a:solidFill>
+                <a:srgbClr val="A401FF"/>
+              </a:solidFill>
+              <a:prstDash val="solid"/>
+              <a:round/>
+              <a:headEnd type="none" w="med" len="med"/>
+              <a:tailEnd type="none" w="med" len="med"/>
+            </a:ln>
+          </p:spPr>
+          <p:style>
+            <a:lnRef idx="0">
+              <a:scrgbClr r="0" g="0" b="0"/>
+            </a:lnRef>
+            <a:fillRef idx="0">
+              <a:scrgbClr r="0" g="0" b="0"/>
+            </a:fillRef>
+            <a:effectRef idx="0">
+              <a:scrgbClr r="0" g="0" b="0"/>
+            </a:effectRef>
+            <a:fontRef idx="minor">
+              <a:schemeClr val="accent4"/>
+            </a:fontRef>
+          </p:style>
+          <p:txBody>
+            <a:bodyPr rtlCol="0" anchor="ctr"/>
+            <a:lstStyle/>
+            <a:p>
+              <a:pPr algn="ctr"/>
+              <a:endParaRPr lang="en-SG"/>
+            </a:p>
+          </p:txBody>
+        </p:sp>
+        <p:sp>
+          <p:nvSpPr>
+            <p:cNvPr id="34" name="Left Brace 33">
+              <a:extLst>
+                <a:ext uri="{FF2B5EF4-FFF2-40B4-BE49-F238E27FC236}">
+                  <a16:creationId xmlns:a16="http://schemas.microsoft.com/office/drawing/2014/main" id="{222FAE24-7A73-4290-9FB2-3A3528D6EBA2}"/>
+                </a:ext>
+              </a:extLst>
+            </p:cNvPr>
+            <p:cNvSpPr/>
+            <p:nvPr/>
+          </p:nvSpPr>
+          <p:spPr>
+            <a:xfrm>
+              <a:off x="1098796" y="2084176"/>
+              <a:ext cx="348052" cy="237053"/>
+            </a:xfrm>
+            <a:prstGeom prst="leftBrace">
+              <a:avLst/>
+            </a:prstGeom>
+            <a:ln w="19050">
+              <a:solidFill>
+                <a:srgbClr val="A401FF"/>
+              </a:solidFill>
+            </a:ln>
+          </p:spPr>
+          <p:style>
+            <a:lnRef idx="1">
+              <a:schemeClr val="accent1"/>
+            </a:lnRef>
+            <a:fillRef idx="0">
+              <a:schemeClr val="accent1"/>
+            </a:fillRef>
+            <a:effectRef idx="0">
+              <a:schemeClr val="accent1"/>
+            </a:effectRef>
+            <a:fontRef idx="minor">
+              <a:schemeClr val="tx1"/>
+            </a:fontRef>
+          </p:style>
+          <p:txBody>
+            <a:bodyPr rtlCol="0" anchor="ctr"/>
+            <a:lstStyle/>
+            <a:p>
+              <a:pPr algn="ctr"/>
+              <a:endParaRPr lang="en-SG"/>
+            </a:p>
+          </p:txBody>
+        </p:sp>
+        <p:sp>
+          <p:nvSpPr>
+            <p:cNvPr id="35" name="TextBox 34">
+              <a:extLst>
+                <a:ext uri="{FF2B5EF4-FFF2-40B4-BE49-F238E27FC236}">
+                  <a16:creationId xmlns:a16="http://schemas.microsoft.com/office/drawing/2014/main" id="{EF436BD1-46E2-4EB0-8C8E-A61FF6951C31}"/>
+                </a:ext>
+              </a:extLst>
+            </p:cNvPr>
+            <p:cNvSpPr txBox="1"/>
+            <p:nvPr/>
+          </p:nvSpPr>
+          <p:spPr>
+            <a:xfrm>
+              <a:off x="460520" y="1991112"/>
+              <a:ext cx="723900" cy="461665"/>
+            </a:xfrm>
+            <a:prstGeom prst="rect">
+              <a:avLst/>
+            </a:prstGeom>
+            <a:noFill/>
+          </p:spPr>
+          <p:txBody>
+            <a:bodyPr wrap="square" rtlCol="0">
+              <a:spAutoFit/>
+            </a:bodyPr>
+            <a:lstStyle/>
+            <a:p>
+              <a:pPr algn="ctr"/>
+              <a:r>
+                <a:rPr lang="en-US" sz="1200" dirty="0">
+                  <a:solidFill>
+                    <a:srgbClr val="7030A0"/>
+                  </a:solidFill>
+                </a:rPr>
+                <a:t>Ramp Chart</a:t>
+              </a:r>
+            </a:p>
+          </p:txBody>
+        </p:sp>
+      </p:grpSp>
+      <p:grpSp>
+        <p:nvGrpSpPr>
+          <p:cNvPr id="42" name="Group 41">
+            <a:extLst>
+              <a:ext uri="{FF2B5EF4-FFF2-40B4-BE49-F238E27FC236}">
+                <a16:creationId xmlns:a16="http://schemas.microsoft.com/office/drawing/2014/main" id="{B9C91654-E14E-4BC1-8843-976ECB18131B}"/>
+              </a:ext>
+            </a:extLst>
+          </p:cNvPr>
+          <p:cNvGrpSpPr/>
+          <p:nvPr/>
+        </p:nvGrpSpPr>
+        <p:grpSpPr>
+          <a:xfrm>
+            <a:off x="181614" y="3460043"/>
+            <a:ext cx="5827029" cy="461665"/>
+            <a:chOff x="181614" y="3716589"/>
+            <a:chExt cx="5827029" cy="461665"/>
+          </a:xfrm>
+        </p:grpSpPr>
+        <p:sp>
+          <p:nvSpPr>
+            <p:cNvPr id="46" name="Rectangle 45">
+              <a:extLst>
+                <a:ext uri="{FF2B5EF4-FFF2-40B4-BE49-F238E27FC236}">
+                  <a16:creationId xmlns:a16="http://schemas.microsoft.com/office/drawing/2014/main" id="{046392F6-712F-4248-819F-5F03FBDBE02B}"/>
+                </a:ext>
+              </a:extLst>
+            </p:cNvPr>
+            <p:cNvSpPr/>
+            <p:nvPr/>
+          </p:nvSpPr>
+          <p:spPr>
+            <a:xfrm>
+              <a:off x="1526181" y="3880858"/>
+              <a:ext cx="4482462" cy="96793"/>
+            </a:xfrm>
+            <a:prstGeom prst="rect">
+              <a:avLst/>
+            </a:prstGeom>
+            <a:noFill/>
+            <a:ln w="9525" cap="flat" cmpd="sng" algn="ctr">
+              <a:solidFill>
+                <a:schemeClr val="dk1"/>
+              </a:solidFill>
+              <a:prstDash val="solid"/>
+              <a:round/>
+              <a:headEnd type="none" w="med" len="med"/>
+              <a:tailEnd type="none" w="med" len="med"/>
+            </a:ln>
+          </p:spPr>
+          <p:style>
+            <a:lnRef idx="0">
+              <a:scrgbClr r="0" g="0" b="0"/>
+            </a:lnRef>
+            <a:fillRef idx="0">
+              <a:scrgbClr r="0" g="0" b="0"/>
+            </a:fillRef>
+            <a:effectRef idx="0">
+              <a:scrgbClr r="0" g="0" b="0"/>
+            </a:effectRef>
+            <a:fontRef idx="minor">
+              <a:schemeClr val="dk1"/>
+            </a:fontRef>
+          </p:style>
+          <p:txBody>
+            <a:bodyPr rtlCol="0" anchor="ctr"/>
+            <a:lstStyle/>
+            <a:p>
+              <a:pPr algn="ctr"/>
+              <a:endParaRPr lang="en-SG"/>
+            </a:p>
+          </p:txBody>
+        </p:sp>
+        <p:sp>
+          <p:nvSpPr>
+            <p:cNvPr id="48" name="Arrow: Left 47">
+              <a:extLst>
+                <a:ext uri="{FF2B5EF4-FFF2-40B4-BE49-F238E27FC236}">
+                  <a16:creationId xmlns:a16="http://schemas.microsoft.com/office/drawing/2014/main" id="{1B3593E0-8F68-41EA-A8FE-5188B0C5C7EA}"/>
+                </a:ext>
+              </a:extLst>
+            </p:cNvPr>
+            <p:cNvSpPr/>
+            <p:nvPr/>
+          </p:nvSpPr>
+          <p:spPr>
+            <a:xfrm>
+              <a:off x="1133943" y="3880858"/>
+              <a:ext cx="348052" cy="96793"/>
+            </a:xfrm>
+            <a:prstGeom prst="leftArrow">
+              <a:avLst/>
+            </a:prstGeom>
+          </p:spPr>
+          <p:style>
+            <a:lnRef idx="2">
+              <a:schemeClr val="dk1">
+                <a:shade val="50000"/>
+              </a:schemeClr>
+            </a:lnRef>
+            <a:fillRef idx="1">
+              <a:schemeClr val="dk1"/>
+            </a:fillRef>
+            <a:effectRef idx="0">
+              <a:schemeClr val="dk1"/>
+            </a:effectRef>
+            <a:fontRef idx="minor">
+              <a:schemeClr val="lt1"/>
+            </a:fontRef>
+          </p:style>
+          <p:txBody>
+            <a:bodyPr rtlCol="0" anchor="ctr"/>
+            <a:lstStyle/>
+            <a:p>
+              <a:pPr algn="ctr"/>
+              <a:endParaRPr lang="en-SG"/>
+            </a:p>
+          </p:txBody>
+        </p:sp>
+        <p:sp>
+          <p:nvSpPr>
+            <p:cNvPr id="49" name="TextBox 48">
+              <a:extLst>
+                <a:ext uri="{FF2B5EF4-FFF2-40B4-BE49-F238E27FC236}">
+                  <a16:creationId xmlns:a16="http://schemas.microsoft.com/office/drawing/2014/main" id="{B179F6A5-F356-4AE0-BE67-A636F79B6560}"/>
+                </a:ext>
+              </a:extLst>
+            </p:cNvPr>
+            <p:cNvSpPr txBox="1"/>
+            <p:nvPr/>
+          </p:nvSpPr>
+          <p:spPr>
+            <a:xfrm>
+              <a:off x="181614" y="3716589"/>
+              <a:ext cx="1014711" cy="461665"/>
+            </a:xfrm>
+            <a:prstGeom prst="rect">
+              <a:avLst/>
+            </a:prstGeom>
+            <a:noFill/>
+          </p:spPr>
+          <p:txBody>
+            <a:bodyPr wrap="square" rtlCol="0">
+              <a:spAutoFit/>
+            </a:bodyPr>
+            <a:lstStyle/>
+            <a:p>
+              <a:pPr algn="ctr"/>
+              <a:r>
+                <a:rPr lang="en-US" sz="1200" dirty="0"/>
+                <a:t>Contribution Bar</a:t>
+              </a:r>
+              <a:endParaRPr lang="en-SG" sz="1200" dirty="0"/>
+            </a:p>
+          </p:txBody>
+        </p:sp>
+      </p:grpSp>
+      <p:grpSp>
+        <p:nvGrpSpPr>
+          <p:cNvPr id="37" name="Group 36">
+            <a:extLst>
+              <a:ext uri="{FF2B5EF4-FFF2-40B4-BE49-F238E27FC236}">
+                <a16:creationId xmlns:a16="http://schemas.microsoft.com/office/drawing/2014/main" id="{40CE11B1-9A6E-4A62-839A-2DCDA1A8D4FF}"/>
+              </a:ext>
+            </a:extLst>
+          </p:cNvPr>
+          <p:cNvGrpSpPr/>
+          <p:nvPr/>
+        </p:nvGrpSpPr>
+        <p:grpSpPr>
+          <a:xfrm>
+            <a:off x="6204585" y="1871638"/>
+            <a:ext cx="3424155" cy="402234"/>
+            <a:chOff x="6202680" y="1735827"/>
+            <a:chExt cx="3424155" cy="402234"/>
+          </a:xfrm>
+        </p:grpSpPr>
+        <p:sp>
+          <p:nvSpPr>
+            <p:cNvPr id="12" name="Arrow: Right 11">
+              <a:extLst>
+                <a:ext uri="{FF2B5EF4-FFF2-40B4-BE49-F238E27FC236}">
+                  <a16:creationId xmlns:a16="http://schemas.microsoft.com/office/drawing/2014/main" id="{88177BEA-4D65-45B7-A56C-6FBD7CF8C471}"/>
+                </a:ext>
+              </a:extLst>
+            </p:cNvPr>
+            <p:cNvSpPr/>
+            <p:nvPr/>
+          </p:nvSpPr>
+          <p:spPr>
+            <a:xfrm rot="21372755">
+              <a:off x="8429466" y="1857407"/>
+              <a:ext cx="402336" cy="121920"/>
+            </a:xfrm>
+            <a:prstGeom prst="rightArrow">
+              <a:avLst/>
+            </a:prstGeom>
+          </p:spPr>
+          <p:style>
+            <a:lnRef idx="2">
+              <a:schemeClr val="accent6">
+                <a:shade val="50000"/>
+              </a:schemeClr>
+            </a:lnRef>
+            <a:fillRef idx="1">
+              <a:schemeClr val="accent6"/>
+            </a:fillRef>
+            <a:effectRef idx="0">
+              <a:schemeClr val="accent6"/>
+            </a:effectRef>
+            <a:fontRef idx="minor">
+              <a:schemeClr val="lt1"/>
+            </a:fontRef>
+          </p:style>
+          <p:txBody>
+            <a:bodyPr rtlCol="0" anchor="ctr"/>
+            <a:lstStyle/>
+            <a:p>
+              <a:pPr algn="ctr"/>
+              <a:endParaRPr lang="en-SG"/>
+            </a:p>
+          </p:txBody>
+        </p:sp>
+        <p:sp>
+          <p:nvSpPr>
+            <p:cNvPr id="13" name="TextBox 12">
+              <a:extLst>
+                <a:ext uri="{FF2B5EF4-FFF2-40B4-BE49-F238E27FC236}">
+                  <a16:creationId xmlns:a16="http://schemas.microsoft.com/office/drawing/2014/main" id="{C135F275-4477-467B-8D51-84AA5700DE35}"/>
+                </a:ext>
+              </a:extLst>
+            </p:cNvPr>
+            <p:cNvSpPr txBox="1"/>
+            <p:nvPr/>
+          </p:nvSpPr>
+          <p:spPr>
+            <a:xfrm>
+              <a:off x="8790433" y="1735827"/>
+              <a:ext cx="836402" cy="276999"/>
+            </a:xfrm>
+            <a:prstGeom prst="rect">
+              <a:avLst/>
+            </a:prstGeom>
+            <a:noFill/>
+          </p:spPr>
+          <p:txBody>
+            <a:bodyPr wrap="square" rtlCol="0">
+              <a:spAutoFit/>
+            </a:bodyPr>
+            <a:lstStyle/>
+            <a:p>
+              <a:r>
+                <a:rPr lang="en-US" sz="1200" dirty="0">
+                  <a:solidFill>
+                    <a:schemeClr val="accent6">
+                      <a:lumMod val="75000"/>
+                    </a:schemeClr>
+                  </a:solidFill>
+                </a:rPr>
+                <a:t>Glob Filter</a:t>
+              </a:r>
+              <a:endParaRPr lang="en-SG" sz="1200" dirty="0">
                 <a:solidFill>
                   <a:schemeClr val="accent6">
                     <a:lumMod val="75000"/>
                   </a:schemeClr>
                 </a:solidFill>
-              </a:rPr>
-              <a:t>Glob Filter</a:t>
-            </a:r>
-            <a:endParaRPr lang="en-SG" sz="1200" dirty="0">
+              </a:endParaRPr>
+            </a:p>
+          </p:txBody>
+        </p:sp>
+        <p:sp>
+          <p:nvSpPr>
+            <p:cNvPr id="50" name="Rectangle 49">
+              <a:extLst>
+                <a:ext uri="{FF2B5EF4-FFF2-40B4-BE49-F238E27FC236}">
+                  <a16:creationId xmlns:a16="http://schemas.microsoft.com/office/drawing/2014/main" id="{66E4832A-82B6-4ACE-88A2-1FC6DCF2CED8}"/>
+                </a:ext>
+              </a:extLst>
+            </p:cNvPr>
+            <p:cNvSpPr/>
+            <p:nvPr/>
+          </p:nvSpPr>
+          <p:spPr>
+            <a:xfrm>
+              <a:off x="6202680" y="1861062"/>
+              <a:ext cx="2151751" cy="276999"/>
+            </a:xfrm>
+            <a:prstGeom prst="rect">
+              <a:avLst/>
+            </a:prstGeom>
+            <a:noFill/>
+            <a:ln w="19050" cap="flat" cmpd="sng" algn="ctr">
               <a:solidFill>
-                <a:schemeClr val="accent6">
-                  <a:lumMod val="75000"/>
-                </a:schemeClr>
+                <a:schemeClr val="accent6"/>
               </a:solidFill>
-            </a:endParaRPr>
-          </a:p>
-        </p:txBody>
-      </p:sp>
-      <p:sp>
-        <p:nvSpPr>
-          <p:cNvPr id="16" name="Oval 15">
-            <a:extLst>
-              <a:ext uri="{FF2B5EF4-FFF2-40B4-BE49-F238E27FC236}">
-                <a16:creationId xmlns:a16="http://schemas.microsoft.com/office/drawing/2014/main" id="{0FA3B7FA-4DB5-4EB3-9614-C6246C535AC6}"/>
-              </a:ext>
-            </a:extLst>
-          </p:cNvPr>
-          <p:cNvSpPr/>
+              <a:prstDash val="solid"/>
+              <a:round/>
+              <a:headEnd type="none" w="med" len="med"/>
+              <a:tailEnd type="none" w="med" len="med"/>
+            </a:ln>
+          </p:spPr>
+          <p:style>
+            <a:lnRef idx="0">
+              <a:scrgbClr r="0" g="0" b="0"/>
+            </a:lnRef>
+            <a:fillRef idx="0">
+              <a:scrgbClr r="0" g="0" b="0"/>
+            </a:fillRef>
+            <a:effectRef idx="0">
+              <a:scrgbClr r="0" g="0" b="0"/>
+            </a:effectRef>
+            <a:fontRef idx="minor">
+              <a:schemeClr val="accent6"/>
+            </a:fontRef>
+          </p:style>
+          <p:txBody>
+            <a:bodyPr rtlCol="0" anchor="ctr"/>
+            <a:lstStyle/>
+            <a:p>
+              <a:pPr algn="ctr"/>
+              <a:endParaRPr lang="en-SG"/>
+            </a:p>
+          </p:txBody>
+        </p:sp>
+      </p:grpSp>
+      <p:grpSp>
+        <p:nvGrpSpPr>
+          <p:cNvPr id="45" name="Group 44">
+            <a:extLst>
+              <a:ext uri="{FF2B5EF4-FFF2-40B4-BE49-F238E27FC236}">
+                <a16:creationId xmlns:a16="http://schemas.microsoft.com/office/drawing/2014/main" id="{BA9B9247-4484-4646-8644-07DCE3660A2C}"/>
+              </a:ext>
+            </a:extLst>
+          </p:cNvPr>
+          <p:cNvGrpSpPr/>
           <p:nvPr/>
-        </p:nvSpPr>
-        <p:spPr>
+        </p:nvGrpSpPr>
+        <p:grpSpPr>
           <a:xfrm>
-            <a:off x="8603087" y="3116629"/>
-            <a:ext cx="154341" cy="163314"/>
+            <a:off x="2958279" y="3702395"/>
+            <a:ext cx="1674876" cy="246221"/>
+            <a:chOff x="2943039" y="3682075"/>
+            <a:chExt cx="1674876" cy="246221"/>
           </a:xfrm>
-          <a:prstGeom prst="ellipse">
-            <a:avLst/>
-          </a:prstGeom>
-          <a:noFill/>
-          <a:ln w="9525" cap="flat" cmpd="sng" algn="ctr">
-            <a:solidFill>
-              <a:schemeClr val="accent5"/>
-            </a:solidFill>
-            <a:prstDash val="solid"/>
-            <a:round/>
-            <a:headEnd type="none" w="med" len="med"/>
-            <a:tailEnd type="none" w="med" len="med"/>
-          </a:ln>
-        </p:spPr>
-        <p:style>
-          <a:lnRef idx="0">
-            <a:scrgbClr r="0" g="0" b="0"/>
-          </a:lnRef>
-          <a:fillRef idx="0">
-            <a:scrgbClr r="0" g="0" b="0"/>
-          </a:fillRef>
-          <a:effectRef idx="0">
-            <a:scrgbClr r="0" g="0" b="0"/>
-          </a:effectRef>
-          <a:fontRef idx="minor">
-            <a:schemeClr val="accent5"/>
-          </a:fontRef>
-        </p:style>
-        <p:txBody>
-          <a:bodyPr rtlCol="0" anchor="ctr"/>
-          <a:lstStyle/>
-          <a:p>
-            <a:pPr algn="ctr"/>
-            <a:endParaRPr lang="en-SG"/>
-          </a:p>
-        </p:txBody>
-      </p:sp>
-      <p:sp>
-        <p:nvSpPr>
-          <p:cNvPr id="17" name="TextBox 16">
-            <a:extLst>
-              <a:ext uri="{FF2B5EF4-FFF2-40B4-BE49-F238E27FC236}">
-                <a16:creationId xmlns:a16="http://schemas.microsoft.com/office/drawing/2014/main" id="{0213D02D-4396-4437-B87F-870EECAA3F68}"/>
-              </a:ext>
-            </a:extLst>
-          </p:cNvPr>
-          <p:cNvSpPr txBox="1"/>
-          <p:nvPr/>
-        </p:nvSpPr>
-        <p:spPr>
-          <a:xfrm>
-            <a:off x="8777222" y="2719565"/>
-            <a:ext cx="921278" cy="276999"/>
-          </a:xfrm>
-          <a:prstGeom prst="rect">
-            <a:avLst/>
-          </a:prstGeom>
-          <a:noFill/>
-        </p:spPr>
-        <p:txBody>
-          <a:bodyPr wrap="none" rtlCol="0">
-            <a:spAutoFit/>
-          </a:bodyPr>
-          <a:lstStyle/>
-          <a:p>
-            <a:r>
-              <a:rPr lang="en-US" sz="1200" dirty="0">
+        </p:grpSpPr>
+        <p:sp>
+          <p:nvSpPr>
+            <p:cNvPr id="41" name="Oval 40">
+              <a:extLst>
+                <a:ext uri="{FF2B5EF4-FFF2-40B4-BE49-F238E27FC236}">
+                  <a16:creationId xmlns:a16="http://schemas.microsoft.com/office/drawing/2014/main" id="{6880A5AA-24C1-43E2-8DFB-1B2950E077F8}"/>
+                </a:ext>
+              </a:extLst>
+            </p:cNvPr>
+            <p:cNvSpPr/>
+            <p:nvPr/>
+          </p:nvSpPr>
+          <p:spPr>
+            <a:xfrm>
+              <a:off x="2943039" y="3747521"/>
+              <a:ext cx="121920" cy="155835"/>
+            </a:xfrm>
+            <a:prstGeom prst="ellipse">
+              <a:avLst/>
+            </a:prstGeom>
+            <a:noFill/>
+            <a:ln w="9525" cap="flat" cmpd="sng" algn="ctr">
+              <a:solidFill>
+                <a:schemeClr val="accent1"/>
+              </a:solidFill>
+              <a:prstDash val="solid"/>
+              <a:round/>
+              <a:headEnd type="none" w="med" len="med"/>
+              <a:tailEnd type="none" w="med" len="med"/>
+            </a:ln>
+          </p:spPr>
+          <p:style>
+            <a:lnRef idx="0">
+              <a:scrgbClr r="0" g="0" b="0"/>
+            </a:lnRef>
+            <a:fillRef idx="0">
+              <a:scrgbClr r="0" g="0" b="0"/>
+            </a:fillRef>
+            <a:effectRef idx="0">
+              <a:scrgbClr r="0" g="0" b="0"/>
+            </a:effectRef>
+            <a:fontRef idx="minor">
+              <a:schemeClr val="accent1"/>
+            </a:fontRef>
+          </p:style>
+          <p:txBody>
+            <a:bodyPr rtlCol="0" anchor="ctr"/>
+            <a:lstStyle/>
+            <a:p>
+              <a:pPr algn="ctr"/>
+              <a:endParaRPr lang="en-SG"/>
+            </a:p>
+          </p:txBody>
+        </p:sp>
+        <p:sp>
+          <p:nvSpPr>
+            <p:cNvPr id="43" name="Arrow: Right 42">
+              <a:extLst>
+                <a:ext uri="{FF2B5EF4-FFF2-40B4-BE49-F238E27FC236}">
+                  <a16:creationId xmlns:a16="http://schemas.microsoft.com/office/drawing/2014/main" id="{EF37E420-EADC-4F88-A44F-E20C33AD8985}"/>
+                </a:ext>
+              </a:extLst>
+            </p:cNvPr>
+            <p:cNvSpPr/>
+            <p:nvPr/>
+          </p:nvSpPr>
+          <p:spPr>
+            <a:xfrm>
+              <a:off x="3120106" y="3768558"/>
+              <a:ext cx="147081" cy="96793"/>
+            </a:xfrm>
+            <a:prstGeom prst="rightArrow">
+              <a:avLst/>
+            </a:prstGeom>
+          </p:spPr>
+          <p:style>
+            <a:lnRef idx="2">
+              <a:schemeClr val="accent1">
+                <a:shade val="50000"/>
+              </a:schemeClr>
+            </a:lnRef>
+            <a:fillRef idx="1">
+              <a:schemeClr val="accent1"/>
+            </a:fillRef>
+            <a:effectRef idx="0">
+              <a:schemeClr val="accent1"/>
+            </a:effectRef>
+            <a:fontRef idx="minor">
+              <a:schemeClr val="lt1"/>
+            </a:fontRef>
+          </p:style>
+          <p:txBody>
+            <a:bodyPr rtlCol="0" anchor="ctr"/>
+            <a:lstStyle/>
+            <a:p>
+              <a:pPr algn="ctr"/>
+              <a:endParaRPr lang="en-SG"/>
+            </a:p>
+          </p:txBody>
+        </p:sp>
+        <p:sp>
+          <p:nvSpPr>
+            <p:cNvPr id="52" name="TextBox 51">
+              <a:extLst>
+                <a:ext uri="{FF2B5EF4-FFF2-40B4-BE49-F238E27FC236}">
+                  <a16:creationId xmlns:a16="http://schemas.microsoft.com/office/drawing/2014/main" id="{20B2E512-146C-44A7-8F30-D1175B798E6B}"/>
+                </a:ext>
+              </a:extLst>
+            </p:cNvPr>
+            <p:cNvSpPr txBox="1"/>
+            <p:nvPr/>
+          </p:nvSpPr>
+          <p:spPr>
+            <a:xfrm>
+              <a:off x="3217740" y="3682075"/>
+              <a:ext cx="1400175" cy="246221"/>
+            </a:xfrm>
+            <a:prstGeom prst="rect">
+              <a:avLst/>
+            </a:prstGeom>
+            <a:noFill/>
+          </p:spPr>
+          <p:txBody>
+            <a:bodyPr wrap="square" rtlCol="0">
+              <a:spAutoFit/>
+            </a:bodyPr>
+            <a:lstStyle/>
+            <a:p>
+              <a:r>
+                <a:rPr lang="en-US" sz="1000" dirty="0">
+                  <a:solidFill>
+                    <a:schemeClr val="accent1"/>
+                  </a:solidFill>
+                </a:rPr>
+                <a:t>Link to commits panel</a:t>
+              </a:r>
+              <a:endParaRPr lang="en-SG" sz="1000" dirty="0">
                 <a:solidFill>
                   <a:schemeClr val="accent1"/>
                 </a:solidFill>
-              </a:rPr>
-              <a:t>Blame View</a:t>
-            </a:r>
-            <a:endParaRPr lang="en-SG" sz="1200" dirty="0">
-              <a:solidFill>
-                <a:schemeClr val="accent1"/>
-              </a:solidFill>
-            </a:endParaRPr>
-          </a:p>
-        </p:txBody>
-      </p:sp>
-      <p:sp>
-        <p:nvSpPr>
-          <p:cNvPr id="18" name="Oval 17">
-            <a:extLst>
-              <a:ext uri="{FF2B5EF4-FFF2-40B4-BE49-F238E27FC236}">
-                <a16:creationId xmlns:a16="http://schemas.microsoft.com/office/drawing/2014/main" id="{3698720C-0C2B-463A-B70A-97FF666889C2}"/>
-              </a:ext>
-            </a:extLst>
-          </p:cNvPr>
-          <p:cNvSpPr/>
-          <p:nvPr/>
-        </p:nvSpPr>
-        <p:spPr>
-          <a:xfrm>
-            <a:off x="8448746" y="3115227"/>
-            <a:ext cx="154341" cy="165109"/>
-          </a:xfrm>
-          <a:prstGeom prst="ellipse">
-            <a:avLst/>
-          </a:prstGeom>
-          <a:noFill/>
-          <a:ln w="9525" cap="flat" cmpd="sng" algn="ctr">
-            <a:solidFill>
-              <a:schemeClr val="accent2"/>
-            </a:solidFill>
-            <a:prstDash val="solid"/>
-            <a:round/>
-            <a:headEnd type="none" w="med" len="med"/>
-            <a:tailEnd type="none" w="med" len="med"/>
-          </a:ln>
-        </p:spPr>
-        <p:style>
-          <a:lnRef idx="0">
-            <a:scrgbClr r="0" g="0" b="0"/>
-          </a:lnRef>
-          <a:fillRef idx="0">
-            <a:scrgbClr r="0" g="0" b="0"/>
-          </a:fillRef>
-          <a:effectRef idx="0">
-            <a:scrgbClr r="0" g="0" b="0"/>
-          </a:effectRef>
-          <a:fontRef idx="minor">
-            <a:schemeClr val="accent2"/>
-          </a:fontRef>
-        </p:style>
-        <p:txBody>
-          <a:bodyPr rtlCol="0" anchor="ctr"/>
-          <a:lstStyle/>
-          <a:p>
-            <a:pPr algn="ctr"/>
-            <a:endParaRPr lang="en-SG"/>
-          </a:p>
-        </p:txBody>
-      </p:sp>
-      <p:sp>
-        <p:nvSpPr>
-          <p:cNvPr id="19" name="Arrow: Right 18">
-            <a:extLst>
-              <a:ext uri="{FF2B5EF4-FFF2-40B4-BE49-F238E27FC236}">
-                <a16:creationId xmlns:a16="http://schemas.microsoft.com/office/drawing/2014/main" id="{A85A5DB4-65AD-4483-B496-640C742923A0}"/>
-              </a:ext>
-            </a:extLst>
-          </p:cNvPr>
-          <p:cNvSpPr/>
-          <p:nvPr/>
-        </p:nvSpPr>
-        <p:spPr>
-          <a:xfrm rot="19492286">
-            <a:off x="8747796" y="2993386"/>
-            <a:ext cx="236436" cy="97790"/>
-          </a:xfrm>
-          <a:prstGeom prst="rightArrow">
-            <a:avLst/>
-          </a:prstGeom>
-        </p:spPr>
-        <p:style>
-          <a:lnRef idx="2">
-            <a:schemeClr val="accent1">
-              <a:shade val="50000"/>
-            </a:schemeClr>
-          </a:lnRef>
-          <a:fillRef idx="1">
-            <a:schemeClr val="accent1"/>
-          </a:fillRef>
-          <a:effectRef idx="0">
-            <a:schemeClr val="accent1"/>
-          </a:effectRef>
-          <a:fontRef idx="minor">
-            <a:schemeClr val="lt1"/>
-          </a:fontRef>
-        </p:style>
-        <p:txBody>
-          <a:bodyPr rtlCol="0" anchor="ctr"/>
-          <a:lstStyle/>
-          <a:p>
-            <a:pPr algn="ctr"/>
-            <a:endParaRPr lang="en-SG"/>
-          </a:p>
-        </p:txBody>
-      </p:sp>
-      <p:sp>
-        <p:nvSpPr>
-          <p:cNvPr id="20" name="Arrow: Right 19">
-            <a:extLst>
-              <a:ext uri="{FF2B5EF4-FFF2-40B4-BE49-F238E27FC236}">
-                <a16:creationId xmlns:a16="http://schemas.microsoft.com/office/drawing/2014/main" id="{620CEC16-4148-4C61-AC47-F7DFED9FDB71}"/>
-              </a:ext>
-            </a:extLst>
-          </p:cNvPr>
-          <p:cNvSpPr/>
-          <p:nvPr/>
-        </p:nvSpPr>
-        <p:spPr>
-          <a:xfrm rot="18900000">
-            <a:off x="8286583" y="3318450"/>
-            <a:ext cx="158874" cy="97790"/>
-          </a:xfrm>
-          <a:prstGeom prst="rightArrow">
-            <a:avLst/>
-          </a:prstGeom>
-        </p:spPr>
-        <p:style>
-          <a:lnRef idx="2">
-            <a:schemeClr val="accent2">
-              <a:shade val="50000"/>
-            </a:schemeClr>
-          </a:lnRef>
-          <a:fillRef idx="1">
-            <a:schemeClr val="accent2"/>
-          </a:fillRef>
-          <a:effectRef idx="0">
-            <a:schemeClr val="accent2"/>
-          </a:effectRef>
-          <a:fontRef idx="minor">
-            <a:schemeClr val="lt1"/>
-          </a:fontRef>
-        </p:style>
-        <p:txBody>
-          <a:bodyPr rtlCol="0" anchor="ctr"/>
-          <a:lstStyle/>
-          <a:p>
-            <a:pPr algn="ctr"/>
-            <a:endParaRPr lang="en-SG"/>
-          </a:p>
-        </p:txBody>
-      </p:sp>
-      <p:sp>
-        <p:nvSpPr>
-          <p:cNvPr id="21" name="TextBox 20">
-            <a:extLst>
-              <a:ext uri="{FF2B5EF4-FFF2-40B4-BE49-F238E27FC236}">
-                <a16:creationId xmlns:a16="http://schemas.microsoft.com/office/drawing/2014/main" id="{D1178780-E5C8-40A3-866C-F0D48D349217}"/>
-              </a:ext>
-            </a:extLst>
-          </p:cNvPr>
-          <p:cNvSpPr txBox="1"/>
-          <p:nvPr/>
-        </p:nvSpPr>
-        <p:spPr>
-          <a:xfrm>
-            <a:off x="7475403" y="3406828"/>
-            <a:ext cx="973343" cy="276999"/>
-          </a:xfrm>
-          <a:prstGeom prst="rect">
-            <a:avLst/>
-          </a:prstGeom>
-          <a:noFill/>
-        </p:spPr>
-        <p:txBody>
-          <a:bodyPr wrap="none" rtlCol="0">
-            <a:spAutoFit/>
-          </a:bodyPr>
-          <a:lstStyle/>
-          <a:p>
-            <a:r>
-              <a:rPr lang="en-US" sz="1200" dirty="0">
-                <a:solidFill>
-                  <a:schemeClr val="accent2"/>
-                </a:solidFill>
-              </a:rPr>
-              <a:t>History View</a:t>
-            </a:r>
-            <a:endParaRPr lang="en-SG" sz="1200" dirty="0">
-              <a:solidFill>
-                <a:schemeClr val="accent2"/>
-              </a:solidFill>
-            </a:endParaRPr>
-          </a:p>
-        </p:txBody>
-      </p:sp>
-      <p:sp>
-        <p:nvSpPr>
-          <p:cNvPr id="23" name="Rectangle 22">
-            <a:extLst>
-              <a:ext uri="{FF2B5EF4-FFF2-40B4-BE49-F238E27FC236}">
-                <a16:creationId xmlns:a16="http://schemas.microsoft.com/office/drawing/2014/main" id="{6D6AB3E9-494B-45F6-B9FF-736F40C71E04}"/>
-              </a:ext>
-            </a:extLst>
-          </p:cNvPr>
-          <p:cNvSpPr/>
-          <p:nvPr/>
-        </p:nvSpPr>
-        <p:spPr>
-          <a:xfrm>
-            <a:off x="1443990" y="814386"/>
-            <a:ext cx="4607814" cy="5229225"/>
-          </a:xfrm>
-          <a:prstGeom prst="rect">
-            <a:avLst/>
-          </a:prstGeom>
-          <a:noFill/>
-          <a:ln w="57150" cap="flat" cmpd="sng" algn="ctr">
-            <a:solidFill>
-              <a:schemeClr val="accent1"/>
-            </a:solidFill>
-            <a:prstDash val="solid"/>
-            <a:round/>
-            <a:headEnd type="none" w="med" len="med"/>
-            <a:tailEnd type="none" w="med" len="med"/>
-          </a:ln>
-        </p:spPr>
-        <p:style>
-          <a:lnRef idx="0">
-            <a:scrgbClr r="0" g="0" b="0"/>
-          </a:lnRef>
-          <a:fillRef idx="0">
-            <a:scrgbClr r="0" g="0" b="0"/>
-          </a:fillRef>
-          <a:effectRef idx="0">
-            <a:scrgbClr r="0" g="0" b="0"/>
-          </a:effectRef>
-          <a:fontRef idx="minor">
-            <a:schemeClr val="accent1"/>
-          </a:fontRef>
-        </p:style>
-        <p:txBody>
-          <a:bodyPr rtlCol="0" anchor="ctr"/>
-          <a:lstStyle/>
-          <a:p>
-            <a:pPr algn="ctr"/>
-            <a:endParaRPr lang="en-SG"/>
-          </a:p>
-        </p:txBody>
-      </p:sp>
-      <p:sp>
-        <p:nvSpPr>
-          <p:cNvPr id="22" name="Left Brace 21">
-            <a:extLst>
-              <a:ext uri="{FF2B5EF4-FFF2-40B4-BE49-F238E27FC236}">
-                <a16:creationId xmlns:a16="http://schemas.microsoft.com/office/drawing/2014/main" id="{C4A07B1E-02AC-4689-807B-B2620194B508}"/>
-              </a:ext>
-            </a:extLst>
-          </p:cNvPr>
-          <p:cNvSpPr/>
-          <p:nvPr/>
-        </p:nvSpPr>
-        <p:spPr>
-          <a:xfrm>
-            <a:off x="1343406" y="945870"/>
-            <a:ext cx="516530" cy="869029"/>
-          </a:xfrm>
-          <a:prstGeom prst="leftBrace">
-            <a:avLst>
-              <a:gd name="adj1" fmla="val 14462"/>
-              <a:gd name="adj2" fmla="val 50000"/>
-            </a:avLst>
-          </a:prstGeom>
-        </p:spPr>
-        <p:style>
-          <a:lnRef idx="3">
-            <a:schemeClr val="accent6"/>
-          </a:lnRef>
-          <a:fillRef idx="0">
-            <a:schemeClr val="accent6"/>
-          </a:fillRef>
-          <a:effectRef idx="2">
-            <a:schemeClr val="accent6"/>
-          </a:effectRef>
-          <a:fontRef idx="minor">
-            <a:schemeClr val="tx1"/>
-          </a:fontRef>
-        </p:style>
-        <p:txBody>
-          <a:bodyPr rtlCol="0" anchor="ctr"/>
-          <a:lstStyle/>
-          <a:p>
-            <a:pPr algn="ctr"/>
-            <a:endParaRPr lang="en-SG"/>
-          </a:p>
-        </p:txBody>
-      </p:sp>
-      <p:sp>
-        <p:nvSpPr>
-          <p:cNvPr id="24" name="TextBox 23">
-            <a:extLst>
-              <a:ext uri="{FF2B5EF4-FFF2-40B4-BE49-F238E27FC236}">
-                <a16:creationId xmlns:a16="http://schemas.microsoft.com/office/drawing/2014/main" id="{ACDC6C00-2DF8-42EF-B108-6D30BD3CBE76}"/>
-              </a:ext>
-            </a:extLst>
-          </p:cNvPr>
-          <p:cNvSpPr txBox="1"/>
-          <p:nvPr/>
-        </p:nvSpPr>
-        <p:spPr>
-          <a:xfrm>
-            <a:off x="569214" y="1222349"/>
-            <a:ext cx="723900" cy="276999"/>
-          </a:xfrm>
-          <a:prstGeom prst="rect">
-            <a:avLst/>
-          </a:prstGeom>
-          <a:noFill/>
-        </p:spPr>
-        <p:txBody>
-          <a:bodyPr wrap="square" rtlCol="0">
-            <a:spAutoFit/>
-          </a:bodyPr>
-          <a:lstStyle/>
-          <a:p>
-            <a:pPr algn="ctr"/>
-            <a:r>
-              <a:rPr lang="en-US" sz="1200" dirty="0">
-                <a:solidFill>
-                  <a:schemeClr val="accent6"/>
-                </a:solidFill>
-              </a:rPr>
-              <a:t>Toolbar</a:t>
-            </a:r>
-          </a:p>
-        </p:txBody>
-      </p:sp>
-      <p:sp>
-        <p:nvSpPr>
-          <p:cNvPr id="25" name="Rectangle 24">
-            <a:extLst>
-              <a:ext uri="{FF2B5EF4-FFF2-40B4-BE49-F238E27FC236}">
-                <a16:creationId xmlns:a16="http://schemas.microsoft.com/office/drawing/2014/main" id="{38234176-8BB8-4114-96C5-171C66ECDE3F}"/>
-              </a:ext>
-            </a:extLst>
-          </p:cNvPr>
-          <p:cNvSpPr/>
-          <p:nvPr/>
-        </p:nvSpPr>
-        <p:spPr>
-          <a:xfrm>
-            <a:off x="1859936" y="945870"/>
-            <a:ext cx="3706363" cy="869029"/>
-          </a:xfrm>
-          <a:prstGeom prst="rect">
-            <a:avLst/>
-          </a:prstGeom>
-          <a:noFill/>
-          <a:ln w="9525" cap="flat" cmpd="sng" algn="ctr">
-            <a:solidFill>
-              <a:schemeClr val="accent6"/>
-            </a:solidFill>
-            <a:prstDash val="solid"/>
-            <a:round/>
-            <a:headEnd type="none" w="med" len="med"/>
-            <a:tailEnd type="none" w="med" len="med"/>
-          </a:ln>
-        </p:spPr>
-        <p:style>
-          <a:lnRef idx="0">
-            <a:scrgbClr r="0" g="0" b="0"/>
-          </a:lnRef>
-          <a:fillRef idx="0">
-            <a:scrgbClr r="0" g="0" b="0"/>
-          </a:fillRef>
-          <a:effectRef idx="0">
-            <a:scrgbClr r="0" g="0" b="0"/>
-          </a:effectRef>
-          <a:fontRef idx="minor">
-            <a:schemeClr val="accent6"/>
-          </a:fontRef>
-        </p:style>
-        <p:txBody>
-          <a:bodyPr rtlCol="0" anchor="ctr"/>
-          <a:lstStyle/>
-          <a:p>
-            <a:pPr algn="ctr"/>
-            <a:endParaRPr lang="en-SG"/>
-          </a:p>
-        </p:txBody>
-      </p:sp>
-      <p:sp>
-        <p:nvSpPr>
-          <p:cNvPr id="26" name="Oval 25">
-            <a:extLst>
-              <a:ext uri="{FF2B5EF4-FFF2-40B4-BE49-F238E27FC236}">
-                <a16:creationId xmlns:a16="http://schemas.microsoft.com/office/drawing/2014/main" id="{1173C975-EBB3-439F-8872-826D3DAF91EB}"/>
-              </a:ext>
-            </a:extLst>
-          </p:cNvPr>
-          <p:cNvSpPr/>
-          <p:nvPr/>
-        </p:nvSpPr>
-        <p:spPr>
-          <a:xfrm>
-            <a:off x="2464522" y="2454206"/>
-            <a:ext cx="142875" cy="133350"/>
-          </a:xfrm>
-          <a:prstGeom prst="ellipse">
-            <a:avLst/>
-          </a:prstGeom>
-          <a:noFill/>
-          <a:ln w="9525" cap="flat" cmpd="sng" algn="ctr">
-            <a:solidFill>
-              <a:schemeClr val="accent2"/>
-            </a:solidFill>
-            <a:prstDash val="solid"/>
-            <a:round/>
-            <a:headEnd type="none" w="med" len="med"/>
-            <a:tailEnd type="none" w="med" len="med"/>
-          </a:ln>
-        </p:spPr>
-        <p:style>
-          <a:lnRef idx="0">
-            <a:scrgbClr r="0" g="0" b="0"/>
-          </a:lnRef>
-          <a:fillRef idx="0">
-            <a:scrgbClr r="0" g="0" b="0"/>
-          </a:fillRef>
-          <a:effectRef idx="0">
-            <a:scrgbClr r="0" g="0" b="0"/>
-          </a:effectRef>
-          <a:fontRef idx="minor">
-            <a:schemeClr val="accent2"/>
-          </a:fontRef>
-        </p:style>
-        <p:txBody>
-          <a:bodyPr rtlCol="0" anchor="ctr"/>
-          <a:lstStyle/>
-          <a:p>
-            <a:pPr algn="ctr"/>
-            <a:endParaRPr lang="en-SG"/>
-          </a:p>
-        </p:txBody>
-      </p:sp>
-      <p:sp>
-        <p:nvSpPr>
-          <p:cNvPr id="27" name="Arrow: Right 26">
-            <a:extLst>
-              <a:ext uri="{FF2B5EF4-FFF2-40B4-BE49-F238E27FC236}">
-                <a16:creationId xmlns:a16="http://schemas.microsoft.com/office/drawing/2014/main" id="{A58405F1-EAAD-4099-A00D-F41C9263239F}"/>
-              </a:ext>
-            </a:extLst>
-          </p:cNvPr>
-          <p:cNvSpPr/>
-          <p:nvPr/>
-        </p:nvSpPr>
-        <p:spPr>
-          <a:xfrm rot="21204583">
-            <a:off x="2661847" y="2453845"/>
-            <a:ext cx="142378" cy="66676"/>
-          </a:xfrm>
-          <a:prstGeom prst="rightArrow">
-            <a:avLst/>
-          </a:prstGeom>
-        </p:spPr>
-        <p:style>
-          <a:lnRef idx="2">
-            <a:schemeClr val="accent2">
-              <a:shade val="50000"/>
-            </a:schemeClr>
-          </a:lnRef>
-          <a:fillRef idx="1">
-            <a:schemeClr val="accent2"/>
-          </a:fillRef>
-          <a:effectRef idx="0">
-            <a:schemeClr val="accent2"/>
-          </a:effectRef>
-          <a:fontRef idx="minor">
-            <a:schemeClr val="lt1"/>
-          </a:fontRef>
-        </p:style>
-        <p:txBody>
-          <a:bodyPr rtlCol="0" anchor="ctr"/>
-          <a:lstStyle/>
-          <a:p>
-            <a:pPr algn="ctr"/>
-            <a:endParaRPr lang="en-SG"/>
-          </a:p>
-        </p:txBody>
-      </p:sp>
-      <p:sp>
-        <p:nvSpPr>
-          <p:cNvPr id="28" name="TextBox 27">
-            <a:extLst>
-              <a:ext uri="{FF2B5EF4-FFF2-40B4-BE49-F238E27FC236}">
-                <a16:creationId xmlns:a16="http://schemas.microsoft.com/office/drawing/2014/main" id="{34AE8672-B518-45E4-9DE5-A05EE9D1C6F3}"/>
-              </a:ext>
-            </a:extLst>
-          </p:cNvPr>
-          <p:cNvSpPr txBox="1"/>
-          <p:nvPr/>
-        </p:nvSpPr>
-        <p:spPr>
-          <a:xfrm>
-            <a:off x="2760090" y="2361561"/>
-            <a:ext cx="1400175" cy="246221"/>
-          </a:xfrm>
-          <a:prstGeom prst="rect">
-            <a:avLst/>
-          </a:prstGeom>
-          <a:noFill/>
-        </p:spPr>
-        <p:txBody>
-          <a:bodyPr wrap="square" rtlCol="0">
-            <a:spAutoFit/>
-          </a:bodyPr>
-          <a:lstStyle/>
-          <a:p>
-            <a:r>
-              <a:rPr lang="en-US" sz="1000" dirty="0">
-                <a:solidFill>
-                  <a:schemeClr val="accent2"/>
-                </a:solidFill>
-              </a:rPr>
-              <a:t>Link to repository</a:t>
-            </a:r>
-            <a:endParaRPr lang="en-SG" sz="1000" dirty="0">
-              <a:solidFill>
-                <a:schemeClr val="accent2"/>
-              </a:solidFill>
-            </a:endParaRPr>
-          </a:p>
-        </p:txBody>
-      </p:sp>
-      <p:sp>
-        <p:nvSpPr>
-          <p:cNvPr id="29" name="Oval 28">
-            <a:extLst>
-              <a:ext uri="{FF2B5EF4-FFF2-40B4-BE49-F238E27FC236}">
-                <a16:creationId xmlns:a16="http://schemas.microsoft.com/office/drawing/2014/main" id="{2206B7BC-33E8-473B-84CD-DA37BCD06CDF}"/>
-              </a:ext>
-            </a:extLst>
-          </p:cNvPr>
-          <p:cNvSpPr/>
-          <p:nvPr/>
-        </p:nvSpPr>
-        <p:spPr>
-          <a:xfrm>
-            <a:off x="2230032" y="3000667"/>
-            <a:ext cx="130499" cy="133350"/>
-          </a:xfrm>
-          <a:prstGeom prst="ellipse">
-            <a:avLst/>
-          </a:prstGeom>
-          <a:noFill/>
-          <a:ln w="9525" cap="flat" cmpd="sng" algn="ctr">
-            <a:solidFill>
-              <a:schemeClr val="accent6"/>
-            </a:solidFill>
-            <a:prstDash val="solid"/>
-            <a:round/>
-            <a:headEnd type="none" w="med" len="med"/>
-            <a:tailEnd type="none" w="med" len="med"/>
-          </a:ln>
-        </p:spPr>
-        <p:style>
-          <a:lnRef idx="0">
-            <a:scrgbClr r="0" g="0" b="0"/>
-          </a:lnRef>
-          <a:fillRef idx="0">
-            <a:scrgbClr r="0" g="0" b="0"/>
-          </a:fillRef>
-          <a:effectRef idx="0">
-            <a:scrgbClr r="0" g="0" b="0"/>
-          </a:effectRef>
-          <a:fontRef idx="minor">
-            <a:schemeClr val="accent6"/>
-          </a:fontRef>
-        </p:style>
-        <p:txBody>
-          <a:bodyPr rtlCol="0" anchor="ctr"/>
-          <a:lstStyle/>
-          <a:p>
-            <a:pPr algn="ctr"/>
-            <a:endParaRPr lang="en-SG"/>
-          </a:p>
-        </p:txBody>
-      </p:sp>
-      <p:sp>
-        <p:nvSpPr>
-          <p:cNvPr id="30" name="Arrow: Bent 29">
-            <a:extLst>
-              <a:ext uri="{FF2B5EF4-FFF2-40B4-BE49-F238E27FC236}">
-                <a16:creationId xmlns:a16="http://schemas.microsoft.com/office/drawing/2014/main" id="{DFCFA230-CA83-4084-9F6D-71E51B2037DE}"/>
-              </a:ext>
-            </a:extLst>
-          </p:cNvPr>
-          <p:cNvSpPr/>
-          <p:nvPr/>
-        </p:nvSpPr>
-        <p:spPr>
-          <a:xfrm>
-            <a:off x="2281147" y="2943385"/>
-            <a:ext cx="243840" cy="62865"/>
-          </a:xfrm>
-          <a:prstGeom prst="bentArrow">
-            <a:avLst>
-              <a:gd name="adj1" fmla="val 25000"/>
-              <a:gd name="adj2" fmla="val 26516"/>
-              <a:gd name="adj3" fmla="val 25000"/>
-              <a:gd name="adj4" fmla="val 43750"/>
-            </a:avLst>
-          </a:prstGeom>
-        </p:spPr>
-        <p:style>
-          <a:lnRef idx="2">
-            <a:schemeClr val="accent6">
-              <a:shade val="50000"/>
-            </a:schemeClr>
-          </a:lnRef>
-          <a:fillRef idx="1">
-            <a:schemeClr val="accent6"/>
-          </a:fillRef>
-          <a:effectRef idx="0">
-            <a:schemeClr val="accent6"/>
-          </a:effectRef>
-          <a:fontRef idx="minor">
-            <a:schemeClr val="lt1"/>
-          </a:fontRef>
-        </p:style>
-        <p:txBody>
-          <a:bodyPr rtlCol="0" anchor="ctr"/>
-          <a:lstStyle/>
-          <a:p>
-            <a:pPr algn="ctr"/>
-            <a:endParaRPr lang="en-SG">
-              <a:solidFill>
-                <a:schemeClr val="tx1"/>
-              </a:solidFill>
-            </a:endParaRPr>
-          </a:p>
-        </p:txBody>
-      </p:sp>
-      <p:sp>
-        <p:nvSpPr>
-          <p:cNvPr id="31" name="TextBox 30">
-            <a:extLst>
-              <a:ext uri="{FF2B5EF4-FFF2-40B4-BE49-F238E27FC236}">
-                <a16:creationId xmlns:a16="http://schemas.microsoft.com/office/drawing/2014/main" id="{FD5681D1-EF5F-4AB0-9C45-DF91004DFCC2}"/>
-              </a:ext>
-            </a:extLst>
-          </p:cNvPr>
-          <p:cNvSpPr txBox="1"/>
-          <p:nvPr/>
-        </p:nvSpPr>
-        <p:spPr>
-          <a:xfrm>
-            <a:off x="2493500" y="2870443"/>
-            <a:ext cx="1902143" cy="246221"/>
-          </a:xfrm>
-          <a:prstGeom prst="rect">
-            <a:avLst/>
-          </a:prstGeom>
-          <a:noFill/>
-        </p:spPr>
-        <p:txBody>
-          <a:bodyPr wrap="square" rtlCol="0">
-            <a:spAutoFit/>
-          </a:bodyPr>
-          <a:lstStyle/>
-          <a:p>
-            <a:r>
-              <a:rPr lang="en-US" sz="1000" dirty="0">
-                <a:solidFill>
-                  <a:schemeClr val="accent6"/>
-                </a:solidFill>
-              </a:rPr>
-              <a:t>View author’s committed codes</a:t>
-            </a:r>
-            <a:endParaRPr lang="en-SG" sz="1000" dirty="0">
-              <a:solidFill>
-                <a:schemeClr val="accent6"/>
-              </a:solidFill>
-            </a:endParaRPr>
-          </a:p>
-        </p:txBody>
-      </p:sp>
-      <p:sp>
-        <p:nvSpPr>
-          <p:cNvPr id="32" name="Rectangle 31">
-            <a:extLst>
-              <a:ext uri="{FF2B5EF4-FFF2-40B4-BE49-F238E27FC236}">
-                <a16:creationId xmlns:a16="http://schemas.microsoft.com/office/drawing/2014/main" id="{78349196-1F24-461D-AD8C-4AD1D6A0E5B6}"/>
-              </a:ext>
-            </a:extLst>
-          </p:cNvPr>
-          <p:cNvSpPr/>
-          <p:nvPr/>
-        </p:nvSpPr>
-        <p:spPr>
-          <a:xfrm>
-            <a:off x="6204585" y="814386"/>
-            <a:ext cx="4547616" cy="5229225"/>
-          </a:xfrm>
-          <a:prstGeom prst="rect">
-            <a:avLst/>
-          </a:prstGeom>
-          <a:noFill/>
-          <a:ln w="57150" cap="flat" cmpd="sng" algn="ctr">
-            <a:solidFill>
-              <a:schemeClr val="accent2"/>
-            </a:solidFill>
-            <a:prstDash val="solid"/>
-            <a:round/>
-            <a:headEnd type="none" w="med" len="med"/>
-            <a:tailEnd type="none" w="med" len="med"/>
-          </a:ln>
-        </p:spPr>
-        <p:style>
-          <a:lnRef idx="0">
-            <a:scrgbClr r="0" g="0" b="0"/>
-          </a:lnRef>
-          <a:fillRef idx="0">
-            <a:scrgbClr r="0" g="0" b="0"/>
-          </a:fillRef>
-          <a:effectRef idx="0">
-            <a:scrgbClr r="0" g="0" b="0"/>
-          </a:effectRef>
-          <a:fontRef idx="minor">
-            <a:schemeClr val="accent1"/>
-          </a:fontRef>
-        </p:style>
-        <p:txBody>
-          <a:bodyPr rtlCol="0" anchor="ctr"/>
-          <a:lstStyle/>
-          <a:p>
-            <a:pPr algn="ctr"/>
-            <a:endParaRPr lang="en-SG"/>
-          </a:p>
-        </p:txBody>
-      </p:sp>
-      <p:sp>
-        <p:nvSpPr>
-          <p:cNvPr id="33" name="Rectangle 32">
-            <a:extLst>
-              <a:ext uri="{FF2B5EF4-FFF2-40B4-BE49-F238E27FC236}">
-                <a16:creationId xmlns:a16="http://schemas.microsoft.com/office/drawing/2014/main" id="{0C689E94-04DA-4405-AE79-8BC095FCC283}"/>
-              </a:ext>
-            </a:extLst>
-          </p:cNvPr>
-          <p:cNvSpPr/>
-          <p:nvPr/>
-        </p:nvSpPr>
-        <p:spPr>
-          <a:xfrm>
-            <a:off x="1504949" y="2067663"/>
-            <a:ext cx="4482463" cy="276999"/>
-          </a:xfrm>
-          <a:prstGeom prst="rect">
-            <a:avLst/>
-          </a:prstGeom>
-          <a:noFill/>
-          <a:ln w="28575" cap="flat" cmpd="sng" algn="ctr">
-            <a:solidFill>
-              <a:srgbClr val="A401FF"/>
-            </a:solidFill>
-            <a:prstDash val="solid"/>
-            <a:round/>
-            <a:headEnd type="none" w="med" len="med"/>
-            <a:tailEnd type="none" w="med" len="med"/>
-          </a:ln>
-        </p:spPr>
-        <p:style>
-          <a:lnRef idx="0">
-            <a:scrgbClr r="0" g="0" b="0"/>
-          </a:lnRef>
-          <a:fillRef idx="0">
-            <a:scrgbClr r="0" g="0" b="0"/>
-          </a:fillRef>
-          <a:effectRef idx="0">
-            <a:scrgbClr r="0" g="0" b="0"/>
-          </a:effectRef>
-          <a:fontRef idx="minor">
-            <a:schemeClr val="accent4"/>
-          </a:fontRef>
-        </p:style>
-        <p:txBody>
-          <a:bodyPr rtlCol="0" anchor="ctr"/>
-          <a:lstStyle/>
-          <a:p>
-            <a:pPr algn="ctr"/>
-            <a:endParaRPr lang="en-SG"/>
-          </a:p>
-        </p:txBody>
-      </p:sp>
-      <p:sp>
-        <p:nvSpPr>
-          <p:cNvPr id="34" name="Left Brace 33">
-            <a:extLst>
-              <a:ext uri="{FF2B5EF4-FFF2-40B4-BE49-F238E27FC236}">
-                <a16:creationId xmlns:a16="http://schemas.microsoft.com/office/drawing/2014/main" id="{222FAE24-7A73-4290-9FB2-3A3528D6EBA2}"/>
-              </a:ext>
-            </a:extLst>
-          </p:cNvPr>
-          <p:cNvSpPr/>
-          <p:nvPr/>
-        </p:nvSpPr>
-        <p:spPr>
-          <a:xfrm>
-            <a:off x="1098796" y="2084176"/>
-            <a:ext cx="348052" cy="237053"/>
-          </a:xfrm>
-          <a:prstGeom prst="leftBrace">
-            <a:avLst/>
-          </a:prstGeom>
-          <a:ln w="19050">
-            <a:solidFill>
-              <a:srgbClr val="A401FF"/>
-            </a:solidFill>
-          </a:ln>
-        </p:spPr>
-        <p:style>
-          <a:lnRef idx="1">
-            <a:schemeClr val="accent1"/>
-          </a:lnRef>
-          <a:fillRef idx="0">
-            <a:schemeClr val="accent1"/>
-          </a:fillRef>
-          <a:effectRef idx="0">
-            <a:schemeClr val="accent1"/>
-          </a:effectRef>
-          <a:fontRef idx="minor">
-            <a:schemeClr val="tx1"/>
-          </a:fontRef>
-        </p:style>
-        <p:txBody>
-          <a:bodyPr rtlCol="0" anchor="ctr"/>
-          <a:lstStyle/>
-          <a:p>
-            <a:pPr algn="ctr"/>
-            <a:endParaRPr lang="en-SG"/>
-          </a:p>
-        </p:txBody>
-      </p:sp>
-      <p:sp>
-        <p:nvSpPr>
-          <p:cNvPr id="35" name="TextBox 34">
-            <a:extLst>
-              <a:ext uri="{FF2B5EF4-FFF2-40B4-BE49-F238E27FC236}">
-                <a16:creationId xmlns:a16="http://schemas.microsoft.com/office/drawing/2014/main" id="{EF436BD1-46E2-4EB0-8C8E-A61FF6951C31}"/>
-              </a:ext>
-            </a:extLst>
-          </p:cNvPr>
-          <p:cNvSpPr txBox="1"/>
-          <p:nvPr/>
-        </p:nvSpPr>
-        <p:spPr>
-          <a:xfrm>
-            <a:off x="460520" y="1991112"/>
-            <a:ext cx="723900" cy="461665"/>
-          </a:xfrm>
-          <a:prstGeom prst="rect">
-            <a:avLst/>
-          </a:prstGeom>
-          <a:noFill/>
-        </p:spPr>
-        <p:txBody>
-          <a:bodyPr wrap="square" rtlCol="0">
-            <a:spAutoFit/>
-          </a:bodyPr>
-          <a:lstStyle/>
-          <a:p>
-            <a:pPr algn="ctr"/>
-            <a:r>
-              <a:rPr lang="en-US" sz="1200" dirty="0">
-                <a:solidFill>
-                  <a:srgbClr val="7030A0"/>
-                </a:solidFill>
-              </a:rPr>
-              <a:t>Ramp Chart</a:t>
-            </a:r>
-          </a:p>
-        </p:txBody>
-      </p:sp>
-      <p:cxnSp>
-        <p:nvCxnSpPr>
-          <p:cNvPr id="39" name="Straight Arrow Connector 38">
-            <a:extLst>
-              <a:ext uri="{FF2B5EF4-FFF2-40B4-BE49-F238E27FC236}">
-                <a16:creationId xmlns:a16="http://schemas.microsoft.com/office/drawing/2014/main" id="{B342102E-EAF2-4DC0-B960-4F7846016550}"/>
-              </a:ext>
-            </a:extLst>
-          </p:cNvPr>
-          <p:cNvCxnSpPr>
-            <a:cxnSpLocks/>
-          </p:cNvCxnSpPr>
-          <p:nvPr/>
-        </p:nvCxnSpPr>
-        <p:spPr>
-          <a:xfrm flipV="1">
-            <a:off x="4181285" y="3764584"/>
-            <a:ext cx="291556" cy="382919"/>
-          </a:xfrm>
-          <a:prstGeom prst="straightConnector1">
-            <a:avLst/>
-          </a:prstGeom>
-          <a:ln>
-            <a:tailEnd type="triangle"/>
-          </a:ln>
-        </p:spPr>
-        <p:style>
-          <a:lnRef idx="3">
-            <a:schemeClr val="accent4"/>
-          </a:lnRef>
-          <a:fillRef idx="0">
-            <a:schemeClr val="accent4"/>
-          </a:fillRef>
-          <a:effectRef idx="2">
-            <a:schemeClr val="accent4"/>
-          </a:effectRef>
-          <a:fontRef idx="minor">
-            <a:schemeClr val="tx1"/>
-          </a:fontRef>
-        </p:style>
-      </p:cxnSp>
-      <p:cxnSp>
-        <p:nvCxnSpPr>
-          <p:cNvPr id="41" name="Straight Arrow Connector 40">
-            <a:extLst>
-              <a:ext uri="{FF2B5EF4-FFF2-40B4-BE49-F238E27FC236}">
-                <a16:creationId xmlns:a16="http://schemas.microsoft.com/office/drawing/2014/main" id="{54A0E17B-CC65-450A-8DA3-6E665798ACA3}"/>
-              </a:ext>
-            </a:extLst>
-          </p:cNvPr>
-          <p:cNvCxnSpPr>
-            <a:cxnSpLocks/>
-          </p:cNvCxnSpPr>
-          <p:nvPr/>
-        </p:nvCxnSpPr>
-        <p:spPr>
-          <a:xfrm flipV="1">
-            <a:off x="4623058" y="3764584"/>
-            <a:ext cx="0" cy="389178"/>
-          </a:xfrm>
-          <a:prstGeom prst="straightConnector1">
-            <a:avLst/>
-          </a:prstGeom>
-          <a:ln>
-            <a:tailEnd type="triangle"/>
-          </a:ln>
-        </p:spPr>
-        <p:style>
-          <a:lnRef idx="3">
-            <a:schemeClr val="accent4"/>
-          </a:lnRef>
-          <a:fillRef idx="0">
-            <a:schemeClr val="accent4"/>
-          </a:fillRef>
-          <a:effectRef idx="2">
-            <a:schemeClr val="accent4"/>
-          </a:effectRef>
-          <a:fontRef idx="minor">
-            <a:schemeClr val="tx1"/>
-          </a:fontRef>
-        </p:style>
-      </p:cxnSp>
-      <p:cxnSp>
-        <p:nvCxnSpPr>
-          <p:cNvPr id="43" name="Straight Arrow Connector 42">
-            <a:extLst>
-              <a:ext uri="{FF2B5EF4-FFF2-40B4-BE49-F238E27FC236}">
-                <a16:creationId xmlns:a16="http://schemas.microsoft.com/office/drawing/2014/main" id="{859A842E-D51F-4106-BF0A-90048A2FAC0A}"/>
-              </a:ext>
-            </a:extLst>
-          </p:cNvPr>
-          <p:cNvCxnSpPr>
-            <a:cxnSpLocks/>
-          </p:cNvCxnSpPr>
-          <p:nvPr/>
-        </p:nvCxnSpPr>
-        <p:spPr>
-          <a:xfrm flipH="1" flipV="1">
-            <a:off x="4731644" y="3764584"/>
-            <a:ext cx="297080" cy="405596"/>
-          </a:xfrm>
-          <a:prstGeom prst="straightConnector1">
-            <a:avLst/>
-          </a:prstGeom>
-          <a:ln>
-            <a:tailEnd type="triangle"/>
-          </a:ln>
-        </p:spPr>
-        <p:style>
-          <a:lnRef idx="3">
-            <a:schemeClr val="accent4"/>
-          </a:lnRef>
-          <a:fillRef idx="0">
-            <a:schemeClr val="accent4"/>
-          </a:fillRef>
-          <a:effectRef idx="2">
-            <a:schemeClr val="accent4"/>
-          </a:effectRef>
-          <a:fontRef idx="minor">
-            <a:schemeClr val="tx1"/>
-          </a:fontRef>
-        </p:style>
-      </p:cxnSp>
-      <p:sp>
-        <p:nvSpPr>
-          <p:cNvPr id="44" name="TextBox 43">
-            <a:extLst>
-              <a:ext uri="{FF2B5EF4-FFF2-40B4-BE49-F238E27FC236}">
-                <a16:creationId xmlns:a16="http://schemas.microsoft.com/office/drawing/2014/main" id="{4DB4692F-5627-4F26-AA17-560705B6CBA1}"/>
-              </a:ext>
-            </a:extLst>
-          </p:cNvPr>
-          <p:cNvSpPr txBox="1"/>
-          <p:nvPr/>
-        </p:nvSpPr>
-        <p:spPr>
-          <a:xfrm>
-            <a:off x="4319174" y="3497779"/>
-            <a:ext cx="1019826" cy="276999"/>
-          </a:xfrm>
-          <a:prstGeom prst="rect">
-            <a:avLst/>
-          </a:prstGeom>
-          <a:noFill/>
-        </p:spPr>
-        <p:txBody>
-          <a:bodyPr wrap="square" rtlCol="0">
-            <a:spAutoFit/>
-          </a:bodyPr>
-          <a:lstStyle/>
-          <a:p>
-            <a:r>
-              <a:rPr lang="en-US" sz="1200" dirty="0">
-                <a:solidFill>
-                  <a:srgbClr val="FFC000"/>
-                </a:solidFill>
-              </a:rPr>
-              <a:t>Ramps</a:t>
-            </a:r>
-            <a:endParaRPr lang="en-SG" sz="1200" dirty="0">
-              <a:solidFill>
-                <a:srgbClr val="FFC000"/>
-              </a:solidFill>
-            </a:endParaRPr>
-          </a:p>
-        </p:txBody>
-      </p:sp>
-      <p:sp>
-        <p:nvSpPr>
-          <p:cNvPr id="46" name="Rectangle 45">
-            <a:extLst>
-              <a:ext uri="{FF2B5EF4-FFF2-40B4-BE49-F238E27FC236}">
-                <a16:creationId xmlns:a16="http://schemas.microsoft.com/office/drawing/2014/main" id="{046392F6-712F-4248-819F-5F03FBDBE02B}"/>
-              </a:ext>
-            </a:extLst>
-          </p:cNvPr>
-          <p:cNvSpPr/>
-          <p:nvPr/>
-        </p:nvSpPr>
-        <p:spPr>
-          <a:xfrm>
-            <a:off x="1526181" y="3880858"/>
-            <a:ext cx="4482462" cy="96793"/>
-          </a:xfrm>
-          <a:prstGeom prst="rect">
-            <a:avLst/>
-          </a:prstGeom>
-          <a:noFill/>
-          <a:ln w="9525" cap="flat" cmpd="sng" algn="ctr">
-            <a:solidFill>
-              <a:schemeClr val="dk1"/>
-            </a:solidFill>
-            <a:prstDash val="solid"/>
-            <a:round/>
-            <a:headEnd type="none" w="med" len="med"/>
-            <a:tailEnd type="none" w="med" len="med"/>
-          </a:ln>
-        </p:spPr>
-        <p:style>
-          <a:lnRef idx="0">
-            <a:scrgbClr r="0" g="0" b="0"/>
-          </a:lnRef>
-          <a:fillRef idx="0">
-            <a:scrgbClr r="0" g="0" b="0"/>
-          </a:fillRef>
-          <a:effectRef idx="0">
-            <a:scrgbClr r="0" g="0" b="0"/>
-          </a:effectRef>
-          <a:fontRef idx="minor">
-            <a:schemeClr val="dk1"/>
-          </a:fontRef>
-        </p:style>
-        <p:txBody>
-          <a:bodyPr rtlCol="0" anchor="ctr"/>
-          <a:lstStyle/>
-          <a:p>
-            <a:pPr algn="ctr"/>
-            <a:endParaRPr lang="en-SG"/>
-          </a:p>
-        </p:txBody>
-      </p:sp>
-      <p:sp>
-        <p:nvSpPr>
-          <p:cNvPr id="48" name="Arrow: Left 47">
-            <a:extLst>
-              <a:ext uri="{FF2B5EF4-FFF2-40B4-BE49-F238E27FC236}">
-                <a16:creationId xmlns:a16="http://schemas.microsoft.com/office/drawing/2014/main" id="{1B3593E0-8F68-41EA-A8FE-5188B0C5C7EA}"/>
-              </a:ext>
-            </a:extLst>
-          </p:cNvPr>
-          <p:cNvSpPr/>
-          <p:nvPr/>
-        </p:nvSpPr>
-        <p:spPr>
-          <a:xfrm>
-            <a:off x="1133943" y="3880858"/>
-            <a:ext cx="348052" cy="96793"/>
-          </a:xfrm>
-          <a:prstGeom prst="leftArrow">
-            <a:avLst/>
-          </a:prstGeom>
-        </p:spPr>
-        <p:style>
-          <a:lnRef idx="2">
-            <a:schemeClr val="dk1">
-              <a:shade val="50000"/>
-            </a:schemeClr>
-          </a:lnRef>
-          <a:fillRef idx="1">
-            <a:schemeClr val="dk1"/>
-          </a:fillRef>
-          <a:effectRef idx="0">
-            <a:schemeClr val="dk1"/>
-          </a:effectRef>
-          <a:fontRef idx="minor">
-            <a:schemeClr val="lt1"/>
-          </a:fontRef>
-        </p:style>
-        <p:txBody>
-          <a:bodyPr rtlCol="0" anchor="ctr"/>
-          <a:lstStyle/>
-          <a:p>
-            <a:pPr algn="ctr"/>
-            <a:endParaRPr lang="en-SG"/>
-          </a:p>
-        </p:txBody>
-      </p:sp>
-      <p:sp>
-        <p:nvSpPr>
-          <p:cNvPr id="49" name="TextBox 48">
-            <a:extLst>
-              <a:ext uri="{FF2B5EF4-FFF2-40B4-BE49-F238E27FC236}">
-                <a16:creationId xmlns:a16="http://schemas.microsoft.com/office/drawing/2014/main" id="{B179F6A5-F356-4AE0-BE67-A636F79B6560}"/>
-              </a:ext>
-            </a:extLst>
-          </p:cNvPr>
-          <p:cNvSpPr txBox="1"/>
-          <p:nvPr/>
-        </p:nvSpPr>
-        <p:spPr>
-          <a:xfrm>
-            <a:off x="181614" y="3716589"/>
-            <a:ext cx="1014711" cy="461665"/>
-          </a:xfrm>
-          <a:prstGeom prst="rect">
-            <a:avLst/>
-          </a:prstGeom>
-          <a:noFill/>
-        </p:spPr>
-        <p:txBody>
-          <a:bodyPr wrap="square" rtlCol="0">
-            <a:spAutoFit/>
-          </a:bodyPr>
-          <a:lstStyle/>
-          <a:p>
-            <a:pPr algn="ctr"/>
-            <a:r>
-              <a:rPr lang="en-US" sz="1200" dirty="0"/>
-              <a:t>Contribution Bar</a:t>
-            </a:r>
-            <a:endParaRPr lang="en-SG" sz="1200" dirty="0"/>
-          </a:p>
-        </p:txBody>
-      </p:sp>
-      <p:sp>
-        <p:nvSpPr>
-          <p:cNvPr id="50" name="Rectangle 49">
-            <a:extLst>
-              <a:ext uri="{FF2B5EF4-FFF2-40B4-BE49-F238E27FC236}">
-                <a16:creationId xmlns:a16="http://schemas.microsoft.com/office/drawing/2014/main" id="{66E4832A-82B6-4ACE-88A2-1FC6DCF2CED8}"/>
-              </a:ext>
-            </a:extLst>
-          </p:cNvPr>
-          <p:cNvSpPr/>
-          <p:nvPr/>
-        </p:nvSpPr>
-        <p:spPr>
-          <a:xfrm>
-            <a:off x="6202680" y="1861062"/>
-            <a:ext cx="2151751" cy="276999"/>
-          </a:xfrm>
-          <a:prstGeom prst="rect">
-            <a:avLst/>
-          </a:prstGeom>
-          <a:noFill/>
-          <a:ln w="19050" cap="flat" cmpd="sng" algn="ctr">
-            <a:solidFill>
-              <a:schemeClr val="accent6"/>
-            </a:solidFill>
-            <a:prstDash val="solid"/>
-            <a:round/>
-            <a:headEnd type="none" w="med" len="med"/>
-            <a:tailEnd type="none" w="med" len="med"/>
-          </a:ln>
-        </p:spPr>
-        <p:style>
-          <a:lnRef idx="0">
-            <a:scrgbClr r="0" g="0" b="0"/>
-          </a:lnRef>
-          <a:fillRef idx="0">
-            <a:scrgbClr r="0" g="0" b="0"/>
-          </a:fillRef>
-          <a:effectRef idx="0">
-            <a:scrgbClr r="0" g="0" b="0"/>
-          </a:effectRef>
-          <a:fontRef idx="minor">
-            <a:schemeClr val="accent6"/>
-          </a:fontRef>
-        </p:style>
-        <p:txBody>
-          <a:bodyPr rtlCol="0" anchor="ctr"/>
-          <a:lstStyle/>
-          <a:p>
-            <a:pPr algn="ctr"/>
-            <a:endParaRPr lang="en-SG"/>
-          </a:p>
-        </p:txBody>
-      </p:sp>
+              </a:endParaRPr>
+            </a:p>
+          </p:txBody>
+        </p:sp>
+      </p:grpSp>
     </p:spTree>
     <p:extLst>
       <p:ext uri="{BB962C8B-B14F-4D97-AF65-F5344CB8AC3E}">

</xml_diff>

<commit_message>
[#920] Ramp chart: show percentile for each item (#922)
We have index number for each group in the ramp chart but not its
percentile. It is hard to tell the ranking position of the group.

This can be improved to show the percentile of each item so that it
is easy to see whether an item is in the 20%th percentile and so on.

Let's add a percentile number at the right side of each group.
</commit_message>
<xml_diff>
--- a/docs/diagrams/report-features.pptx
+++ b/docs/diagrams/report-features.pptx
@@ -261,7 +261,7 @@
           <a:p>
             <a:fld id="{BC643CBC-B76F-46AA-8129-8C84DB44B84D}" type="datetimeFigureOut">
               <a:rPr lang="en-SG" smtClean="0"/>
-              <a:t>31/7/2019</a:t>
+              <a:t>1/1/2020</a:t>
             </a:fld>
             <a:endParaRPr lang="en-SG"/>
           </a:p>
@@ -461,7 +461,7 @@
           <a:p>
             <a:fld id="{BC643CBC-B76F-46AA-8129-8C84DB44B84D}" type="datetimeFigureOut">
               <a:rPr lang="en-SG" smtClean="0"/>
-              <a:t>31/7/2019</a:t>
+              <a:t>1/1/2020</a:t>
             </a:fld>
             <a:endParaRPr lang="en-SG"/>
           </a:p>
@@ -671,7 +671,7 @@
           <a:p>
             <a:fld id="{BC643CBC-B76F-46AA-8129-8C84DB44B84D}" type="datetimeFigureOut">
               <a:rPr lang="en-SG" smtClean="0"/>
-              <a:t>31/7/2019</a:t>
+              <a:t>1/1/2020</a:t>
             </a:fld>
             <a:endParaRPr lang="en-SG"/>
           </a:p>
@@ -871,7 +871,7 @@
           <a:p>
             <a:fld id="{BC643CBC-B76F-46AA-8129-8C84DB44B84D}" type="datetimeFigureOut">
               <a:rPr lang="en-SG" smtClean="0"/>
-              <a:t>31/7/2019</a:t>
+              <a:t>1/1/2020</a:t>
             </a:fld>
             <a:endParaRPr lang="en-SG"/>
           </a:p>
@@ -1147,7 +1147,7 @@
           <a:p>
             <a:fld id="{BC643CBC-B76F-46AA-8129-8C84DB44B84D}" type="datetimeFigureOut">
               <a:rPr lang="en-SG" smtClean="0"/>
-              <a:t>31/7/2019</a:t>
+              <a:t>1/1/2020</a:t>
             </a:fld>
             <a:endParaRPr lang="en-SG"/>
           </a:p>
@@ -1415,7 +1415,7 @@
           <a:p>
             <a:fld id="{BC643CBC-B76F-46AA-8129-8C84DB44B84D}" type="datetimeFigureOut">
               <a:rPr lang="en-SG" smtClean="0"/>
-              <a:t>31/7/2019</a:t>
+              <a:t>1/1/2020</a:t>
             </a:fld>
             <a:endParaRPr lang="en-SG"/>
           </a:p>
@@ -1830,7 +1830,7 @@
           <a:p>
             <a:fld id="{BC643CBC-B76F-46AA-8129-8C84DB44B84D}" type="datetimeFigureOut">
               <a:rPr lang="en-SG" smtClean="0"/>
-              <a:t>31/7/2019</a:t>
+              <a:t>1/1/2020</a:t>
             </a:fld>
             <a:endParaRPr lang="en-SG"/>
           </a:p>
@@ -1972,7 +1972,7 @@
           <a:p>
             <a:fld id="{BC643CBC-B76F-46AA-8129-8C84DB44B84D}" type="datetimeFigureOut">
               <a:rPr lang="en-SG" smtClean="0"/>
-              <a:t>31/7/2019</a:t>
+              <a:t>1/1/2020</a:t>
             </a:fld>
             <a:endParaRPr lang="en-SG"/>
           </a:p>
@@ -2085,7 +2085,7 @@
           <a:p>
             <a:fld id="{BC643CBC-B76F-46AA-8129-8C84DB44B84D}" type="datetimeFigureOut">
               <a:rPr lang="en-SG" smtClean="0"/>
-              <a:t>31/7/2019</a:t>
+              <a:t>1/1/2020</a:t>
             </a:fld>
             <a:endParaRPr lang="en-SG"/>
           </a:p>
@@ -2398,7 +2398,7 @@
           <a:p>
             <a:fld id="{BC643CBC-B76F-46AA-8129-8C84DB44B84D}" type="datetimeFigureOut">
               <a:rPr lang="en-SG" smtClean="0"/>
-              <a:t>31/7/2019</a:t>
+              <a:t>1/1/2020</a:t>
             </a:fld>
             <a:endParaRPr lang="en-SG"/>
           </a:p>
@@ -2687,7 +2687,7 @@
           <a:p>
             <a:fld id="{BC643CBC-B76F-46AA-8129-8C84DB44B84D}" type="datetimeFigureOut">
               <a:rPr lang="en-SG" smtClean="0"/>
-              <a:t>31/7/2019</a:t>
+              <a:t>1/1/2020</a:t>
             </a:fld>
             <a:endParaRPr lang="en-SG"/>
           </a:p>
@@ -2930,7 +2930,7 @@
           <a:p>
             <a:fld id="{BC643CBC-B76F-46AA-8129-8C84DB44B84D}" type="datetimeFigureOut">
               <a:rPr lang="en-SG" smtClean="0"/>
-              <a:t>31/7/2019</a:t>
+              <a:t>1/1/2020</a:t>
             </a:fld>
             <a:endParaRPr lang="en-SG"/>
           </a:p>
@@ -3349,10 +3349,10 @@
       </p:grpSpPr>
       <p:pic>
         <p:nvPicPr>
-          <p:cNvPr id="47" name="Picture 46">
-            <a:extLst>
-              <a:ext uri="{FF2B5EF4-FFF2-40B4-BE49-F238E27FC236}">
-                <a16:creationId xmlns:a16="http://schemas.microsoft.com/office/drawing/2014/main" id="{93313844-D6A5-4663-BFA6-6614735A1446}"/>
+          <p:cNvPr id="59" name="Picture 58">
+            <a:extLst>
+              <a:ext uri="{FF2B5EF4-FFF2-40B4-BE49-F238E27FC236}">
+                <a16:creationId xmlns:a16="http://schemas.microsoft.com/office/drawing/2014/main" id="{F3C703F0-DCC2-438D-830F-AEEDBEB852A9}"/>
               </a:ext>
             </a:extLst>
           </p:cNvPr>
@@ -3362,15 +3362,21 @@
           <p:nvPr/>
         </p:nvPicPr>
         <p:blipFill>
-          <a:blip r:embed="rId2"/>
+          <a:blip r:embed="rId2">
+            <a:extLst>
+              <a:ext uri="{28A0092B-C50C-407E-A947-70E740481C1C}">
+                <a14:useLocalDpi xmlns:a14="http://schemas.microsoft.com/office/drawing/2010/main" val="0"/>
+              </a:ext>
+            </a:extLst>
+          </a:blip>
           <a:stretch>
             <a:fillRect/>
           </a:stretch>
         </p:blipFill>
         <p:spPr>
           <a:xfrm>
-            <a:off x="1447797" y="841021"/>
-            <a:ext cx="9268452" cy="5213504"/>
+            <a:off x="1439799" y="814385"/>
+            <a:ext cx="9341158" cy="5162105"/>
           </a:xfrm>
           <a:prstGeom prst="rect">
             <a:avLst/>
@@ -3391,7 +3397,7 @@
         </p:nvGrpSpPr>
         <p:grpSpPr>
           <a:xfrm>
-            <a:off x="3876419" y="5090769"/>
+            <a:off x="3353297" y="5041811"/>
             <a:ext cx="1019826" cy="623120"/>
             <a:chOff x="3946269" y="5051399"/>
             <a:chExt cx="1019826" cy="623120"/>
@@ -3510,7 +3516,7 @@
         </p:nvGrpSpPr>
         <p:grpSpPr>
           <a:xfrm>
-            <a:off x="9723023" y="3098194"/>
+            <a:off x="9598506" y="2857087"/>
             <a:ext cx="1095413" cy="560378"/>
             <a:chOff x="8603087" y="2719565"/>
             <a:chExt cx="1095413" cy="560378"/>
@@ -3675,7 +3681,7 @@
         </p:nvGrpSpPr>
         <p:grpSpPr>
           <a:xfrm>
-            <a:off x="8625163" y="2688150"/>
+            <a:off x="8507108" y="2488443"/>
             <a:ext cx="1127684" cy="568600"/>
             <a:chOff x="7475403" y="3115227"/>
             <a:chExt cx="1127684" cy="568600"/>
@@ -4158,7 +4164,7 @@
         </p:nvGrpSpPr>
         <p:grpSpPr>
           <a:xfrm>
-            <a:off x="2754415" y="3135977"/>
+            <a:off x="2824966" y="3083362"/>
             <a:ext cx="1695743" cy="246221"/>
             <a:chOff x="2464522" y="2361561"/>
             <a:chExt cx="1695743" cy="246221"/>
@@ -4323,7 +4329,7 @@
         </p:nvGrpSpPr>
         <p:grpSpPr>
           <a:xfrm>
-            <a:off x="2775084" y="2520611"/>
+            <a:off x="2773892" y="2499943"/>
             <a:ext cx="2165611" cy="263574"/>
             <a:chOff x="2230032" y="2870443"/>
             <a:chExt cx="2165611" cy="263574"/>
@@ -4817,7 +4823,7 @@
         </p:nvGrpSpPr>
         <p:grpSpPr>
           <a:xfrm>
-            <a:off x="181614" y="3460043"/>
+            <a:off x="105361" y="3392098"/>
             <a:ext cx="5827029" cy="461665"/>
             <a:chOff x="181614" y="3716589"/>
             <a:chExt cx="5827029" cy="461665"/>
@@ -4975,7 +4981,7 @@
         </p:nvGrpSpPr>
         <p:grpSpPr>
           <a:xfrm>
-            <a:off x="6204585" y="1871638"/>
+            <a:off x="6174351" y="1712697"/>
             <a:ext cx="3424155" cy="402234"/>
             <a:chOff x="6202680" y="1735827"/>
             <a:chExt cx="3424155" cy="402234"/>
@@ -5144,8 +5150,8 @@
         </p:nvGrpSpPr>
         <p:grpSpPr>
           <a:xfrm>
-            <a:off x="2958279" y="3702395"/>
-            <a:ext cx="1674876" cy="246221"/>
+            <a:off x="2888422" y="3630692"/>
+            <a:ext cx="1674876" cy="291016"/>
             <a:chOff x="2943039" y="3682075"/>
             <a:chExt cx="1674876" cy="246221"/>
           </a:xfrm>

</xml_diff>

<commit_message>
update report features ppt
</commit_message>
<xml_diff>
--- a/docs/diagrams/report-features.pptx
+++ b/docs/diagrams/report-features.pptx
@@ -5,7 +5,7 @@
     <p:sldMasterId id="2147483648" r:id="rId1"/>
   </p:sldMasterIdLst>
   <p:sldIdLst>
-    <p:sldId id="256" r:id="rId2"/>
+    <p:sldId id="261" r:id="rId2"/>
   </p:sldIdLst>
   <p:sldSz cx="12192000" cy="6858000"/>
   <p:notesSz cx="6858000" cy="9144000"/>
@@ -261,7 +261,7 @@
           <a:p>
             <a:fld id="{BC643CBC-B76F-46AA-8129-8C84DB44B84D}" type="datetimeFigureOut">
               <a:rPr lang="en-SG" smtClean="0"/>
-              <a:t>1/1/2020</a:t>
+              <a:t>18/3/20</a:t>
             </a:fld>
             <a:endParaRPr lang="en-SG"/>
           </a:p>
@@ -461,7 +461,7 @@
           <a:p>
             <a:fld id="{BC643CBC-B76F-46AA-8129-8C84DB44B84D}" type="datetimeFigureOut">
               <a:rPr lang="en-SG" smtClean="0"/>
-              <a:t>1/1/2020</a:t>
+              <a:t>18/3/20</a:t>
             </a:fld>
             <a:endParaRPr lang="en-SG"/>
           </a:p>
@@ -671,7 +671,7 @@
           <a:p>
             <a:fld id="{BC643CBC-B76F-46AA-8129-8C84DB44B84D}" type="datetimeFigureOut">
               <a:rPr lang="en-SG" smtClean="0"/>
-              <a:t>1/1/2020</a:t>
+              <a:t>18/3/20</a:t>
             </a:fld>
             <a:endParaRPr lang="en-SG"/>
           </a:p>
@@ -871,7 +871,7 @@
           <a:p>
             <a:fld id="{BC643CBC-B76F-46AA-8129-8C84DB44B84D}" type="datetimeFigureOut">
               <a:rPr lang="en-SG" smtClean="0"/>
-              <a:t>1/1/2020</a:t>
+              <a:t>18/3/20</a:t>
             </a:fld>
             <a:endParaRPr lang="en-SG"/>
           </a:p>
@@ -1147,7 +1147,7 @@
           <a:p>
             <a:fld id="{BC643CBC-B76F-46AA-8129-8C84DB44B84D}" type="datetimeFigureOut">
               <a:rPr lang="en-SG" smtClean="0"/>
-              <a:t>1/1/2020</a:t>
+              <a:t>18/3/20</a:t>
             </a:fld>
             <a:endParaRPr lang="en-SG"/>
           </a:p>
@@ -1415,7 +1415,7 @@
           <a:p>
             <a:fld id="{BC643CBC-B76F-46AA-8129-8C84DB44B84D}" type="datetimeFigureOut">
               <a:rPr lang="en-SG" smtClean="0"/>
-              <a:t>1/1/2020</a:t>
+              <a:t>18/3/20</a:t>
             </a:fld>
             <a:endParaRPr lang="en-SG"/>
           </a:p>
@@ -1830,7 +1830,7 @@
           <a:p>
             <a:fld id="{BC643CBC-B76F-46AA-8129-8C84DB44B84D}" type="datetimeFigureOut">
               <a:rPr lang="en-SG" smtClean="0"/>
-              <a:t>1/1/2020</a:t>
+              <a:t>18/3/20</a:t>
             </a:fld>
             <a:endParaRPr lang="en-SG"/>
           </a:p>
@@ -1972,7 +1972,7 @@
           <a:p>
             <a:fld id="{BC643CBC-B76F-46AA-8129-8C84DB44B84D}" type="datetimeFigureOut">
               <a:rPr lang="en-SG" smtClean="0"/>
-              <a:t>1/1/2020</a:t>
+              <a:t>18/3/20</a:t>
             </a:fld>
             <a:endParaRPr lang="en-SG"/>
           </a:p>
@@ -2085,7 +2085,7 @@
           <a:p>
             <a:fld id="{BC643CBC-B76F-46AA-8129-8C84DB44B84D}" type="datetimeFigureOut">
               <a:rPr lang="en-SG" smtClean="0"/>
-              <a:t>1/1/2020</a:t>
+              <a:t>18/3/20</a:t>
             </a:fld>
             <a:endParaRPr lang="en-SG"/>
           </a:p>
@@ -2398,7 +2398,7 @@
           <a:p>
             <a:fld id="{BC643CBC-B76F-46AA-8129-8C84DB44B84D}" type="datetimeFigureOut">
               <a:rPr lang="en-SG" smtClean="0"/>
-              <a:t>1/1/2020</a:t>
+              <a:t>18/3/20</a:t>
             </a:fld>
             <a:endParaRPr lang="en-SG"/>
           </a:p>
@@ -2687,7 +2687,7 @@
           <a:p>
             <a:fld id="{BC643CBC-B76F-46AA-8129-8C84DB44B84D}" type="datetimeFigureOut">
               <a:rPr lang="en-SG" smtClean="0"/>
-              <a:t>1/1/2020</a:t>
+              <a:t>18/3/20</a:t>
             </a:fld>
             <a:endParaRPr lang="en-SG"/>
           </a:p>
@@ -2930,7 +2930,7 @@
           <a:p>
             <a:fld id="{BC643CBC-B76F-46AA-8129-8C84DB44B84D}" type="datetimeFigureOut">
               <a:rPr lang="en-SG" smtClean="0"/>
-              <a:t>1/1/2020</a:t>
+              <a:t>18/3/20</a:t>
             </a:fld>
             <a:endParaRPr lang="en-SG"/>
           </a:p>
@@ -3333,6 +3333,14 @@
 <file path=ppt/slides/slide1.xml><?xml version="1.0" encoding="utf-8"?>
 <p:sld xmlns:a="http://schemas.openxmlformats.org/drawingml/2006/main" xmlns:r="http://schemas.openxmlformats.org/officeDocument/2006/relationships" xmlns:p="http://schemas.openxmlformats.org/presentationml/2006/main">
   <p:cSld>
+    <p:bg>
+      <p:bgPr>
+        <a:solidFill>
+          <a:schemeClr val="bg1"/>
+        </a:solidFill>
+        <a:effectLst/>
+      </p:bgPr>
+    </p:bg>
     <p:spTree>
       <p:nvGrpSpPr>
         <p:cNvPr id="1" name=""/>
@@ -3349,10 +3357,10 @@
       </p:grpSpPr>
       <p:pic>
         <p:nvPicPr>
-          <p:cNvPr id="59" name="Picture 58">
-            <a:extLst>
-              <a:ext uri="{FF2B5EF4-FFF2-40B4-BE49-F238E27FC236}">
-                <a16:creationId xmlns:a16="http://schemas.microsoft.com/office/drawing/2014/main" id="{F3C703F0-DCC2-438D-830F-AEEDBEB852A9}"/>
+          <p:cNvPr id="5" name="Picture 4" descr="A screenshot of a social media post&#10;&#10;Description automatically generated">
+            <a:extLst>
+              <a:ext uri="{FF2B5EF4-FFF2-40B4-BE49-F238E27FC236}">
+                <a16:creationId xmlns:a16="http://schemas.microsoft.com/office/drawing/2014/main" id="{B4E5294F-444B-4447-B9AA-FA88D06B7743}"/>
               </a:ext>
             </a:extLst>
           </p:cNvPr>
@@ -3375,8 +3383,8 @@
         </p:blipFill>
         <p:spPr>
           <a:xfrm>
-            <a:off x="1439799" y="814385"/>
-            <a:ext cx="9341158" cy="5162105"/>
+            <a:off x="1187572" y="643466"/>
+            <a:ext cx="9813566" cy="5569200"/>
           </a:xfrm>
           <a:prstGeom prst="rect">
             <a:avLst/>
@@ -3385,10 +3393,10 @@
       </p:pic>
       <p:grpSp>
         <p:nvGrpSpPr>
-          <p:cNvPr id="4" name="Group 3">
-            <a:extLst>
-              <a:ext uri="{FF2B5EF4-FFF2-40B4-BE49-F238E27FC236}">
-                <a16:creationId xmlns:a16="http://schemas.microsoft.com/office/drawing/2014/main" id="{F0D58C48-0153-4B14-BF07-F967F1B7F730}"/>
+          <p:cNvPr id="6" name="Group 5">
+            <a:extLst>
+              <a:ext uri="{FF2B5EF4-FFF2-40B4-BE49-F238E27FC236}">
+                <a16:creationId xmlns:a16="http://schemas.microsoft.com/office/drawing/2014/main" id="{79766EAC-8642-D843-AAF2-A0EAEA91F400}"/>
               </a:ext>
             </a:extLst>
           </p:cNvPr>
@@ -3397,7 +3405,7 @@
         </p:nvGrpSpPr>
         <p:grpSpPr>
           <a:xfrm>
-            <a:off x="3353297" y="5041811"/>
+            <a:off x="3604583" y="5552602"/>
             <a:ext cx="1019826" cy="623120"/>
             <a:chOff x="3946269" y="5051399"/>
             <a:chExt cx="1019826" cy="623120"/>
@@ -3405,10 +3413,10 @@
         </p:grpSpPr>
         <p:sp>
           <p:nvSpPr>
-            <p:cNvPr id="44" name="TextBox 43">
+            <p:cNvPr id="7" name="TextBox 6">
               <a:extLst>
                 <a:ext uri="{FF2B5EF4-FFF2-40B4-BE49-F238E27FC236}">
-                  <a16:creationId xmlns:a16="http://schemas.microsoft.com/office/drawing/2014/main" id="{4DB4692F-5627-4F26-AA17-560705B6CBA1}"/>
+                  <a16:creationId xmlns:a16="http://schemas.microsoft.com/office/drawing/2014/main" id="{B0BA5182-A179-4D47-86ED-5C1E184ADFAD}"/>
                 </a:ext>
               </a:extLst>
             </p:cNvPr>
@@ -3449,10 +3457,10 @@
         </p:sp>
         <p:sp>
           <p:nvSpPr>
-            <p:cNvPr id="2" name="Oval 1">
+            <p:cNvPr id="8" name="Oval 7">
               <a:extLst>
                 <a:ext uri="{FF2B5EF4-FFF2-40B4-BE49-F238E27FC236}">
-                  <a16:creationId xmlns:a16="http://schemas.microsoft.com/office/drawing/2014/main" id="{7CBF2F7E-DF4B-4937-B579-9A5191DFED6B}"/>
+                  <a16:creationId xmlns:a16="http://schemas.microsoft.com/office/drawing/2014/main" id="{5C2C6CF5-9D38-9349-A1A2-5B2FAAAACBB2}"/>
                 </a:ext>
               </a:extLst>
             </p:cNvPr>
@@ -3504,10 +3512,10 @@
       </p:grpSp>
       <p:grpSp>
         <p:nvGrpSpPr>
-          <p:cNvPr id="40" name="Group 39">
-            <a:extLst>
-              <a:ext uri="{FF2B5EF4-FFF2-40B4-BE49-F238E27FC236}">
-                <a16:creationId xmlns:a16="http://schemas.microsoft.com/office/drawing/2014/main" id="{355B37A5-8EA6-41FF-AE7C-7F8A4FFA63AA}"/>
+          <p:cNvPr id="9" name="Group 8">
+            <a:extLst>
+              <a:ext uri="{FF2B5EF4-FFF2-40B4-BE49-F238E27FC236}">
+                <a16:creationId xmlns:a16="http://schemas.microsoft.com/office/drawing/2014/main" id="{F5C23996-7C4F-7E4F-B4FF-3A2029C89358}"/>
               </a:ext>
             </a:extLst>
           </p:cNvPr>
@@ -3516,18 +3524,18 @@
         </p:nvGrpSpPr>
         <p:grpSpPr>
           <a:xfrm>
-            <a:off x="9598506" y="2857087"/>
-            <a:ext cx="1095413" cy="560378"/>
-            <a:chOff x="8603087" y="2719565"/>
-            <a:chExt cx="1095413" cy="560378"/>
+            <a:off x="3048219" y="3723003"/>
+            <a:ext cx="1695743" cy="246221"/>
+            <a:chOff x="2464522" y="2361561"/>
+            <a:chExt cx="1695743" cy="246221"/>
           </a:xfrm>
         </p:grpSpPr>
         <p:sp>
           <p:nvSpPr>
-            <p:cNvPr id="16" name="Oval 15">
+            <p:cNvPr id="10" name="Oval 9">
               <a:extLst>
                 <a:ext uri="{FF2B5EF4-FFF2-40B4-BE49-F238E27FC236}">
-                  <a16:creationId xmlns:a16="http://schemas.microsoft.com/office/drawing/2014/main" id="{0FA3B7FA-4DB5-4EB3-9614-C6246C535AC6}"/>
+                  <a16:creationId xmlns:a16="http://schemas.microsoft.com/office/drawing/2014/main" id="{FFC95C22-4AFA-764A-9BFB-1CBCF6917C7E}"/>
                 </a:ext>
               </a:extLst>
             </p:cNvPr>
@@ -3536,8 +3544,960 @@
           </p:nvSpPr>
           <p:spPr>
             <a:xfrm>
-              <a:off x="8603087" y="3116629"/>
-              <a:ext cx="154341" cy="163314"/>
+              <a:off x="2464522" y="2454206"/>
+              <a:ext cx="142875" cy="133350"/>
+            </a:xfrm>
+            <a:prstGeom prst="ellipse">
+              <a:avLst/>
+            </a:prstGeom>
+            <a:noFill/>
+            <a:ln w="9525" cap="flat" cmpd="sng" algn="ctr">
+              <a:solidFill>
+                <a:schemeClr val="accent2"/>
+              </a:solidFill>
+              <a:prstDash val="solid"/>
+              <a:round/>
+              <a:headEnd type="none" w="med" len="med"/>
+              <a:tailEnd type="none" w="med" len="med"/>
+            </a:ln>
+          </p:spPr>
+          <p:style>
+            <a:lnRef idx="0">
+              <a:scrgbClr r="0" g="0" b="0"/>
+            </a:lnRef>
+            <a:fillRef idx="0">
+              <a:scrgbClr r="0" g="0" b="0"/>
+            </a:fillRef>
+            <a:effectRef idx="0">
+              <a:scrgbClr r="0" g="0" b="0"/>
+            </a:effectRef>
+            <a:fontRef idx="minor">
+              <a:schemeClr val="accent2"/>
+            </a:fontRef>
+          </p:style>
+          <p:txBody>
+            <a:bodyPr rtlCol="0" anchor="ctr"/>
+            <a:lstStyle/>
+            <a:p>
+              <a:pPr algn="ctr"/>
+              <a:endParaRPr lang="en-SG"/>
+            </a:p>
+          </p:txBody>
+        </p:sp>
+        <p:sp>
+          <p:nvSpPr>
+            <p:cNvPr id="11" name="Arrow: Right 26">
+              <a:extLst>
+                <a:ext uri="{FF2B5EF4-FFF2-40B4-BE49-F238E27FC236}">
+                  <a16:creationId xmlns:a16="http://schemas.microsoft.com/office/drawing/2014/main" id="{92F77A80-7975-A047-9AC8-95F3789669E7}"/>
+                </a:ext>
+              </a:extLst>
+            </p:cNvPr>
+            <p:cNvSpPr/>
+            <p:nvPr/>
+          </p:nvSpPr>
+          <p:spPr>
+            <a:xfrm rot="21204583">
+              <a:off x="2661847" y="2453845"/>
+              <a:ext cx="142378" cy="66676"/>
+            </a:xfrm>
+            <a:prstGeom prst="rightArrow">
+              <a:avLst/>
+            </a:prstGeom>
+          </p:spPr>
+          <p:style>
+            <a:lnRef idx="2">
+              <a:schemeClr val="accent2">
+                <a:shade val="50000"/>
+              </a:schemeClr>
+            </a:lnRef>
+            <a:fillRef idx="1">
+              <a:schemeClr val="accent2"/>
+            </a:fillRef>
+            <a:effectRef idx="0">
+              <a:schemeClr val="accent2"/>
+            </a:effectRef>
+            <a:fontRef idx="minor">
+              <a:schemeClr val="lt1"/>
+            </a:fontRef>
+          </p:style>
+          <p:txBody>
+            <a:bodyPr rtlCol="0" anchor="ctr"/>
+            <a:lstStyle/>
+            <a:p>
+              <a:pPr algn="ctr"/>
+              <a:endParaRPr lang="en-SG"/>
+            </a:p>
+          </p:txBody>
+        </p:sp>
+        <p:sp>
+          <p:nvSpPr>
+            <p:cNvPr id="12" name="TextBox 11">
+              <a:extLst>
+                <a:ext uri="{FF2B5EF4-FFF2-40B4-BE49-F238E27FC236}">
+                  <a16:creationId xmlns:a16="http://schemas.microsoft.com/office/drawing/2014/main" id="{82FD49BE-679E-FB4E-9B2C-DB6B3E1AD08D}"/>
+                </a:ext>
+              </a:extLst>
+            </p:cNvPr>
+            <p:cNvSpPr txBox="1"/>
+            <p:nvPr/>
+          </p:nvSpPr>
+          <p:spPr>
+            <a:xfrm>
+              <a:off x="2760090" y="2361561"/>
+              <a:ext cx="1400175" cy="246221"/>
+            </a:xfrm>
+            <a:prstGeom prst="rect">
+              <a:avLst/>
+            </a:prstGeom>
+            <a:noFill/>
+          </p:spPr>
+          <p:txBody>
+            <a:bodyPr wrap="square" rtlCol="0">
+              <a:spAutoFit/>
+            </a:bodyPr>
+            <a:lstStyle/>
+            <a:p>
+              <a:r>
+                <a:rPr lang="en-US" sz="1000" dirty="0">
+                  <a:solidFill>
+                    <a:schemeClr val="accent2"/>
+                  </a:solidFill>
+                </a:rPr>
+                <a:t>Link to repository</a:t>
+              </a:r>
+              <a:endParaRPr lang="en-SG" sz="1000" dirty="0">
+                <a:solidFill>
+                  <a:schemeClr val="accent2"/>
+                </a:solidFill>
+              </a:endParaRPr>
+            </a:p>
+          </p:txBody>
+        </p:sp>
+      </p:grpSp>
+      <p:grpSp>
+        <p:nvGrpSpPr>
+          <p:cNvPr id="13" name="Group 12">
+            <a:extLst>
+              <a:ext uri="{FF2B5EF4-FFF2-40B4-BE49-F238E27FC236}">
+                <a16:creationId xmlns:a16="http://schemas.microsoft.com/office/drawing/2014/main" id="{D62F89A8-1701-DF47-B09B-2D40770BE744}"/>
+              </a:ext>
+            </a:extLst>
+          </p:cNvPr>
+          <p:cNvGrpSpPr/>
+          <p:nvPr/>
+        </p:nvGrpSpPr>
+        <p:grpSpPr>
+          <a:xfrm>
+            <a:off x="2942352" y="4322650"/>
+            <a:ext cx="1672681" cy="291016"/>
+            <a:chOff x="2945234" y="3682075"/>
+            <a:chExt cx="1672681" cy="246221"/>
+          </a:xfrm>
+        </p:grpSpPr>
+        <p:sp>
+          <p:nvSpPr>
+            <p:cNvPr id="14" name="Oval 13">
+              <a:extLst>
+                <a:ext uri="{FF2B5EF4-FFF2-40B4-BE49-F238E27FC236}">
+                  <a16:creationId xmlns:a16="http://schemas.microsoft.com/office/drawing/2014/main" id="{BDCB45B0-8710-AE4F-8F1C-D69EB6E825F5}"/>
+                </a:ext>
+              </a:extLst>
+            </p:cNvPr>
+            <p:cNvSpPr/>
+            <p:nvPr/>
+          </p:nvSpPr>
+          <p:spPr>
+            <a:xfrm>
+              <a:off x="2945234" y="3739036"/>
+              <a:ext cx="147081" cy="158015"/>
+            </a:xfrm>
+            <a:prstGeom prst="ellipse">
+              <a:avLst/>
+            </a:prstGeom>
+            <a:noFill/>
+            <a:ln w="9525" cap="flat" cmpd="sng" algn="ctr">
+              <a:solidFill>
+                <a:schemeClr val="accent1"/>
+              </a:solidFill>
+              <a:prstDash val="solid"/>
+              <a:round/>
+              <a:headEnd type="none" w="med" len="med"/>
+              <a:tailEnd type="none" w="med" len="med"/>
+            </a:ln>
+          </p:spPr>
+          <p:style>
+            <a:lnRef idx="0">
+              <a:scrgbClr r="0" g="0" b="0"/>
+            </a:lnRef>
+            <a:fillRef idx="0">
+              <a:scrgbClr r="0" g="0" b="0"/>
+            </a:fillRef>
+            <a:effectRef idx="0">
+              <a:scrgbClr r="0" g="0" b="0"/>
+            </a:effectRef>
+            <a:fontRef idx="minor">
+              <a:schemeClr val="accent1"/>
+            </a:fontRef>
+          </p:style>
+          <p:txBody>
+            <a:bodyPr rtlCol="0" anchor="ctr"/>
+            <a:lstStyle/>
+            <a:p>
+              <a:pPr algn="ctr"/>
+              <a:endParaRPr lang="en-SG"/>
+            </a:p>
+          </p:txBody>
+        </p:sp>
+        <p:sp>
+          <p:nvSpPr>
+            <p:cNvPr id="15" name="Arrow: Right 42">
+              <a:extLst>
+                <a:ext uri="{FF2B5EF4-FFF2-40B4-BE49-F238E27FC236}">
+                  <a16:creationId xmlns:a16="http://schemas.microsoft.com/office/drawing/2014/main" id="{9E9ABC44-2B22-0042-AFBE-32BB6D8F04D6}"/>
+                </a:ext>
+              </a:extLst>
+            </p:cNvPr>
+            <p:cNvSpPr/>
+            <p:nvPr/>
+          </p:nvSpPr>
+          <p:spPr>
+            <a:xfrm>
+              <a:off x="3120106" y="3768558"/>
+              <a:ext cx="147081" cy="96793"/>
+            </a:xfrm>
+            <a:prstGeom prst="rightArrow">
+              <a:avLst/>
+            </a:prstGeom>
+          </p:spPr>
+          <p:style>
+            <a:lnRef idx="2">
+              <a:schemeClr val="accent1">
+                <a:shade val="50000"/>
+              </a:schemeClr>
+            </a:lnRef>
+            <a:fillRef idx="1">
+              <a:schemeClr val="accent1"/>
+            </a:fillRef>
+            <a:effectRef idx="0">
+              <a:schemeClr val="accent1"/>
+            </a:effectRef>
+            <a:fontRef idx="minor">
+              <a:schemeClr val="lt1"/>
+            </a:fontRef>
+          </p:style>
+          <p:txBody>
+            <a:bodyPr rtlCol="0" anchor="ctr"/>
+            <a:lstStyle/>
+            <a:p>
+              <a:pPr algn="ctr"/>
+              <a:endParaRPr lang="en-SG"/>
+            </a:p>
+          </p:txBody>
+        </p:sp>
+        <p:sp>
+          <p:nvSpPr>
+            <p:cNvPr id="16" name="TextBox 15">
+              <a:extLst>
+                <a:ext uri="{FF2B5EF4-FFF2-40B4-BE49-F238E27FC236}">
+                  <a16:creationId xmlns:a16="http://schemas.microsoft.com/office/drawing/2014/main" id="{C7DD8455-0AED-F846-AD19-213E95104B40}"/>
+                </a:ext>
+              </a:extLst>
+            </p:cNvPr>
+            <p:cNvSpPr txBox="1"/>
+            <p:nvPr/>
+          </p:nvSpPr>
+          <p:spPr>
+            <a:xfrm>
+              <a:off x="3217740" y="3682075"/>
+              <a:ext cx="1400175" cy="246221"/>
+            </a:xfrm>
+            <a:prstGeom prst="rect">
+              <a:avLst/>
+            </a:prstGeom>
+            <a:noFill/>
+          </p:spPr>
+          <p:txBody>
+            <a:bodyPr wrap="square" rtlCol="0">
+              <a:spAutoFit/>
+            </a:bodyPr>
+            <a:lstStyle/>
+            <a:p>
+              <a:r>
+                <a:rPr lang="en-US" sz="1000" dirty="0">
+                  <a:solidFill>
+                    <a:schemeClr val="accent1"/>
+                  </a:solidFill>
+                </a:rPr>
+                <a:t>Link to commits panel</a:t>
+              </a:r>
+              <a:endParaRPr lang="en-SG" sz="1000" dirty="0">
+                <a:solidFill>
+                  <a:schemeClr val="accent1"/>
+                </a:solidFill>
+              </a:endParaRPr>
+            </a:p>
+          </p:txBody>
+        </p:sp>
+      </p:grpSp>
+      <p:grpSp>
+        <p:nvGrpSpPr>
+          <p:cNvPr id="17" name="Group 16">
+            <a:extLst>
+              <a:ext uri="{FF2B5EF4-FFF2-40B4-BE49-F238E27FC236}">
+                <a16:creationId xmlns:a16="http://schemas.microsoft.com/office/drawing/2014/main" id="{B79D4D12-0CDC-3846-848D-865CEED1A53E}"/>
+              </a:ext>
+            </a:extLst>
+          </p:cNvPr>
+          <p:cNvGrpSpPr/>
+          <p:nvPr/>
+        </p:nvGrpSpPr>
+        <p:grpSpPr>
+          <a:xfrm>
+            <a:off x="2753264" y="3023089"/>
+            <a:ext cx="2165611" cy="263574"/>
+            <a:chOff x="2230032" y="2870443"/>
+            <a:chExt cx="2165611" cy="263574"/>
+          </a:xfrm>
+        </p:grpSpPr>
+        <p:sp>
+          <p:nvSpPr>
+            <p:cNvPr id="18" name="Oval 17">
+              <a:extLst>
+                <a:ext uri="{FF2B5EF4-FFF2-40B4-BE49-F238E27FC236}">
+                  <a16:creationId xmlns:a16="http://schemas.microsoft.com/office/drawing/2014/main" id="{AF5ADA51-9563-D943-9B4A-E31F0847BA2C}"/>
+                </a:ext>
+              </a:extLst>
+            </p:cNvPr>
+            <p:cNvSpPr/>
+            <p:nvPr/>
+          </p:nvSpPr>
+          <p:spPr>
+            <a:xfrm>
+              <a:off x="2230032" y="3000667"/>
+              <a:ext cx="130499" cy="133350"/>
+            </a:xfrm>
+            <a:prstGeom prst="ellipse">
+              <a:avLst/>
+            </a:prstGeom>
+            <a:noFill/>
+            <a:ln w="9525" cap="flat" cmpd="sng" algn="ctr">
+              <a:solidFill>
+                <a:schemeClr val="accent6"/>
+              </a:solidFill>
+              <a:prstDash val="solid"/>
+              <a:round/>
+              <a:headEnd type="none" w="med" len="med"/>
+              <a:tailEnd type="none" w="med" len="med"/>
+            </a:ln>
+          </p:spPr>
+          <p:style>
+            <a:lnRef idx="0">
+              <a:scrgbClr r="0" g="0" b="0"/>
+            </a:lnRef>
+            <a:fillRef idx="0">
+              <a:scrgbClr r="0" g="0" b="0"/>
+            </a:fillRef>
+            <a:effectRef idx="0">
+              <a:scrgbClr r="0" g="0" b="0"/>
+            </a:effectRef>
+            <a:fontRef idx="minor">
+              <a:schemeClr val="accent6"/>
+            </a:fontRef>
+          </p:style>
+          <p:txBody>
+            <a:bodyPr rtlCol="0" anchor="ctr"/>
+            <a:lstStyle/>
+            <a:p>
+              <a:pPr algn="ctr"/>
+              <a:endParaRPr lang="en-SG"/>
+            </a:p>
+          </p:txBody>
+        </p:sp>
+        <p:sp>
+          <p:nvSpPr>
+            <p:cNvPr id="19" name="Arrow: Bent 29">
+              <a:extLst>
+                <a:ext uri="{FF2B5EF4-FFF2-40B4-BE49-F238E27FC236}">
+                  <a16:creationId xmlns:a16="http://schemas.microsoft.com/office/drawing/2014/main" id="{460DE55D-DDF3-364A-A026-D777B4FA3774}"/>
+                </a:ext>
+              </a:extLst>
+            </p:cNvPr>
+            <p:cNvSpPr/>
+            <p:nvPr/>
+          </p:nvSpPr>
+          <p:spPr>
+            <a:xfrm>
+              <a:off x="2281147" y="2943385"/>
+              <a:ext cx="243840" cy="62865"/>
+            </a:xfrm>
+            <a:prstGeom prst="bentArrow">
+              <a:avLst>
+                <a:gd name="adj1" fmla="val 25000"/>
+                <a:gd name="adj2" fmla="val 26516"/>
+                <a:gd name="adj3" fmla="val 25000"/>
+                <a:gd name="adj4" fmla="val 43750"/>
+              </a:avLst>
+            </a:prstGeom>
+          </p:spPr>
+          <p:style>
+            <a:lnRef idx="2">
+              <a:schemeClr val="accent6">
+                <a:shade val="50000"/>
+              </a:schemeClr>
+            </a:lnRef>
+            <a:fillRef idx="1">
+              <a:schemeClr val="accent6"/>
+            </a:fillRef>
+            <a:effectRef idx="0">
+              <a:schemeClr val="accent6"/>
+            </a:effectRef>
+            <a:fontRef idx="minor">
+              <a:schemeClr val="lt1"/>
+            </a:fontRef>
+          </p:style>
+          <p:txBody>
+            <a:bodyPr rtlCol="0" anchor="ctr"/>
+            <a:lstStyle/>
+            <a:p>
+              <a:pPr algn="ctr"/>
+              <a:endParaRPr lang="en-SG">
+                <a:solidFill>
+                  <a:schemeClr val="tx1"/>
+                </a:solidFill>
+              </a:endParaRPr>
+            </a:p>
+          </p:txBody>
+        </p:sp>
+        <p:sp>
+          <p:nvSpPr>
+            <p:cNvPr id="20" name="TextBox 19">
+              <a:extLst>
+                <a:ext uri="{FF2B5EF4-FFF2-40B4-BE49-F238E27FC236}">
+                  <a16:creationId xmlns:a16="http://schemas.microsoft.com/office/drawing/2014/main" id="{13633E74-DB09-6F48-B9E2-8BDA72C8A93D}"/>
+                </a:ext>
+              </a:extLst>
+            </p:cNvPr>
+            <p:cNvSpPr txBox="1"/>
+            <p:nvPr/>
+          </p:nvSpPr>
+          <p:spPr>
+            <a:xfrm>
+              <a:off x="2493500" y="2870443"/>
+              <a:ext cx="1902143" cy="246221"/>
+            </a:xfrm>
+            <a:prstGeom prst="rect">
+              <a:avLst/>
+            </a:prstGeom>
+            <a:noFill/>
+          </p:spPr>
+          <p:txBody>
+            <a:bodyPr wrap="square" rtlCol="0">
+              <a:spAutoFit/>
+            </a:bodyPr>
+            <a:lstStyle/>
+            <a:p>
+              <a:r>
+                <a:rPr lang="en-US" sz="1000" dirty="0">
+                  <a:solidFill>
+                    <a:schemeClr val="accent6"/>
+                  </a:solidFill>
+                </a:rPr>
+                <a:t>View author’s committed codes</a:t>
+              </a:r>
+              <a:endParaRPr lang="en-SG" sz="1000" dirty="0">
+                <a:solidFill>
+                  <a:schemeClr val="accent6"/>
+                </a:solidFill>
+              </a:endParaRPr>
+            </a:p>
+          </p:txBody>
+        </p:sp>
+      </p:grpSp>
+      <p:grpSp>
+        <p:nvGrpSpPr>
+          <p:cNvPr id="22" name="Group 21">
+            <a:extLst>
+              <a:ext uri="{FF2B5EF4-FFF2-40B4-BE49-F238E27FC236}">
+                <a16:creationId xmlns:a16="http://schemas.microsoft.com/office/drawing/2014/main" id="{25A622BC-A5B7-A44A-9C42-676F5FE8C9F9}"/>
+              </a:ext>
+            </a:extLst>
+          </p:cNvPr>
+          <p:cNvGrpSpPr/>
+          <p:nvPr/>
+        </p:nvGrpSpPr>
+        <p:grpSpPr>
+          <a:xfrm>
+            <a:off x="118577" y="4640643"/>
+            <a:ext cx="5959559" cy="461665"/>
+            <a:chOff x="731728" y="3629956"/>
+            <a:chExt cx="5399128" cy="461665"/>
+          </a:xfrm>
+        </p:grpSpPr>
+        <p:sp>
+          <p:nvSpPr>
+            <p:cNvPr id="23" name="Rectangle 22">
+              <a:extLst>
+                <a:ext uri="{FF2B5EF4-FFF2-40B4-BE49-F238E27FC236}">
+                  <a16:creationId xmlns:a16="http://schemas.microsoft.com/office/drawing/2014/main" id="{B564F8AB-86E1-AE47-8AEE-A391EE3A595A}"/>
+                </a:ext>
+              </a:extLst>
+            </p:cNvPr>
+            <p:cNvSpPr/>
+            <p:nvPr/>
+          </p:nvSpPr>
+          <p:spPr>
+            <a:xfrm>
+              <a:off x="1803254" y="3860789"/>
+              <a:ext cx="4327602" cy="119555"/>
+            </a:xfrm>
+            <a:prstGeom prst="rect">
+              <a:avLst/>
+            </a:prstGeom>
+            <a:noFill/>
+            <a:ln w="9525" cap="flat" cmpd="sng" algn="ctr">
+              <a:solidFill>
+                <a:schemeClr val="dk1"/>
+              </a:solidFill>
+              <a:prstDash val="solid"/>
+              <a:round/>
+              <a:headEnd type="none" w="med" len="med"/>
+              <a:tailEnd type="none" w="med" len="med"/>
+            </a:ln>
+          </p:spPr>
+          <p:style>
+            <a:lnRef idx="0">
+              <a:scrgbClr r="0" g="0" b="0"/>
+            </a:lnRef>
+            <a:fillRef idx="0">
+              <a:scrgbClr r="0" g="0" b="0"/>
+            </a:fillRef>
+            <a:effectRef idx="0">
+              <a:scrgbClr r="0" g="0" b="0"/>
+            </a:effectRef>
+            <a:fontRef idx="minor">
+              <a:schemeClr val="dk1"/>
+            </a:fontRef>
+          </p:style>
+          <p:txBody>
+            <a:bodyPr rtlCol="0" anchor="ctr"/>
+            <a:lstStyle/>
+            <a:p>
+              <a:pPr algn="ctr"/>
+              <a:endParaRPr lang="en-SG"/>
+            </a:p>
+          </p:txBody>
+        </p:sp>
+        <p:sp>
+          <p:nvSpPr>
+            <p:cNvPr id="25" name="TextBox 24">
+              <a:extLst>
+                <a:ext uri="{FF2B5EF4-FFF2-40B4-BE49-F238E27FC236}">
+                  <a16:creationId xmlns:a16="http://schemas.microsoft.com/office/drawing/2014/main" id="{C8343F1E-8844-E749-B305-01B53FD52B56}"/>
+                </a:ext>
+              </a:extLst>
+            </p:cNvPr>
+            <p:cNvSpPr txBox="1"/>
+            <p:nvPr/>
+          </p:nvSpPr>
+          <p:spPr>
+            <a:xfrm>
+              <a:off x="731728" y="3629956"/>
+              <a:ext cx="1014711" cy="461665"/>
+            </a:xfrm>
+            <a:prstGeom prst="rect">
+              <a:avLst/>
+            </a:prstGeom>
+            <a:noFill/>
+          </p:spPr>
+          <p:txBody>
+            <a:bodyPr wrap="square" rtlCol="0">
+              <a:spAutoFit/>
+            </a:bodyPr>
+            <a:lstStyle/>
+            <a:p>
+              <a:pPr algn="ctr"/>
+              <a:r>
+                <a:rPr lang="en-US" sz="1200" dirty="0"/>
+                <a:t>Contribution Bar</a:t>
+              </a:r>
+              <a:endParaRPr lang="en-SG" sz="1200" dirty="0"/>
+            </a:p>
+          </p:txBody>
+        </p:sp>
+      </p:grpSp>
+      <p:grpSp>
+        <p:nvGrpSpPr>
+          <p:cNvPr id="26" name="Group 25">
+            <a:extLst>
+              <a:ext uri="{FF2B5EF4-FFF2-40B4-BE49-F238E27FC236}">
+                <a16:creationId xmlns:a16="http://schemas.microsoft.com/office/drawing/2014/main" id="{DEF0A00E-6934-F848-A76D-E0C0910D196B}"/>
+              </a:ext>
+            </a:extLst>
+          </p:cNvPr>
+          <p:cNvGrpSpPr/>
+          <p:nvPr/>
+        </p:nvGrpSpPr>
+        <p:grpSpPr>
+          <a:xfrm>
+            <a:off x="189682" y="3246565"/>
+            <a:ext cx="5752649" cy="530943"/>
+            <a:chOff x="778195" y="2021953"/>
+            <a:chExt cx="5209217" cy="461665"/>
+          </a:xfrm>
+        </p:grpSpPr>
+        <p:sp>
+          <p:nvSpPr>
+            <p:cNvPr id="27" name="Rectangle 26">
+              <a:extLst>
+                <a:ext uri="{FF2B5EF4-FFF2-40B4-BE49-F238E27FC236}">
+                  <a16:creationId xmlns:a16="http://schemas.microsoft.com/office/drawing/2014/main" id="{C7A45855-68A6-F540-A5D5-8009F825F12B}"/>
+                </a:ext>
+              </a:extLst>
+            </p:cNvPr>
+            <p:cNvSpPr/>
+            <p:nvPr/>
+          </p:nvSpPr>
+          <p:spPr>
+            <a:xfrm>
+              <a:off x="1843248" y="2067663"/>
+              <a:ext cx="4144164" cy="276999"/>
+            </a:xfrm>
+            <a:prstGeom prst="rect">
+              <a:avLst/>
+            </a:prstGeom>
+            <a:noFill/>
+            <a:ln w="28575" cap="flat" cmpd="sng" algn="ctr">
+              <a:solidFill>
+                <a:srgbClr val="A401FF"/>
+              </a:solidFill>
+              <a:prstDash val="solid"/>
+              <a:round/>
+              <a:headEnd type="none" w="med" len="med"/>
+              <a:tailEnd type="none" w="med" len="med"/>
+            </a:ln>
+          </p:spPr>
+          <p:style>
+            <a:lnRef idx="0">
+              <a:scrgbClr r="0" g="0" b="0"/>
+            </a:lnRef>
+            <a:fillRef idx="0">
+              <a:scrgbClr r="0" g="0" b="0"/>
+            </a:fillRef>
+            <a:effectRef idx="0">
+              <a:scrgbClr r="0" g="0" b="0"/>
+            </a:effectRef>
+            <a:fontRef idx="minor">
+              <a:schemeClr val="accent4"/>
+            </a:fontRef>
+          </p:style>
+          <p:txBody>
+            <a:bodyPr rtlCol="0" anchor="ctr"/>
+            <a:lstStyle/>
+            <a:p>
+              <a:pPr algn="ctr"/>
+              <a:endParaRPr lang="en-SG"/>
+            </a:p>
+          </p:txBody>
+        </p:sp>
+        <p:sp>
+          <p:nvSpPr>
+            <p:cNvPr id="29" name="TextBox 28">
+              <a:extLst>
+                <a:ext uri="{FF2B5EF4-FFF2-40B4-BE49-F238E27FC236}">
+                  <a16:creationId xmlns:a16="http://schemas.microsoft.com/office/drawing/2014/main" id="{7F64F347-F556-4A40-9DBB-1A737BF6C468}"/>
+                </a:ext>
+              </a:extLst>
+            </p:cNvPr>
+            <p:cNvSpPr txBox="1"/>
+            <p:nvPr/>
+          </p:nvSpPr>
+          <p:spPr>
+            <a:xfrm>
+              <a:off x="778195" y="2021953"/>
+              <a:ext cx="723900" cy="461665"/>
+            </a:xfrm>
+            <a:prstGeom prst="rect">
+              <a:avLst/>
+            </a:prstGeom>
+            <a:noFill/>
+          </p:spPr>
+          <p:txBody>
+            <a:bodyPr wrap="square" rtlCol="0">
+              <a:spAutoFit/>
+            </a:bodyPr>
+            <a:lstStyle/>
+            <a:p>
+              <a:pPr algn="ctr"/>
+              <a:r>
+                <a:rPr lang="en-US" sz="1200" dirty="0">
+                  <a:solidFill>
+                    <a:srgbClr val="7030A0"/>
+                  </a:solidFill>
+                </a:rPr>
+                <a:t>Ramp Chart</a:t>
+              </a:r>
+            </a:p>
+          </p:txBody>
+        </p:sp>
+        <p:sp>
+          <p:nvSpPr>
+            <p:cNvPr id="28" name="Left Brace 27">
+              <a:extLst>
+                <a:ext uri="{FF2B5EF4-FFF2-40B4-BE49-F238E27FC236}">
+                  <a16:creationId xmlns:a16="http://schemas.microsoft.com/office/drawing/2014/main" id="{02D57226-4585-844C-9BC1-7E76A3AD52DA}"/>
+                </a:ext>
+              </a:extLst>
+            </p:cNvPr>
+            <p:cNvSpPr/>
+            <p:nvPr/>
+          </p:nvSpPr>
+          <p:spPr>
+            <a:xfrm>
+              <a:off x="1311783" y="2087636"/>
+              <a:ext cx="522533" cy="257026"/>
+            </a:xfrm>
+            <a:prstGeom prst="leftBrace">
+              <a:avLst>
+                <a:gd name="adj1" fmla="val 8333"/>
+                <a:gd name="adj2" fmla="val 53106"/>
+              </a:avLst>
+            </a:prstGeom>
+            <a:ln w="19050">
+              <a:solidFill>
+                <a:srgbClr val="A401FF"/>
+              </a:solidFill>
+            </a:ln>
+          </p:spPr>
+          <p:style>
+            <a:lnRef idx="1">
+              <a:schemeClr val="accent1"/>
+            </a:lnRef>
+            <a:fillRef idx="0">
+              <a:schemeClr val="accent1"/>
+            </a:fillRef>
+            <a:effectRef idx="0">
+              <a:schemeClr val="accent1"/>
+            </a:effectRef>
+            <a:fontRef idx="minor">
+              <a:schemeClr val="tx1"/>
+            </a:fontRef>
+          </p:style>
+          <p:txBody>
+            <a:bodyPr rtlCol="0" anchor="ctr"/>
+            <a:lstStyle/>
+            <a:p>
+              <a:pPr algn="ctr"/>
+              <a:endParaRPr lang="en-SG"/>
+            </a:p>
+          </p:txBody>
+        </p:sp>
+      </p:grpSp>
+      <p:grpSp>
+        <p:nvGrpSpPr>
+          <p:cNvPr id="30" name="Group 29">
+            <a:extLst>
+              <a:ext uri="{FF2B5EF4-FFF2-40B4-BE49-F238E27FC236}">
+                <a16:creationId xmlns:a16="http://schemas.microsoft.com/office/drawing/2014/main" id="{B006722F-2E7C-2A42-8BC9-3C585481D959}"/>
+              </a:ext>
+            </a:extLst>
+          </p:cNvPr>
+          <p:cNvGrpSpPr/>
+          <p:nvPr/>
+        </p:nvGrpSpPr>
+        <p:grpSpPr>
+          <a:xfrm>
+            <a:off x="6509832" y="1982345"/>
+            <a:ext cx="3424155" cy="402234"/>
+            <a:chOff x="6202680" y="1735827"/>
+            <a:chExt cx="3424155" cy="402234"/>
+          </a:xfrm>
+        </p:grpSpPr>
+        <p:sp>
+          <p:nvSpPr>
+            <p:cNvPr id="31" name="Arrow: Right 11">
+              <a:extLst>
+                <a:ext uri="{FF2B5EF4-FFF2-40B4-BE49-F238E27FC236}">
+                  <a16:creationId xmlns:a16="http://schemas.microsoft.com/office/drawing/2014/main" id="{D4F445DF-DF09-F24E-AB16-DB9631CF26EA}"/>
+                </a:ext>
+              </a:extLst>
+            </p:cNvPr>
+            <p:cNvSpPr/>
+            <p:nvPr/>
+          </p:nvSpPr>
+          <p:spPr>
+            <a:xfrm rot="21372755">
+              <a:off x="8429466" y="1857407"/>
+              <a:ext cx="402336" cy="121920"/>
+            </a:xfrm>
+            <a:prstGeom prst="rightArrow">
+              <a:avLst/>
+            </a:prstGeom>
+          </p:spPr>
+          <p:style>
+            <a:lnRef idx="2">
+              <a:schemeClr val="accent6">
+                <a:shade val="50000"/>
+              </a:schemeClr>
+            </a:lnRef>
+            <a:fillRef idx="1">
+              <a:schemeClr val="accent6"/>
+            </a:fillRef>
+            <a:effectRef idx="0">
+              <a:schemeClr val="accent6"/>
+            </a:effectRef>
+            <a:fontRef idx="minor">
+              <a:schemeClr val="lt1"/>
+            </a:fontRef>
+          </p:style>
+          <p:txBody>
+            <a:bodyPr rtlCol="0" anchor="ctr"/>
+            <a:lstStyle/>
+            <a:p>
+              <a:pPr algn="ctr"/>
+              <a:endParaRPr lang="en-SG"/>
+            </a:p>
+          </p:txBody>
+        </p:sp>
+        <p:sp>
+          <p:nvSpPr>
+            <p:cNvPr id="32" name="TextBox 31">
+              <a:extLst>
+                <a:ext uri="{FF2B5EF4-FFF2-40B4-BE49-F238E27FC236}">
+                  <a16:creationId xmlns:a16="http://schemas.microsoft.com/office/drawing/2014/main" id="{E262627B-E8FC-6541-85DB-FBD3727EF674}"/>
+                </a:ext>
+              </a:extLst>
+            </p:cNvPr>
+            <p:cNvSpPr txBox="1"/>
+            <p:nvPr/>
+          </p:nvSpPr>
+          <p:spPr>
+            <a:xfrm>
+              <a:off x="8790433" y="1735827"/>
+              <a:ext cx="836402" cy="276999"/>
+            </a:xfrm>
+            <a:prstGeom prst="rect">
+              <a:avLst/>
+            </a:prstGeom>
+            <a:noFill/>
+          </p:spPr>
+          <p:txBody>
+            <a:bodyPr wrap="square" rtlCol="0">
+              <a:spAutoFit/>
+            </a:bodyPr>
+            <a:lstStyle/>
+            <a:p>
+              <a:r>
+                <a:rPr lang="en-US" sz="1200" dirty="0">
+                  <a:solidFill>
+                    <a:schemeClr val="accent6">
+                      <a:lumMod val="75000"/>
+                    </a:schemeClr>
+                  </a:solidFill>
+                </a:rPr>
+                <a:t>Glob Filter</a:t>
+              </a:r>
+              <a:endParaRPr lang="en-SG" sz="1200" dirty="0">
+                <a:solidFill>
+                  <a:schemeClr val="accent6">
+                    <a:lumMod val="75000"/>
+                  </a:schemeClr>
+                </a:solidFill>
+              </a:endParaRPr>
+            </a:p>
+          </p:txBody>
+        </p:sp>
+        <p:sp>
+          <p:nvSpPr>
+            <p:cNvPr id="33" name="Rectangle 32">
+              <a:extLst>
+                <a:ext uri="{FF2B5EF4-FFF2-40B4-BE49-F238E27FC236}">
+                  <a16:creationId xmlns:a16="http://schemas.microsoft.com/office/drawing/2014/main" id="{E4380F1C-1A19-6949-931D-E836972EBE98}"/>
+                </a:ext>
+              </a:extLst>
+            </p:cNvPr>
+            <p:cNvSpPr/>
+            <p:nvPr/>
+          </p:nvSpPr>
+          <p:spPr>
+            <a:xfrm>
+              <a:off x="6202680" y="1861062"/>
+              <a:ext cx="2151751" cy="276999"/>
+            </a:xfrm>
+            <a:prstGeom prst="rect">
+              <a:avLst/>
+            </a:prstGeom>
+            <a:noFill/>
+            <a:ln w="19050" cap="flat" cmpd="sng" algn="ctr">
+              <a:solidFill>
+                <a:schemeClr val="accent6"/>
+              </a:solidFill>
+              <a:prstDash val="solid"/>
+              <a:round/>
+              <a:headEnd type="none" w="med" len="med"/>
+              <a:tailEnd type="none" w="med" len="med"/>
+            </a:ln>
+          </p:spPr>
+          <p:style>
+            <a:lnRef idx="0">
+              <a:scrgbClr r="0" g="0" b="0"/>
+            </a:lnRef>
+            <a:fillRef idx="0">
+              <a:scrgbClr r="0" g="0" b="0"/>
+            </a:fillRef>
+            <a:effectRef idx="0">
+              <a:scrgbClr r="0" g="0" b="0"/>
+            </a:effectRef>
+            <a:fontRef idx="minor">
+              <a:schemeClr val="accent6"/>
+            </a:fontRef>
+          </p:style>
+          <p:txBody>
+            <a:bodyPr rtlCol="0" anchor="ctr"/>
+            <a:lstStyle/>
+            <a:p>
+              <a:pPr algn="ctr"/>
+              <a:endParaRPr lang="en-SG"/>
+            </a:p>
+          </p:txBody>
+        </p:sp>
+      </p:grpSp>
+      <p:grpSp>
+        <p:nvGrpSpPr>
+          <p:cNvPr id="34" name="Group 33">
+            <a:extLst>
+              <a:ext uri="{FF2B5EF4-FFF2-40B4-BE49-F238E27FC236}">
+                <a16:creationId xmlns:a16="http://schemas.microsoft.com/office/drawing/2014/main" id="{D4AD8626-A999-EF41-9A8A-8089B1A093A9}"/>
+              </a:ext>
+            </a:extLst>
+          </p:cNvPr>
+          <p:cNvGrpSpPr/>
+          <p:nvPr/>
+        </p:nvGrpSpPr>
+        <p:grpSpPr>
+          <a:xfrm>
+            <a:off x="9567334" y="3299134"/>
+            <a:ext cx="1139315" cy="562172"/>
+            <a:chOff x="8559185" y="2719565"/>
+            <a:chExt cx="1139315" cy="562172"/>
+          </a:xfrm>
+        </p:grpSpPr>
+        <p:sp>
+          <p:nvSpPr>
+            <p:cNvPr id="35" name="Oval 34">
+              <a:extLst>
+                <a:ext uri="{FF2B5EF4-FFF2-40B4-BE49-F238E27FC236}">
+                  <a16:creationId xmlns:a16="http://schemas.microsoft.com/office/drawing/2014/main" id="{5AF2C386-5D22-2A40-86A1-D31380F7236C}"/>
+                </a:ext>
+              </a:extLst>
+            </p:cNvPr>
+            <p:cNvSpPr/>
+            <p:nvPr/>
+          </p:nvSpPr>
+          <p:spPr>
+            <a:xfrm>
+              <a:off x="8559185" y="3116628"/>
+              <a:ext cx="198244" cy="165109"/>
             </a:xfrm>
             <a:prstGeom prst="ellipse">
               <a:avLst/>
@@ -3572,16 +4532,16 @@
             <a:lstStyle/>
             <a:p>
               <a:pPr algn="ctr"/>
-              <a:endParaRPr lang="en-SG"/>
+              <a:endParaRPr lang="en-SG" dirty="0"/>
             </a:p>
           </p:txBody>
         </p:sp>
         <p:sp>
           <p:nvSpPr>
-            <p:cNvPr id="17" name="TextBox 16">
+            <p:cNvPr id="36" name="TextBox 35">
               <a:extLst>
                 <a:ext uri="{FF2B5EF4-FFF2-40B4-BE49-F238E27FC236}">
-                  <a16:creationId xmlns:a16="http://schemas.microsoft.com/office/drawing/2014/main" id="{0213D02D-4396-4437-B87F-870EECAA3F68}"/>
+                  <a16:creationId xmlns:a16="http://schemas.microsoft.com/office/drawing/2014/main" id="{03D2FA7A-9E06-A04F-B625-97362DA15A32}"/>
                 </a:ext>
               </a:extLst>
             </p:cNvPr>
@@ -3622,10 +4582,10 @@
         </p:sp>
         <p:sp>
           <p:nvSpPr>
-            <p:cNvPr id="19" name="Arrow: Right 18">
+            <p:cNvPr id="37" name="Arrow: Right 18">
               <a:extLst>
                 <a:ext uri="{FF2B5EF4-FFF2-40B4-BE49-F238E27FC236}">
-                  <a16:creationId xmlns:a16="http://schemas.microsoft.com/office/drawing/2014/main" id="{A85A5DB4-65AD-4483-B496-640C742923A0}"/>
+                  <a16:creationId xmlns:a16="http://schemas.microsoft.com/office/drawing/2014/main" id="{091ABFBD-A089-3549-B8B5-BD5FC37AB45A}"/>
                 </a:ext>
               </a:extLst>
             </p:cNvPr>
@@ -3672,7 +4632,7 @@
           <p:cNvPr id="38" name="Group 37">
             <a:extLst>
               <a:ext uri="{FF2B5EF4-FFF2-40B4-BE49-F238E27FC236}">
-                <a16:creationId xmlns:a16="http://schemas.microsoft.com/office/drawing/2014/main" id="{E8CB930F-3742-4BA6-BECD-C54762D6B43C}"/>
+                <a16:creationId xmlns:a16="http://schemas.microsoft.com/office/drawing/2014/main" id="{A6A6B5EE-F6C1-4642-9E3A-6F5A08A078BC}"/>
               </a:ext>
             </a:extLst>
           </p:cNvPr>
@@ -3681,18 +4641,18 @@
         </p:nvGrpSpPr>
         <p:grpSpPr>
           <a:xfrm>
-            <a:off x="8507108" y="2488443"/>
-            <a:ext cx="1127684" cy="568600"/>
-            <a:chOff x="7475403" y="3115227"/>
-            <a:chExt cx="1127684" cy="568600"/>
+            <a:off x="8358978" y="2895216"/>
+            <a:ext cx="1252259" cy="404424"/>
+            <a:chOff x="7350829" y="3118022"/>
+            <a:chExt cx="1252259" cy="404424"/>
           </a:xfrm>
         </p:grpSpPr>
         <p:sp>
           <p:nvSpPr>
-            <p:cNvPr id="18" name="Oval 17">
+            <p:cNvPr id="39" name="Oval 38">
               <a:extLst>
                 <a:ext uri="{FF2B5EF4-FFF2-40B4-BE49-F238E27FC236}">
-                  <a16:creationId xmlns:a16="http://schemas.microsoft.com/office/drawing/2014/main" id="{3698720C-0C2B-463A-B70A-97FF666889C2}"/>
+                  <a16:creationId xmlns:a16="http://schemas.microsoft.com/office/drawing/2014/main" id="{054FADD2-562C-AF43-9AE4-764DFC55F605}"/>
                 </a:ext>
               </a:extLst>
             </p:cNvPr>
@@ -3701,8 +4661,8 @@
           </p:nvSpPr>
           <p:spPr>
             <a:xfrm>
-              <a:off x="8448746" y="3115227"/>
-              <a:ext cx="154341" cy="165109"/>
+              <a:off x="8427028" y="3118022"/>
+              <a:ext cx="176060" cy="162314"/>
             </a:xfrm>
             <a:prstGeom prst="ellipse">
               <a:avLst/>
@@ -3743,10 +4703,10 @@
         </p:sp>
         <p:sp>
           <p:nvSpPr>
-            <p:cNvPr id="20" name="Arrow: Right 19">
+            <p:cNvPr id="40" name="Arrow: Right 19">
               <a:extLst>
                 <a:ext uri="{FF2B5EF4-FFF2-40B4-BE49-F238E27FC236}">
-                  <a16:creationId xmlns:a16="http://schemas.microsoft.com/office/drawing/2014/main" id="{620CEC16-4148-4C61-AC47-F7DFED9FDB71}"/>
+                  <a16:creationId xmlns:a16="http://schemas.microsoft.com/office/drawing/2014/main" id="{DA30601D-F89B-9F4E-846D-1A2744B968ED}"/>
                 </a:ext>
               </a:extLst>
             </p:cNvPr>
@@ -3754,8 +4714,8 @@
             <p:nvPr/>
           </p:nvSpPr>
           <p:spPr>
-            <a:xfrm rot="18900000">
-              <a:off x="8286583" y="3318450"/>
+            <a:xfrm rot="19328561">
+              <a:off x="8260549" y="3244306"/>
               <a:ext cx="158874" cy="97790"/>
             </a:xfrm>
             <a:prstGeom prst="rightArrow">
@@ -3789,10 +4749,10 @@
         </p:sp>
         <p:sp>
           <p:nvSpPr>
-            <p:cNvPr id="21" name="TextBox 20">
+            <p:cNvPr id="41" name="TextBox 40">
               <a:extLst>
                 <a:ext uri="{FF2B5EF4-FFF2-40B4-BE49-F238E27FC236}">
-                  <a16:creationId xmlns:a16="http://schemas.microsoft.com/office/drawing/2014/main" id="{D1178780-E5C8-40A3-866C-F0D48D349217}"/>
+                  <a16:creationId xmlns:a16="http://schemas.microsoft.com/office/drawing/2014/main" id="{C98B7E2C-4543-8540-987D-32B81D0ECA45}"/>
                 </a:ext>
               </a:extLst>
             </p:cNvPr>
@@ -3801,7 +4761,7 @@
           </p:nvSpPr>
           <p:spPr>
             <a:xfrm>
-              <a:off x="7475403" y="3406828"/>
+              <a:off x="7350829" y="3245447"/>
               <a:ext cx="973343" cy="276999"/>
             </a:xfrm>
             <a:prstGeom prst="rect">
@@ -3834,10 +4794,10 @@
       </p:grpSp>
       <p:grpSp>
         <p:nvGrpSpPr>
-          <p:cNvPr id="15" name="Group 14">
-            <a:extLst>
-              <a:ext uri="{FF2B5EF4-FFF2-40B4-BE49-F238E27FC236}">
-                <a16:creationId xmlns:a16="http://schemas.microsoft.com/office/drawing/2014/main" id="{63E15A1F-3E59-4DDC-A66B-A3347279DE71}"/>
+          <p:cNvPr id="42" name="Group 41">
+            <a:extLst>
+              <a:ext uri="{FF2B5EF4-FFF2-40B4-BE49-F238E27FC236}">
+                <a16:creationId xmlns:a16="http://schemas.microsoft.com/office/drawing/2014/main" id="{DD6026D3-4444-4741-8BF4-79B21C750898}"/>
               </a:ext>
             </a:extLst>
           </p:cNvPr>
@@ -3846,18 +4806,18 @@
         </p:nvGrpSpPr>
         <p:grpSpPr>
           <a:xfrm>
-            <a:off x="1443990" y="79248"/>
-            <a:ext cx="4652010" cy="5964363"/>
-            <a:chOff x="1443990" y="79248"/>
-            <a:chExt cx="4652010" cy="5964363"/>
+            <a:off x="1167842" y="10803"/>
+            <a:ext cx="4940161" cy="6203729"/>
+            <a:chOff x="1443990" y="207969"/>
+            <a:chExt cx="4652010" cy="5835642"/>
           </a:xfrm>
         </p:grpSpPr>
         <p:sp>
           <p:nvSpPr>
-            <p:cNvPr id="8" name="Right Brace 7">
+            <p:cNvPr id="43" name="Right Brace 42">
               <a:extLst>
                 <a:ext uri="{FF2B5EF4-FFF2-40B4-BE49-F238E27FC236}">
-                  <a16:creationId xmlns:a16="http://schemas.microsoft.com/office/drawing/2014/main" id="{C05B2C6F-DCA4-45F9-94E5-345EC17842DB}"/>
+                  <a16:creationId xmlns:a16="http://schemas.microsoft.com/office/drawing/2014/main" id="{7CC774A1-EA77-2A4C-BD1D-0EAE3FADDC0B}"/>
                 </a:ext>
               </a:extLst>
             </p:cNvPr>
@@ -3898,10 +4858,10 @@
         </p:sp>
         <p:sp>
           <p:nvSpPr>
-            <p:cNvPr id="9" name="TextBox 8">
+            <p:cNvPr id="44" name="TextBox 43">
               <a:extLst>
                 <a:ext uri="{FF2B5EF4-FFF2-40B4-BE49-F238E27FC236}">
-                  <a16:creationId xmlns:a16="http://schemas.microsoft.com/office/drawing/2014/main" id="{64E7039B-00EC-4DDC-B348-58F4C75F63AF}"/>
+                  <a16:creationId xmlns:a16="http://schemas.microsoft.com/office/drawing/2014/main" id="{DAD29254-7522-BC42-B9C9-5A551CFCBCD6}"/>
                 </a:ext>
               </a:extLst>
             </p:cNvPr>
@@ -3910,7 +4870,7 @@
           </p:nvSpPr>
           <p:spPr>
             <a:xfrm>
-              <a:off x="2726436" y="79248"/>
+              <a:off x="2702432" y="207969"/>
               <a:ext cx="2090928" cy="276999"/>
             </a:xfrm>
             <a:prstGeom prst="rect">
@@ -3935,10 +4895,10 @@
         </p:sp>
         <p:sp>
           <p:nvSpPr>
-            <p:cNvPr id="23" name="Rectangle 22">
+            <p:cNvPr id="45" name="Rectangle 44">
               <a:extLst>
                 <a:ext uri="{FF2B5EF4-FFF2-40B4-BE49-F238E27FC236}">
-                  <a16:creationId xmlns:a16="http://schemas.microsoft.com/office/drawing/2014/main" id="{6D6AB3E9-494B-45F6-B9FF-736F40C71E04}"/>
+                  <a16:creationId xmlns:a16="http://schemas.microsoft.com/office/drawing/2014/main" id="{1AB64EEF-A7FE-2B45-8398-A7CBC07F2F20}"/>
                 </a:ext>
               </a:extLst>
             </p:cNvPr>
@@ -3990,10 +4950,10 @@
       </p:grpSp>
       <p:grpSp>
         <p:nvGrpSpPr>
-          <p:cNvPr id="7" name="Group 6">
-            <a:extLst>
-              <a:ext uri="{FF2B5EF4-FFF2-40B4-BE49-F238E27FC236}">
-                <a16:creationId xmlns:a16="http://schemas.microsoft.com/office/drawing/2014/main" id="{136E2079-5E0D-4506-AFAA-58961257A6DD}"/>
+          <p:cNvPr id="46" name="Group 45">
+            <a:extLst>
+              <a:ext uri="{FF2B5EF4-FFF2-40B4-BE49-F238E27FC236}">
+                <a16:creationId xmlns:a16="http://schemas.microsoft.com/office/drawing/2014/main" id="{E3017512-F6E2-6E44-9028-2AE547D43868}"/>
               </a:ext>
             </a:extLst>
           </p:cNvPr>
@@ -4002,519 +4962,18 @@
         </p:nvGrpSpPr>
         <p:grpSpPr>
           <a:xfrm>
-            <a:off x="544590" y="945870"/>
-            <a:ext cx="5327890" cy="869029"/>
-            <a:chOff x="823377" y="945870"/>
-            <a:chExt cx="4742922" cy="869029"/>
+            <a:off x="6155318" y="41570"/>
+            <a:ext cx="4900204" cy="6172963"/>
+            <a:chOff x="6196584" y="220234"/>
+            <a:chExt cx="4555617" cy="5823377"/>
           </a:xfrm>
         </p:grpSpPr>
         <p:sp>
           <p:nvSpPr>
-            <p:cNvPr id="22" name="Left Brace 21">
+            <p:cNvPr id="47" name="Right Brace 46">
               <a:extLst>
                 <a:ext uri="{FF2B5EF4-FFF2-40B4-BE49-F238E27FC236}">
-                  <a16:creationId xmlns:a16="http://schemas.microsoft.com/office/drawing/2014/main" id="{C4A07B1E-02AC-4689-807B-B2620194B508}"/>
-                </a:ext>
-              </a:extLst>
-            </p:cNvPr>
-            <p:cNvSpPr/>
-            <p:nvPr/>
-          </p:nvSpPr>
-          <p:spPr>
-            <a:xfrm>
-              <a:off x="1548971" y="945870"/>
-              <a:ext cx="310965" cy="869029"/>
-            </a:xfrm>
-            <a:prstGeom prst="leftBrace">
-              <a:avLst>
-                <a:gd name="adj1" fmla="val 14462"/>
-                <a:gd name="adj2" fmla="val 48831"/>
-              </a:avLst>
-            </a:prstGeom>
-          </p:spPr>
-          <p:style>
-            <a:lnRef idx="3">
-              <a:schemeClr val="accent6"/>
-            </a:lnRef>
-            <a:fillRef idx="0">
-              <a:schemeClr val="accent6"/>
-            </a:fillRef>
-            <a:effectRef idx="2">
-              <a:schemeClr val="accent6"/>
-            </a:effectRef>
-            <a:fontRef idx="minor">
-              <a:schemeClr val="tx1"/>
-            </a:fontRef>
-          </p:style>
-          <p:txBody>
-            <a:bodyPr rtlCol="0" anchor="ctr"/>
-            <a:lstStyle/>
-            <a:p>
-              <a:pPr algn="ctr"/>
-              <a:endParaRPr lang="en-SG"/>
-            </a:p>
-          </p:txBody>
-        </p:sp>
-        <p:sp>
-          <p:nvSpPr>
-            <p:cNvPr id="24" name="TextBox 23">
-              <a:extLst>
-                <a:ext uri="{FF2B5EF4-FFF2-40B4-BE49-F238E27FC236}">
-                  <a16:creationId xmlns:a16="http://schemas.microsoft.com/office/drawing/2014/main" id="{ACDC6C00-2DF8-42EF-B108-6D30BD3CBE76}"/>
-                </a:ext>
-              </a:extLst>
-            </p:cNvPr>
-            <p:cNvSpPr txBox="1"/>
-            <p:nvPr/>
-          </p:nvSpPr>
-          <p:spPr>
-            <a:xfrm>
-              <a:off x="823377" y="1208184"/>
-              <a:ext cx="723900" cy="276999"/>
-            </a:xfrm>
-            <a:prstGeom prst="rect">
-              <a:avLst/>
-            </a:prstGeom>
-            <a:noFill/>
-          </p:spPr>
-          <p:txBody>
-            <a:bodyPr wrap="square" rtlCol="0">
-              <a:spAutoFit/>
-            </a:bodyPr>
-            <a:lstStyle/>
-            <a:p>
-              <a:pPr algn="ctr"/>
-              <a:r>
-                <a:rPr lang="en-US" sz="1200" dirty="0">
-                  <a:solidFill>
-                    <a:schemeClr val="accent6"/>
-                  </a:solidFill>
-                </a:rPr>
-                <a:t>Toolbar</a:t>
-              </a:r>
-            </a:p>
-          </p:txBody>
-        </p:sp>
-        <p:sp>
-          <p:nvSpPr>
-            <p:cNvPr id="25" name="Rectangle 24">
-              <a:extLst>
-                <a:ext uri="{FF2B5EF4-FFF2-40B4-BE49-F238E27FC236}">
-                  <a16:creationId xmlns:a16="http://schemas.microsoft.com/office/drawing/2014/main" id="{38234176-8BB8-4114-96C5-171C66ECDE3F}"/>
-                </a:ext>
-              </a:extLst>
-            </p:cNvPr>
-            <p:cNvSpPr/>
-            <p:nvPr/>
-          </p:nvSpPr>
-          <p:spPr>
-            <a:xfrm>
-              <a:off x="1859936" y="945870"/>
-              <a:ext cx="3706363" cy="869029"/>
-            </a:xfrm>
-            <a:prstGeom prst="rect">
-              <a:avLst/>
-            </a:prstGeom>
-            <a:noFill/>
-            <a:ln w="9525" cap="flat" cmpd="sng" algn="ctr">
-              <a:solidFill>
-                <a:schemeClr val="accent6"/>
-              </a:solidFill>
-              <a:prstDash val="solid"/>
-              <a:round/>
-              <a:headEnd type="none" w="med" len="med"/>
-              <a:tailEnd type="none" w="med" len="med"/>
-            </a:ln>
-          </p:spPr>
-          <p:style>
-            <a:lnRef idx="0">
-              <a:scrgbClr r="0" g="0" b="0"/>
-            </a:lnRef>
-            <a:fillRef idx="0">
-              <a:scrgbClr r="0" g="0" b="0"/>
-            </a:fillRef>
-            <a:effectRef idx="0">
-              <a:scrgbClr r="0" g="0" b="0"/>
-            </a:effectRef>
-            <a:fontRef idx="minor">
-              <a:schemeClr val="accent6"/>
-            </a:fontRef>
-          </p:style>
-          <p:txBody>
-            <a:bodyPr rtlCol="0" anchor="ctr"/>
-            <a:lstStyle/>
-            <a:p>
-              <a:pPr algn="ctr"/>
-              <a:endParaRPr lang="en-SG"/>
-            </a:p>
-          </p:txBody>
-        </p:sp>
-      </p:grpSp>
-      <p:grpSp>
-        <p:nvGrpSpPr>
-          <p:cNvPr id="5" name="Group 4">
-            <a:extLst>
-              <a:ext uri="{FF2B5EF4-FFF2-40B4-BE49-F238E27FC236}">
-                <a16:creationId xmlns:a16="http://schemas.microsoft.com/office/drawing/2014/main" id="{4FF72358-8A89-4AE0-983B-BB094CC4E4D9}"/>
-              </a:ext>
-            </a:extLst>
-          </p:cNvPr>
-          <p:cNvGrpSpPr/>
-          <p:nvPr/>
-        </p:nvGrpSpPr>
-        <p:grpSpPr>
-          <a:xfrm>
-            <a:off x="2824966" y="3083362"/>
-            <a:ext cx="1695743" cy="246221"/>
-            <a:chOff x="2464522" y="2361561"/>
-            <a:chExt cx="1695743" cy="246221"/>
-          </a:xfrm>
-        </p:grpSpPr>
-        <p:sp>
-          <p:nvSpPr>
-            <p:cNvPr id="26" name="Oval 25">
-              <a:extLst>
-                <a:ext uri="{FF2B5EF4-FFF2-40B4-BE49-F238E27FC236}">
-                  <a16:creationId xmlns:a16="http://schemas.microsoft.com/office/drawing/2014/main" id="{1173C975-EBB3-439F-8872-826D3DAF91EB}"/>
-                </a:ext>
-              </a:extLst>
-            </p:cNvPr>
-            <p:cNvSpPr/>
-            <p:nvPr/>
-          </p:nvSpPr>
-          <p:spPr>
-            <a:xfrm>
-              <a:off x="2464522" y="2454206"/>
-              <a:ext cx="142875" cy="133350"/>
-            </a:xfrm>
-            <a:prstGeom prst="ellipse">
-              <a:avLst/>
-            </a:prstGeom>
-            <a:noFill/>
-            <a:ln w="9525" cap="flat" cmpd="sng" algn="ctr">
-              <a:solidFill>
-                <a:schemeClr val="accent2"/>
-              </a:solidFill>
-              <a:prstDash val="solid"/>
-              <a:round/>
-              <a:headEnd type="none" w="med" len="med"/>
-              <a:tailEnd type="none" w="med" len="med"/>
-            </a:ln>
-          </p:spPr>
-          <p:style>
-            <a:lnRef idx="0">
-              <a:scrgbClr r="0" g="0" b="0"/>
-            </a:lnRef>
-            <a:fillRef idx="0">
-              <a:scrgbClr r="0" g="0" b="0"/>
-            </a:fillRef>
-            <a:effectRef idx="0">
-              <a:scrgbClr r="0" g="0" b="0"/>
-            </a:effectRef>
-            <a:fontRef idx="minor">
-              <a:schemeClr val="accent2"/>
-            </a:fontRef>
-          </p:style>
-          <p:txBody>
-            <a:bodyPr rtlCol="0" anchor="ctr"/>
-            <a:lstStyle/>
-            <a:p>
-              <a:pPr algn="ctr"/>
-              <a:endParaRPr lang="en-SG"/>
-            </a:p>
-          </p:txBody>
-        </p:sp>
-        <p:sp>
-          <p:nvSpPr>
-            <p:cNvPr id="27" name="Arrow: Right 26">
-              <a:extLst>
-                <a:ext uri="{FF2B5EF4-FFF2-40B4-BE49-F238E27FC236}">
-                  <a16:creationId xmlns:a16="http://schemas.microsoft.com/office/drawing/2014/main" id="{A58405F1-EAAD-4099-A00D-F41C9263239F}"/>
-                </a:ext>
-              </a:extLst>
-            </p:cNvPr>
-            <p:cNvSpPr/>
-            <p:nvPr/>
-          </p:nvSpPr>
-          <p:spPr>
-            <a:xfrm rot="21204583">
-              <a:off x="2661847" y="2453845"/>
-              <a:ext cx="142378" cy="66676"/>
-            </a:xfrm>
-            <a:prstGeom prst="rightArrow">
-              <a:avLst/>
-            </a:prstGeom>
-          </p:spPr>
-          <p:style>
-            <a:lnRef idx="2">
-              <a:schemeClr val="accent2">
-                <a:shade val="50000"/>
-              </a:schemeClr>
-            </a:lnRef>
-            <a:fillRef idx="1">
-              <a:schemeClr val="accent2"/>
-            </a:fillRef>
-            <a:effectRef idx="0">
-              <a:schemeClr val="accent2"/>
-            </a:effectRef>
-            <a:fontRef idx="minor">
-              <a:schemeClr val="lt1"/>
-            </a:fontRef>
-          </p:style>
-          <p:txBody>
-            <a:bodyPr rtlCol="0" anchor="ctr"/>
-            <a:lstStyle/>
-            <a:p>
-              <a:pPr algn="ctr"/>
-              <a:endParaRPr lang="en-SG"/>
-            </a:p>
-          </p:txBody>
-        </p:sp>
-        <p:sp>
-          <p:nvSpPr>
-            <p:cNvPr id="28" name="TextBox 27">
-              <a:extLst>
-                <a:ext uri="{FF2B5EF4-FFF2-40B4-BE49-F238E27FC236}">
-                  <a16:creationId xmlns:a16="http://schemas.microsoft.com/office/drawing/2014/main" id="{34AE8672-B518-45E4-9DE5-A05EE9D1C6F3}"/>
-                </a:ext>
-              </a:extLst>
-            </p:cNvPr>
-            <p:cNvSpPr txBox="1"/>
-            <p:nvPr/>
-          </p:nvSpPr>
-          <p:spPr>
-            <a:xfrm>
-              <a:off x="2760090" y="2361561"/>
-              <a:ext cx="1400175" cy="246221"/>
-            </a:xfrm>
-            <a:prstGeom prst="rect">
-              <a:avLst/>
-            </a:prstGeom>
-            <a:noFill/>
-          </p:spPr>
-          <p:txBody>
-            <a:bodyPr wrap="square" rtlCol="0">
-              <a:spAutoFit/>
-            </a:bodyPr>
-            <a:lstStyle/>
-            <a:p>
-              <a:r>
-                <a:rPr lang="en-US" sz="1000" dirty="0">
-                  <a:solidFill>
-                    <a:schemeClr val="accent2"/>
-                  </a:solidFill>
-                </a:rPr>
-                <a:t>Link to repository</a:t>
-              </a:r>
-              <a:endParaRPr lang="en-SG" sz="1000" dirty="0">
-                <a:solidFill>
-                  <a:schemeClr val="accent2"/>
-                </a:solidFill>
-              </a:endParaRPr>
-            </a:p>
-          </p:txBody>
-        </p:sp>
-      </p:grpSp>
-      <p:grpSp>
-        <p:nvGrpSpPr>
-          <p:cNvPr id="6" name="Group 5">
-            <a:extLst>
-              <a:ext uri="{FF2B5EF4-FFF2-40B4-BE49-F238E27FC236}">
-                <a16:creationId xmlns:a16="http://schemas.microsoft.com/office/drawing/2014/main" id="{71B6EB53-FA00-4D6F-8B6D-CFC7C368353A}"/>
-              </a:ext>
-            </a:extLst>
-          </p:cNvPr>
-          <p:cNvGrpSpPr/>
-          <p:nvPr/>
-        </p:nvGrpSpPr>
-        <p:grpSpPr>
-          <a:xfrm>
-            <a:off x="2773892" y="2499943"/>
-            <a:ext cx="2165611" cy="263574"/>
-            <a:chOff x="2230032" y="2870443"/>
-            <a:chExt cx="2165611" cy="263574"/>
-          </a:xfrm>
-        </p:grpSpPr>
-        <p:sp>
-          <p:nvSpPr>
-            <p:cNvPr id="29" name="Oval 28">
-              <a:extLst>
-                <a:ext uri="{FF2B5EF4-FFF2-40B4-BE49-F238E27FC236}">
-                  <a16:creationId xmlns:a16="http://schemas.microsoft.com/office/drawing/2014/main" id="{2206B7BC-33E8-473B-84CD-DA37BCD06CDF}"/>
-                </a:ext>
-              </a:extLst>
-            </p:cNvPr>
-            <p:cNvSpPr/>
-            <p:nvPr/>
-          </p:nvSpPr>
-          <p:spPr>
-            <a:xfrm>
-              <a:off x="2230032" y="3000667"/>
-              <a:ext cx="130499" cy="133350"/>
-            </a:xfrm>
-            <a:prstGeom prst="ellipse">
-              <a:avLst/>
-            </a:prstGeom>
-            <a:noFill/>
-            <a:ln w="9525" cap="flat" cmpd="sng" algn="ctr">
-              <a:solidFill>
-                <a:schemeClr val="accent6"/>
-              </a:solidFill>
-              <a:prstDash val="solid"/>
-              <a:round/>
-              <a:headEnd type="none" w="med" len="med"/>
-              <a:tailEnd type="none" w="med" len="med"/>
-            </a:ln>
-          </p:spPr>
-          <p:style>
-            <a:lnRef idx="0">
-              <a:scrgbClr r="0" g="0" b="0"/>
-            </a:lnRef>
-            <a:fillRef idx="0">
-              <a:scrgbClr r="0" g="0" b="0"/>
-            </a:fillRef>
-            <a:effectRef idx="0">
-              <a:scrgbClr r="0" g="0" b="0"/>
-            </a:effectRef>
-            <a:fontRef idx="minor">
-              <a:schemeClr val="accent6"/>
-            </a:fontRef>
-          </p:style>
-          <p:txBody>
-            <a:bodyPr rtlCol="0" anchor="ctr"/>
-            <a:lstStyle/>
-            <a:p>
-              <a:pPr algn="ctr"/>
-              <a:endParaRPr lang="en-SG"/>
-            </a:p>
-          </p:txBody>
-        </p:sp>
-        <p:sp>
-          <p:nvSpPr>
-            <p:cNvPr id="30" name="Arrow: Bent 29">
-              <a:extLst>
-                <a:ext uri="{FF2B5EF4-FFF2-40B4-BE49-F238E27FC236}">
-                  <a16:creationId xmlns:a16="http://schemas.microsoft.com/office/drawing/2014/main" id="{DFCFA230-CA83-4084-9F6D-71E51B2037DE}"/>
-                </a:ext>
-              </a:extLst>
-            </p:cNvPr>
-            <p:cNvSpPr/>
-            <p:nvPr/>
-          </p:nvSpPr>
-          <p:spPr>
-            <a:xfrm>
-              <a:off x="2281147" y="2943385"/>
-              <a:ext cx="243840" cy="62865"/>
-            </a:xfrm>
-            <a:prstGeom prst="bentArrow">
-              <a:avLst>
-                <a:gd name="adj1" fmla="val 25000"/>
-                <a:gd name="adj2" fmla="val 26516"/>
-                <a:gd name="adj3" fmla="val 25000"/>
-                <a:gd name="adj4" fmla="val 43750"/>
-              </a:avLst>
-            </a:prstGeom>
-          </p:spPr>
-          <p:style>
-            <a:lnRef idx="2">
-              <a:schemeClr val="accent6">
-                <a:shade val="50000"/>
-              </a:schemeClr>
-            </a:lnRef>
-            <a:fillRef idx="1">
-              <a:schemeClr val="accent6"/>
-            </a:fillRef>
-            <a:effectRef idx="0">
-              <a:schemeClr val="accent6"/>
-            </a:effectRef>
-            <a:fontRef idx="minor">
-              <a:schemeClr val="lt1"/>
-            </a:fontRef>
-          </p:style>
-          <p:txBody>
-            <a:bodyPr rtlCol="0" anchor="ctr"/>
-            <a:lstStyle/>
-            <a:p>
-              <a:pPr algn="ctr"/>
-              <a:endParaRPr lang="en-SG">
-                <a:solidFill>
-                  <a:schemeClr val="tx1"/>
-                </a:solidFill>
-              </a:endParaRPr>
-            </a:p>
-          </p:txBody>
-        </p:sp>
-        <p:sp>
-          <p:nvSpPr>
-            <p:cNvPr id="31" name="TextBox 30">
-              <a:extLst>
-                <a:ext uri="{FF2B5EF4-FFF2-40B4-BE49-F238E27FC236}">
-                  <a16:creationId xmlns:a16="http://schemas.microsoft.com/office/drawing/2014/main" id="{FD5681D1-EF5F-4AB0-9C45-DF91004DFCC2}"/>
-                </a:ext>
-              </a:extLst>
-            </p:cNvPr>
-            <p:cNvSpPr txBox="1"/>
-            <p:nvPr/>
-          </p:nvSpPr>
-          <p:spPr>
-            <a:xfrm>
-              <a:off x="2493500" y="2870443"/>
-              <a:ext cx="1902143" cy="246221"/>
-            </a:xfrm>
-            <a:prstGeom prst="rect">
-              <a:avLst/>
-            </a:prstGeom>
-            <a:noFill/>
-          </p:spPr>
-          <p:txBody>
-            <a:bodyPr wrap="square" rtlCol="0">
-              <a:spAutoFit/>
-            </a:bodyPr>
-            <a:lstStyle/>
-            <a:p>
-              <a:r>
-                <a:rPr lang="en-US" sz="1000" dirty="0">
-                  <a:solidFill>
-                    <a:schemeClr val="accent6"/>
-                  </a:solidFill>
-                </a:rPr>
-                <a:t>View author’s committed codes</a:t>
-              </a:r>
-              <a:endParaRPr lang="en-SG" sz="1000" dirty="0">
-                <a:solidFill>
-                  <a:schemeClr val="accent6"/>
-                </a:solidFill>
-              </a:endParaRPr>
-            </a:p>
-          </p:txBody>
-        </p:sp>
-      </p:grpSp>
-      <p:grpSp>
-        <p:nvGrpSpPr>
-          <p:cNvPr id="36" name="Group 35">
-            <a:extLst>
-              <a:ext uri="{FF2B5EF4-FFF2-40B4-BE49-F238E27FC236}">
-                <a16:creationId xmlns:a16="http://schemas.microsoft.com/office/drawing/2014/main" id="{A7AFB063-FD92-44F4-BCAE-B42330D96AE2}"/>
-              </a:ext>
-            </a:extLst>
-          </p:cNvPr>
-          <p:cNvGrpSpPr/>
-          <p:nvPr/>
-        </p:nvGrpSpPr>
-        <p:grpSpPr>
-          <a:xfrm>
-            <a:off x="6140186" y="79248"/>
-            <a:ext cx="4612015" cy="5964363"/>
-            <a:chOff x="6196584" y="79248"/>
-            <a:chExt cx="4555617" cy="5964363"/>
-          </a:xfrm>
-        </p:grpSpPr>
-        <p:sp>
-          <p:nvSpPr>
-            <p:cNvPr id="10" name="Right Brace 9">
-              <a:extLst>
-                <a:ext uri="{FF2B5EF4-FFF2-40B4-BE49-F238E27FC236}">
-                  <a16:creationId xmlns:a16="http://schemas.microsoft.com/office/drawing/2014/main" id="{195D0920-5C1C-411D-A43A-B7FB72C2CF80}"/>
+                  <a16:creationId xmlns:a16="http://schemas.microsoft.com/office/drawing/2014/main" id="{2A46AAA6-B2C1-DD41-AB93-54EFF439EACE}"/>
                 </a:ext>
               </a:extLst>
             </p:cNvPr>
@@ -4555,10 +5014,10 @@
         </p:sp>
         <p:sp>
           <p:nvSpPr>
-            <p:cNvPr id="11" name="TextBox 10">
+            <p:cNvPr id="48" name="TextBox 47">
               <a:extLst>
                 <a:ext uri="{FF2B5EF4-FFF2-40B4-BE49-F238E27FC236}">
-                  <a16:creationId xmlns:a16="http://schemas.microsoft.com/office/drawing/2014/main" id="{08293D95-459E-4730-BC16-CD778BC8DE8A}"/>
+                  <a16:creationId xmlns:a16="http://schemas.microsoft.com/office/drawing/2014/main" id="{EA2562D6-C037-DB4E-BA0A-9FBB0C53A918}"/>
                 </a:ext>
               </a:extLst>
             </p:cNvPr>
@@ -4567,7 +5026,7 @@
           </p:nvSpPr>
           <p:spPr>
             <a:xfrm>
-              <a:off x="7424928" y="79248"/>
+              <a:off x="7424928" y="220234"/>
               <a:ext cx="2090928" cy="276999"/>
             </a:xfrm>
             <a:prstGeom prst="rect">
@@ -4592,10 +5051,10 @@
         </p:sp>
         <p:sp>
           <p:nvSpPr>
-            <p:cNvPr id="32" name="Rectangle 31">
+            <p:cNvPr id="49" name="Rectangle 48">
               <a:extLst>
                 <a:ext uri="{FF2B5EF4-FFF2-40B4-BE49-F238E27FC236}">
-                  <a16:creationId xmlns:a16="http://schemas.microsoft.com/office/drawing/2014/main" id="{78349196-1F24-461D-AD8C-4AD1D6A0E5B6}"/>
+                  <a16:creationId xmlns:a16="http://schemas.microsoft.com/office/drawing/2014/main" id="{BE36A025-2170-BD4C-85B7-9E52A6ECA41E}"/>
                 </a:ext>
               </a:extLst>
             </p:cNvPr>
@@ -4645,12 +5104,58 @@
           </p:txBody>
         </p:sp>
       </p:grpSp>
+      <p:sp>
+        <p:nvSpPr>
+          <p:cNvPr id="54" name="Arrow: Left 47">
+            <a:extLst>
+              <a:ext uri="{FF2B5EF4-FFF2-40B4-BE49-F238E27FC236}">
+                <a16:creationId xmlns:a16="http://schemas.microsoft.com/office/drawing/2014/main" id="{D08A5AA5-5E30-1B44-B88A-D53EE29DB3F4}"/>
+              </a:ext>
+            </a:extLst>
+          </p:cNvPr>
+          <p:cNvSpPr/>
+          <p:nvPr/>
+        </p:nvSpPr>
+        <p:spPr>
+          <a:xfrm>
+            <a:off x="969529" y="4892392"/>
+            <a:ext cx="250504" cy="77721"/>
+          </a:xfrm>
+          <a:prstGeom prst="leftArrow">
+            <a:avLst/>
+          </a:prstGeom>
+        </p:spPr>
+        <p:style>
+          <a:lnRef idx="2">
+            <a:schemeClr val="dk1">
+              <a:shade val="50000"/>
+            </a:schemeClr>
+          </a:lnRef>
+          <a:fillRef idx="1">
+            <a:schemeClr val="dk1"/>
+          </a:fillRef>
+          <a:effectRef idx="0">
+            <a:schemeClr val="dk1"/>
+          </a:effectRef>
+          <a:fontRef idx="minor">
+            <a:schemeClr val="lt1"/>
+          </a:fontRef>
+        </p:style>
+        <p:txBody>
+          <a:bodyPr rtlCol="0" anchor="ctr"/>
+          <a:lstStyle/>
+          <a:p>
+            <a:pPr algn="ctr"/>
+            <a:endParaRPr lang="en-SG"/>
+          </a:p>
+        </p:txBody>
+      </p:sp>
       <p:grpSp>
         <p:nvGrpSpPr>
-          <p:cNvPr id="14" name="Group 13">
-            <a:extLst>
-              <a:ext uri="{FF2B5EF4-FFF2-40B4-BE49-F238E27FC236}">
-                <a16:creationId xmlns:a16="http://schemas.microsoft.com/office/drawing/2014/main" id="{F0680E85-D3A9-48B1-B089-8B49261F1BEF}"/>
+          <p:cNvPr id="55" name="Group 54">
+            <a:extLst>
+              <a:ext uri="{FF2B5EF4-FFF2-40B4-BE49-F238E27FC236}">
+                <a16:creationId xmlns:a16="http://schemas.microsoft.com/office/drawing/2014/main" id="{87394544-1C31-4842-B355-A950D7748C56}"/>
               </a:ext>
             </a:extLst>
           </p:cNvPr>
@@ -4659,18 +5164,18 @@
         </p:nvGrpSpPr>
         <p:grpSpPr>
           <a:xfrm>
-            <a:off x="440200" y="2158326"/>
-            <a:ext cx="5526892" cy="461665"/>
-            <a:chOff x="460520" y="1991112"/>
-            <a:chExt cx="5526892" cy="461665"/>
+            <a:off x="140442" y="793236"/>
+            <a:ext cx="5801889" cy="869031"/>
+            <a:chOff x="315534" y="945868"/>
+            <a:chExt cx="5164879" cy="869031"/>
           </a:xfrm>
         </p:grpSpPr>
         <p:sp>
           <p:nvSpPr>
-            <p:cNvPr id="33" name="Rectangle 32">
+            <p:cNvPr id="56" name="Left Brace 55">
               <a:extLst>
                 <a:ext uri="{FF2B5EF4-FFF2-40B4-BE49-F238E27FC236}">
-                  <a16:creationId xmlns:a16="http://schemas.microsoft.com/office/drawing/2014/main" id="{0C689E94-04DA-4405-AE79-8BC095FCC283}"/>
+                  <a16:creationId xmlns:a16="http://schemas.microsoft.com/office/drawing/2014/main" id="{B199A6C2-8651-BE4D-92AE-2F236CD5DBE7}"/>
                 </a:ext>
               </a:extLst>
             </p:cNvPr>
@@ -4679,81 +5184,25 @@
           </p:nvSpPr>
           <p:spPr>
             <a:xfrm>
-              <a:off x="1504949" y="2067663"/>
-              <a:ext cx="4482463" cy="276999"/>
+              <a:off x="919101" y="945868"/>
+              <a:ext cx="513688" cy="869029"/>
             </a:xfrm>
-            <a:prstGeom prst="rect">
-              <a:avLst/>
+            <a:prstGeom prst="leftBrace">
+              <a:avLst>
+                <a:gd name="adj1" fmla="val 14462"/>
+                <a:gd name="adj2" fmla="val 49594"/>
+              </a:avLst>
             </a:prstGeom>
-            <a:noFill/>
-            <a:ln w="28575" cap="flat" cmpd="sng" algn="ctr">
-              <a:solidFill>
-                <a:srgbClr val="A401FF"/>
-              </a:solidFill>
-              <a:prstDash val="solid"/>
-              <a:round/>
-              <a:headEnd type="none" w="med" len="med"/>
-              <a:tailEnd type="none" w="med" len="med"/>
-            </a:ln>
           </p:spPr>
           <p:style>
-            <a:lnRef idx="0">
-              <a:scrgbClr r="0" g="0" b="0"/>
+            <a:lnRef idx="3">
+              <a:schemeClr val="accent6"/>
             </a:lnRef>
             <a:fillRef idx="0">
-              <a:scrgbClr r="0" g="0" b="0"/>
+              <a:schemeClr val="accent6"/>
             </a:fillRef>
-            <a:effectRef idx="0">
-              <a:scrgbClr r="0" g="0" b="0"/>
-            </a:effectRef>
-            <a:fontRef idx="minor">
-              <a:schemeClr val="accent4"/>
-            </a:fontRef>
-          </p:style>
-          <p:txBody>
-            <a:bodyPr rtlCol="0" anchor="ctr"/>
-            <a:lstStyle/>
-            <a:p>
-              <a:pPr algn="ctr"/>
-              <a:endParaRPr lang="en-SG"/>
-            </a:p>
-          </p:txBody>
-        </p:sp>
-        <p:sp>
-          <p:nvSpPr>
-            <p:cNvPr id="34" name="Left Brace 33">
-              <a:extLst>
-                <a:ext uri="{FF2B5EF4-FFF2-40B4-BE49-F238E27FC236}">
-                  <a16:creationId xmlns:a16="http://schemas.microsoft.com/office/drawing/2014/main" id="{222FAE24-7A73-4290-9FB2-3A3528D6EBA2}"/>
-                </a:ext>
-              </a:extLst>
-            </p:cNvPr>
-            <p:cNvSpPr/>
-            <p:nvPr/>
-          </p:nvSpPr>
-          <p:spPr>
-            <a:xfrm>
-              <a:off x="1098796" y="2084176"/>
-              <a:ext cx="348052" cy="237053"/>
-            </a:xfrm>
-            <a:prstGeom prst="leftBrace">
-              <a:avLst/>
-            </a:prstGeom>
-            <a:ln w="19050">
-              <a:solidFill>
-                <a:srgbClr val="A401FF"/>
-              </a:solidFill>
-            </a:ln>
-          </p:spPr>
-          <p:style>
-            <a:lnRef idx="1">
-              <a:schemeClr val="accent1"/>
-            </a:lnRef>
-            <a:fillRef idx="0">
-              <a:schemeClr val="accent1"/>
-            </a:fillRef>
-            <a:effectRef idx="0">
-              <a:schemeClr val="accent1"/>
+            <a:effectRef idx="2">
+              <a:schemeClr val="accent6"/>
             </a:effectRef>
             <a:fontRef idx="minor">
               <a:schemeClr val="tx1"/>
@@ -4770,10 +5219,10 @@
         </p:sp>
         <p:sp>
           <p:nvSpPr>
-            <p:cNvPr id="35" name="TextBox 34">
+            <p:cNvPr id="57" name="TextBox 56">
               <a:extLst>
                 <a:ext uri="{FF2B5EF4-FFF2-40B4-BE49-F238E27FC236}">
-                  <a16:creationId xmlns:a16="http://schemas.microsoft.com/office/drawing/2014/main" id="{EF436BD1-46E2-4EB0-8C8E-A61FF6951C31}"/>
+                  <a16:creationId xmlns:a16="http://schemas.microsoft.com/office/drawing/2014/main" id="{83C4785A-7BA6-3446-B8BA-1A7C2B9EB1E6}"/>
                 </a:ext>
               </a:extLst>
             </p:cNvPr>
@@ -4782,8 +5231,8 @@
           </p:nvSpPr>
           <p:spPr>
             <a:xfrm>
-              <a:off x="460520" y="1991112"/>
-              <a:ext cx="723900" cy="461665"/>
+              <a:off x="315534" y="1241882"/>
+              <a:ext cx="723900" cy="276999"/>
             </a:xfrm>
             <a:prstGeom prst="rect">
               <a:avLst/>
@@ -4800,41 +5249,20 @@
               <a:r>
                 <a:rPr lang="en-US" sz="1200" dirty="0">
                   <a:solidFill>
-                    <a:srgbClr val="7030A0"/>
+                    <a:schemeClr val="accent6"/>
                   </a:solidFill>
                 </a:rPr>
-                <a:t>Ramp Chart</a:t>
+                <a:t>Toolbar</a:t>
               </a:r>
             </a:p>
           </p:txBody>
         </p:sp>
-      </p:grpSp>
-      <p:grpSp>
-        <p:nvGrpSpPr>
-          <p:cNvPr id="42" name="Group 41">
-            <a:extLst>
-              <a:ext uri="{FF2B5EF4-FFF2-40B4-BE49-F238E27FC236}">
-                <a16:creationId xmlns:a16="http://schemas.microsoft.com/office/drawing/2014/main" id="{B9C91654-E14E-4BC1-8843-976ECB18131B}"/>
-              </a:ext>
-            </a:extLst>
-          </p:cNvPr>
-          <p:cNvGrpSpPr/>
-          <p:nvPr/>
-        </p:nvGrpSpPr>
-        <p:grpSpPr>
-          <a:xfrm>
-            <a:off x="105361" y="3392098"/>
-            <a:ext cx="5827029" cy="461665"/>
-            <a:chOff x="181614" y="3716589"/>
-            <a:chExt cx="5827029" cy="461665"/>
-          </a:xfrm>
-        </p:grpSpPr>
         <p:sp>
           <p:nvSpPr>
-            <p:cNvPr id="46" name="Rectangle 45">
+            <p:cNvPr id="58" name="Rectangle 57">
               <a:extLst>
                 <a:ext uri="{FF2B5EF4-FFF2-40B4-BE49-F238E27FC236}">
-                  <a16:creationId xmlns:a16="http://schemas.microsoft.com/office/drawing/2014/main" id="{046392F6-712F-4248-819F-5F03FBDBE02B}"/>
+                  <a16:creationId xmlns:a16="http://schemas.microsoft.com/office/drawing/2014/main" id="{D73EC32A-330F-0D40-B05F-4FE2354456D8}"/>
                 </a:ext>
               </a:extLst>
             </p:cNvPr>
@@ -4843,266 +5271,14 @@
           </p:nvSpPr>
           <p:spPr>
             <a:xfrm>
-              <a:off x="1526181" y="3880858"/>
-              <a:ext cx="4482462" cy="96793"/>
+              <a:off x="1432790" y="945870"/>
+              <a:ext cx="4047623" cy="869029"/>
             </a:xfrm>
             <a:prstGeom prst="rect">
               <a:avLst/>
             </a:prstGeom>
             <a:noFill/>
             <a:ln w="9525" cap="flat" cmpd="sng" algn="ctr">
-              <a:solidFill>
-                <a:schemeClr val="dk1"/>
-              </a:solidFill>
-              <a:prstDash val="solid"/>
-              <a:round/>
-              <a:headEnd type="none" w="med" len="med"/>
-              <a:tailEnd type="none" w="med" len="med"/>
-            </a:ln>
-          </p:spPr>
-          <p:style>
-            <a:lnRef idx="0">
-              <a:scrgbClr r="0" g="0" b="0"/>
-            </a:lnRef>
-            <a:fillRef idx="0">
-              <a:scrgbClr r="0" g="0" b="0"/>
-            </a:fillRef>
-            <a:effectRef idx="0">
-              <a:scrgbClr r="0" g="0" b="0"/>
-            </a:effectRef>
-            <a:fontRef idx="minor">
-              <a:schemeClr val="dk1"/>
-            </a:fontRef>
-          </p:style>
-          <p:txBody>
-            <a:bodyPr rtlCol="0" anchor="ctr"/>
-            <a:lstStyle/>
-            <a:p>
-              <a:pPr algn="ctr"/>
-              <a:endParaRPr lang="en-SG"/>
-            </a:p>
-          </p:txBody>
-        </p:sp>
-        <p:sp>
-          <p:nvSpPr>
-            <p:cNvPr id="48" name="Arrow: Left 47">
-              <a:extLst>
-                <a:ext uri="{FF2B5EF4-FFF2-40B4-BE49-F238E27FC236}">
-                  <a16:creationId xmlns:a16="http://schemas.microsoft.com/office/drawing/2014/main" id="{1B3593E0-8F68-41EA-A8FE-5188B0C5C7EA}"/>
-                </a:ext>
-              </a:extLst>
-            </p:cNvPr>
-            <p:cNvSpPr/>
-            <p:nvPr/>
-          </p:nvSpPr>
-          <p:spPr>
-            <a:xfrm>
-              <a:off x="1133943" y="3880858"/>
-              <a:ext cx="348052" cy="96793"/>
-            </a:xfrm>
-            <a:prstGeom prst="leftArrow">
-              <a:avLst/>
-            </a:prstGeom>
-          </p:spPr>
-          <p:style>
-            <a:lnRef idx="2">
-              <a:schemeClr val="dk1">
-                <a:shade val="50000"/>
-              </a:schemeClr>
-            </a:lnRef>
-            <a:fillRef idx="1">
-              <a:schemeClr val="dk1"/>
-            </a:fillRef>
-            <a:effectRef idx="0">
-              <a:schemeClr val="dk1"/>
-            </a:effectRef>
-            <a:fontRef idx="minor">
-              <a:schemeClr val="lt1"/>
-            </a:fontRef>
-          </p:style>
-          <p:txBody>
-            <a:bodyPr rtlCol="0" anchor="ctr"/>
-            <a:lstStyle/>
-            <a:p>
-              <a:pPr algn="ctr"/>
-              <a:endParaRPr lang="en-SG"/>
-            </a:p>
-          </p:txBody>
-        </p:sp>
-        <p:sp>
-          <p:nvSpPr>
-            <p:cNvPr id="49" name="TextBox 48">
-              <a:extLst>
-                <a:ext uri="{FF2B5EF4-FFF2-40B4-BE49-F238E27FC236}">
-                  <a16:creationId xmlns:a16="http://schemas.microsoft.com/office/drawing/2014/main" id="{B179F6A5-F356-4AE0-BE67-A636F79B6560}"/>
-                </a:ext>
-              </a:extLst>
-            </p:cNvPr>
-            <p:cNvSpPr txBox="1"/>
-            <p:nvPr/>
-          </p:nvSpPr>
-          <p:spPr>
-            <a:xfrm>
-              <a:off x="181614" y="3716589"/>
-              <a:ext cx="1014711" cy="461665"/>
-            </a:xfrm>
-            <a:prstGeom prst="rect">
-              <a:avLst/>
-            </a:prstGeom>
-            <a:noFill/>
-          </p:spPr>
-          <p:txBody>
-            <a:bodyPr wrap="square" rtlCol="0">
-              <a:spAutoFit/>
-            </a:bodyPr>
-            <a:lstStyle/>
-            <a:p>
-              <a:pPr algn="ctr"/>
-              <a:r>
-                <a:rPr lang="en-US" sz="1200" dirty="0"/>
-                <a:t>Contribution Bar</a:t>
-              </a:r>
-              <a:endParaRPr lang="en-SG" sz="1200" dirty="0"/>
-            </a:p>
-          </p:txBody>
-        </p:sp>
-      </p:grpSp>
-      <p:grpSp>
-        <p:nvGrpSpPr>
-          <p:cNvPr id="37" name="Group 36">
-            <a:extLst>
-              <a:ext uri="{FF2B5EF4-FFF2-40B4-BE49-F238E27FC236}">
-                <a16:creationId xmlns:a16="http://schemas.microsoft.com/office/drawing/2014/main" id="{40CE11B1-9A6E-4A62-839A-2DCDA1A8D4FF}"/>
-              </a:ext>
-            </a:extLst>
-          </p:cNvPr>
-          <p:cNvGrpSpPr/>
-          <p:nvPr/>
-        </p:nvGrpSpPr>
-        <p:grpSpPr>
-          <a:xfrm>
-            <a:off x="6174351" y="1712697"/>
-            <a:ext cx="3424155" cy="402234"/>
-            <a:chOff x="6202680" y="1735827"/>
-            <a:chExt cx="3424155" cy="402234"/>
-          </a:xfrm>
-        </p:grpSpPr>
-        <p:sp>
-          <p:nvSpPr>
-            <p:cNvPr id="12" name="Arrow: Right 11">
-              <a:extLst>
-                <a:ext uri="{FF2B5EF4-FFF2-40B4-BE49-F238E27FC236}">
-                  <a16:creationId xmlns:a16="http://schemas.microsoft.com/office/drawing/2014/main" id="{88177BEA-4D65-45B7-A56C-6FBD7CF8C471}"/>
-                </a:ext>
-              </a:extLst>
-            </p:cNvPr>
-            <p:cNvSpPr/>
-            <p:nvPr/>
-          </p:nvSpPr>
-          <p:spPr>
-            <a:xfrm rot="21372755">
-              <a:off x="8429466" y="1857407"/>
-              <a:ext cx="402336" cy="121920"/>
-            </a:xfrm>
-            <a:prstGeom prst="rightArrow">
-              <a:avLst/>
-            </a:prstGeom>
-          </p:spPr>
-          <p:style>
-            <a:lnRef idx="2">
-              <a:schemeClr val="accent6">
-                <a:shade val="50000"/>
-              </a:schemeClr>
-            </a:lnRef>
-            <a:fillRef idx="1">
-              <a:schemeClr val="accent6"/>
-            </a:fillRef>
-            <a:effectRef idx="0">
-              <a:schemeClr val="accent6"/>
-            </a:effectRef>
-            <a:fontRef idx="minor">
-              <a:schemeClr val="lt1"/>
-            </a:fontRef>
-          </p:style>
-          <p:txBody>
-            <a:bodyPr rtlCol="0" anchor="ctr"/>
-            <a:lstStyle/>
-            <a:p>
-              <a:pPr algn="ctr"/>
-              <a:endParaRPr lang="en-SG"/>
-            </a:p>
-          </p:txBody>
-        </p:sp>
-        <p:sp>
-          <p:nvSpPr>
-            <p:cNvPr id="13" name="TextBox 12">
-              <a:extLst>
-                <a:ext uri="{FF2B5EF4-FFF2-40B4-BE49-F238E27FC236}">
-                  <a16:creationId xmlns:a16="http://schemas.microsoft.com/office/drawing/2014/main" id="{C135F275-4477-467B-8D51-84AA5700DE35}"/>
-                </a:ext>
-              </a:extLst>
-            </p:cNvPr>
-            <p:cNvSpPr txBox="1"/>
-            <p:nvPr/>
-          </p:nvSpPr>
-          <p:spPr>
-            <a:xfrm>
-              <a:off x="8790433" y="1735827"/>
-              <a:ext cx="836402" cy="276999"/>
-            </a:xfrm>
-            <a:prstGeom prst="rect">
-              <a:avLst/>
-            </a:prstGeom>
-            <a:noFill/>
-          </p:spPr>
-          <p:txBody>
-            <a:bodyPr wrap="square" rtlCol="0">
-              <a:spAutoFit/>
-            </a:bodyPr>
-            <a:lstStyle/>
-            <a:p>
-              <a:r>
-                <a:rPr lang="en-US" sz="1200" dirty="0">
-                  <a:solidFill>
-                    <a:schemeClr val="accent6">
-                      <a:lumMod val="75000"/>
-                    </a:schemeClr>
-                  </a:solidFill>
-                </a:rPr>
-                <a:t>Glob Filter</a:t>
-              </a:r>
-              <a:endParaRPr lang="en-SG" sz="1200" dirty="0">
-                <a:solidFill>
-                  <a:schemeClr val="accent6">
-                    <a:lumMod val="75000"/>
-                  </a:schemeClr>
-                </a:solidFill>
-              </a:endParaRPr>
-            </a:p>
-          </p:txBody>
-        </p:sp>
-        <p:sp>
-          <p:nvSpPr>
-            <p:cNvPr id="50" name="Rectangle 49">
-              <a:extLst>
-                <a:ext uri="{FF2B5EF4-FFF2-40B4-BE49-F238E27FC236}">
-                  <a16:creationId xmlns:a16="http://schemas.microsoft.com/office/drawing/2014/main" id="{66E4832A-82B6-4ACE-88A2-1FC6DCF2CED8}"/>
-                </a:ext>
-              </a:extLst>
-            </p:cNvPr>
-            <p:cNvSpPr/>
-            <p:nvPr/>
-          </p:nvSpPr>
-          <p:spPr>
-            <a:xfrm>
-              <a:off x="6202680" y="1861062"/>
-              <a:ext cx="2151751" cy="276999"/>
-            </a:xfrm>
-            <a:prstGeom prst="rect">
-              <a:avLst/>
-            </a:prstGeom>
-            <a:noFill/>
-            <a:ln w="19050" cap="flat" cmpd="sng" algn="ctr">
               <a:solidFill>
                 <a:schemeClr val="accent6"/>
               </a:solidFill>
@@ -5136,175 +5312,10 @@
           </p:txBody>
         </p:sp>
       </p:grpSp>
-      <p:grpSp>
-        <p:nvGrpSpPr>
-          <p:cNvPr id="45" name="Group 44">
-            <a:extLst>
-              <a:ext uri="{FF2B5EF4-FFF2-40B4-BE49-F238E27FC236}">
-                <a16:creationId xmlns:a16="http://schemas.microsoft.com/office/drawing/2014/main" id="{BA9B9247-4484-4646-8644-07DCE3660A2C}"/>
-              </a:ext>
-            </a:extLst>
-          </p:cNvPr>
-          <p:cNvGrpSpPr/>
-          <p:nvPr/>
-        </p:nvGrpSpPr>
-        <p:grpSpPr>
-          <a:xfrm>
-            <a:off x="2888422" y="3630692"/>
-            <a:ext cx="1674876" cy="291016"/>
-            <a:chOff x="2943039" y="3682075"/>
-            <a:chExt cx="1674876" cy="246221"/>
-          </a:xfrm>
-        </p:grpSpPr>
-        <p:sp>
-          <p:nvSpPr>
-            <p:cNvPr id="41" name="Oval 40">
-              <a:extLst>
-                <a:ext uri="{FF2B5EF4-FFF2-40B4-BE49-F238E27FC236}">
-                  <a16:creationId xmlns:a16="http://schemas.microsoft.com/office/drawing/2014/main" id="{6880A5AA-24C1-43E2-8DFB-1B2950E077F8}"/>
-                </a:ext>
-              </a:extLst>
-            </p:cNvPr>
-            <p:cNvSpPr/>
-            <p:nvPr/>
-          </p:nvSpPr>
-          <p:spPr>
-            <a:xfrm>
-              <a:off x="2943039" y="3747521"/>
-              <a:ext cx="121920" cy="155835"/>
-            </a:xfrm>
-            <a:prstGeom prst="ellipse">
-              <a:avLst/>
-            </a:prstGeom>
-            <a:noFill/>
-            <a:ln w="9525" cap="flat" cmpd="sng" algn="ctr">
-              <a:solidFill>
-                <a:schemeClr val="accent1"/>
-              </a:solidFill>
-              <a:prstDash val="solid"/>
-              <a:round/>
-              <a:headEnd type="none" w="med" len="med"/>
-              <a:tailEnd type="none" w="med" len="med"/>
-            </a:ln>
-          </p:spPr>
-          <p:style>
-            <a:lnRef idx="0">
-              <a:scrgbClr r="0" g="0" b="0"/>
-            </a:lnRef>
-            <a:fillRef idx="0">
-              <a:scrgbClr r="0" g="0" b="0"/>
-            </a:fillRef>
-            <a:effectRef idx="0">
-              <a:scrgbClr r="0" g="0" b="0"/>
-            </a:effectRef>
-            <a:fontRef idx="minor">
-              <a:schemeClr val="accent1"/>
-            </a:fontRef>
-          </p:style>
-          <p:txBody>
-            <a:bodyPr rtlCol="0" anchor="ctr"/>
-            <a:lstStyle/>
-            <a:p>
-              <a:pPr algn="ctr"/>
-              <a:endParaRPr lang="en-SG"/>
-            </a:p>
-          </p:txBody>
-        </p:sp>
-        <p:sp>
-          <p:nvSpPr>
-            <p:cNvPr id="43" name="Arrow: Right 42">
-              <a:extLst>
-                <a:ext uri="{FF2B5EF4-FFF2-40B4-BE49-F238E27FC236}">
-                  <a16:creationId xmlns:a16="http://schemas.microsoft.com/office/drawing/2014/main" id="{EF37E420-EADC-4F88-A44F-E20C33AD8985}"/>
-                </a:ext>
-              </a:extLst>
-            </p:cNvPr>
-            <p:cNvSpPr/>
-            <p:nvPr/>
-          </p:nvSpPr>
-          <p:spPr>
-            <a:xfrm>
-              <a:off x="3120106" y="3768558"/>
-              <a:ext cx="147081" cy="96793"/>
-            </a:xfrm>
-            <a:prstGeom prst="rightArrow">
-              <a:avLst/>
-            </a:prstGeom>
-          </p:spPr>
-          <p:style>
-            <a:lnRef idx="2">
-              <a:schemeClr val="accent1">
-                <a:shade val="50000"/>
-              </a:schemeClr>
-            </a:lnRef>
-            <a:fillRef idx="1">
-              <a:schemeClr val="accent1"/>
-            </a:fillRef>
-            <a:effectRef idx="0">
-              <a:schemeClr val="accent1"/>
-            </a:effectRef>
-            <a:fontRef idx="minor">
-              <a:schemeClr val="lt1"/>
-            </a:fontRef>
-          </p:style>
-          <p:txBody>
-            <a:bodyPr rtlCol="0" anchor="ctr"/>
-            <a:lstStyle/>
-            <a:p>
-              <a:pPr algn="ctr"/>
-              <a:endParaRPr lang="en-SG"/>
-            </a:p>
-          </p:txBody>
-        </p:sp>
-        <p:sp>
-          <p:nvSpPr>
-            <p:cNvPr id="52" name="TextBox 51">
-              <a:extLst>
-                <a:ext uri="{FF2B5EF4-FFF2-40B4-BE49-F238E27FC236}">
-                  <a16:creationId xmlns:a16="http://schemas.microsoft.com/office/drawing/2014/main" id="{20B2E512-146C-44A7-8F30-D1175B798E6B}"/>
-                </a:ext>
-              </a:extLst>
-            </p:cNvPr>
-            <p:cNvSpPr txBox="1"/>
-            <p:nvPr/>
-          </p:nvSpPr>
-          <p:spPr>
-            <a:xfrm>
-              <a:off x="3217740" y="3682075"/>
-              <a:ext cx="1400175" cy="246221"/>
-            </a:xfrm>
-            <a:prstGeom prst="rect">
-              <a:avLst/>
-            </a:prstGeom>
-            <a:noFill/>
-          </p:spPr>
-          <p:txBody>
-            <a:bodyPr wrap="square" rtlCol="0">
-              <a:spAutoFit/>
-            </a:bodyPr>
-            <a:lstStyle/>
-            <a:p>
-              <a:r>
-                <a:rPr lang="en-US" sz="1000" dirty="0">
-                  <a:solidFill>
-                    <a:schemeClr val="accent1"/>
-                  </a:solidFill>
-                </a:rPr>
-                <a:t>Link to commits panel</a:t>
-              </a:r>
-              <a:endParaRPr lang="en-SG" sz="1000" dirty="0">
-                <a:solidFill>
-                  <a:schemeClr val="accent1"/>
-                </a:solidFill>
-              </a:endParaRPr>
-            </a:p>
-          </p:txBody>
-        </p:sp>
-      </p:grpSp>
     </p:spTree>
     <p:extLst>
       <p:ext uri="{BB962C8B-B14F-4D97-AF65-F5344CB8AC3E}">
-        <p14:creationId xmlns:p14="http://schemas.microsoft.com/office/powerpoint/2010/main" val="121365696"/>
+        <p14:creationId xmlns:p14="http://schemas.microsoft.com/office/powerpoint/2010/main" val="3109031595"/>
       </p:ext>
     </p:extLst>
   </p:cSld>

</xml_diff>

<commit_message>
[#1144, #1135] Docs: update outdated info (#1149)
There is a lot of outdated info in the User Guide and Developer 
Guide.

Let's 
- update the UG and DG to show the current state of RepoSense as 
  this will help people better in using/developing RepoSense.
- remove the warnings reported by Travis by removing the trailing
  whitespaces.
</commit_message>
<xml_diff>
--- a/docs/diagrams/report-features.pptx
+++ b/docs/diagrams/report-features.pptx
@@ -5,7 +5,7 @@
     <p:sldMasterId id="2147483648" r:id="rId1"/>
   </p:sldMasterIdLst>
   <p:sldIdLst>
-    <p:sldId id="256" r:id="rId2"/>
+    <p:sldId id="261" r:id="rId2"/>
   </p:sldIdLst>
   <p:sldSz cx="12192000" cy="6858000"/>
   <p:notesSz cx="6858000" cy="9144000"/>
@@ -261,7 +261,7 @@
           <a:p>
             <a:fld id="{BC643CBC-B76F-46AA-8129-8C84DB44B84D}" type="datetimeFigureOut">
               <a:rPr lang="en-SG" smtClean="0"/>
-              <a:t>1/1/2020</a:t>
+              <a:t>18/3/20</a:t>
             </a:fld>
             <a:endParaRPr lang="en-SG"/>
           </a:p>
@@ -461,7 +461,7 @@
           <a:p>
             <a:fld id="{BC643CBC-B76F-46AA-8129-8C84DB44B84D}" type="datetimeFigureOut">
               <a:rPr lang="en-SG" smtClean="0"/>
-              <a:t>1/1/2020</a:t>
+              <a:t>18/3/20</a:t>
             </a:fld>
             <a:endParaRPr lang="en-SG"/>
           </a:p>
@@ -671,7 +671,7 @@
           <a:p>
             <a:fld id="{BC643CBC-B76F-46AA-8129-8C84DB44B84D}" type="datetimeFigureOut">
               <a:rPr lang="en-SG" smtClean="0"/>
-              <a:t>1/1/2020</a:t>
+              <a:t>18/3/20</a:t>
             </a:fld>
             <a:endParaRPr lang="en-SG"/>
           </a:p>
@@ -871,7 +871,7 @@
           <a:p>
             <a:fld id="{BC643CBC-B76F-46AA-8129-8C84DB44B84D}" type="datetimeFigureOut">
               <a:rPr lang="en-SG" smtClean="0"/>
-              <a:t>1/1/2020</a:t>
+              <a:t>18/3/20</a:t>
             </a:fld>
             <a:endParaRPr lang="en-SG"/>
           </a:p>
@@ -1147,7 +1147,7 @@
           <a:p>
             <a:fld id="{BC643CBC-B76F-46AA-8129-8C84DB44B84D}" type="datetimeFigureOut">
               <a:rPr lang="en-SG" smtClean="0"/>
-              <a:t>1/1/2020</a:t>
+              <a:t>18/3/20</a:t>
             </a:fld>
             <a:endParaRPr lang="en-SG"/>
           </a:p>
@@ -1415,7 +1415,7 @@
           <a:p>
             <a:fld id="{BC643CBC-B76F-46AA-8129-8C84DB44B84D}" type="datetimeFigureOut">
               <a:rPr lang="en-SG" smtClean="0"/>
-              <a:t>1/1/2020</a:t>
+              <a:t>18/3/20</a:t>
             </a:fld>
             <a:endParaRPr lang="en-SG"/>
           </a:p>
@@ -1830,7 +1830,7 @@
           <a:p>
             <a:fld id="{BC643CBC-B76F-46AA-8129-8C84DB44B84D}" type="datetimeFigureOut">
               <a:rPr lang="en-SG" smtClean="0"/>
-              <a:t>1/1/2020</a:t>
+              <a:t>18/3/20</a:t>
             </a:fld>
             <a:endParaRPr lang="en-SG"/>
           </a:p>
@@ -1972,7 +1972,7 @@
           <a:p>
             <a:fld id="{BC643CBC-B76F-46AA-8129-8C84DB44B84D}" type="datetimeFigureOut">
               <a:rPr lang="en-SG" smtClean="0"/>
-              <a:t>1/1/2020</a:t>
+              <a:t>18/3/20</a:t>
             </a:fld>
             <a:endParaRPr lang="en-SG"/>
           </a:p>
@@ -2085,7 +2085,7 @@
           <a:p>
             <a:fld id="{BC643CBC-B76F-46AA-8129-8C84DB44B84D}" type="datetimeFigureOut">
               <a:rPr lang="en-SG" smtClean="0"/>
-              <a:t>1/1/2020</a:t>
+              <a:t>18/3/20</a:t>
             </a:fld>
             <a:endParaRPr lang="en-SG"/>
           </a:p>
@@ -2398,7 +2398,7 @@
           <a:p>
             <a:fld id="{BC643CBC-B76F-46AA-8129-8C84DB44B84D}" type="datetimeFigureOut">
               <a:rPr lang="en-SG" smtClean="0"/>
-              <a:t>1/1/2020</a:t>
+              <a:t>18/3/20</a:t>
             </a:fld>
             <a:endParaRPr lang="en-SG"/>
           </a:p>
@@ -2687,7 +2687,7 @@
           <a:p>
             <a:fld id="{BC643CBC-B76F-46AA-8129-8C84DB44B84D}" type="datetimeFigureOut">
               <a:rPr lang="en-SG" smtClean="0"/>
-              <a:t>1/1/2020</a:t>
+              <a:t>18/3/20</a:t>
             </a:fld>
             <a:endParaRPr lang="en-SG"/>
           </a:p>
@@ -2930,7 +2930,7 @@
           <a:p>
             <a:fld id="{BC643CBC-B76F-46AA-8129-8C84DB44B84D}" type="datetimeFigureOut">
               <a:rPr lang="en-SG" smtClean="0"/>
-              <a:t>1/1/2020</a:t>
+              <a:t>18/3/20</a:t>
             </a:fld>
             <a:endParaRPr lang="en-SG"/>
           </a:p>
@@ -3333,6 +3333,14 @@
 <file path=ppt/slides/slide1.xml><?xml version="1.0" encoding="utf-8"?>
 <p:sld xmlns:a="http://schemas.openxmlformats.org/drawingml/2006/main" xmlns:r="http://schemas.openxmlformats.org/officeDocument/2006/relationships" xmlns:p="http://schemas.openxmlformats.org/presentationml/2006/main">
   <p:cSld>
+    <p:bg>
+      <p:bgPr>
+        <a:solidFill>
+          <a:schemeClr val="bg1"/>
+        </a:solidFill>
+        <a:effectLst/>
+      </p:bgPr>
+    </p:bg>
     <p:spTree>
       <p:nvGrpSpPr>
         <p:cNvPr id="1" name=""/>
@@ -3349,10 +3357,10 @@
       </p:grpSpPr>
       <p:pic>
         <p:nvPicPr>
-          <p:cNvPr id="59" name="Picture 58">
-            <a:extLst>
-              <a:ext uri="{FF2B5EF4-FFF2-40B4-BE49-F238E27FC236}">
-                <a16:creationId xmlns:a16="http://schemas.microsoft.com/office/drawing/2014/main" id="{F3C703F0-DCC2-438D-830F-AEEDBEB852A9}"/>
+          <p:cNvPr id="5" name="Picture 4" descr="A screenshot of a social media post&#10;&#10;Description automatically generated">
+            <a:extLst>
+              <a:ext uri="{FF2B5EF4-FFF2-40B4-BE49-F238E27FC236}">
+                <a16:creationId xmlns:a16="http://schemas.microsoft.com/office/drawing/2014/main" id="{B4E5294F-444B-4447-B9AA-FA88D06B7743}"/>
               </a:ext>
             </a:extLst>
           </p:cNvPr>
@@ -3375,8 +3383,8 @@
         </p:blipFill>
         <p:spPr>
           <a:xfrm>
-            <a:off x="1439799" y="814385"/>
-            <a:ext cx="9341158" cy="5162105"/>
+            <a:off x="1187572" y="643466"/>
+            <a:ext cx="9813566" cy="5569200"/>
           </a:xfrm>
           <a:prstGeom prst="rect">
             <a:avLst/>
@@ -3385,10 +3393,10 @@
       </p:pic>
       <p:grpSp>
         <p:nvGrpSpPr>
-          <p:cNvPr id="4" name="Group 3">
-            <a:extLst>
-              <a:ext uri="{FF2B5EF4-FFF2-40B4-BE49-F238E27FC236}">
-                <a16:creationId xmlns:a16="http://schemas.microsoft.com/office/drawing/2014/main" id="{F0D58C48-0153-4B14-BF07-F967F1B7F730}"/>
+          <p:cNvPr id="6" name="Group 5">
+            <a:extLst>
+              <a:ext uri="{FF2B5EF4-FFF2-40B4-BE49-F238E27FC236}">
+                <a16:creationId xmlns:a16="http://schemas.microsoft.com/office/drawing/2014/main" id="{79766EAC-8642-D843-AAF2-A0EAEA91F400}"/>
               </a:ext>
             </a:extLst>
           </p:cNvPr>
@@ -3397,7 +3405,7 @@
         </p:nvGrpSpPr>
         <p:grpSpPr>
           <a:xfrm>
-            <a:off x="3353297" y="5041811"/>
+            <a:off x="3604583" y="5552602"/>
             <a:ext cx="1019826" cy="623120"/>
             <a:chOff x="3946269" y="5051399"/>
             <a:chExt cx="1019826" cy="623120"/>
@@ -3405,10 +3413,10 @@
         </p:grpSpPr>
         <p:sp>
           <p:nvSpPr>
-            <p:cNvPr id="44" name="TextBox 43">
+            <p:cNvPr id="7" name="TextBox 6">
               <a:extLst>
                 <a:ext uri="{FF2B5EF4-FFF2-40B4-BE49-F238E27FC236}">
-                  <a16:creationId xmlns:a16="http://schemas.microsoft.com/office/drawing/2014/main" id="{4DB4692F-5627-4F26-AA17-560705B6CBA1}"/>
+                  <a16:creationId xmlns:a16="http://schemas.microsoft.com/office/drawing/2014/main" id="{B0BA5182-A179-4D47-86ED-5C1E184ADFAD}"/>
                 </a:ext>
               </a:extLst>
             </p:cNvPr>
@@ -3449,10 +3457,10 @@
         </p:sp>
         <p:sp>
           <p:nvSpPr>
-            <p:cNvPr id="2" name="Oval 1">
+            <p:cNvPr id="8" name="Oval 7">
               <a:extLst>
                 <a:ext uri="{FF2B5EF4-FFF2-40B4-BE49-F238E27FC236}">
-                  <a16:creationId xmlns:a16="http://schemas.microsoft.com/office/drawing/2014/main" id="{7CBF2F7E-DF4B-4937-B579-9A5191DFED6B}"/>
+                  <a16:creationId xmlns:a16="http://schemas.microsoft.com/office/drawing/2014/main" id="{5C2C6CF5-9D38-9349-A1A2-5B2FAAAACBB2}"/>
                 </a:ext>
               </a:extLst>
             </p:cNvPr>
@@ -3504,10 +3512,10 @@
       </p:grpSp>
       <p:grpSp>
         <p:nvGrpSpPr>
-          <p:cNvPr id="40" name="Group 39">
-            <a:extLst>
-              <a:ext uri="{FF2B5EF4-FFF2-40B4-BE49-F238E27FC236}">
-                <a16:creationId xmlns:a16="http://schemas.microsoft.com/office/drawing/2014/main" id="{355B37A5-8EA6-41FF-AE7C-7F8A4FFA63AA}"/>
+          <p:cNvPr id="9" name="Group 8">
+            <a:extLst>
+              <a:ext uri="{FF2B5EF4-FFF2-40B4-BE49-F238E27FC236}">
+                <a16:creationId xmlns:a16="http://schemas.microsoft.com/office/drawing/2014/main" id="{F5C23996-7C4F-7E4F-B4FF-3A2029C89358}"/>
               </a:ext>
             </a:extLst>
           </p:cNvPr>
@@ -3516,18 +3524,18 @@
         </p:nvGrpSpPr>
         <p:grpSpPr>
           <a:xfrm>
-            <a:off x="9598506" y="2857087"/>
-            <a:ext cx="1095413" cy="560378"/>
-            <a:chOff x="8603087" y="2719565"/>
-            <a:chExt cx="1095413" cy="560378"/>
+            <a:off x="3048219" y="3723003"/>
+            <a:ext cx="1695743" cy="246221"/>
+            <a:chOff x="2464522" y="2361561"/>
+            <a:chExt cx="1695743" cy="246221"/>
           </a:xfrm>
         </p:grpSpPr>
         <p:sp>
           <p:nvSpPr>
-            <p:cNvPr id="16" name="Oval 15">
+            <p:cNvPr id="10" name="Oval 9">
               <a:extLst>
                 <a:ext uri="{FF2B5EF4-FFF2-40B4-BE49-F238E27FC236}">
-                  <a16:creationId xmlns:a16="http://schemas.microsoft.com/office/drawing/2014/main" id="{0FA3B7FA-4DB5-4EB3-9614-C6246C535AC6}"/>
+                  <a16:creationId xmlns:a16="http://schemas.microsoft.com/office/drawing/2014/main" id="{FFC95C22-4AFA-764A-9BFB-1CBCF6917C7E}"/>
                 </a:ext>
               </a:extLst>
             </p:cNvPr>
@@ -3536,8 +3544,960 @@
           </p:nvSpPr>
           <p:spPr>
             <a:xfrm>
-              <a:off x="8603087" y="3116629"/>
-              <a:ext cx="154341" cy="163314"/>
+              <a:off x="2464522" y="2454206"/>
+              <a:ext cx="142875" cy="133350"/>
+            </a:xfrm>
+            <a:prstGeom prst="ellipse">
+              <a:avLst/>
+            </a:prstGeom>
+            <a:noFill/>
+            <a:ln w="9525" cap="flat" cmpd="sng" algn="ctr">
+              <a:solidFill>
+                <a:schemeClr val="accent2"/>
+              </a:solidFill>
+              <a:prstDash val="solid"/>
+              <a:round/>
+              <a:headEnd type="none" w="med" len="med"/>
+              <a:tailEnd type="none" w="med" len="med"/>
+            </a:ln>
+          </p:spPr>
+          <p:style>
+            <a:lnRef idx="0">
+              <a:scrgbClr r="0" g="0" b="0"/>
+            </a:lnRef>
+            <a:fillRef idx="0">
+              <a:scrgbClr r="0" g="0" b="0"/>
+            </a:fillRef>
+            <a:effectRef idx="0">
+              <a:scrgbClr r="0" g="0" b="0"/>
+            </a:effectRef>
+            <a:fontRef idx="minor">
+              <a:schemeClr val="accent2"/>
+            </a:fontRef>
+          </p:style>
+          <p:txBody>
+            <a:bodyPr rtlCol="0" anchor="ctr"/>
+            <a:lstStyle/>
+            <a:p>
+              <a:pPr algn="ctr"/>
+              <a:endParaRPr lang="en-SG"/>
+            </a:p>
+          </p:txBody>
+        </p:sp>
+        <p:sp>
+          <p:nvSpPr>
+            <p:cNvPr id="11" name="Arrow: Right 26">
+              <a:extLst>
+                <a:ext uri="{FF2B5EF4-FFF2-40B4-BE49-F238E27FC236}">
+                  <a16:creationId xmlns:a16="http://schemas.microsoft.com/office/drawing/2014/main" id="{92F77A80-7975-A047-9AC8-95F3789669E7}"/>
+                </a:ext>
+              </a:extLst>
+            </p:cNvPr>
+            <p:cNvSpPr/>
+            <p:nvPr/>
+          </p:nvSpPr>
+          <p:spPr>
+            <a:xfrm rot="21204583">
+              <a:off x="2661847" y="2453845"/>
+              <a:ext cx="142378" cy="66676"/>
+            </a:xfrm>
+            <a:prstGeom prst="rightArrow">
+              <a:avLst/>
+            </a:prstGeom>
+          </p:spPr>
+          <p:style>
+            <a:lnRef idx="2">
+              <a:schemeClr val="accent2">
+                <a:shade val="50000"/>
+              </a:schemeClr>
+            </a:lnRef>
+            <a:fillRef idx="1">
+              <a:schemeClr val="accent2"/>
+            </a:fillRef>
+            <a:effectRef idx="0">
+              <a:schemeClr val="accent2"/>
+            </a:effectRef>
+            <a:fontRef idx="minor">
+              <a:schemeClr val="lt1"/>
+            </a:fontRef>
+          </p:style>
+          <p:txBody>
+            <a:bodyPr rtlCol="0" anchor="ctr"/>
+            <a:lstStyle/>
+            <a:p>
+              <a:pPr algn="ctr"/>
+              <a:endParaRPr lang="en-SG"/>
+            </a:p>
+          </p:txBody>
+        </p:sp>
+        <p:sp>
+          <p:nvSpPr>
+            <p:cNvPr id="12" name="TextBox 11">
+              <a:extLst>
+                <a:ext uri="{FF2B5EF4-FFF2-40B4-BE49-F238E27FC236}">
+                  <a16:creationId xmlns:a16="http://schemas.microsoft.com/office/drawing/2014/main" id="{82FD49BE-679E-FB4E-9B2C-DB6B3E1AD08D}"/>
+                </a:ext>
+              </a:extLst>
+            </p:cNvPr>
+            <p:cNvSpPr txBox="1"/>
+            <p:nvPr/>
+          </p:nvSpPr>
+          <p:spPr>
+            <a:xfrm>
+              <a:off x="2760090" y="2361561"/>
+              <a:ext cx="1400175" cy="246221"/>
+            </a:xfrm>
+            <a:prstGeom prst="rect">
+              <a:avLst/>
+            </a:prstGeom>
+            <a:noFill/>
+          </p:spPr>
+          <p:txBody>
+            <a:bodyPr wrap="square" rtlCol="0">
+              <a:spAutoFit/>
+            </a:bodyPr>
+            <a:lstStyle/>
+            <a:p>
+              <a:r>
+                <a:rPr lang="en-US" sz="1000" dirty="0">
+                  <a:solidFill>
+                    <a:schemeClr val="accent2"/>
+                  </a:solidFill>
+                </a:rPr>
+                <a:t>Link to repository</a:t>
+              </a:r>
+              <a:endParaRPr lang="en-SG" sz="1000" dirty="0">
+                <a:solidFill>
+                  <a:schemeClr val="accent2"/>
+                </a:solidFill>
+              </a:endParaRPr>
+            </a:p>
+          </p:txBody>
+        </p:sp>
+      </p:grpSp>
+      <p:grpSp>
+        <p:nvGrpSpPr>
+          <p:cNvPr id="13" name="Group 12">
+            <a:extLst>
+              <a:ext uri="{FF2B5EF4-FFF2-40B4-BE49-F238E27FC236}">
+                <a16:creationId xmlns:a16="http://schemas.microsoft.com/office/drawing/2014/main" id="{D62F89A8-1701-DF47-B09B-2D40770BE744}"/>
+              </a:ext>
+            </a:extLst>
+          </p:cNvPr>
+          <p:cNvGrpSpPr/>
+          <p:nvPr/>
+        </p:nvGrpSpPr>
+        <p:grpSpPr>
+          <a:xfrm>
+            <a:off x="2942352" y="4322650"/>
+            <a:ext cx="1672681" cy="291016"/>
+            <a:chOff x="2945234" y="3682075"/>
+            <a:chExt cx="1672681" cy="246221"/>
+          </a:xfrm>
+        </p:grpSpPr>
+        <p:sp>
+          <p:nvSpPr>
+            <p:cNvPr id="14" name="Oval 13">
+              <a:extLst>
+                <a:ext uri="{FF2B5EF4-FFF2-40B4-BE49-F238E27FC236}">
+                  <a16:creationId xmlns:a16="http://schemas.microsoft.com/office/drawing/2014/main" id="{BDCB45B0-8710-AE4F-8F1C-D69EB6E825F5}"/>
+                </a:ext>
+              </a:extLst>
+            </p:cNvPr>
+            <p:cNvSpPr/>
+            <p:nvPr/>
+          </p:nvSpPr>
+          <p:spPr>
+            <a:xfrm>
+              <a:off x="2945234" y="3739036"/>
+              <a:ext cx="147081" cy="158015"/>
+            </a:xfrm>
+            <a:prstGeom prst="ellipse">
+              <a:avLst/>
+            </a:prstGeom>
+            <a:noFill/>
+            <a:ln w="9525" cap="flat" cmpd="sng" algn="ctr">
+              <a:solidFill>
+                <a:schemeClr val="accent1"/>
+              </a:solidFill>
+              <a:prstDash val="solid"/>
+              <a:round/>
+              <a:headEnd type="none" w="med" len="med"/>
+              <a:tailEnd type="none" w="med" len="med"/>
+            </a:ln>
+          </p:spPr>
+          <p:style>
+            <a:lnRef idx="0">
+              <a:scrgbClr r="0" g="0" b="0"/>
+            </a:lnRef>
+            <a:fillRef idx="0">
+              <a:scrgbClr r="0" g="0" b="0"/>
+            </a:fillRef>
+            <a:effectRef idx="0">
+              <a:scrgbClr r="0" g="0" b="0"/>
+            </a:effectRef>
+            <a:fontRef idx="minor">
+              <a:schemeClr val="accent1"/>
+            </a:fontRef>
+          </p:style>
+          <p:txBody>
+            <a:bodyPr rtlCol="0" anchor="ctr"/>
+            <a:lstStyle/>
+            <a:p>
+              <a:pPr algn="ctr"/>
+              <a:endParaRPr lang="en-SG"/>
+            </a:p>
+          </p:txBody>
+        </p:sp>
+        <p:sp>
+          <p:nvSpPr>
+            <p:cNvPr id="15" name="Arrow: Right 42">
+              <a:extLst>
+                <a:ext uri="{FF2B5EF4-FFF2-40B4-BE49-F238E27FC236}">
+                  <a16:creationId xmlns:a16="http://schemas.microsoft.com/office/drawing/2014/main" id="{9E9ABC44-2B22-0042-AFBE-32BB6D8F04D6}"/>
+                </a:ext>
+              </a:extLst>
+            </p:cNvPr>
+            <p:cNvSpPr/>
+            <p:nvPr/>
+          </p:nvSpPr>
+          <p:spPr>
+            <a:xfrm>
+              <a:off x="3120106" y="3768558"/>
+              <a:ext cx="147081" cy="96793"/>
+            </a:xfrm>
+            <a:prstGeom prst="rightArrow">
+              <a:avLst/>
+            </a:prstGeom>
+          </p:spPr>
+          <p:style>
+            <a:lnRef idx="2">
+              <a:schemeClr val="accent1">
+                <a:shade val="50000"/>
+              </a:schemeClr>
+            </a:lnRef>
+            <a:fillRef idx="1">
+              <a:schemeClr val="accent1"/>
+            </a:fillRef>
+            <a:effectRef idx="0">
+              <a:schemeClr val="accent1"/>
+            </a:effectRef>
+            <a:fontRef idx="minor">
+              <a:schemeClr val="lt1"/>
+            </a:fontRef>
+          </p:style>
+          <p:txBody>
+            <a:bodyPr rtlCol="0" anchor="ctr"/>
+            <a:lstStyle/>
+            <a:p>
+              <a:pPr algn="ctr"/>
+              <a:endParaRPr lang="en-SG"/>
+            </a:p>
+          </p:txBody>
+        </p:sp>
+        <p:sp>
+          <p:nvSpPr>
+            <p:cNvPr id="16" name="TextBox 15">
+              <a:extLst>
+                <a:ext uri="{FF2B5EF4-FFF2-40B4-BE49-F238E27FC236}">
+                  <a16:creationId xmlns:a16="http://schemas.microsoft.com/office/drawing/2014/main" id="{C7DD8455-0AED-F846-AD19-213E95104B40}"/>
+                </a:ext>
+              </a:extLst>
+            </p:cNvPr>
+            <p:cNvSpPr txBox="1"/>
+            <p:nvPr/>
+          </p:nvSpPr>
+          <p:spPr>
+            <a:xfrm>
+              <a:off x="3217740" y="3682075"/>
+              <a:ext cx="1400175" cy="246221"/>
+            </a:xfrm>
+            <a:prstGeom prst="rect">
+              <a:avLst/>
+            </a:prstGeom>
+            <a:noFill/>
+          </p:spPr>
+          <p:txBody>
+            <a:bodyPr wrap="square" rtlCol="0">
+              <a:spAutoFit/>
+            </a:bodyPr>
+            <a:lstStyle/>
+            <a:p>
+              <a:r>
+                <a:rPr lang="en-US" sz="1000" dirty="0">
+                  <a:solidFill>
+                    <a:schemeClr val="accent1"/>
+                  </a:solidFill>
+                </a:rPr>
+                <a:t>Link to commits panel</a:t>
+              </a:r>
+              <a:endParaRPr lang="en-SG" sz="1000" dirty="0">
+                <a:solidFill>
+                  <a:schemeClr val="accent1"/>
+                </a:solidFill>
+              </a:endParaRPr>
+            </a:p>
+          </p:txBody>
+        </p:sp>
+      </p:grpSp>
+      <p:grpSp>
+        <p:nvGrpSpPr>
+          <p:cNvPr id="17" name="Group 16">
+            <a:extLst>
+              <a:ext uri="{FF2B5EF4-FFF2-40B4-BE49-F238E27FC236}">
+                <a16:creationId xmlns:a16="http://schemas.microsoft.com/office/drawing/2014/main" id="{B79D4D12-0CDC-3846-848D-865CEED1A53E}"/>
+              </a:ext>
+            </a:extLst>
+          </p:cNvPr>
+          <p:cNvGrpSpPr/>
+          <p:nvPr/>
+        </p:nvGrpSpPr>
+        <p:grpSpPr>
+          <a:xfrm>
+            <a:off x="2753264" y="3023089"/>
+            <a:ext cx="2165611" cy="263574"/>
+            <a:chOff x="2230032" y="2870443"/>
+            <a:chExt cx="2165611" cy="263574"/>
+          </a:xfrm>
+        </p:grpSpPr>
+        <p:sp>
+          <p:nvSpPr>
+            <p:cNvPr id="18" name="Oval 17">
+              <a:extLst>
+                <a:ext uri="{FF2B5EF4-FFF2-40B4-BE49-F238E27FC236}">
+                  <a16:creationId xmlns:a16="http://schemas.microsoft.com/office/drawing/2014/main" id="{AF5ADA51-9563-D943-9B4A-E31F0847BA2C}"/>
+                </a:ext>
+              </a:extLst>
+            </p:cNvPr>
+            <p:cNvSpPr/>
+            <p:nvPr/>
+          </p:nvSpPr>
+          <p:spPr>
+            <a:xfrm>
+              <a:off x="2230032" y="3000667"/>
+              <a:ext cx="130499" cy="133350"/>
+            </a:xfrm>
+            <a:prstGeom prst="ellipse">
+              <a:avLst/>
+            </a:prstGeom>
+            <a:noFill/>
+            <a:ln w="9525" cap="flat" cmpd="sng" algn="ctr">
+              <a:solidFill>
+                <a:schemeClr val="accent6"/>
+              </a:solidFill>
+              <a:prstDash val="solid"/>
+              <a:round/>
+              <a:headEnd type="none" w="med" len="med"/>
+              <a:tailEnd type="none" w="med" len="med"/>
+            </a:ln>
+          </p:spPr>
+          <p:style>
+            <a:lnRef idx="0">
+              <a:scrgbClr r="0" g="0" b="0"/>
+            </a:lnRef>
+            <a:fillRef idx="0">
+              <a:scrgbClr r="0" g="0" b="0"/>
+            </a:fillRef>
+            <a:effectRef idx="0">
+              <a:scrgbClr r="0" g="0" b="0"/>
+            </a:effectRef>
+            <a:fontRef idx="minor">
+              <a:schemeClr val="accent6"/>
+            </a:fontRef>
+          </p:style>
+          <p:txBody>
+            <a:bodyPr rtlCol="0" anchor="ctr"/>
+            <a:lstStyle/>
+            <a:p>
+              <a:pPr algn="ctr"/>
+              <a:endParaRPr lang="en-SG"/>
+            </a:p>
+          </p:txBody>
+        </p:sp>
+        <p:sp>
+          <p:nvSpPr>
+            <p:cNvPr id="19" name="Arrow: Bent 29">
+              <a:extLst>
+                <a:ext uri="{FF2B5EF4-FFF2-40B4-BE49-F238E27FC236}">
+                  <a16:creationId xmlns:a16="http://schemas.microsoft.com/office/drawing/2014/main" id="{460DE55D-DDF3-364A-A026-D777B4FA3774}"/>
+                </a:ext>
+              </a:extLst>
+            </p:cNvPr>
+            <p:cNvSpPr/>
+            <p:nvPr/>
+          </p:nvSpPr>
+          <p:spPr>
+            <a:xfrm>
+              <a:off x="2281147" y="2943385"/>
+              <a:ext cx="243840" cy="62865"/>
+            </a:xfrm>
+            <a:prstGeom prst="bentArrow">
+              <a:avLst>
+                <a:gd name="adj1" fmla="val 25000"/>
+                <a:gd name="adj2" fmla="val 26516"/>
+                <a:gd name="adj3" fmla="val 25000"/>
+                <a:gd name="adj4" fmla="val 43750"/>
+              </a:avLst>
+            </a:prstGeom>
+          </p:spPr>
+          <p:style>
+            <a:lnRef idx="2">
+              <a:schemeClr val="accent6">
+                <a:shade val="50000"/>
+              </a:schemeClr>
+            </a:lnRef>
+            <a:fillRef idx="1">
+              <a:schemeClr val="accent6"/>
+            </a:fillRef>
+            <a:effectRef idx="0">
+              <a:schemeClr val="accent6"/>
+            </a:effectRef>
+            <a:fontRef idx="minor">
+              <a:schemeClr val="lt1"/>
+            </a:fontRef>
+          </p:style>
+          <p:txBody>
+            <a:bodyPr rtlCol="0" anchor="ctr"/>
+            <a:lstStyle/>
+            <a:p>
+              <a:pPr algn="ctr"/>
+              <a:endParaRPr lang="en-SG">
+                <a:solidFill>
+                  <a:schemeClr val="tx1"/>
+                </a:solidFill>
+              </a:endParaRPr>
+            </a:p>
+          </p:txBody>
+        </p:sp>
+        <p:sp>
+          <p:nvSpPr>
+            <p:cNvPr id="20" name="TextBox 19">
+              <a:extLst>
+                <a:ext uri="{FF2B5EF4-FFF2-40B4-BE49-F238E27FC236}">
+                  <a16:creationId xmlns:a16="http://schemas.microsoft.com/office/drawing/2014/main" id="{13633E74-DB09-6F48-B9E2-8BDA72C8A93D}"/>
+                </a:ext>
+              </a:extLst>
+            </p:cNvPr>
+            <p:cNvSpPr txBox="1"/>
+            <p:nvPr/>
+          </p:nvSpPr>
+          <p:spPr>
+            <a:xfrm>
+              <a:off x="2493500" y="2870443"/>
+              <a:ext cx="1902143" cy="246221"/>
+            </a:xfrm>
+            <a:prstGeom prst="rect">
+              <a:avLst/>
+            </a:prstGeom>
+            <a:noFill/>
+          </p:spPr>
+          <p:txBody>
+            <a:bodyPr wrap="square" rtlCol="0">
+              <a:spAutoFit/>
+            </a:bodyPr>
+            <a:lstStyle/>
+            <a:p>
+              <a:r>
+                <a:rPr lang="en-US" sz="1000" dirty="0">
+                  <a:solidFill>
+                    <a:schemeClr val="accent6"/>
+                  </a:solidFill>
+                </a:rPr>
+                <a:t>View author’s committed codes</a:t>
+              </a:r>
+              <a:endParaRPr lang="en-SG" sz="1000" dirty="0">
+                <a:solidFill>
+                  <a:schemeClr val="accent6"/>
+                </a:solidFill>
+              </a:endParaRPr>
+            </a:p>
+          </p:txBody>
+        </p:sp>
+      </p:grpSp>
+      <p:grpSp>
+        <p:nvGrpSpPr>
+          <p:cNvPr id="22" name="Group 21">
+            <a:extLst>
+              <a:ext uri="{FF2B5EF4-FFF2-40B4-BE49-F238E27FC236}">
+                <a16:creationId xmlns:a16="http://schemas.microsoft.com/office/drawing/2014/main" id="{25A622BC-A5B7-A44A-9C42-676F5FE8C9F9}"/>
+              </a:ext>
+            </a:extLst>
+          </p:cNvPr>
+          <p:cNvGrpSpPr/>
+          <p:nvPr/>
+        </p:nvGrpSpPr>
+        <p:grpSpPr>
+          <a:xfrm>
+            <a:off x="118577" y="4640643"/>
+            <a:ext cx="5959559" cy="461665"/>
+            <a:chOff x="731728" y="3629956"/>
+            <a:chExt cx="5399128" cy="461665"/>
+          </a:xfrm>
+        </p:grpSpPr>
+        <p:sp>
+          <p:nvSpPr>
+            <p:cNvPr id="23" name="Rectangle 22">
+              <a:extLst>
+                <a:ext uri="{FF2B5EF4-FFF2-40B4-BE49-F238E27FC236}">
+                  <a16:creationId xmlns:a16="http://schemas.microsoft.com/office/drawing/2014/main" id="{B564F8AB-86E1-AE47-8AEE-A391EE3A595A}"/>
+                </a:ext>
+              </a:extLst>
+            </p:cNvPr>
+            <p:cNvSpPr/>
+            <p:nvPr/>
+          </p:nvSpPr>
+          <p:spPr>
+            <a:xfrm>
+              <a:off x="1803254" y="3860789"/>
+              <a:ext cx="4327602" cy="119555"/>
+            </a:xfrm>
+            <a:prstGeom prst="rect">
+              <a:avLst/>
+            </a:prstGeom>
+            <a:noFill/>
+            <a:ln w="9525" cap="flat" cmpd="sng" algn="ctr">
+              <a:solidFill>
+                <a:schemeClr val="dk1"/>
+              </a:solidFill>
+              <a:prstDash val="solid"/>
+              <a:round/>
+              <a:headEnd type="none" w="med" len="med"/>
+              <a:tailEnd type="none" w="med" len="med"/>
+            </a:ln>
+          </p:spPr>
+          <p:style>
+            <a:lnRef idx="0">
+              <a:scrgbClr r="0" g="0" b="0"/>
+            </a:lnRef>
+            <a:fillRef idx="0">
+              <a:scrgbClr r="0" g="0" b="0"/>
+            </a:fillRef>
+            <a:effectRef idx="0">
+              <a:scrgbClr r="0" g="0" b="0"/>
+            </a:effectRef>
+            <a:fontRef idx="minor">
+              <a:schemeClr val="dk1"/>
+            </a:fontRef>
+          </p:style>
+          <p:txBody>
+            <a:bodyPr rtlCol="0" anchor="ctr"/>
+            <a:lstStyle/>
+            <a:p>
+              <a:pPr algn="ctr"/>
+              <a:endParaRPr lang="en-SG"/>
+            </a:p>
+          </p:txBody>
+        </p:sp>
+        <p:sp>
+          <p:nvSpPr>
+            <p:cNvPr id="25" name="TextBox 24">
+              <a:extLst>
+                <a:ext uri="{FF2B5EF4-FFF2-40B4-BE49-F238E27FC236}">
+                  <a16:creationId xmlns:a16="http://schemas.microsoft.com/office/drawing/2014/main" id="{C8343F1E-8844-E749-B305-01B53FD52B56}"/>
+                </a:ext>
+              </a:extLst>
+            </p:cNvPr>
+            <p:cNvSpPr txBox="1"/>
+            <p:nvPr/>
+          </p:nvSpPr>
+          <p:spPr>
+            <a:xfrm>
+              <a:off x="731728" y="3629956"/>
+              <a:ext cx="1014711" cy="461665"/>
+            </a:xfrm>
+            <a:prstGeom prst="rect">
+              <a:avLst/>
+            </a:prstGeom>
+            <a:noFill/>
+          </p:spPr>
+          <p:txBody>
+            <a:bodyPr wrap="square" rtlCol="0">
+              <a:spAutoFit/>
+            </a:bodyPr>
+            <a:lstStyle/>
+            <a:p>
+              <a:pPr algn="ctr"/>
+              <a:r>
+                <a:rPr lang="en-US" sz="1200" dirty="0"/>
+                <a:t>Contribution Bar</a:t>
+              </a:r>
+              <a:endParaRPr lang="en-SG" sz="1200" dirty="0"/>
+            </a:p>
+          </p:txBody>
+        </p:sp>
+      </p:grpSp>
+      <p:grpSp>
+        <p:nvGrpSpPr>
+          <p:cNvPr id="26" name="Group 25">
+            <a:extLst>
+              <a:ext uri="{FF2B5EF4-FFF2-40B4-BE49-F238E27FC236}">
+                <a16:creationId xmlns:a16="http://schemas.microsoft.com/office/drawing/2014/main" id="{DEF0A00E-6934-F848-A76D-E0C0910D196B}"/>
+              </a:ext>
+            </a:extLst>
+          </p:cNvPr>
+          <p:cNvGrpSpPr/>
+          <p:nvPr/>
+        </p:nvGrpSpPr>
+        <p:grpSpPr>
+          <a:xfrm>
+            <a:off x="189682" y="3246565"/>
+            <a:ext cx="5752649" cy="530943"/>
+            <a:chOff x="778195" y="2021953"/>
+            <a:chExt cx="5209217" cy="461665"/>
+          </a:xfrm>
+        </p:grpSpPr>
+        <p:sp>
+          <p:nvSpPr>
+            <p:cNvPr id="27" name="Rectangle 26">
+              <a:extLst>
+                <a:ext uri="{FF2B5EF4-FFF2-40B4-BE49-F238E27FC236}">
+                  <a16:creationId xmlns:a16="http://schemas.microsoft.com/office/drawing/2014/main" id="{C7A45855-68A6-F540-A5D5-8009F825F12B}"/>
+                </a:ext>
+              </a:extLst>
+            </p:cNvPr>
+            <p:cNvSpPr/>
+            <p:nvPr/>
+          </p:nvSpPr>
+          <p:spPr>
+            <a:xfrm>
+              <a:off x="1843248" y="2067663"/>
+              <a:ext cx="4144164" cy="276999"/>
+            </a:xfrm>
+            <a:prstGeom prst="rect">
+              <a:avLst/>
+            </a:prstGeom>
+            <a:noFill/>
+            <a:ln w="28575" cap="flat" cmpd="sng" algn="ctr">
+              <a:solidFill>
+                <a:srgbClr val="A401FF"/>
+              </a:solidFill>
+              <a:prstDash val="solid"/>
+              <a:round/>
+              <a:headEnd type="none" w="med" len="med"/>
+              <a:tailEnd type="none" w="med" len="med"/>
+            </a:ln>
+          </p:spPr>
+          <p:style>
+            <a:lnRef idx="0">
+              <a:scrgbClr r="0" g="0" b="0"/>
+            </a:lnRef>
+            <a:fillRef idx="0">
+              <a:scrgbClr r="0" g="0" b="0"/>
+            </a:fillRef>
+            <a:effectRef idx="0">
+              <a:scrgbClr r="0" g="0" b="0"/>
+            </a:effectRef>
+            <a:fontRef idx="minor">
+              <a:schemeClr val="accent4"/>
+            </a:fontRef>
+          </p:style>
+          <p:txBody>
+            <a:bodyPr rtlCol="0" anchor="ctr"/>
+            <a:lstStyle/>
+            <a:p>
+              <a:pPr algn="ctr"/>
+              <a:endParaRPr lang="en-SG"/>
+            </a:p>
+          </p:txBody>
+        </p:sp>
+        <p:sp>
+          <p:nvSpPr>
+            <p:cNvPr id="29" name="TextBox 28">
+              <a:extLst>
+                <a:ext uri="{FF2B5EF4-FFF2-40B4-BE49-F238E27FC236}">
+                  <a16:creationId xmlns:a16="http://schemas.microsoft.com/office/drawing/2014/main" id="{7F64F347-F556-4A40-9DBB-1A737BF6C468}"/>
+                </a:ext>
+              </a:extLst>
+            </p:cNvPr>
+            <p:cNvSpPr txBox="1"/>
+            <p:nvPr/>
+          </p:nvSpPr>
+          <p:spPr>
+            <a:xfrm>
+              <a:off x="778195" y="2021953"/>
+              <a:ext cx="723900" cy="461665"/>
+            </a:xfrm>
+            <a:prstGeom prst="rect">
+              <a:avLst/>
+            </a:prstGeom>
+            <a:noFill/>
+          </p:spPr>
+          <p:txBody>
+            <a:bodyPr wrap="square" rtlCol="0">
+              <a:spAutoFit/>
+            </a:bodyPr>
+            <a:lstStyle/>
+            <a:p>
+              <a:pPr algn="ctr"/>
+              <a:r>
+                <a:rPr lang="en-US" sz="1200" dirty="0">
+                  <a:solidFill>
+                    <a:srgbClr val="7030A0"/>
+                  </a:solidFill>
+                </a:rPr>
+                <a:t>Ramp Chart</a:t>
+              </a:r>
+            </a:p>
+          </p:txBody>
+        </p:sp>
+        <p:sp>
+          <p:nvSpPr>
+            <p:cNvPr id="28" name="Left Brace 27">
+              <a:extLst>
+                <a:ext uri="{FF2B5EF4-FFF2-40B4-BE49-F238E27FC236}">
+                  <a16:creationId xmlns:a16="http://schemas.microsoft.com/office/drawing/2014/main" id="{02D57226-4585-844C-9BC1-7E76A3AD52DA}"/>
+                </a:ext>
+              </a:extLst>
+            </p:cNvPr>
+            <p:cNvSpPr/>
+            <p:nvPr/>
+          </p:nvSpPr>
+          <p:spPr>
+            <a:xfrm>
+              <a:off x="1311783" y="2087636"/>
+              <a:ext cx="522533" cy="257026"/>
+            </a:xfrm>
+            <a:prstGeom prst="leftBrace">
+              <a:avLst>
+                <a:gd name="adj1" fmla="val 8333"/>
+                <a:gd name="adj2" fmla="val 53106"/>
+              </a:avLst>
+            </a:prstGeom>
+            <a:ln w="19050">
+              <a:solidFill>
+                <a:srgbClr val="A401FF"/>
+              </a:solidFill>
+            </a:ln>
+          </p:spPr>
+          <p:style>
+            <a:lnRef idx="1">
+              <a:schemeClr val="accent1"/>
+            </a:lnRef>
+            <a:fillRef idx="0">
+              <a:schemeClr val="accent1"/>
+            </a:fillRef>
+            <a:effectRef idx="0">
+              <a:schemeClr val="accent1"/>
+            </a:effectRef>
+            <a:fontRef idx="minor">
+              <a:schemeClr val="tx1"/>
+            </a:fontRef>
+          </p:style>
+          <p:txBody>
+            <a:bodyPr rtlCol="0" anchor="ctr"/>
+            <a:lstStyle/>
+            <a:p>
+              <a:pPr algn="ctr"/>
+              <a:endParaRPr lang="en-SG"/>
+            </a:p>
+          </p:txBody>
+        </p:sp>
+      </p:grpSp>
+      <p:grpSp>
+        <p:nvGrpSpPr>
+          <p:cNvPr id="30" name="Group 29">
+            <a:extLst>
+              <a:ext uri="{FF2B5EF4-FFF2-40B4-BE49-F238E27FC236}">
+                <a16:creationId xmlns:a16="http://schemas.microsoft.com/office/drawing/2014/main" id="{B006722F-2E7C-2A42-8BC9-3C585481D959}"/>
+              </a:ext>
+            </a:extLst>
+          </p:cNvPr>
+          <p:cNvGrpSpPr/>
+          <p:nvPr/>
+        </p:nvGrpSpPr>
+        <p:grpSpPr>
+          <a:xfrm>
+            <a:off x="6509832" y="1982345"/>
+            <a:ext cx="3424155" cy="402234"/>
+            <a:chOff x="6202680" y="1735827"/>
+            <a:chExt cx="3424155" cy="402234"/>
+          </a:xfrm>
+        </p:grpSpPr>
+        <p:sp>
+          <p:nvSpPr>
+            <p:cNvPr id="31" name="Arrow: Right 11">
+              <a:extLst>
+                <a:ext uri="{FF2B5EF4-FFF2-40B4-BE49-F238E27FC236}">
+                  <a16:creationId xmlns:a16="http://schemas.microsoft.com/office/drawing/2014/main" id="{D4F445DF-DF09-F24E-AB16-DB9631CF26EA}"/>
+                </a:ext>
+              </a:extLst>
+            </p:cNvPr>
+            <p:cNvSpPr/>
+            <p:nvPr/>
+          </p:nvSpPr>
+          <p:spPr>
+            <a:xfrm rot="21372755">
+              <a:off x="8429466" y="1857407"/>
+              <a:ext cx="402336" cy="121920"/>
+            </a:xfrm>
+            <a:prstGeom prst="rightArrow">
+              <a:avLst/>
+            </a:prstGeom>
+          </p:spPr>
+          <p:style>
+            <a:lnRef idx="2">
+              <a:schemeClr val="accent6">
+                <a:shade val="50000"/>
+              </a:schemeClr>
+            </a:lnRef>
+            <a:fillRef idx="1">
+              <a:schemeClr val="accent6"/>
+            </a:fillRef>
+            <a:effectRef idx="0">
+              <a:schemeClr val="accent6"/>
+            </a:effectRef>
+            <a:fontRef idx="minor">
+              <a:schemeClr val="lt1"/>
+            </a:fontRef>
+          </p:style>
+          <p:txBody>
+            <a:bodyPr rtlCol="0" anchor="ctr"/>
+            <a:lstStyle/>
+            <a:p>
+              <a:pPr algn="ctr"/>
+              <a:endParaRPr lang="en-SG"/>
+            </a:p>
+          </p:txBody>
+        </p:sp>
+        <p:sp>
+          <p:nvSpPr>
+            <p:cNvPr id="32" name="TextBox 31">
+              <a:extLst>
+                <a:ext uri="{FF2B5EF4-FFF2-40B4-BE49-F238E27FC236}">
+                  <a16:creationId xmlns:a16="http://schemas.microsoft.com/office/drawing/2014/main" id="{E262627B-E8FC-6541-85DB-FBD3727EF674}"/>
+                </a:ext>
+              </a:extLst>
+            </p:cNvPr>
+            <p:cNvSpPr txBox="1"/>
+            <p:nvPr/>
+          </p:nvSpPr>
+          <p:spPr>
+            <a:xfrm>
+              <a:off x="8790433" y="1735827"/>
+              <a:ext cx="836402" cy="276999"/>
+            </a:xfrm>
+            <a:prstGeom prst="rect">
+              <a:avLst/>
+            </a:prstGeom>
+            <a:noFill/>
+          </p:spPr>
+          <p:txBody>
+            <a:bodyPr wrap="square" rtlCol="0">
+              <a:spAutoFit/>
+            </a:bodyPr>
+            <a:lstStyle/>
+            <a:p>
+              <a:r>
+                <a:rPr lang="en-US" sz="1200" dirty="0">
+                  <a:solidFill>
+                    <a:schemeClr val="accent6">
+                      <a:lumMod val="75000"/>
+                    </a:schemeClr>
+                  </a:solidFill>
+                </a:rPr>
+                <a:t>Glob Filter</a:t>
+              </a:r>
+              <a:endParaRPr lang="en-SG" sz="1200" dirty="0">
+                <a:solidFill>
+                  <a:schemeClr val="accent6">
+                    <a:lumMod val="75000"/>
+                  </a:schemeClr>
+                </a:solidFill>
+              </a:endParaRPr>
+            </a:p>
+          </p:txBody>
+        </p:sp>
+        <p:sp>
+          <p:nvSpPr>
+            <p:cNvPr id="33" name="Rectangle 32">
+              <a:extLst>
+                <a:ext uri="{FF2B5EF4-FFF2-40B4-BE49-F238E27FC236}">
+                  <a16:creationId xmlns:a16="http://schemas.microsoft.com/office/drawing/2014/main" id="{E4380F1C-1A19-6949-931D-E836972EBE98}"/>
+                </a:ext>
+              </a:extLst>
+            </p:cNvPr>
+            <p:cNvSpPr/>
+            <p:nvPr/>
+          </p:nvSpPr>
+          <p:spPr>
+            <a:xfrm>
+              <a:off x="6202680" y="1861062"/>
+              <a:ext cx="2151751" cy="276999"/>
+            </a:xfrm>
+            <a:prstGeom prst="rect">
+              <a:avLst/>
+            </a:prstGeom>
+            <a:noFill/>
+            <a:ln w="19050" cap="flat" cmpd="sng" algn="ctr">
+              <a:solidFill>
+                <a:schemeClr val="accent6"/>
+              </a:solidFill>
+              <a:prstDash val="solid"/>
+              <a:round/>
+              <a:headEnd type="none" w="med" len="med"/>
+              <a:tailEnd type="none" w="med" len="med"/>
+            </a:ln>
+          </p:spPr>
+          <p:style>
+            <a:lnRef idx="0">
+              <a:scrgbClr r="0" g="0" b="0"/>
+            </a:lnRef>
+            <a:fillRef idx="0">
+              <a:scrgbClr r="0" g="0" b="0"/>
+            </a:fillRef>
+            <a:effectRef idx="0">
+              <a:scrgbClr r="0" g="0" b="0"/>
+            </a:effectRef>
+            <a:fontRef idx="minor">
+              <a:schemeClr val="accent6"/>
+            </a:fontRef>
+          </p:style>
+          <p:txBody>
+            <a:bodyPr rtlCol="0" anchor="ctr"/>
+            <a:lstStyle/>
+            <a:p>
+              <a:pPr algn="ctr"/>
+              <a:endParaRPr lang="en-SG"/>
+            </a:p>
+          </p:txBody>
+        </p:sp>
+      </p:grpSp>
+      <p:grpSp>
+        <p:nvGrpSpPr>
+          <p:cNvPr id="34" name="Group 33">
+            <a:extLst>
+              <a:ext uri="{FF2B5EF4-FFF2-40B4-BE49-F238E27FC236}">
+                <a16:creationId xmlns:a16="http://schemas.microsoft.com/office/drawing/2014/main" id="{D4AD8626-A999-EF41-9A8A-8089B1A093A9}"/>
+              </a:ext>
+            </a:extLst>
+          </p:cNvPr>
+          <p:cNvGrpSpPr/>
+          <p:nvPr/>
+        </p:nvGrpSpPr>
+        <p:grpSpPr>
+          <a:xfrm>
+            <a:off x="9567334" y="3299134"/>
+            <a:ext cx="1139315" cy="562172"/>
+            <a:chOff x="8559185" y="2719565"/>
+            <a:chExt cx="1139315" cy="562172"/>
+          </a:xfrm>
+        </p:grpSpPr>
+        <p:sp>
+          <p:nvSpPr>
+            <p:cNvPr id="35" name="Oval 34">
+              <a:extLst>
+                <a:ext uri="{FF2B5EF4-FFF2-40B4-BE49-F238E27FC236}">
+                  <a16:creationId xmlns:a16="http://schemas.microsoft.com/office/drawing/2014/main" id="{5AF2C386-5D22-2A40-86A1-D31380F7236C}"/>
+                </a:ext>
+              </a:extLst>
+            </p:cNvPr>
+            <p:cNvSpPr/>
+            <p:nvPr/>
+          </p:nvSpPr>
+          <p:spPr>
+            <a:xfrm>
+              <a:off x="8559185" y="3116628"/>
+              <a:ext cx="198244" cy="165109"/>
             </a:xfrm>
             <a:prstGeom prst="ellipse">
               <a:avLst/>
@@ -3572,16 +4532,16 @@
             <a:lstStyle/>
             <a:p>
               <a:pPr algn="ctr"/>
-              <a:endParaRPr lang="en-SG"/>
+              <a:endParaRPr lang="en-SG" dirty="0"/>
             </a:p>
           </p:txBody>
         </p:sp>
         <p:sp>
           <p:nvSpPr>
-            <p:cNvPr id="17" name="TextBox 16">
+            <p:cNvPr id="36" name="TextBox 35">
               <a:extLst>
                 <a:ext uri="{FF2B5EF4-FFF2-40B4-BE49-F238E27FC236}">
-                  <a16:creationId xmlns:a16="http://schemas.microsoft.com/office/drawing/2014/main" id="{0213D02D-4396-4437-B87F-870EECAA3F68}"/>
+                  <a16:creationId xmlns:a16="http://schemas.microsoft.com/office/drawing/2014/main" id="{03D2FA7A-9E06-A04F-B625-97362DA15A32}"/>
                 </a:ext>
               </a:extLst>
             </p:cNvPr>
@@ -3622,10 +4582,10 @@
         </p:sp>
         <p:sp>
           <p:nvSpPr>
-            <p:cNvPr id="19" name="Arrow: Right 18">
+            <p:cNvPr id="37" name="Arrow: Right 18">
               <a:extLst>
                 <a:ext uri="{FF2B5EF4-FFF2-40B4-BE49-F238E27FC236}">
-                  <a16:creationId xmlns:a16="http://schemas.microsoft.com/office/drawing/2014/main" id="{A85A5DB4-65AD-4483-B496-640C742923A0}"/>
+                  <a16:creationId xmlns:a16="http://schemas.microsoft.com/office/drawing/2014/main" id="{091ABFBD-A089-3549-B8B5-BD5FC37AB45A}"/>
                 </a:ext>
               </a:extLst>
             </p:cNvPr>
@@ -3672,7 +4632,7 @@
           <p:cNvPr id="38" name="Group 37">
             <a:extLst>
               <a:ext uri="{FF2B5EF4-FFF2-40B4-BE49-F238E27FC236}">
-                <a16:creationId xmlns:a16="http://schemas.microsoft.com/office/drawing/2014/main" id="{E8CB930F-3742-4BA6-BECD-C54762D6B43C}"/>
+                <a16:creationId xmlns:a16="http://schemas.microsoft.com/office/drawing/2014/main" id="{A6A6B5EE-F6C1-4642-9E3A-6F5A08A078BC}"/>
               </a:ext>
             </a:extLst>
           </p:cNvPr>
@@ -3681,18 +4641,18 @@
         </p:nvGrpSpPr>
         <p:grpSpPr>
           <a:xfrm>
-            <a:off x="8507108" y="2488443"/>
-            <a:ext cx="1127684" cy="568600"/>
-            <a:chOff x="7475403" y="3115227"/>
-            <a:chExt cx="1127684" cy="568600"/>
+            <a:off x="8358978" y="2895216"/>
+            <a:ext cx="1252259" cy="404424"/>
+            <a:chOff x="7350829" y="3118022"/>
+            <a:chExt cx="1252259" cy="404424"/>
           </a:xfrm>
         </p:grpSpPr>
         <p:sp>
           <p:nvSpPr>
-            <p:cNvPr id="18" name="Oval 17">
+            <p:cNvPr id="39" name="Oval 38">
               <a:extLst>
                 <a:ext uri="{FF2B5EF4-FFF2-40B4-BE49-F238E27FC236}">
-                  <a16:creationId xmlns:a16="http://schemas.microsoft.com/office/drawing/2014/main" id="{3698720C-0C2B-463A-B70A-97FF666889C2}"/>
+                  <a16:creationId xmlns:a16="http://schemas.microsoft.com/office/drawing/2014/main" id="{054FADD2-562C-AF43-9AE4-764DFC55F605}"/>
                 </a:ext>
               </a:extLst>
             </p:cNvPr>
@@ -3701,8 +4661,8 @@
           </p:nvSpPr>
           <p:spPr>
             <a:xfrm>
-              <a:off x="8448746" y="3115227"/>
-              <a:ext cx="154341" cy="165109"/>
+              <a:off x="8427028" y="3118022"/>
+              <a:ext cx="176060" cy="162314"/>
             </a:xfrm>
             <a:prstGeom prst="ellipse">
               <a:avLst/>
@@ -3743,10 +4703,10 @@
         </p:sp>
         <p:sp>
           <p:nvSpPr>
-            <p:cNvPr id="20" name="Arrow: Right 19">
+            <p:cNvPr id="40" name="Arrow: Right 19">
               <a:extLst>
                 <a:ext uri="{FF2B5EF4-FFF2-40B4-BE49-F238E27FC236}">
-                  <a16:creationId xmlns:a16="http://schemas.microsoft.com/office/drawing/2014/main" id="{620CEC16-4148-4C61-AC47-F7DFED9FDB71}"/>
+                  <a16:creationId xmlns:a16="http://schemas.microsoft.com/office/drawing/2014/main" id="{DA30601D-F89B-9F4E-846D-1A2744B968ED}"/>
                 </a:ext>
               </a:extLst>
             </p:cNvPr>
@@ -3754,8 +4714,8 @@
             <p:nvPr/>
           </p:nvSpPr>
           <p:spPr>
-            <a:xfrm rot="18900000">
-              <a:off x="8286583" y="3318450"/>
+            <a:xfrm rot="19328561">
+              <a:off x="8260549" y="3244306"/>
               <a:ext cx="158874" cy="97790"/>
             </a:xfrm>
             <a:prstGeom prst="rightArrow">
@@ -3789,10 +4749,10 @@
         </p:sp>
         <p:sp>
           <p:nvSpPr>
-            <p:cNvPr id="21" name="TextBox 20">
+            <p:cNvPr id="41" name="TextBox 40">
               <a:extLst>
                 <a:ext uri="{FF2B5EF4-FFF2-40B4-BE49-F238E27FC236}">
-                  <a16:creationId xmlns:a16="http://schemas.microsoft.com/office/drawing/2014/main" id="{D1178780-E5C8-40A3-866C-F0D48D349217}"/>
+                  <a16:creationId xmlns:a16="http://schemas.microsoft.com/office/drawing/2014/main" id="{C98B7E2C-4543-8540-987D-32B81D0ECA45}"/>
                 </a:ext>
               </a:extLst>
             </p:cNvPr>
@@ -3801,7 +4761,7 @@
           </p:nvSpPr>
           <p:spPr>
             <a:xfrm>
-              <a:off x="7475403" y="3406828"/>
+              <a:off x="7350829" y="3245447"/>
               <a:ext cx="973343" cy="276999"/>
             </a:xfrm>
             <a:prstGeom prst="rect">
@@ -3834,10 +4794,10 @@
       </p:grpSp>
       <p:grpSp>
         <p:nvGrpSpPr>
-          <p:cNvPr id="15" name="Group 14">
-            <a:extLst>
-              <a:ext uri="{FF2B5EF4-FFF2-40B4-BE49-F238E27FC236}">
-                <a16:creationId xmlns:a16="http://schemas.microsoft.com/office/drawing/2014/main" id="{63E15A1F-3E59-4DDC-A66B-A3347279DE71}"/>
+          <p:cNvPr id="42" name="Group 41">
+            <a:extLst>
+              <a:ext uri="{FF2B5EF4-FFF2-40B4-BE49-F238E27FC236}">
+                <a16:creationId xmlns:a16="http://schemas.microsoft.com/office/drawing/2014/main" id="{DD6026D3-4444-4741-8BF4-79B21C750898}"/>
               </a:ext>
             </a:extLst>
           </p:cNvPr>
@@ -3846,18 +4806,18 @@
         </p:nvGrpSpPr>
         <p:grpSpPr>
           <a:xfrm>
-            <a:off x="1443990" y="79248"/>
-            <a:ext cx="4652010" cy="5964363"/>
-            <a:chOff x="1443990" y="79248"/>
-            <a:chExt cx="4652010" cy="5964363"/>
+            <a:off x="1167842" y="10803"/>
+            <a:ext cx="4940161" cy="6203729"/>
+            <a:chOff x="1443990" y="207969"/>
+            <a:chExt cx="4652010" cy="5835642"/>
           </a:xfrm>
         </p:grpSpPr>
         <p:sp>
           <p:nvSpPr>
-            <p:cNvPr id="8" name="Right Brace 7">
+            <p:cNvPr id="43" name="Right Brace 42">
               <a:extLst>
                 <a:ext uri="{FF2B5EF4-FFF2-40B4-BE49-F238E27FC236}">
-                  <a16:creationId xmlns:a16="http://schemas.microsoft.com/office/drawing/2014/main" id="{C05B2C6F-DCA4-45F9-94E5-345EC17842DB}"/>
+                  <a16:creationId xmlns:a16="http://schemas.microsoft.com/office/drawing/2014/main" id="{7CC774A1-EA77-2A4C-BD1D-0EAE3FADDC0B}"/>
                 </a:ext>
               </a:extLst>
             </p:cNvPr>
@@ -3898,10 +4858,10 @@
         </p:sp>
         <p:sp>
           <p:nvSpPr>
-            <p:cNvPr id="9" name="TextBox 8">
+            <p:cNvPr id="44" name="TextBox 43">
               <a:extLst>
                 <a:ext uri="{FF2B5EF4-FFF2-40B4-BE49-F238E27FC236}">
-                  <a16:creationId xmlns:a16="http://schemas.microsoft.com/office/drawing/2014/main" id="{64E7039B-00EC-4DDC-B348-58F4C75F63AF}"/>
+                  <a16:creationId xmlns:a16="http://schemas.microsoft.com/office/drawing/2014/main" id="{DAD29254-7522-BC42-B9C9-5A551CFCBCD6}"/>
                 </a:ext>
               </a:extLst>
             </p:cNvPr>
@@ -3910,7 +4870,7 @@
           </p:nvSpPr>
           <p:spPr>
             <a:xfrm>
-              <a:off x="2726436" y="79248"/>
+              <a:off x="2702432" y="207969"/>
               <a:ext cx="2090928" cy="276999"/>
             </a:xfrm>
             <a:prstGeom prst="rect">
@@ -3935,10 +4895,10 @@
         </p:sp>
         <p:sp>
           <p:nvSpPr>
-            <p:cNvPr id="23" name="Rectangle 22">
+            <p:cNvPr id="45" name="Rectangle 44">
               <a:extLst>
                 <a:ext uri="{FF2B5EF4-FFF2-40B4-BE49-F238E27FC236}">
-                  <a16:creationId xmlns:a16="http://schemas.microsoft.com/office/drawing/2014/main" id="{6D6AB3E9-494B-45F6-B9FF-736F40C71E04}"/>
+                  <a16:creationId xmlns:a16="http://schemas.microsoft.com/office/drawing/2014/main" id="{1AB64EEF-A7FE-2B45-8398-A7CBC07F2F20}"/>
                 </a:ext>
               </a:extLst>
             </p:cNvPr>
@@ -3990,10 +4950,10 @@
       </p:grpSp>
       <p:grpSp>
         <p:nvGrpSpPr>
-          <p:cNvPr id="7" name="Group 6">
-            <a:extLst>
-              <a:ext uri="{FF2B5EF4-FFF2-40B4-BE49-F238E27FC236}">
-                <a16:creationId xmlns:a16="http://schemas.microsoft.com/office/drawing/2014/main" id="{136E2079-5E0D-4506-AFAA-58961257A6DD}"/>
+          <p:cNvPr id="46" name="Group 45">
+            <a:extLst>
+              <a:ext uri="{FF2B5EF4-FFF2-40B4-BE49-F238E27FC236}">
+                <a16:creationId xmlns:a16="http://schemas.microsoft.com/office/drawing/2014/main" id="{E3017512-F6E2-6E44-9028-2AE547D43868}"/>
               </a:ext>
             </a:extLst>
           </p:cNvPr>
@@ -4002,519 +4962,18 @@
         </p:nvGrpSpPr>
         <p:grpSpPr>
           <a:xfrm>
-            <a:off x="544590" y="945870"/>
-            <a:ext cx="5327890" cy="869029"/>
-            <a:chOff x="823377" y="945870"/>
-            <a:chExt cx="4742922" cy="869029"/>
+            <a:off x="6155318" y="41570"/>
+            <a:ext cx="4900204" cy="6172963"/>
+            <a:chOff x="6196584" y="220234"/>
+            <a:chExt cx="4555617" cy="5823377"/>
           </a:xfrm>
         </p:grpSpPr>
         <p:sp>
           <p:nvSpPr>
-            <p:cNvPr id="22" name="Left Brace 21">
+            <p:cNvPr id="47" name="Right Brace 46">
               <a:extLst>
                 <a:ext uri="{FF2B5EF4-FFF2-40B4-BE49-F238E27FC236}">
-                  <a16:creationId xmlns:a16="http://schemas.microsoft.com/office/drawing/2014/main" id="{C4A07B1E-02AC-4689-807B-B2620194B508}"/>
-                </a:ext>
-              </a:extLst>
-            </p:cNvPr>
-            <p:cNvSpPr/>
-            <p:nvPr/>
-          </p:nvSpPr>
-          <p:spPr>
-            <a:xfrm>
-              <a:off x="1548971" y="945870"/>
-              <a:ext cx="310965" cy="869029"/>
-            </a:xfrm>
-            <a:prstGeom prst="leftBrace">
-              <a:avLst>
-                <a:gd name="adj1" fmla="val 14462"/>
-                <a:gd name="adj2" fmla="val 48831"/>
-              </a:avLst>
-            </a:prstGeom>
-          </p:spPr>
-          <p:style>
-            <a:lnRef idx="3">
-              <a:schemeClr val="accent6"/>
-            </a:lnRef>
-            <a:fillRef idx="0">
-              <a:schemeClr val="accent6"/>
-            </a:fillRef>
-            <a:effectRef idx="2">
-              <a:schemeClr val="accent6"/>
-            </a:effectRef>
-            <a:fontRef idx="minor">
-              <a:schemeClr val="tx1"/>
-            </a:fontRef>
-          </p:style>
-          <p:txBody>
-            <a:bodyPr rtlCol="0" anchor="ctr"/>
-            <a:lstStyle/>
-            <a:p>
-              <a:pPr algn="ctr"/>
-              <a:endParaRPr lang="en-SG"/>
-            </a:p>
-          </p:txBody>
-        </p:sp>
-        <p:sp>
-          <p:nvSpPr>
-            <p:cNvPr id="24" name="TextBox 23">
-              <a:extLst>
-                <a:ext uri="{FF2B5EF4-FFF2-40B4-BE49-F238E27FC236}">
-                  <a16:creationId xmlns:a16="http://schemas.microsoft.com/office/drawing/2014/main" id="{ACDC6C00-2DF8-42EF-B108-6D30BD3CBE76}"/>
-                </a:ext>
-              </a:extLst>
-            </p:cNvPr>
-            <p:cNvSpPr txBox="1"/>
-            <p:nvPr/>
-          </p:nvSpPr>
-          <p:spPr>
-            <a:xfrm>
-              <a:off x="823377" y="1208184"/>
-              <a:ext cx="723900" cy="276999"/>
-            </a:xfrm>
-            <a:prstGeom prst="rect">
-              <a:avLst/>
-            </a:prstGeom>
-            <a:noFill/>
-          </p:spPr>
-          <p:txBody>
-            <a:bodyPr wrap="square" rtlCol="0">
-              <a:spAutoFit/>
-            </a:bodyPr>
-            <a:lstStyle/>
-            <a:p>
-              <a:pPr algn="ctr"/>
-              <a:r>
-                <a:rPr lang="en-US" sz="1200" dirty="0">
-                  <a:solidFill>
-                    <a:schemeClr val="accent6"/>
-                  </a:solidFill>
-                </a:rPr>
-                <a:t>Toolbar</a:t>
-              </a:r>
-            </a:p>
-          </p:txBody>
-        </p:sp>
-        <p:sp>
-          <p:nvSpPr>
-            <p:cNvPr id="25" name="Rectangle 24">
-              <a:extLst>
-                <a:ext uri="{FF2B5EF4-FFF2-40B4-BE49-F238E27FC236}">
-                  <a16:creationId xmlns:a16="http://schemas.microsoft.com/office/drawing/2014/main" id="{38234176-8BB8-4114-96C5-171C66ECDE3F}"/>
-                </a:ext>
-              </a:extLst>
-            </p:cNvPr>
-            <p:cNvSpPr/>
-            <p:nvPr/>
-          </p:nvSpPr>
-          <p:spPr>
-            <a:xfrm>
-              <a:off x="1859936" y="945870"/>
-              <a:ext cx="3706363" cy="869029"/>
-            </a:xfrm>
-            <a:prstGeom prst="rect">
-              <a:avLst/>
-            </a:prstGeom>
-            <a:noFill/>
-            <a:ln w="9525" cap="flat" cmpd="sng" algn="ctr">
-              <a:solidFill>
-                <a:schemeClr val="accent6"/>
-              </a:solidFill>
-              <a:prstDash val="solid"/>
-              <a:round/>
-              <a:headEnd type="none" w="med" len="med"/>
-              <a:tailEnd type="none" w="med" len="med"/>
-            </a:ln>
-          </p:spPr>
-          <p:style>
-            <a:lnRef idx="0">
-              <a:scrgbClr r="0" g="0" b="0"/>
-            </a:lnRef>
-            <a:fillRef idx="0">
-              <a:scrgbClr r="0" g="0" b="0"/>
-            </a:fillRef>
-            <a:effectRef idx="0">
-              <a:scrgbClr r="0" g="0" b="0"/>
-            </a:effectRef>
-            <a:fontRef idx="minor">
-              <a:schemeClr val="accent6"/>
-            </a:fontRef>
-          </p:style>
-          <p:txBody>
-            <a:bodyPr rtlCol="0" anchor="ctr"/>
-            <a:lstStyle/>
-            <a:p>
-              <a:pPr algn="ctr"/>
-              <a:endParaRPr lang="en-SG"/>
-            </a:p>
-          </p:txBody>
-        </p:sp>
-      </p:grpSp>
-      <p:grpSp>
-        <p:nvGrpSpPr>
-          <p:cNvPr id="5" name="Group 4">
-            <a:extLst>
-              <a:ext uri="{FF2B5EF4-FFF2-40B4-BE49-F238E27FC236}">
-                <a16:creationId xmlns:a16="http://schemas.microsoft.com/office/drawing/2014/main" id="{4FF72358-8A89-4AE0-983B-BB094CC4E4D9}"/>
-              </a:ext>
-            </a:extLst>
-          </p:cNvPr>
-          <p:cNvGrpSpPr/>
-          <p:nvPr/>
-        </p:nvGrpSpPr>
-        <p:grpSpPr>
-          <a:xfrm>
-            <a:off x="2824966" y="3083362"/>
-            <a:ext cx="1695743" cy="246221"/>
-            <a:chOff x="2464522" y="2361561"/>
-            <a:chExt cx="1695743" cy="246221"/>
-          </a:xfrm>
-        </p:grpSpPr>
-        <p:sp>
-          <p:nvSpPr>
-            <p:cNvPr id="26" name="Oval 25">
-              <a:extLst>
-                <a:ext uri="{FF2B5EF4-FFF2-40B4-BE49-F238E27FC236}">
-                  <a16:creationId xmlns:a16="http://schemas.microsoft.com/office/drawing/2014/main" id="{1173C975-EBB3-439F-8872-826D3DAF91EB}"/>
-                </a:ext>
-              </a:extLst>
-            </p:cNvPr>
-            <p:cNvSpPr/>
-            <p:nvPr/>
-          </p:nvSpPr>
-          <p:spPr>
-            <a:xfrm>
-              <a:off x="2464522" y="2454206"/>
-              <a:ext cx="142875" cy="133350"/>
-            </a:xfrm>
-            <a:prstGeom prst="ellipse">
-              <a:avLst/>
-            </a:prstGeom>
-            <a:noFill/>
-            <a:ln w="9525" cap="flat" cmpd="sng" algn="ctr">
-              <a:solidFill>
-                <a:schemeClr val="accent2"/>
-              </a:solidFill>
-              <a:prstDash val="solid"/>
-              <a:round/>
-              <a:headEnd type="none" w="med" len="med"/>
-              <a:tailEnd type="none" w="med" len="med"/>
-            </a:ln>
-          </p:spPr>
-          <p:style>
-            <a:lnRef idx="0">
-              <a:scrgbClr r="0" g="0" b="0"/>
-            </a:lnRef>
-            <a:fillRef idx="0">
-              <a:scrgbClr r="0" g="0" b="0"/>
-            </a:fillRef>
-            <a:effectRef idx="0">
-              <a:scrgbClr r="0" g="0" b="0"/>
-            </a:effectRef>
-            <a:fontRef idx="minor">
-              <a:schemeClr val="accent2"/>
-            </a:fontRef>
-          </p:style>
-          <p:txBody>
-            <a:bodyPr rtlCol="0" anchor="ctr"/>
-            <a:lstStyle/>
-            <a:p>
-              <a:pPr algn="ctr"/>
-              <a:endParaRPr lang="en-SG"/>
-            </a:p>
-          </p:txBody>
-        </p:sp>
-        <p:sp>
-          <p:nvSpPr>
-            <p:cNvPr id="27" name="Arrow: Right 26">
-              <a:extLst>
-                <a:ext uri="{FF2B5EF4-FFF2-40B4-BE49-F238E27FC236}">
-                  <a16:creationId xmlns:a16="http://schemas.microsoft.com/office/drawing/2014/main" id="{A58405F1-EAAD-4099-A00D-F41C9263239F}"/>
-                </a:ext>
-              </a:extLst>
-            </p:cNvPr>
-            <p:cNvSpPr/>
-            <p:nvPr/>
-          </p:nvSpPr>
-          <p:spPr>
-            <a:xfrm rot="21204583">
-              <a:off x="2661847" y="2453845"/>
-              <a:ext cx="142378" cy="66676"/>
-            </a:xfrm>
-            <a:prstGeom prst="rightArrow">
-              <a:avLst/>
-            </a:prstGeom>
-          </p:spPr>
-          <p:style>
-            <a:lnRef idx="2">
-              <a:schemeClr val="accent2">
-                <a:shade val="50000"/>
-              </a:schemeClr>
-            </a:lnRef>
-            <a:fillRef idx="1">
-              <a:schemeClr val="accent2"/>
-            </a:fillRef>
-            <a:effectRef idx="0">
-              <a:schemeClr val="accent2"/>
-            </a:effectRef>
-            <a:fontRef idx="minor">
-              <a:schemeClr val="lt1"/>
-            </a:fontRef>
-          </p:style>
-          <p:txBody>
-            <a:bodyPr rtlCol="0" anchor="ctr"/>
-            <a:lstStyle/>
-            <a:p>
-              <a:pPr algn="ctr"/>
-              <a:endParaRPr lang="en-SG"/>
-            </a:p>
-          </p:txBody>
-        </p:sp>
-        <p:sp>
-          <p:nvSpPr>
-            <p:cNvPr id="28" name="TextBox 27">
-              <a:extLst>
-                <a:ext uri="{FF2B5EF4-FFF2-40B4-BE49-F238E27FC236}">
-                  <a16:creationId xmlns:a16="http://schemas.microsoft.com/office/drawing/2014/main" id="{34AE8672-B518-45E4-9DE5-A05EE9D1C6F3}"/>
-                </a:ext>
-              </a:extLst>
-            </p:cNvPr>
-            <p:cNvSpPr txBox="1"/>
-            <p:nvPr/>
-          </p:nvSpPr>
-          <p:spPr>
-            <a:xfrm>
-              <a:off x="2760090" y="2361561"/>
-              <a:ext cx="1400175" cy="246221"/>
-            </a:xfrm>
-            <a:prstGeom prst="rect">
-              <a:avLst/>
-            </a:prstGeom>
-            <a:noFill/>
-          </p:spPr>
-          <p:txBody>
-            <a:bodyPr wrap="square" rtlCol="0">
-              <a:spAutoFit/>
-            </a:bodyPr>
-            <a:lstStyle/>
-            <a:p>
-              <a:r>
-                <a:rPr lang="en-US" sz="1000" dirty="0">
-                  <a:solidFill>
-                    <a:schemeClr val="accent2"/>
-                  </a:solidFill>
-                </a:rPr>
-                <a:t>Link to repository</a:t>
-              </a:r>
-              <a:endParaRPr lang="en-SG" sz="1000" dirty="0">
-                <a:solidFill>
-                  <a:schemeClr val="accent2"/>
-                </a:solidFill>
-              </a:endParaRPr>
-            </a:p>
-          </p:txBody>
-        </p:sp>
-      </p:grpSp>
-      <p:grpSp>
-        <p:nvGrpSpPr>
-          <p:cNvPr id="6" name="Group 5">
-            <a:extLst>
-              <a:ext uri="{FF2B5EF4-FFF2-40B4-BE49-F238E27FC236}">
-                <a16:creationId xmlns:a16="http://schemas.microsoft.com/office/drawing/2014/main" id="{71B6EB53-FA00-4D6F-8B6D-CFC7C368353A}"/>
-              </a:ext>
-            </a:extLst>
-          </p:cNvPr>
-          <p:cNvGrpSpPr/>
-          <p:nvPr/>
-        </p:nvGrpSpPr>
-        <p:grpSpPr>
-          <a:xfrm>
-            <a:off x="2773892" y="2499943"/>
-            <a:ext cx="2165611" cy="263574"/>
-            <a:chOff x="2230032" y="2870443"/>
-            <a:chExt cx="2165611" cy="263574"/>
-          </a:xfrm>
-        </p:grpSpPr>
-        <p:sp>
-          <p:nvSpPr>
-            <p:cNvPr id="29" name="Oval 28">
-              <a:extLst>
-                <a:ext uri="{FF2B5EF4-FFF2-40B4-BE49-F238E27FC236}">
-                  <a16:creationId xmlns:a16="http://schemas.microsoft.com/office/drawing/2014/main" id="{2206B7BC-33E8-473B-84CD-DA37BCD06CDF}"/>
-                </a:ext>
-              </a:extLst>
-            </p:cNvPr>
-            <p:cNvSpPr/>
-            <p:nvPr/>
-          </p:nvSpPr>
-          <p:spPr>
-            <a:xfrm>
-              <a:off x="2230032" y="3000667"/>
-              <a:ext cx="130499" cy="133350"/>
-            </a:xfrm>
-            <a:prstGeom prst="ellipse">
-              <a:avLst/>
-            </a:prstGeom>
-            <a:noFill/>
-            <a:ln w="9525" cap="flat" cmpd="sng" algn="ctr">
-              <a:solidFill>
-                <a:schemeClr val="accent6"/>
-              </a:solidFill>
-              <a:prstDash val="solid"/>
-              <a:round/>
-              <a:headEnd type="none" w="med" len="med"/>
-              <a:tailEnd type="none" w="med" len="med"/>
-            </a:ln>
-          </p:spPr>
-          <p:style>
-            <a:lnRef idx="0">
-              <a:scrgbClr r="0" g="0" b="0"/>
-            </a:lnRef>
-            <a:fillRef idx="0">
-              <a:scrgbClr r="0" g="0" b="0"/>
-            </a:fillRef>
-            <a:effectRef idx="0">
-              <a:scrgbClr r="0" g="0" b="0"/>
-            </a:effectRef>
-            <a:fontRef idx="minor">
-              <a:schemeClr val="accent6"/>
-            </a:fontRef>
-          </p:style>
-          <p:txBody>
-            <a:bodyPr rtlCol="0" anchor="ctr"/>
-            <a:lstStyle/>
-            <a:p>
-              <a:pPr algn="ctr"/>
-              <a:endParaRPr lang="en-SG"/>
-            </a:p>
-          </p:txBody>
-        </p:sp>
-        <p:sp>
-          <p:nvSpPr>
-            <p:cNvPr id="30" name="Arrow: Bent 29">
-              <a:extLst>
-                <a:ext uri="{FF2B5EF4-FFF2-40B4-BE49-F238E27FC236}">
-                  <a16:creationId xmlns:a16="http://schemas.microsoft.com/office/drawing/2014/main" id="{DFCFA230-CA83-4084-9F6D-71E51B2037DE}"/>
-                </a:ext>
-              </a:extLst>
-            </p:cNvPr>
-            <p:cNvSpPr/>
-            <p:nvPr/>
-          </p:nvSpPr>
-          <p:spPr>
-            <a:xfrm>
-              <a:off x="2281147" y="2943385"/>
-              <a:ext cx="243840" cy="62865"/>
-            </a:xfrm>
-            <a:prstGeom prst="bentArrow">
-              <a:avLst>
-                <a:gd name="adj1" fmla="val 25000"/>
-                <a:gd name="adj2" fmla="val 26516"/>
-                <a:gd name="adj3" fmla="val 25000"/>
-                <a:gd name="adj4" fmla="val 43750"/>
-              </a:avLst>
-            </a:prstGeom>
-          </p:spPr>
-          <p:style>
-            <a:lnRef idx="2">
-              <a:schemeClr val="accent6">
-                <a:shade val="50000"/>
-              </a:schemeClr>
-            </a:lnRef>
-            <a:fillRef idx="1">
-              <a:schemeClr val="accent6"/>
-            </a:fillRef>
-            <a:effectRef idx="0">
-              <a:schemeClr val="accent6"/>
-            </a:effectRef>
-            <a:fontRef idx="minor">
-              <a:schemeClr val="lt1"/>
-            </a:fontRef>
-          </p:style>
-          <p:txBody>
-            <a:bodyPr rtlCol="0" anchor="ctr"/>
-            <a:lstStyle/>
-            <a:p>
-              <a:pPr algn="ctr"/>
-              <a:endParaRPr lang="en-SG">
-                <a:solidFill>
-                  <a:schemeClr val="tx1"/>
-                </a:solidFill>
-              </a:endParaRPr>
-            </a:p>
-          </p:txBody>
-        </p:sp>
-        <p:sp>
-          <p:nvSpPr>
-            <p:cNvPr id="31" name="TextBox 30">
-              <a:extLst>
-                <a:ext uri="{FF2B5EF4-FFF2-40B4-BE49-F238E27FC236}">
-                  <a16:creationId xmlns:a16="http://schemas.microsoft.com/office/drawing/2014/main" id="{FD5681D1-EF5F-4AB0-9C45-DF91004DFCC2}"/>
-                </a:ext>
-              </a:extLst>
-            </p:cNvPr>
-            <p:cNvSpPr txBox="1"/>
-            <p:nvPr/>
-          </p:nvSpPr>
-          <p:spPr>
-            <a:xfrm>
-              <a:off x="2493500" y="2870443"/>
-              <a:ext cx="1902143" cy="246221"/>
-            </a:xfrm>
-            <a:prstGeom prst="rect">
-              <a:avLst/>
-            </a:prstGeom>
-            <a:noFill/>
-          </p:spPr>
-          <p:txBody>
-            <a:bodyPr wrap="square" rtlCol="0">
-              <a:spAutoFit/>
-            </a:bodyPr>
-            <a:lstStyle/>
-            <a:p>
-              <a:r>
-                <a:rPr lang="en-US" sz="1000" dirty="0">
-                  <a:solidFill>
-                    <a:schemeClr val="accent6"/>
-                  </a:solidFill>
-                </a:rPr>
-                <a:t>View author’s committed codes</a:t>
-              </a:r>
-              <a:endParaRPr lang="en-SG" sz="1000" dirty="0">
-                <a:solidFill>
-                  <a:schemeClr val="accent6"/>
-                </a:solidFill>
-              </a:endParaRPr>
-            </a:p>
-          </p:txBody>
-        </p:sp>
-      </p:grpSp>
-      <p:grpSp>
-        <p:nvGrpSpPr>
-          <p:cNvPr id="36" name="Group 35">
-            <a:extLst>
-              <a:ext uri="{FF2B5EF4-FFF2-40B4-BE49-F238E27FC236}">
-                <a16:creationId xmlns:a16="http://schemas.microsoft.com/office/drawing/2014/main" id="{A7AFB063-FD92-44F4-BCAE-B42330D96AE2}"/>
-              </a:ext>
-            </a:extLst>
-          </p:cNvPr>
-          <p:cNvGrpSpPr/>
-          <p:nvPr/>
-        </p:nvGrpSpPr>
-        <p:grpSpPr>
-          <a:xfrm>
-            <a:off x="6140186" y="79248"/>
-            <a:ext cx="4612015" cy="5964363"/>
-            <a:chOff x="6196584" y="79248"/>
-            <a:chExt cx="4555617" cy="5964363"/>
-          </a:xfrm>
-        </p:grpSpPr>
-        <p:sp>
-          <p:nvSpPr>
-            <p:cNvPr id="10" name="Right Brace 9">
-              <a:extLst>
-                <a:ext uri="{FF2B5EF4-FFF2-40B4-BE49-F238E27FC236}">
-                  <a16:creationId xmlns:a16="http://schemas.microsoft.com/office/drawing/2014/main" id="{195D0920-5C1C-411D-A43A-B7FB72C2CF80}"/>
+                  <a16:creationId xmlns:a16="http://schemas.microsoft.com/office/drawing/2014/main" id="{2A46AAA6-B2C1-DD41-AB93-54EFF439EACE}"/>
                 </a:ext>
               </a:extLst>
             </p:cNvPr>
@@ -4555,10 +5014,10 @@
         </p:sp>
         <p:sp>
           <p:nvSpPr>
-            <p:cNvPr id="11" name="TextBox 10">
+            <p:cNvPr id="48" name="TextBox 47">
               <a:extLst>
                 <a:ext uri="{FF2B5EF4-FFF2-40B4-BE49-F238E27FC236}">
-                  <a16:creationId xmlns:a16="http://schemas.microsoft.com/office/drawing/2014/main" id="{08293D95-459E-4730-BC16-CD778BC8DE8A}"/>
+                  <a16:creationId xmlns:a16="http://schemas.microsoft.com/office/drawing/2014/main" id="{EA2562D6-C037-DB4E-BA0A-9FBB0C53A918}"/>
                 </a:ext>
               </a:extLst>
             </p:cNvPr>
@@ -4567,7 +5026,7 @@
           </p:nvSpPr>
           <p:spPr>
             <a:xfrm>
-              <a:off x="7424928" y="79248"/>
+              <a:off x="7424928" y="220234"/>
               <a:ext cx="2090928" cy="276999"/>
             </a:xfrm>
             <a:prstGeom prst="rect">
@@ -4592,10 +5051,10 @@
         </p:sp>
         <p:sp>
           <p:nvSpPr>
-            <p:cNvPr id="32" name="Rectangle 31">
+            <p:cNvPr id="49" name="Rectangle 48">
               <a:extLst>
                 <a:ext uri="{FF2B5EF4-FFF2-40B4-BE49-F238E27FC236}">
-                  <a16:creationId xmlns:a16="http://schemas.microsoft.com/office/drawing/2014/main" id="{78349196-1F24-461D-AD8C-4AD1D6A0E5B6}"/>
+                  <a16:creationId xmlns:a16="http://schemas.microsoft.com/office/drawing/2014/main" id="{BE36A025-2170-BD4C-85B7-9E52A6ECA41E}"/>
                 </a:ext>
               </a:extLst>
             </p:cNvPr>
@@ -4645,12 +5104,58 @@
           </p:txBody>
         </p:sp>
       </p:grpSp>
+      <p:sp>
+        <p:nvSpPr>
+          <p:cNvPr id="54" name="Arrow: Left 47">
+            <a:extLst>
+              <a:ext uri="{FF2B5EF4-FFF2-40B4-BE49-F238E27FC236}">
+                <a16:creationId xmlns:a16="http://schemas.microsoft.com/office/drawing/2014/main" id="{D08A5AA5-5E30-1B44-B88A-D53EE29DB3F4}"/>
+              </a:ext>
+            </a:extLst>
+          </p:cNvPr>
+          <p:cNvSpPr/>
+          <p:nvPr/>
+        </p:nvSpPr>
+        <p:spPr>
+          <a:xfrm>
+            <a:off x="969529" y="4892392"/>
+            <a:ext cx="250504" cy="77721"/>
+          </a:xfrm>
+          <a:prstGeom prst="leftArrow">
+            <a:avLst/>
+          </a:prstGeom>
+        </p:spPr>
+        <p:style>
+          <a:lnRef idx="2">
+            <a:schemeClr val="dk1">
+              <a:shade val="50000"/>
+            </a:schemeClr>
+          </a:lnRef>
+          <a:fillRef idx="1">
+            <a:schemeClr val="dk1"/>
+          </a:fillRef>
+          <a:effectRef idx="0">
+            <a:schemeClr val="dk1"/>
+          </a:effectRef>
+          <a:fontRef idx="minor">
+            <a:schemeClr val="lt1"/>
+          </a:fontRef>
+        </p:style>
+        <p:txBody>
+          <a:bodyPr rtlCol="0" anchor="ctr"/>
+          <a:lstStyle/>
+          <a:p>
+            <a:pPr algn="ctr"/>
+            <a:endParaRPr lang="en-SG"/>
+          </a:p>
+        </p:txBody>
+      </p:sp>
       <p:grpSp>
         <p:nvGrpSpPr>
-          <p:cNvPr id="14" name="Group 13">
-            <a:extLst>
-              <a:ext uri="{FF2B5EF4-FFF2-40B4-BE49-F238E27FC236}">
-                <a16:creationId xmlns:a16="http://schemas.microsoft.com/office/drawing/2014/main" id="{F0680E85-D3A9-48B1-B089-8B49261F1BEF}"/>
+          <p:cNvPr id="55" name="Group 54">
+            <a:extLst>
+              <a:ext uri="{FF2B5EF4-FFF2-40B4-BE49-F238E27FC236}">
+                <a16:creationId xmlns:a16="http://schemas.microsoft.com/office/drawing/2014/main" id="{87394544-1C31-4842-B355-A950D7748C56}"/>
               </a:ext>
             </a:extLst>
           </p:cNvPr>
@@ -4659,18 +5164,18 @@
         </p:nvGrpSpPr>
         <p:grpSpPr>
           <a:xfrm>
-            <a:off x="440200" y="2158326"/>
-            <a:ext cx="5526892" cy="461665"/>
-            <a:chOff x="460520" y="1991112"/>
-            <a:chExt cx="5526892" cy="461665"/>
+            <a:off x="140442" y="793236"/>
+            <a:ext cx="5801889" cy="869031"/>
+            <a:chOff x="315534" y="945868"/>
+            <a:chExt cx="5164879" cy="869031"/>
           </a:xfrm>
         </p:grpSpPr>
         <p:sp>
           <p:nvSpPr>
-            <p:cNvPr id="33" name="Rectangle 32">
+            <p:cNvPr id="56" name="Left Brace 55">
               <a:extLst>
                 <a:ext uri="{FF2B5EF4-FFF2-40B4-BE49-F238E27FC236}">
-                  <a16:creationId xmlns:a16="http://schemas.microsoft.com/office/drawing/2014/main" id="{0C689E94-04DA-4405-AE79-8BC095FCC283}"/>
+                  <a16:creationId xmlns:a16="http://schemas.microsoft.com/office/drawing/2014/main" id="{B199A6C2-8651-BE4D-92AE-2F236CD5DBE7}"/>
                 </a:ext>
               </a:extLst>
             </p:cNvPr>
@@ -4679,81 +5184,25 @@
           </p:nvSpPr>
           <p:spPr>
             <a:xfrm>
-              <a:off x="1504949" y="2067663"/>
-              <a:ext cx="4482463" cy="276999"/>
+              <a:off x="919101" y="945868"/>
+              <a:ext cx="513688" cy="869029"/>
             </a:xfrm>
-            <a:prstGeom prst="rect">
-              <a:avLst/>
+            <a:prstGeom prst="leftBrace">
+              <a:avLst>
+                <a:gd name="adj1" fmla="val 14462"/>
+                <a:gd name="adj2" fmla="val 49594"/>
+              </a:avLst>
             </a:prstGeom>
-            <a:noFill/>
-            <a:ln w="28575" cap="flat" cmpd="sng" algn="ctr">
-              <a:solidFill>
-                <a:srgbClr val="A401FF"/>
-              </a:solidFill>
-              <a:prstDash val="solid"/>
-              <a:round/>
-              <a:headEnd type="none" w="med" len="med"/>
-              <a:tailEnd type="none" w="med" len="med"/>
-            </a:ln>
           </p:spPr>
           <p:style>
-            <a:lnRef idx="0">
-              <a:scrgbClr r="0" g="0" b="0"/>
+            <a:lnRef idx="3">
+              <a:schemeClr val="accent6"/>
             </a:lnRef>
             <a:fillRef idx="0">
-              <a:scrgbClr r="0" g="0" b="0"/>
+              <a:schemeClr val="accent6"/>
             </a:fillRef>
-            <a:effectRef idx="0">
-              <a:scrgbClr r="0" g="0" b="0"/>
-            </a:effectRef>
-            <a:fontRef idx="minor">
-              <a:schemeClr val="accent4"/>
-            </a:fontRef>
-          </p:style>
-          <p:txBody>
-            <a:bodyPr rtlCol="0" anchor="ctr"/>
-            <a:lstStyle/>
-            <a:p>
-              <a:pPr algn="ctr"/>
-              <a:endParaRPr lang="en-SG"/>
-            </a:p>
-          </p:txBody>
-        </p:sp>
-        <p:sp>
-          <p:nvSpPr>
-            <p:cNvPr id="34" name="Left Brace 33">
-              <a:extLst>
-                <a:ext uri="{FF2B5EF4-FFF2-40B4-BE49-F238E27FC236}">
-                  <a16:creationId xmlns:a16="http://schemas.microsoft.com/office/drawing/2014/main" id="{222FAE24-7A73-4290-9FB2-3A3528D6EBA2}"/>
-                </a:ext>
-              </a:extLst>
-            </p:cNvPr>
-            <p:cNvSpPr/>
-            <p:nvPr/>
-          </p:nvSpPr>
-          <p:spPr>
-            <a:xfrm>
-              <a:off x="1098796" y="2084176"/>
-              <a:ext cx="348052" cy="237053"/>
-            </a:xfrm>
-            <a:prstGeom prst="leftBrace">
-              <a:avLst/>
-            </a:prstGeom>
-            <a:ln w="19050">
-              <a:solidFill>
-                <a:srgbClr val="A401FF"/>
-              </a:solidFill>
-            </a:ln>
-          </p:spPr>
-          <p:style>
-            <a:lnRef idx="1">
-              <a:schemeClr val="accent1"/>
-            </a:lnRef>
-            <a:fillRef idx="0">
-              <a:schemeClr val="accent1"/>
-            </a:fillRef>
-            <a:effectRef idx="0">
-              <a:schemeClr val="accent1"/>
+            <a:effectRef idx="2">
+              <a:schemeClr val="accent6"/>
             </a:effectRef>
             <a:fontRef idx="minor">
               <a:schemeClr val="tx1"/>
@@ -4770,10 +5219,10 @@
         </p:sp>
         <p:sp>
           <p:nvSpPr>
-            <p:cNvPr id="35" name="TextBox 34">
+            <p:cNvPr id="57" name="TextBox 56">
               <a:extLst>
                 <a:ext uri="{FF2B5EF4-FFF2-40B4-BE49-F238E27FC236}">
-                  <a16:creationId xmlns:a16="http://schemas.microsoft.com/office/drawing/2014/main" id="{EF436BD1-46E2-4EB0-8C8E-A61FF6951C31}"/>
+                  <a16:creationId xmlns:a16="http://schemas.microsoft.com/office/drawing/2014/main" id="{83C4785A-7BA6-3446-B8BA-1A7C2B9EB1E6}"/>
                 </a:ext>
               </a:extLst>
             </p:cNvPr>
@@ -4782,8 +5231,8 @@
           </p:nvSpPr>
           <p:spPr>
             <a:xfrm>
-              <a:off x="460520" y="1991112"/>
-              <a:ext cx="723900" cy="461665"/>
+              <a:off x="315534" y="1241882"/>
+              <a:ext cx="723900" cy="276999"/>
             </a:xfrm>
             <a:prstGeom prst="rect">
               <a:avLst/>
@@ -4800,41 +5249,20 @@
               <a:r>
                 <a:rPr lang="en-US" sz="1200" dirty="0">
                   <a:solidFill>
-                    <a:srgbClr val="7030A0"/>
+                    <a:schemeClr val="accent6"/>
                   </a:solidFill>
                 </a:rPr>
-                <a:t>Ramp Chart</a:t>
+                <a:t>Toolbar</a:t>
               </a:r>
             </a:p>
           </p:txBody>
         </p:sp>
-      </p:grpSp>
-      <p:grpSp>
-        <p:nvGrpSpPr>
-          <p:cNvPr id="42" name="Group 41">
-            <a:extLst>
-              <a:ext uri="{FF2B5EF4-FFF2-40B4-BE49-F238E27FC236}">
-                <a16:creationId xmlns:a16="http://schemas.microsoft.com/office/drawing/2014/main" id="{B9C91654-E14E-4BC1-8843-976ECB18131B}"/>
-              </a:ext>
-            </a:extLst>
-          </p:cNvPr>
-          <p:cNvGrpSpPr/>
-          <p:nvPr/>
-        </p:nvGrpSpPr>
-        <p:grpSpPr>
-          <a:xfrm>
-            <a:off x="105361" y="3392098"/>
-            <a:ext cx="5827029" cy="461665"/>
-            <a:chOff x="181614" y="3716589"/>
-            <a:chExt cx="5827029" cy="461665"/>
-          </a:xfrm>
-        </p:grpSpPr>
         <p:sp>
           <p:nvSpPr>
-            <p:cNvPr id="46" name="Rectangle 45">
+            <p:cNvPr id="58" name="Rectangle 57">
               <a:extLst>
                 <a:ext uri="{FF2B5EF4-FFF2-40B4-BE49-F238E27FC236}">
-                  <a16:creationId xmlns:a16="http://schemas.microsoft.com/office/drawing/2014/main" id="{046392F6-712F-4248-819F-5F03FBDBE02B}"/>
+                  <a16:creationId xmlns:a16="http://schemas.microsoft.com/office/drawing/2014/main" id="{D73EC32A-330F-0D40-B05F-4FE2354456D8}"/>
                 </a:ext>
               </a:extLst>
             </p:cNvPr>
@@ -4843,266 +5271,14 @@
           </p:nvSpPr>
           <p:spPr>
             <a:xfrm>
-              <a:off x="1526181" y="3880858"/>
-              <a:ext cx="4482462" cy="96793"/>
+              <a:off x="1432790" y="945870"/>
+              <a:ext cx="4047623" cy="869029"/>
             </a:xfrm>
             <a:prstGeom prst="rect">
               <a:avLst/>
             </a:prstGeom>
             <a:noFill/>
             <a:ln w="9525" cap="flat" cmpd="sng" algn="ctr">
-              <a:solidFill>
-                <a:schemeClr val="dk1"/>
-              </a:solidFill>
-              <a:prstDash val="solid"/>
-              <a:round/>
-              <a:headEnd type="none" w="med" len="med"/>
-              <a:tailEnd type="none" w="med" len="med"/>
-            </a:ln>
-          </p:spPr>
-          <p:style>
-            <a:lnRef idx="0">
-              <a:scrgbClr r="0" g="0" b="0"/>
-            </a:lnRef>
-            <a:fillRef idx="0">
-              <a:scrgbClr r="0" g="0" b="0"/>
-            </a:fillRef>
-            <a:effectRef idx="0">
-              <a:scrgbClr r="0" g="0" b="0"/>
-            </a:effectRef>
-            <a:fontRef idx="minor">
-              <a:schemeClr val="dk1"/>
-            </a:fontRef>
-          </p:style>
-          <p:txBody>
-            <a:bodyPr rtlCol="0" anchor="ctr"/>
-            <a:lstStyle/>
-            <a:p>
-              <a:pPr algn="ctr"/>
-              <a:endParaRPr lang="en-SG"/>
-            </a:p>
-          </p:txBody>
-        </p:sp>
-        <p:sp>
-          <p:nvSpPr>
-            <p:cNvPr id="48" name="Arrow: Left 47">
-              <a:extLst>
-                <a:ext uri="{FF2B5EF4-FFF2-40B4-BE49-F238E27FC236}">
-                  <a16:creationId xmlns:a16="http://schemas.microsoft.com/office/drawing/2014/main" id="{1B3593E0-8F68-41EA-A8FE-5188B0C5C7EA}"/>
-                </a:ext>
-              </a:extLst>
-            </p:cNvPr>
-            <p:cNvSpPr/>
-            <p:nvPr/>
-          </p:nvSpPr>
-          <p:spPr>
-            <a:xfrm>
-              <a:off x="1133943" y="3880858"/>
-              <a:ext cx="348052" cy="96793"/>
-            </a:xfrm>
-            <a:prstGeom prst="leftArrow">
-              <a:avLst/>
-            </a:prstGeom>
-          </p:spPr>
-          <p:style>
-            <a:lnRef idx="2">
-              <a:schemeClr val="dk1">
-                <a:shade val="50000"/>
-              </a:schemeClr>
-            </a:lnRef>
-            <a:fillRef idx="1">
-              <a:schemeClr val="dk1"/>
-            </a:fillRef>
-            <a:effectRef idx="0">
-              <a:schemeClr val="dk1"/>
-            </a:effectRef>
-            <a:fontRef idx="minor">
-              <a:schemeClr val="lt1"/>
-            </a:fontRef>
-          </p:style>
-          <p:txBody>
-            <a:bodyPr rtlCol="0" anchor="ctr"/>
-            <a:lstStyle/>
-            <a:p>
-              <a:pPr algn="ctr"/>
-              <a:endParaRPr lang="en-SG"/>
-            </a:p>
-          </p:txBody>
-        </p:sp>
-        <p:sp>
-          <p:nvSpPr>
-            <p:cNvPr id="49" name="TextBox 48">
-              <a:extLst>
-                <a:ext uri="{FF2B5EF4-FFF2-40B4-BE49-F238E27FC236}">
-                  <a16:creationId xmlns:a16="http://schemas.microsoft.com/office/drawing/2014/main" id="{B179F6A5-F356-4AE0-BE67-A636F79B6560}"/>
-                </a:ext>
-              </a:extLst>
-            </p:cNvPr>
-            <p:cNvSpPr txBox="1"/>
-            <p:nvPr/>
-          </p:nvSpPr>
-          <p:spPr>
-            <a:xfrm>
-              <a:off x="181614" y="3716589"/>
-              <a:ext cx="1014711" cy="461665"/>
-            </a:xfrm>
-            <a:prstGeom prst="rect">
-              <a:avLst/>
-            </a:prstGeom>
-            <a:noFill/>
-          </p:spPr>
-          <p:txBody>
-            <a:bodyPr wrap="square" rtlCol="0">
-              <a:spAutoFit/>
-            </a:bodyPr>
-            <a:lstStyle/>
-            <a:p>
-              <a:pPr algn="ctr"/>
-              <a:r>
-                <a:rPr lang="en-US" sz="1200" dirty="0"/>
-                <a:t>Contribution Bar</a:t>
-              </a:r>
-              <a:endParaRPr lang="en-SG" sz="1200" dirty="0"/>
-            </a:p>
-          </p:txBody>
-        </p:sp>
-      </p:grpSp>
-      <p:grpSp>
-        <p:nvGrpSpPr>
-          <p:cNvPr id="37" name="Group 36">
-            <a:extLst>
-              <a:ext uri="{FF2B5EF4-FFF2-40B4-BE49-F238E27FC236}">
-                <a16:creationId xmlns:a16="http://schemas.microsoft.com/office/drawing/2014/main" id="{40CE11B1-9A6E-4A62-839A-2DCDA1A8D4FF}"/>
-              </a:ext>
-            </a:extLst>
-          </p:cNvPr>
-          <p:cNvGrpSpPr/>
-          <p:nvPr/>
-        </p:nvGrpSpPr>
-        <p:grpSpPr>
-          <a:xfrm>
-            <a:off x="6174351" y="1712697"/>
-            <a:ext cx="3424155" cy="402234"/>
-            <a:chOff x="6202680" y="1735827"/>
-            <a:chExt cx="3424155" cy="402234"/>
-          </a:xfrm>
-        </p:grpSpPr>
-        <p:sp>
-          <p:nvSpPr>
-            <p:cNvPr id="12" name="Arrow: Right 11">
-              <a:extLst>
-                <a:ext uri="{FF2B5EF4-FFF2-40B4-BE49-F238E27FC236}">
-                  <a16:creationId xmlns:a16="http://schemas.microsoft.com/office/drawing/2014/main" id="{88177BEA-4D65-45B7-A56C-6FBD7CF8C471}"/>
-                </a:ext>
-              </a:extLst>
-            </p:cNvPr>
-            <p:cNvSpPr/>
-            <p:nvPr/>
-          </p:nvSpPr>
-          <p:spPr>
-            <a:xfrm rot="21372755">
-              <a:off x="8429466" y="1857407"/>
-              <a:ext cx="402336" cy="121920"/>
-            </a:xfrm>
-            <a:prstGeom prst="rightArrow">
-              <a:avLst/>
-            </a:prstGeom>
-          </p:spPr>
-          <p:style>
-            <a:lnRef idx="2">
-              <a:schemeClr val="accent6">
-                <a:shade val="50000"/>
-              </a:schemeClr>
-            </a:lnRef>
-            <a:fillRef idx="1">
-              <a:schemeClr val="accent6"/>
-            </a:fillRef>
-            <a:effectRef idx="0">
-              <a:schemeClr val="accent6"/>
-            </a:effectRef>
-            <a:fontRef idx="minor">
-              <a:schemeClr val="lt1"/>
-            </a:fontRef>
-          </p:style>
-          <p:txBody>
-            <a:bodyPr rtlCol="0" anchor="ctr"/>
-            <a:lstStyle/>
-            <a:p>
-              <a:pPr algn="ctr"/>
-              <a:endParaRPr lang="en-SG"/>
-            </a:p>
-          </p:txBody>
-        </p:sp>
-        <p:sp>
-          <p:nvSpPr>
-            <p:cNvPr id="13" name="TextBox 12">
-              <a:extLst>
-                <a:ext uri="{FF2B5EF4-FFF2-40B4-BE49-F238E27FC236}">
-                  <a16:creationId xmlns:a16="http://schemas.microsoft.com/office/drawing/2014/main" id="{C135F275-4477-467B-8D51-84AA5700DE35}"/>
-                </a:ext>
-              </a:extLst>
-            </p:cNvPr>
-            <p:cNvSpPr txBox="1"/>
-            <p:nvPr/>
-          </p:nvSpPr>
-          <p:spPr>
-            <a:xfrm>
-              <a:off x="8790433" y="1735827"/>
-              <a:ext cx="836402" cy="276999"/>
-            </a:xfrm>
-            <a:prstGeom prst="rect">
-              <a:avLst/>
-            </a:prstGeom>
-            <a:noFill/>
-          </p:spPr>
-          <p:txBody>
-            <a:bodyPr wrap="square" rtlCol="0">
-              <a:spAutoFit/>
-            </a:bodyPr>
-            <a:lstStyle/>
-            <a:p>
-              <a:r>
-                <a:rPr lang="en-US" sz="1200" dirty="0">
-                  <a:solidFill>
-                    <a:schemeClr val="accent6">
-                      <a:lumMod val="75000"/>
-                    </a:schemeClr>
-                  </a:solidFill>
-                </a:rPr>
-                <a:t>Glob Filter</a:t>
-              </a:r>
-              <a:endParaRPr lang="en-SG" sz="1200" dirty="0">
-                <a:solidFill>
-                  <a:schemeClr val="accent6">
-                    <a:lumMod val="75000"/>
-                  </a:schemeClr>
-                </a:solidFill>
-              </a:endParaRPr>
-            </a:p>
-          </p:txBody>
-        </p:sp>
-        <p:sp>
-          <p:nvSpPr>
-            <p:cNvPr id="50" name="Rectangle 49">
-              <a:extLst>
-                <a:ext uri="{FF2B5EF4-FFF2-40B4-BE49-F238E27FC236}">
-                  <a16:creationId xmlns:a16="http://schemas.microsoft.com/office/drawing/2014/main" id="{66E4832A-82B6-4ACE-88A2-1FC6DCF2CED8}"/>
-                </a:ext>
-              </a:extLst>
-            </p:cNvPr>
-            <p:cNvSpPr/>
-            <p:nvPr/>
-          </p:nvSpPr>
-          <p:spPr>
-            <a:xfrm>
-              <a:off x="6202680" y="1861062"/>
-              <a:ext cx="2151751" cy="276999"/>
-            </a:xfrm>
-            <a:prstGeom prst="rect">
-              <a:avLst/>
-            </a:prstGeom>
-            <a:noFill/>
-            <a:ln w="19050" cap="flat" cmpd="sng" algn="ctr">
               <a:solidFill>
                 <a:schemeClr val="accent6"/>
               </a:solidFill>
@@ -5136,175 +5312,10 @@
           </p:txBody>
         </p:sp>
       </p:grpSp>
-      <p:grpSp>
-        <p:nvGrpSpPr>
-          <p:cNvPr id="45" name="Group 44">
-            <a:extLst>
-              <a:ext uri="{FF2B5EF4-FFF2-40B4-BE49-F238E27FC236}">
-                <a16:creationId xmlns:a16="http://schemas.microsoft.com/office/drawing/2014/main" id="{BA9B9247-4484-4646-8644-07DCE3660A2C}"/>
-              </a:ext>
-            </a:extLst>
-          </p:cNvPr>
-          <p:cNvGrpSpPr/>
-          <p:nvPr/>
-        </p:nvGrpSpPr>
-        <p:grpSpPr>
-          <a:xfrm>
-            <a:off x="2888422" y="3630692"/>
-            <a:ext cx="1674876" cy="291016"/>
-            <a:chOff x="2943039" y="3682075"/>
-            <a:chExt cx="1674876" cy="246221"/>
-          </a:xfrm>
-        </p:grpSpPr>
-        <p:sp>
-          <p:nvSpPr>
-            <p:cNvPr id="41" name="Oval 40">
-              <a:extLst>
-                <a:ext uri="{FF2B5EF4-FFF2-40B4-BE49-F238E27FC236}">
-                  <a16:creationId xmlns:a16="http://schemas.microsoft.com/office/drawing/2014/main" id="{6880A5AA-24C1-43E2-8DFB-1B2950E077F8}"/>
-                </a:ext>
-              </a:extLst>
-            </p:cNvPr>
-            <p:cNvSpPr/>
-            <p:nvPr/>
-          </p:nvSpPr>
-          <p:spPr>
-            <a:xfrm>
-              <a:off x="2943039" y="3747521"/>
-              <a:ext cx="121920" cy="155835"/>
-            </a:xfrm>
-            <a:prstGeom prst="ellipse">
-              <a:avLst/>
-            </a:prstGeom>
-            <a:noFill/>
-            <a:ln w="9525" cap="flat" cmpd="sng" algn="ctr">
-              <a:solidFill>
-                <a:schemeClr val="accent1"/>
-              </a:solidFill>
-              <a:prstDash val="solid"/>
-              <a:round/>
-              <a:headEnd type="none" w="med" len="med"/>
-              <a:tailEnd type="none" w="med" len="med"/>
-            </a:ln>
-          </p:spPr>
-          <p:style>
-            <a:lnRef idx="0">
-              <a:scrgbClr r="0" g="0" b="0"/>
-            </a:lnRef>
-            <a:fillRef idx="0">
-              <a:scrgbClr r="0" g="0" b="0"/>
-            </a:fillRef>
-            <a:effectRef idx="0">
-              <a:scrgbClr r="0" g="0" b="0"/>
-            </a:effectRef>
-            <a:fontRef idx="minor">
-              <a:schemeClr val="accent1"/>
-            </a:fontRef>
-          </p:style>
-          <p:txBody>
-            <a:bodyPr rtlCol="0" anchor="ctr"/>
-            <a:lstStyle/>
-            <a:p>
-              <a:pPr algn="ctr"/>
-              <a:endParaRPr lang="en-SG"/>
-            </a:p>
-          </p:txBody>
-        </p:sp>
-        <p:sp>
-          <p:nvSpPr>
-            <p:cNvPr id="43" name="Arrow: Right 42">
-              <a:extLst>
-                <a:ext uri="{FF2B5EF4-FFF2-40B4-BE49-F238E27FC236}">
-                  <a16:creationId xmlns:a16="http://schemas.microsoft.com/office/drawing/2014/main" id="{EF37E420-EADC-4F88-A44F-E20C33AD8985}"/>
-                </a:ext>
-              </a:extLst>
-            </p:cNvPr>
-            <p:cNvSpPr/>
-            <p:nvPr/>
-          </p:nvSpPr>
-          <p:spPr>
-            <a:xfrm>
-              <a:off x="3120106" y="3768558"/>
-              <a:ext cx="147081" cy="96793"/>
-            </a:xfrm>
-            <a:prstGeom prst="rightArrow">
-              <a:avLst/>
-            </a:prstGeom>
-          </p:spPr>
-          <p:style>
-            <a:lnRef idx="2">
-              <a:schemeClr val="accent1">
-                <a:shade val="50000"/>
-              </a:schemeClr>
-            </a:lnRef>
-            <a:fillRef idx="1">
-              <a:schemeClr val="accent1"/>
-            </a:fillRef>
-            <a:effectRef idx="0">
-              <a:schemeClr val="accent1"/>
-            </a:effectRef>
-            <a:fontRef idx="minor">
-              <a:schemeClr val="lt1"/>
-            </a:fontRef>
-          </p:style>
-          <p:txBody>
-            <a:bodyPr rtlCol="0" anchor="ctr"/>
-            <a:lstStyle/>
-            <a:p>
-              <a:pPr algn="ctr"/>
-              <a:endParaRPr lang="en-SG"/>
-            </a:p>
-          </p:txBody>
-        </p:sp>
-        <p:sp>
-          <p:nvSpPr>
-            <p:cNvPr id="52" name="TextBox 51">
-              <a:extLst>
-                <a:ext uri="{FF2B5EF4-FFF2-40B4-BE49-F238E27FC236}">
-                  <a16:creationId xmlns:a16="http://schemas.microsoft.com/office/drawing/2014/main" id="{20B2E512-146C-44A7-8F30-D1175B798E6B}"/>
-                </a:ext>
-              </a:extLst>
-            </p:cNvPr>
-            <p:cNvSpPr txBox="1"/>
-            <p:nvPr/>
-          </p:nvSpPr>
-          <p:spPr>
-            <a:xfrm>
-              <a:off x="3217740" y="3682075"/>
-              <a:ext cx="1400175" cy="246221"/>
-            </a:xfrm>
-            <a:prstGeom prst="rect">
-              <a:avLst/>
-            </a:prstGeom>
-            <a:noFill/>
-          </p:spPr>
-          <p:txBody>
-            <a:bodyPr wrap="square" rtlCol="0">
-              <a:spAutoFit/>
-            </a:bodyPr>
-            <a:lstStyle/>
-            <a:p>
-              <a:r>
-                <a:rPr lang="en-US" sz="1000" dirty="0">
-                  <a:solidFill>
-                    <a:schemeClr val="accent1"/>
-                  </a:solidFill>
-                </a:rPr>
-                <a:t>Link to commits panel</a:t>
-              </a:r>
-              <a:endParaRPr lang="en-SG" sz="1000" dirty="0">
-                <a:solidFill>
-                  <a:schemeClr val="accent1"/>
-                </a:solidFill>
-              </a:endParaRPr>
-            </a:p>
-          </p:txBody>
-        </p:sp>
-      </p:grpSp>
     </p:spTree>
     <p:extLst>
       <p:ext uri="{BB962C8B-B14F-4D97-AF65-F5344CB8AC3E}">
-        <p14:creationId xmlns:p14="http://schemas.microsoft.com/office/powerpoint/2010/main" val="121365696"/>
+        <p14:creationId xmlns:p14="http://schemas.microsoft.com/office/powerpoint/2010/main" val="3109031595"/>
       </p:ext>
     </p:extLst>
   </p:cSld>

</xml_diff>

<commit_message>
Fix errors in report-features image
</commit_message>
<xml_diff>
--- a/docs/diagrams/report-features.pptx
+++ b/docs/diagrams/report-features.pptx
@@ -261,7 +261,7 @@
           <a:p>
             <a:fld id="{BC643CBC-B76F-46AA-8129-8C84DB44B84D}" type="datetimeFigureOut">
               <a:rPr lang="en-SG" smtClean="0"/>
-              <a:t>23/4/20</a:t>
+              <a:t>9/5/20</a:t>
             </a:fld>
             <a:endParaRPr lang="en-SG"/>
           </a:p>
@@ -461,7 +461,7 @@
           <a:p>
             <a:fld id="{BC643CBC-B76F-46AA-8129-8C84DB44B84D}" type="datetimeFigureOut">
               <a:rPr lang="en-SG" smtClean="0"/>
-              <a:t>23/4/20</a:t>
+              <a:t>9/5/20</a:t>
             </a:fld>
             <a:endParaRPr lang="en-SG"/>
           </a:p>
@@ -671,7 +671,7 @@
           <a:p>
             <a:fld id="{BC643CBC-B76F-46AA-8129-8C84DB44B84D}" type="datetimeFigureOut">
               <a:rPr lang="en-SG" smtClean="0"/>
-              <a:t>23/4/20</a:t>
+              <a:t>9/5/20</a:t>
             </a:fld>
             <a:endParaRPr lang="en-SG"/>
           </a:p>
@@ -871,7 +871,7 @@
           <a:p>
             <a:fld id="{BC643CBC-B76F-46AA-8129-8C84DB44B84D}" type="datetimeFigureOut">
               <a:rPr lang="en-SG" smtClean="0"/>
-              <a:t>23/4/20</a:t>
+              <a:t>9/5/20</a:t>
             </a:fld>
             <a:endParaRPr lang="en-SG"/>
           </a:p>
@@ -1147,7 +1147,7 @@
           <a:p>
             <a:fld id="{BC643CBC-B76F-46AA-8129-8C84DB44B84D}" type="datetimeFigureOut">
               <a:rPr lang="en-SG" smtClean="0"/>
-              <a:t>23/4/20</a:t>
+              <a:t>9/5/20</a:t>
             </a:fld>
             <a:endParaRPr lang="en-SG"/>
           </a:p>
@@ -1415,7 +1415,7 @@
           <a:p>
             <a:fld id="{BC643CBC-B76F-46AA-8129-8C84DB44B84D}" type="datetimeFigureOut">
               <a:rPr lang="en-SG" smtClean="0"/>
-              <a:t>23/4/20</a:t>
+              <a:t>9/5/20</a:t>
             </a:fld>
             <a:endParaRPr lang="en-SG"/>
           </a:p>
@@ -1830,7 +1830,7 @@
           <a:p>
             <a:fld id="{BC643CBC-B76F-46AA-8129-8C84DB44B84D}" type="datetimeFigureOut">
               <a:rPr lang="en-SG" smtClean="0"/>
-              <a:t>23/4/20</a:t>
+              <a:t>9/5/20</a:t>
             </a:fld>
             <a:endParaRPr lang="en-SG"/>
           </a:p>
@@ -1972,7 +1972,7 @@
           <a:p>
             <a:fld id="{BC643CBC-B76F-46AA-8129-8C84DB44B84D}" type="datetimeFigureOut">
               <a:rPr lang="en-SG" smtClean="0"/>
-              <a:t>23/4/20</a:t>
+              <a:t>9/5/20</a:t>
             </a:fld>
             <a:endParaRPr lang="en-SG"/>
           </a:p>
@@ -2085,7 +2085,7 @@
           <a:p>
             <a:fld id="{BC643CBC-B76F-46AA-8129-8C84DB44B84D}" type="datetimeFigureOut">
               <a:rPr lang="en-SG" smtClean="0"/>
-              <a:t>23/4/20</a:t>
+              <a:t>9/5/20</a:t>
             </a:fld>
             <a:endParaRPr lang="en-SG"/>
           </a:p>
@@ -2398,7 +2398,7 @@
           <a:p>
             <a:fld id="{BC643CBC-B76F-46AA-8129-8C84DB44B84D}" type="datetimeFigureOut">
               <a:rPr lang="en-SG" smtClean="0"/>
-              <a:t>23/4/20</a:t>
+              <a:t>9/5/20</a:t>
             </a:fld>
             <a:endParaRPr lang="en-SG"/>
           </a:p>
@@ -2687,7 +2687,7 @@
           <a:p>
             <a:fld id="{BC643CBC-B76F-46AA-8129-8C84DB44B84D}" type="datetimeFigureOut">
               <a:rPr lang="en-SG" smtClean="0"/>
-              <a:t>23/4/20</a:t>
+              <a:t>9/5/20</a:t>
             </a:fld>
             <a:endParaRPr lang="en-SG"/>
           </a:p>
@@ -2930,7 +2930,7 @@
           <a:p>
             <a:fld id="{BC643CBC-B76F-46AA-8129-8C84DB44B84D}" type="datetimeFigureOut">
               <a:rPr lang="en-SG" smtClean="0"/>
-              <a:t>23/4/20</a:t>
+              <a:t>9/5/20</a:t>
             </a:fld>
             <a:endParaRPr lang="en-SG"/>
           </a:p>
@@ -3688,10 +3688,10 @@
         </p:nvGrpSpPr>
         <p:grpSpPr>
           <a:xfrm>
-            <a:off x="2953782" y="4551250"/>
-            <a:ext cx="1672681" cy="291016"/>
+            <a:off x="2953782" y="4551257"/>
+            <a:ext cx="1913291" cy="254087"/>
             <a:chOff x="2945234" y="3682075"/>
-            <a:chExt cx="1672681" cy="246221"/>
+            <a:chExt cx="1913291" cy="214976"/>
           </a:xfrm>
         </p:grpSpPr>
         <p:sp>
@@ -3809,7 +3809,7 @@
           <p:spPr>
             <a:xfrm>
               <a:off x="3217740" y="3682075"/>
-              <a:ext cx="1400175" cy="246221"/>
+              <a:ext cx="1640785" cy="208321"/>
             </a:xfrm>
             <a:prstGeom prst="rect">
               <a:avLst/>
@@ -3854,9 +3854,9 @@
         <p:grpSpPr>
           <a:xfrm>
             <a:off x="2913284" y="3205969"/>
-            <a:ext cx="2165611" cy="263574"/>
+            <a:ext cx="2606672" cy="263574"/>
             <a:chOff x="2230032" y="2870443"/>
-            <a:chExt cx="2165611" cy="263574"/>
+            <a:chExt cx="2606672" cy="263574"/>
           </a:xfrm>
         </p:grpSpPr>
         <p:sp>
@@ -3983,7 +3983,7 @@
           <p:spPr>
             <a:xfrm>
               <a:off x="2493500" y="2870443"/>
-              <a:ext cx="1902143" cy="246221"/>
+              <a:ext cx="2343204" cy="246221"/>
             </a:xfrm>
             <a:prstGeom prst="rect">
               <a:avLst/>
@@ -5584,6 +5584,175 @@
           </p:txBody>
         </p:sp>
       </p:grpSp>
+      <p:sp>
+        <p:nvSpPr>
+          <p:cNvPr id="60" name="Oval 59">
+            <a:extLst>
+              <a:ext uri="{FF2B5EF4-FFF2-40B4-BE49-F238E27FC236}">
+                <a16:creationId xmlns:a16="http://schemas.microsoft.com/office/drawing/2014/main" id="{83841894-E3CA-EB43-8F34-D5E1B9E4D403}"/>
+              </a:ext>
+            </a:extLst>
+          </p:cNvPr>
+          <p:cNvSpPr/>
+          <p:nvPr/>
+        </p:nvSpPr>
+        <p:spPr>
+          <a:xfrm>
+            <a:off x="3405955" y="3138233"/>
+            <a:ext cx="147081" cy="143858"/>
+          </a:xfrm>
+          <a:prstGeom prst="ellipse">
+            <a:avLst/>
+          </a:prstGeom>
+          <a:noFill/>
+          <a:ln w="9525" cap="flat" cmpd="sng" algn="ctr">
+            <a:solidFill>
+              <a:schemeClr val="accent1"/>
+            </a:solidFill>
+            <a:prstDash val="solid"/>
+            <a:round/>
+            <a:headEnd type="none" w="med" len="med"/>
+            <a:tailEnd type="none" w="med" len="med"/>
+          </a:ln>
+        </p:spPr>
+        <p:style>
+          <a:lnRef idx="0">
+            <a:scrgbClr r="0" g="0" b="0"/>
+          </a:lnRef>
+          <a:fillRef idx="0">
+            <a:scrgbClr r="0" g="0" b="0"/>
+          </a:fillRef>
+          <a:effectRef idx="0">
+            <a:scrgbClr r="0" g="0" b="0"/>
+          </a:effectRef>
+          <a:fontRef idx="minor">
+            <a:schemeClr val="accent1"/>
+          </a:fontRef>
+        </p:style>
+        <p:txBody>
+          <a:bodyPr rtlCol="0" anchor="ctr"/>
+          <a:lstStyle/>
+          <a:p>
+            <a:pPr algn="ctr"/>
+            <a:endParaRPr lang="en-SG"/>
+          </a:p>
+        </p:txBody>
+      </p:sp>
+      <p:sp>
+        <p:nvSpPr>
+          <p:cNvPr id="61" name="Arrow: Right 26">
+            <a:extLst>
+              <a:ext uri="{FF2B5EF4-FFF2-40B4-BE49-F238E27FC236}">
+                <a16:creationId xmlns:a16="http://schemas.microsoft.com/office/drawing/2014/main" id="{2FEE036E-9ED7-0446-BEDE-DB6E04BF8324}"/>
+              </a:ext>
+            </a:extLst>
+          </p:cNvPr>
+          <p:cNvSpPr/>
+          <p:nvPr/>
+        </p:nvSpPr>
+        <p:spPr>
+          <a:xfrm rot="12225628">
+            <a:off x="3242639" y="3093964"/>
+            <a:ext cx="142378" cy="66676"/>
+          </a:xfrm>
+          <a:prstGeom prst="rightArrow">
+            <a:avLst/>
+          </a:prstGeom>
+          <a:solidFill>
+            <a:schemeClr val="accent1"/>
+          </a:solidFill>
+          <a:ln>
+            <a:solidFill>
+              <a:srgbClr val="002060"/>
+            </a:solidFill>
+          </a:ln>
+        </p:spPr>
+        <p:style>
+          <a:lnRef idx="2">
+            <a:schemeClr val="accent2">
+              <a:shade val="50000"/>
+            </a:schemeClr>
+          </a:lnRef>
+          <a:fillRef idx="1">
+            <a:schemeClr val="accent2"/>
+          </a:fillRef>
+          <a:effectRef idx="0">
+            <a:schemeClr val="accent2"/>
+          </a:effectRef>
+          <a:fontRef idx="minor">
+            <a:schemeClr val="lt1"/>
+          </a:fontRef>
+        </p:style>
+        <p:txBody>
+          <a:bodyPr rtlCol="0" anchor="ctr"/>
+          <a:lstStyle/>
+          <a:p>
+            <a:pPr algn="ctr"/>
+            <a:endParaRPr lang="en-SG"/>
+          </a:p>
+        </p:txBody>
+      </p:sp>
+      <p:sp>
+        <p:nvSpPr>
+          <p:cNvPr id="62" name="TextBox 61">
+            <a:extLst>
+              <a:ext uri="{FF2B5EF4-FFF2-40B4-BE49-F238E27FC236}">
+                <a16:creationId xmlns:a16="http://schemas.microsoft.com/office/drawing/2014/main" id="{D7EDCE94-CB52-7E4E-9F7B-09618674F44D}"/>
+              </a:ext>
+            </a:extLst>
+          </p:cNvPr>
+          <p:cNvSpPr txBox="1"/>
+          <p:nvPr/>
+        </p:nvSpPr>
+        <p:spPr>
+          <a:xfrm>
+            <a:off x="1643150" y="2954822"/>
+            <a:ext cx="1640785" cy="246221"/>
+          </a:xfrm>
+          <a:prstGeom prst="rect">
+            <a:avLst/>
+          </a:prstGeom>
+          <a:noFill/>
+        </p:spPr>
+        <p:txBody>
+          <a:bodyPr wrap="square" rtlCol="0">
+            <a:spAutoFit/>
+          </a:bodyPr>
+          <a:lstStyle/>
+          <a:p>
+            <a:pPr algn="r"/>
+            <a:r>
+              <a:rPr lang="en-US" sz="1000" dirty="0">
+                <a:solidFill>
+                  <a:schemeClr val="accent1"/>
+                </a:solidFill>
+              </a:rPr>
+              <a:t>Merge</a:t>
+            </a:r>
+            <a:r>
+              <a:rPr lang="zh-CN" altLang="en-US" sz="1000" dirty="0">
+                <a:solidFill>
+                  <a:schemeClr val="accent1"/>
+                </a:solidFill>
+              </a:rPr>
+              <a:t> </a:t>
+            </a:r>
+            <a:r>
+              <a:rPr lang="en-US" altLang="zh-CN" sz="1000" dirty="0">
+                <a:solidFill>
+                  <a:schemeClr val="accent1"/>
+                </a:solidFill>
+              </a:rPr>
+              <a:t>group</a:t>
+            </a:r>
+            <a:endParaRPr lang="en-SG" sz="1000" dirty="0">
+              <a:solidFill>
+                <a:schemeClr val="accent1"/>
+              </a:solidFill>
+            </a:endParaRPr>
+          </a:p>
+        </p:txBody>
+      </p:sp>
     </p:spTree>
     <p:extLst>
       <p:ext uri="{BB962C8B-B14F-4D97-AF65-F5344CB8AC3E}">

</xml_diff>

<commit_message>
[#1221] Allow merging of individual groups (#1223)
Currently the `merge group` checkbox only supports merging/expanding all 
groups. 

It is inconvenient for users who want to have an overview across all 
repos first, then take a detailed look within a particular group, because
there is a need to relocate the group on the page after expanding all 
groups. This is especially the case when there are many authors and repos
on the dashboard.

Let's add the feature to allow merging/expanding individual groups 
instead.
</commit_message>
<xml_diff>
--- a/docs/diagrams/report-features.pptx
+++ b/docs/diagrams/report-features.pptx
@@ -261,7 +261,7 @@
           <a:p>
             <a:fld id="{BC643CBC-B76F-46AA-8129-8C84DB44B84D}" type="datetimeFigureOut">
               <a:rPr lang="en-SG" smtClean="0"/>
-              <a:t>18/3/20</a:t>
+              <a:t>9/5/20</a:t>
             </a:fld>
             <a:endParaRPr lang="en-SG"/>
           </a:p>
@@ -461,7 +461,7 @@
           <a:p>
             <a:fld id="{BC643CBC-B76F-46AA-8129-8C84DB44B84D}" type="datetimeFigureOut">
               <a:rPr lang="en-SG" smtClean="0"/>
-              <a:t>18/3/20</a:t>
+              <a:t>9/5/20</a:t>
             </a:fld>
             <a:endParaRPr lang="en-SG"/>
           </a:p>
@@ -671,7 +671,7 @@
           <a:p>
             <a:fld id="{BC643CBC-B76F-46AA-8129-8C84DB44B84D}" type="datetimeFigureOut">
               <a:rPr lang="en-SG" smtClean="0"/>
-              <a:t>18/3/20</a:t>
+              <a:t>9/5/20</a:t>
             </a:fld>
             <a:endParaRPr lang="en-SG"/>
           </a:p>
@@ -871,7 +871,7 @@
           <a:p>
             <a:fld id="{BC643CBC-B76F-46AA-8129-8C84DB44B84D}" type="datetimeFigureOut">
               <a:rPr lang="en-SG" smtClean="0"/>
-              <a:t>18/3/20</a:t>
+              <a:t>9/5/20</a:t>
             </a:fld>
             <a:endParaRPr lang="en-SG"/>
           </a:p>
@@ -1147,7 +1147,7 @@
           <a:p>
             <a:fld id="{BC643CBC-B76F-46AA-8129-8C84DB44B84D}" type="datetimeFigureOut">
               <a:rPr lang="en-SG" smtClean="0"/>
-              <a:t>18/3/20</a:t>
+              <a:t>9/5/20</a:t>
             </a:fld>
             <a:endParaRPr lang="en-SG"/>
           </a:p>
@@ -1415,7 +1415,7 @@
           <a:p>
             <a:fld id="{BC643CBC-B76F-46AA-8129-8C84DB44B84D}" type="datetimeFigureOut">
               <a:rPr lang="en-SG" smtClean="0"/>
-              <a:t>18/3/20</a:t>
+              <a:t>9/5/20</a:t>
             </a:fld>
             <a:endParaRPr lang="en-SG"/>
           </a:p>
@@ -1830,7 +1830,7 @@
           <a:p>
             <a:fld id="{BC643CBC-B76F-46AA-8129-8C84DB44B84D}" type="datetimeFigureOut">
               <a:rPr lang="en-SG" smtClean="0"/>
-              <a:t>18/3/20</a:t>
+              <a:t>9/5/20</a:t>
             </a:fld>
             <a:endParaRPr lang="en-SG"/>
           </a:p>
@@ -1972,7 +1972,7 @@
           <a:p>
             <a:fld id="{BC643CBC-B76F-46AA-8129-8C84DB44B84D}" type="datetimeFigureOut">
               <a:rPr lang="en-SG" smtClean="0"/>
-              <a:t>18/3/20</a:t>
+              <a:t>9/5/20</a:t>
             </a:fld>
             <a:endParaRPr lang="en-SG"/>
           </a:p>
@@ -2085,7 +2085,7 @@
           <a:p>
             <a:fld id="{BC643CBC-B76F-46AA-8129-8C84DB44B84D}" type="datetimeFigureOut">
               <a:rPr lang="en-SG" smtClean="0"/>
-              <a:t>18/3/20</a:t>
+              <a:t>9/5/20</a:t>
             </a:fld>
             <a:endParaRPr lang="en-SG"/>
           </a:p>
@@ -2398,7 +2398,7 @@
           <a:p>
             <a:fld id="{BC643CBC-B76F-46AA-8129-8C84DB44B84D}" type="datetimeFigureOut">
               <a:rPr lang="en-SG" smtClean="0"/>
-              <a:t>18/3/20</a:t>
+              <a:t>9/5/20</a:t>
             </a:fld>
             <a:endParaRPr lang="en-SG"/>
           </a:p>
@@ -2687,7 +2687,7 @@
           <a:p>
             <a:fld id="{BC643CBC-B76F-46AA-8129-8C84DB44B84D}" type="datetimeFigureOut">
               <a:rPr lang="en-SG" smtClean="0"/>
-              <a:t>18/3/20</a:t>
+              <a:t>9/5/20</a:t>
             </a:fld>
             <a:endParaRPr lang="en-SG"/>
           </a:p>
@@ -2930,7 +2930,7 @@
           <a:p>
             <a:fld id="{BC643CBC-B76F-46AA-8129-8C84DB44B84D}" type="datetimeFigureOut">
               <a:rPr lang="en-SG" smtClean="0"/>
-              <a:t>18/3/20</a:t>
+              <a:t>9/5/20</a:t>
             </a:fld>
             <a:endParaRPr lang="en-SG"/>
           </a:p>
@@ -3357,7 +3357,7 @@
       </p:grpSpPr>
       <p:pic>
         <p:nvPicPr>
-          <p:cNvPr id="5" name="Picture 4" descr="A screenshot of a social media post&#10;&#10;Description automatically generated">
+          <p:cNvPr id="5" name="Picture 4">
             <a:extLst>
               <a:ext uri="{FF2B5EF4-FFF2-40B4-BE49-F238E27FC236}">
                 <a16:creationId xmlns:a16="http://schemas.microsoft.com/office/drawing/2014/main" id="{B4E5294F-444B-4447-B9AA-FA88D06B7743}"/>
@@ -3377,14 +3377,13 @@
               </a:ext>
             </a:extLst>
           </a:blip>
-          <a:stretch>
-            <a:fillRect/>
-          </a:stretch>
+          <a:srcRect/>
+          <a:stretch/>
         </p:blipFill>
         <p:spPr>
           <a:xfrm>
-            <a:off x="1187572" y="643466"/>
-            <a:ext cx="9813566" cy="5569200"/>
+            <a:off x="1187572" y="665843"/>
+            <a:ext cx="9813566" cy="5524446"/>
           </a:xfrm>
           <a:prstGeom prst="rect">
             <a:avLst/>
@@ -3405,10 +3404,10 @@
         </p:nvGrpSpPr>
         <p:grpSpPr>
           <a:xfrm>
-            <a:off x="3604583" y="5552602"/>
-            <a:ext cx="1019826" cy="623120"/>
-            <a:chOff x="3946269" y="5051399"/>
-            <a:chExt cx="1019826" cy="623120"/>
+            <a:off x="3176752" y="5197952"/>
+            <a:ext cx="1019826" cy="585020"/>
+            <a:chOff x="3946269" y="5089499"/>
+            <a:chExt cx="1019826" cy="585020"/>
           </a:xfrm>
         </p:grpSpPr>
         <p:sp>
@@ -3425,7 +3424,7 @@
           </p:nvSpPr>
           <p:spPr>
             <a:xfrm>
-              <a:off x="3946269" y="5051399"/>
+              <a:off x="3946269" y="5089499"/>
               <a:ext cx="1019826" cy="276999"/>
             </a:xfrm>
             <a:prstGeom prst="rect">
@@ -3524,7 +3523,7 @@
         </p:nvGrpSpPr>
         <p:grpSpPr>
           <a:xfrm>
-            <a:off x="3048219" y="3723003"/>
+            <a:off x="3551139" y="3048633"/>
             <a:ext cx="1695743" cy="246221"/>
             <a:chOff x="2464522" y="2361561"/>
             <a:chExt cx="1695743" cy="246221"/>
@@ -3689,10 +3688,10 @@
         </p:nvGrpSpPr>
         <p:grpSpPr>
           <a:xfrm>
-            <a:off x="2942352" y="4322650"/>
-            <a:ext cx="1672681" cy="291016"/>
+            <a:off x="2953782" y="4551257"/>
+            <a:ext cx="1913291" cy="254087"/>
             <a:chOff x="2945234" y="3682075"/>
-            <a:chExt cx="1672681" cy="246221"/>
+            <a:chExt cx="1913291" cy="214976"/>
           </a:xfrm>
         </p:grpSpPr>
         <p:sp>
@@ -3810,7 +3809,7 @@
           <p:spPr>
             <a:xfrm>
               <a:off x="3217740" y="3682075"/>
-              <a:ext cx="1400175" cy="246221"/>
+              <a:ext cx="1640785" cy="208321"/>
             </a:xfrm>
             <a:prstGeom prst="rect">
               <a:avLst/>
@@ -3854,10 +3853,10 @@
         </p:nvGrpSpPr>
         <p:grpSpPr>
           <a:xfrm>
-            <a:off x="2753264" y="3023089"/>
-            <a:ext cx="2165611" cy="263574"/>
+            <a:off x="2913284" y="3205969"/>
+            <a:ext cx="2606672" cy="263574"/>
             <a:chOff x="2230032" y="2870443"/>
-            <a:chExt cx="2165611" cy="263574"/>
+            <a:chExt cx="2606672" cy="263574"/>
           </a:xfrm>
         </p:grpSpPr>
         <p:sp>
@@ -3984,7 +3983,7 @@
           <p:spPr>
             <a:xfrm>
               <a:off x="2493500" y="2870443"/>
-              <a:ext cx="1902143" cy="246221"/>
+              <a:ext cx="2343204" cy="246221"/>
             </a:xfrm>
             <a:prstGeom prst="rect">
               <a:avLst/>
@@ -4016,10 +4015,10 @@
       </p:grpSp>
       <p:grpSp>
         <p:nvGrpSpPr>
-          <p:cNvPr id="22" name="Group 21">
-            <a:extLst>
-              <a:ext uri="{FF2B5EF4-FFF2-40B4-BE49-F238E27FC236}">
-                <a16:creationId xmlns:a16="http://schemas.microsoft.com/office/drawing/2014/main" id="{25A622BC-A5B7-A44A-9C42-676F5FE8C9F9}"/>
+          <p:cNvPr id="26" name="Group 25">
+            <a:extLst>
+              <a:ext uri="{FF2B5EF4-FFF2-40B4-BE49-F238E27FC236}">
+                <a16:creationId xmlns:a16="http://schemas.microsoft.com/office/drawing/2014/main" id="{DEF0A00E-6934-F848-A76D-E0C0910D196B}"/>
               </a:ext>
             </a:extLst>
           </p:cNvPr>
@@ -4028,119 +4027,7 @@
         </p:nvGrpSpPr>
         <p:grpSpPr>
           <a:xfrm>
-            <a:off x="118577" y="4640643"/>
-            <a:ext cx="5959559" cy="461665"/>
-            <a:chOff x="731728" y="3629956"/>
-            <a:chExt cx="5399128" cy="461665"/>
-          </a:xfrm>
-        </p:grpSpPr>
-        <p:sp>
-          <p:nvSpPr>
-            <p:cNvPr id="23" name="Rectangle 22">
-              <a:extLst>
-                <a:ext uri="{FF2B5EF4-FFF2-40B4-BE49-F238E27FC236}">
-                  <a16:creationId xmlns:a16="http://schemas.microsoft.com/office/drawing/2014/main" id="{B564F8AB-86E1-AE47-8AEE-A391EE3A595A}"/>
-                </a:ext>
-              </a:extLst>
-            </p:cNvPr>
-            <p:cNvSpPr/>
-            <p:nvPr/>
-          </p:nvSpPr>
-          <p:spPr>
-            <a:xfrm>
-              <a:off x="1803254" y="3860789"/>
-              <a:ext cx="4327602" cy="119555"/>
-            </a:xfrm>
-            <a:prstGeom prst="rect">
-              <a:avLst/>
-            </a:prstGeom>
-            <a:noFill/>
-            <a:ln w="9525" cap="flat" cmpd="sng" algn="ctr">
-              <a:solidFill>
-                <a:schemeClr val="dk1"/>
-              </a:solidFill>
-              <a:prstDash val="solid"/>
-              <a:round/>
-              <a:headEnd type="none" w="med" len="med"/>
-              <a:tailEnd type="none" w="med" len="med"/>
-            </a:ln>
-          </p:spPr>
-          <p:style>
-            <a:lnRef idx="0">
-              <a:scrgbClr r="0" g="0" b="0"/>
-            </a:lnRef>
-            <a:fillRef idx="0">
-              <a:scrgbClr r="0" g="0" b="0"/>
-            </a:fillRef>
-            <a:effectRef idx="0">
-              <a:scrgbClr r="0" g="0" b="0"/>
-            </a:effectRef>
-            <a:fontRef idx="minor">
-              <a:schemeClr val="dk1"/>
-            </a:fontRef>
-          </p:style>
-          <p:txBody>
-            <a:bodyPr rtlCol="0" anchor="ctr"/>
-            <a:lstStyle/>
-            <a:p>
-              <a:pPr algn="ctr"/>
-              <a:endParaRPr lang="en-SG"/>
-            </a:p>
-          </p:txBody>
-        </p:sp>
-        <p:sp>
-          <p:nvSpPr>
-            <p:cNvPr id="25" name="TextBox 24">
-              <a:extLst>
-                <a:ext uri="{FF2B5EF4-FFF2-40B4-BE49-F238E27FC236}">
-                  <a16:creationId xmlns:a16="http://schemas.microsoft.com/office/drawing/2014/main" id="{C8343F1E-8844-E749-B305-01B53FD52B56}"/>
-                </a:ext>
-              </a:extLst>
-            </p:cNvPr>
-            <p:cNvSpPr txBox="1"/>
-            <p:nvPr/>
-          </p:nvSpPr>
-          <p:spPr>
-            <a:xfrm>
-              <a:off x="731728" y="3629956"/>
-              <a:ext cx="1014711" cy="461665"/>
-            </a:xfrm>
-            <a:prstGeom prst="rect">
-              <a:avLst/>
-            </a:prstGeom>
-            <a:noFill/>
-          </p:spPr>
-          <p:txBody>
-            <a:bodyPr wrap="square" rtlCol="0">
-              <a:spAutoFit/>
-            </a:bodyPr>
-            <a:lstStyle/>
-            <a:p>
-              <a:pPr algn="ctr"/>
-              <a:r>
-                <a:rPr lang="en-US" sz="1200" dirty="0"/>
-                <a:t>Contribution Bar</a:t>
-              </a:r>
-              <a:endParaRPr lang="en-SG" sz="1200" dirty="0"/>
-            </a:p>
-          </p:txBody>
-        </p:sp>
-      </p:grpSp>
-      <p:grpSp>
-        <p:nvGrpSpPr>
-          <p:cNvPr id="26" name="Group 25">
-            <a:extLst>
-              <a:ext uri="{FF2B5EF4-FFF2-40B4-BE49-F238E27FC236}">
-                <a16:creationId xmlns:a16="http://schemas.microsoft.com/office/drawing/2014/main" id="{DEF0A00E-6934-F848-A76D-E0C0910D196B}"/>
-              </a:ext>
-            </a:extLst>
-          </p:cNvPr>
-          <p:cNvGrpSpPr/>
-          <p:nvPr/>
-        </p:nvGrpSpPr>
-        <p:grpSpPr>
-          <a:xfrm>
-            <a:off x="189682" y="3246565"/>
+            <a:off x="189682" y="3429445"/>
             <a:ext cx="5752649" cy="530943"/>
             <a:chOff x="778195" y="2021953"/>
             <a:chExt cx="5209217" cy="461665"/>
@@ -4307,7 +4194,7 @@
         </p:nvGrpSpPr>
         <p:grpSpPr>
           <a:xfrm>
-            <a:off x="6509832" y="1982345"/>
+            <a:off x="6509832" y="2029970"/>
             <a:ext cx="3424155" cy="402234"/>
             <a:chOff x="6202680" y="1735827"/>
             <a:chExt cx="3424155" cy="402234"/>
@@ -4476,7 +4363,7 @@
         </p:nvGrpSpPr>
         <p:grpSpPr>
           <a:xfrm>
-            <a:off x="9567334" y="3299134"/>
+            <a:off x="9414934" y="4232584"/>
             <a:ext cx="1139315" cy="562172"/>
             <a:chOff x="8559185" y="2719565"/>
             <a:chExt cx="1139315" cy="562172"/>
@@ -4641,7 +4528,7 @@
         </p:nvGrpSpPr>
         <p:grpSpPr>
           <a:xfrm>
-            <a:off x="8358978" y="2895216"/>
+            <a:off x="8206578" y="3800091"/>
             <a:ext cx="1252259" cy="404424"/>
             <a:chOff x="7350829" y="3118022"/>
             <a:chExt cx="1252259" cy="404424"/>
@@ -5104,52 +4991,185 @@
           </p:txBody>
         </p:sp>
       </p:grpSp>
-      <p:sp>
-        <p:nvSpPr>
-          <p:cNvPr id="54" name="Arrow: Left 47">
-            <a:extLst>
-              <a:ext uri="{FF2B5EF4-FFF2-40B4-BE49-F238E27FC236}">
-                <a16:creationId xmlns:a16="http://schemas.microsoft.com/office/drawing/2014/main" id="{D08A5AA5-5E30-1B44-B88A-D53EE29DB3F4}"/>
-              </a:ext>
-            </a:extLst>
-          </p:cNvPr>
-          <p:cNvSpPr/>
+      <p:grpSp>
+        <p:nvGrpSpPr>
+          <p:cNvPr id="2" name="Group 1">
+            <a:extLst>
+              <a:ext uri="{FF2B5EF4-FFF2-40B4-BE49-F238E27FC236}">
+                <a16:creationId xmlns:a16="http://schemas.microsoft.com/office/drawing/2014/main" id="{FC32F964-DDAA-8C41-A0F8-5E30AECAEB34}"/>
+              </a:ext>
+            </a:extLst>
+          </p:cNvPr>
+          <p:cNvGrpSpPr/>
           <p:nvPr/>
-        </p:nvSpPr>
-        <p:spPr>
+        </p:nvGrpSpPr>
+        <p:grpSpPr>
           <a:xfrm>
-            <a:off x="969529" y="4892392"/>
-            <a:ext cx="250504" cy="77721"/>
+            <a:off x="118577" y="4869243"/>
+            <a:ext cx="5959559" cy="461665"/>
+            <a:chOff x="118577" y="4640643"/>
+            <a:chExt cx="5959559" cy="461665"/>
           </a:xfrm>
-          <a:prstGeom prst="leftArrow">
-            <a:avLst/>
-          </a:prstGeom>
-        </p:spPr>
-        <p:style>
-          <a:lnRef idx="2">
-            <a:schemeClr val="dk1">
-              <a:shade val="50000"/>
-            </a:schemeClr>
-          </a:lnRef>
-          <a:fillRef idx="1">
-            <a:schemeClr val="dk1"/>
-          </a:fillRef>
-          <a:effectRef idx="0">
-            <a:schemeClr val="dk1"/>
-          </a:effectRef>
-          <a:fontRef idx="minor">
-            <a:schemeClr val="lt1"/>
-          </a:fontRef>
-        </p:style>
-        <p:txBody>
-          <a:bodyPr rtlCol="0" anchor="ctr"/>
-          <a:lstStyle/>
-          <a:p>
-            <a:pPr algn="ctr"/>
-            <a:endParaRPr lang="en-SG"/>
-          </a:p>
-        </p:txBody>
-      </p:sp>
+        </p:grpSpPr>
+        <p:grpSp>
+          <p:nvGrpSpPr>
+            <p:cNvPr id="22" name="Group 21">
+              <a:extLst>
+                <a:ext uri="{FF2B5EF4-FFF2-40B4-BE49-F238E27FC236}">
+                  <a16:creationId xmlns:a16="http://schemas.microsoft.com/office/drawing/2014/main" id="{25A622BC-A5B7-A44A-9C42-676F5FE8C9F9}"/>
+                </a:ext>
+              </a:extLst>
+            </p:cNvPr>
+            <p:cNvGrpSpPr/>
+            <p:nvPr/>
+          </p:nvGrpSpPr>
+          <p:grpSpPr>
+            <a:xfrm>
+              <a:off x="118577" y="4640643"/>
+              <a:ext cx="5959559" cy="461665"/>
+              <a:chOff x="731728" y="3629956"/>
+              <a:chExt cx="5399128" cy="461665"/>
+            </a:xfrm>
+          </p:grpSpPr>
+          <p:sp>
+            <p:nvSpPr>
+              <p:cNvPr id="23" name="Rectangle 22">
+                <a:extLst>
+                  <a:ext uri="{FF2B5EF4-FFF2-40B4-BE49-F238E27FC236}">
+                    <a16:creationId xmlns:a16="http://schemas.microsoft.com/office/drawing/2014/main" id="{B564F8AB-86E1-AE47-8AEE-A391EE3A595A}"/>
+                  </a:ext>
+                </a:extLst>
+              </p:cNvPr>
+              <p:cNvSpPr/>
+              <p:nvPr/>
+            </p:nvSpPr>
+            <p:spPr>
+              <a:xfrm>
+                <a:off x="1803254" y="3860789"/>
+                <a:ext cx="4327602" cy="119555"/>
+              </a:xfrm>
+              <a:prstGeom prst="rect">
+                <a:avLst/>
+              </a:prstGeom>
+              <a:noFill/>
+              <a:ln w="9525" cap="flat" cmpd="sng" algn="ctr">
+                <a:solidFill>
+                  <a:schemeClr val="dk1"/>
+                </a:solidFill>
+                <a:prstDash val="solid"/>
+                <a:round/>
+                <a:headEnd type="none" w="med" len="med"/>
+                <a:tailEnd type="none" w="med" len="med"/>
+              </a:ln>
+            </p:spPr>
+            <p:style>
+              <a:lnRef idx="0">
+                <a:scrgbClr r="0" g="0" b="0"/>
+              </a:lnRef>
+              <a:fillRef idx="0">
+                <a:scrgbClr r="0" g="0" b="0"/>
+              </a:fillRef>
+              <a:effectRef idx="0">
+                <a:scrgbClr r="0" g="0" b="0"/>
+              </a:effectRef>
+              <a:fontRef idx="minor">
+                <a:schemeClr val="dk1"/>
+              </a:fontRef>
+            </p:style>
+            <p:txBody>
+              <a:bodyPr rtlCol="0" anchor="ctr"/>
+              <a:lstStyle/>
+              <a:p>
+                <a:pPr algn="ctr"/>
+                <a:endParaRPr lang="en-SG"/>
+              </a:p>
+            </p:txBody>
+          </p:sp>
+          <p:sp>
+            <p:nvSpPr>
+              <p:cNvPr id="25" name="TextBox 24">
+                <a:extLst>
+                  <a:ext uri="{FF2B5EF4-FFF2-40B4-BE49-F238E27FC236}">
+                    <a16:creationId xmlns:a16="http://schemas.microsoft.com/office/drawing/2014/main" id="{C8343F1E-8844-E749-B305-01B53FD52B56}"/>
+                  </a:ext>
+                </a:extLst>
+              </p:cNvPr>
+              <p:cNvSpPr txBox="1"/>
+              <p:nvPr/>
+            </p:nvSpPr>
+            <p:spPr>
+              <a:xfrm>
+                <a:off x="731728" y="3629956"/>
+                <a:ext cx="1014711" cy="461665"/>
+              </a:xfrm>
+              <a:prstGeom prst="rect">
+                <a:avLst/>
+              </a:prstGeom>
+              <a:noFill/>
+            </p:spPr>
+            <p:txBody>
+              <a:bodyPr wrap="square" rtlCol="0">
+                <a:spAutoFit/>
+              </a:bodyPr>
+              <a:lstStyle/>
+              <a:p>
+                <a:pPr algn="ctr"/>
+                <a:r>
+                  <a:rPr lang="en-US" sz="1200" dirty="0"/>
+                  <a:t>Contribution Bar</a:t>
+                </a:r>
+                <a:endParaRPr lang="en-SG" sz="1200" dirty="0"/>
+              </a:p>
+            </p:txBody>
+          </p:sp>
+        </p:grpSp>
+        <p:sp>
+          <p:nvSpPr>
+            <p:cNvPr id="54" name="Arrow: Left 47">
+              <a:extLst>
+                <a:ext uri="{FF2B5EF4-FFF2-40B4-BE49-F238E27FC236}">
+                  <a16:creationId xmlns:a16="http://schemas.microsoft.com/office/drawing/2014/main" id="{D08A5AA5-5E30-1B44-B88A-D53EE29DB3F4}"/>
+                </a:ext>
+              </a:extLst>
+            </p:cNvPr>
+            <p:cNvSpPr/>
+            <p:nvPr/>
+          </p:nvSpPr>
+          <p:spPr>
+            <a:xfrm>
+              <a:off x="969529" y="4892392"/>
+              <a:ext cx="250504" cy="77721"/>
+            </a:xfrm>
+            <a:prstGeom prst="leftArrow">
+              <a:avLst/>
+            </a:prstGeom>
+          </p:spPr>
+          <p:style>
+            <a:lnRef idx="2">
+              <a:schemeClr val="dk1">
+                <a:shade val="50000"/>
+              </a:schemeClr>
+            </a:lnRef>
+            <a:fillRef idx="1">
+              <a:schemeClr val="dk1"/>
+            </a:fillRef>
+            <a:effectRef idx="0">
+              <a:schemeClr val="dk1"/>
+            </a:effectRef>
+            <a:fontRef idx="minor">
+              <a:schemeClr val="lt1"/>
+            </a:fontRef>
+          </p:style>
+          <p:txBody>
+            <a:bodyPr rtlCol="0" anchor="ctr"/>
+            <a:lstStyle/>
+            <a:p>
+              <a:pPr algn="ctr"/>
+              <a:endParaRPr lang="en-SG"/>
+            </a:p>
+          </p:txBody>
+        </p:sp>
+      </p:grpSp>
       <p:grpSp>
         <p:nvGrpSpPr>
           <p:cNvPr id="55" name="Group 54">
@@ -5165,9 +5185,9 @@
         <p:grpSpPr>
           <a:xfrm>
             <a:off x="140442" y="793236"/>
-            <a:ext cx="5801889" cy="869031"/>
+            <a:ext cx="5801889" cy="1148907"/>
             <a:chOff x="315534" y="945868"/>
-            <a:chExt cx="5164879" cy="869031"/>
+            <a:chExt cx="5164879" cy="1148907"/>
           </a:xfrm>
         </p:grpSpPr>
         <p:sp>
@@ -5185,7 +5205,7 @@
           <p:spPr>
             <a:xfrm>
               <a:off x="919101" y="945868"/>
-              <a:ext cx="513688" cy="869029"/>
+              <a:ext cx="513688" cy="1148905"/>
             </a:xfrm>
             <a:prstGeom prst="leftBrace">
               <a:avLst>
@@ -5231,7 +5251,7 @@
           </p:nvSpPr>
           <p:spPr>
             <a:xfrm>
-              <a:off x="315534" y="1241882"/>
+              <a:off x="315534" y="1367612"/>
               <a:ext cx="723900" cy="276999"/>
             </a:xfrm>
             <a:prstGeom prst="rect">
@@ -5272,7 +5292,7 @@
           <p:spPr>
             <a:xfrm>
               <a:off x="1432790" y="945870"/>
-              <a:ext cx="4047623" cy="869029"/>
+              <a:ext cx="4047623" cy="1148905"/>
             </a:xfrm>
             <a:prstGeom prst="rect">
               <a:avLst/>
@@ -5312,6 +5332,427 @@
           </p:txBody>
         </p:sp>
       </p:grpSp>
+      <p:grpSp>
+        <p:nvGrpSpPr>
+          <p:cNvPr id="51" name="Group 50">
+            <a:extLst>
+              <a:ext uri="{FF2B5EF4-FFF2-40B4-BE49-F238E27FC236}">
+                <a16:creationId xmlns:a16="http://schemas.microsoft.com/office/drawing/2014/main" id="{9138041B-F15F-2944-BDDF-59C7EF162B12}"/>
+              </a:ext>
+            </a:extLst>
+          </p:cNvPr>
+          <p:cNvGrpSpPr/>
+          <p:nvPr/>
+        </p:nvGrpSpPr>
+        <p:grpSpPr>
+          <a:xfrm>
+            <a:off x="2882804" y="3872719"/>
+            <a:ext cx="2279911" cy="263574"/>
+            <a:chOff x="2230032" y="2870443"/>
+            <a:chExt cx="2279911" cy="263574"/>
+          </a:xfrm>
+        </p:grpSpPr>
+        <p:sp>
+          <p:nvSpPr>
+            <p:cNvPr id="52" name="Oval 51">
+              <a:extLst>
+                <a:ext uri="{FF2B5EF4-FFF2-40B4-BE49-F238E27FC236}">
+                  <a16:creationId xmlns:a16="http://schemas.microsoft.com/office/drawing/2014/main" id="{8C3DBB80-9D9A-114D-89A6-F5971AE0A38F}"/>
+                </a:ext>
+              </a:extLst>
+            </p:cNvPr>
+            <p:cNvSpPr/>
+            <p:nvPr/>
+          </p:nvSpPr>
+          <p:spPr>
+            <a:xfrm>
+              <a:off x="2230032" y="3000667"/>
+              <a:ext cx="130499" cy="133350"/>
+            </a:xfrm>
+            <a:prstGeom prst="ellipse">
+              <a:avLst/>
+            </a:prstGeom>
+            <a:noFill/>
+            <a:ln w="9525" cap="flat" cmpd="sng" algn="ctr">
+              <a:solidFill>
+                <a:schemeClr val="accent4">
+                  <a:lumMod val="75000"/>
+                </a:schemeClr>
+              </a:solidFill>
+              <a:prstDash val="solid"/>
+              <a:round/>
+              <a:headEnd type="none" w="med" len="med"/>
+              <a:tailEnd type="none" w="med" len="med"/>
+            </a:ln>
+          </p:spPr>
+          <p:style>
+            <a:lnRef idx="0">
+              <a:scrgbClr r="0" g="0" b="0"/>
+            </a:lnRef>
+            <a:fillRef idx="0">
+              <a:scrgbClr r="0" g="0" b="0"/>
+            </a:fillRef>
+            <a:effectRef idx="0">
+              <a:scrgbClr r="0" g="0" b="0"/>
+            </a:effectRef>
+            <a:fontRef idx="minor">
+              <a:schemeClr val="accent6"/>
+            </a:fontRef>
+          </p:style>
+          <p:txBody>
+            <a:bodyPr rtlCol="0" anchor="ctr"/>
+            <a:lstStyle/>
+            <a:p>
+              <a:pPr algn="ctr"/>
+              <a:endParaRPr lang="en-SG"/>
+            </a:p>
+          </p:txBody>
+        </p:sp>
+        <p:sp>
+          <p:nvSpPr>
+            <p:cNvPr id="53" name="Arrow: Bent 29">
+              <a:extLst>
+                <a:ext uri="{FF2B5EF4-FFF2-40B4-BE49-F238E27FC236}">
+                  <a16:creationId xmlns:a16="http://schemas.microsoft.com/office/drawing/2014/main" id="{33158B85-34BF-8042-8B94-5B4B20553CC5}"/>
+                </a:ext>
+              </a:extLst>
+            </p:cNvPr>
+            <p:cNvSpPr/>
+            <p:nvPr/>
+          </p:nvSpPr>
+          <p:spPr>
+            <a:xfrm>
+              <a:off x="2281147" y="2943386"/>
+              <a:ext cx="381984" cy="57282"/>
+            </a:xfrm>
+            <a:prstGeom prst="bentArrow">
+              <a:avLst>
+                <a:gd name="adj1" fmla="val 25000"/>
+                <a:gd name="adj2" fmla="val 26516"/>
+                <a:gd name="adj3" fmla="val 25000"/>
+                <a:gd name="adj4" fmla="val 43750"/>
+              </a:avLst>
+            </a:prstGeom>
+            <a:solidFill>
+              <a:schemeClr val="accent4">
+                <a:lumMod val="75000"/>
+              </a:schemeClr>
+            </a:solidFill>
+            <a:ln>
+              <a:solidFill>
+                <a:schemeClr val="accent4">
+                  <a:lumMod val="50000"/>
+                </a:schemeClr>
+              </a:solidFill>
+            </a:ln>
+          </p:spPr>
+          <p:style>
+            <a:lnRef idx="2">
+              <a:schemeClr val="accent6">
+                <a:shade val="50000"/>
+              </a:schemeClr>
+            </a:lnRef>
+            <a:fillRef idx="1">
+              <a:schemeClr val="accent6"/>
+            </a:fillRef>
+            <a:effectRef idx="0">
+              <a:schemeClr val="accent6"/>
+            </a:effectRef>
+            <a:fontRef idx="minor">
+              <a:schemeClr val="lt1"/>
+            </a:fontRef>
+          </p:style>
+          <p:txBody>
+            <a:bodyPr rtlCol="0" anchor="ctr"/>
+            <a:lstStyle/>
+            <a:p>
+              <a:pPr algn="ctr"/>
+              <a:endParaRPr lang="en-SG">
+                <a:solidFill>
+                  <a:schemeClr val="tx1"/>
+                </a:solidFill>
+              </a:endParaRPr>
+            </a:p>
+          </p:txBody>
+        </p:sp>
+        <p:sp>
+          <p:nvSpPr>
+            <p:cNvPr id="59" name="TextBox 58">
+              <a:extLst>
+                <a:ext uri="{FF2B5EF4-FFF2-40B4-BE49-F238E27FC236}">
+                  <a16:creationId xmlns:a16="http://schemas.microsoft.com/office/drawing/2014/main" id="{C6BC47DB-37BE-7440-9DD6-3E79F8B4F00C}"/>
+                </a:ext>
+              </a:extLst>
+            </p:cNvPr>
+            <p:cNvSpPr txBox="1"/>
+            <p:nvPr/>
+          </p:nvSpPr>
+          <p:spPr>
+            <a:xfrm>
+              <a:off x="2607800" y="2870443"/>
+              <a:ext cx="1902143" cy="246221"/>
+            </a:xfrm>
+            <a:prstGeom prst="rect">
+              <a:avLst/>
+            </a:prstGeom>
+            <a:noFill/>
+          </p:spPr>
+          <p:txBody>
+            <a:bodyPr wrap="square" rtlCol="0">
+              <a:spAutoFit/>
+            </a:bodyPr>
+            <a:lstStyle/>
+            <a:p>
+              <a:r>
+                <a:rPr lang="en-US" altLang="zh-CN" sz="1000" dirty="0">
+                  <a:solidFill>
+                    <a:schemeClr val="accent4">
+                      <a:lumMod val="75000"/>
+                    </a:schemeClr>
+                  </a:solidFill>
+                </a:rPr>
+                <a:t>Link</a:t>
+              </a:r>
+              <a:r>
+                <a:rPr lang="zh-CN" altLang="en-US" sz="1000" dirty="0">
+                  <a:solidFill>
+                    <a:schemeClr val="accent4">
+                      <a:lumMod val="75000"/>
+                    </a:schemeClr>
+                  </a:solidFill>
+                </a:rPr>
+                <a:t> </a:t>
+              </a:r>
+              <a:r>
+                <a:rPr lang="en-US" altLang="zh-CN" sz="1000" dirty="0">
+                  <a:solidFill>
+                    <a:schemeClr val="accent4">
+                      <a:lumMod val="75000"/>
+                    </a:schemeClr>
+                  </a:solidFill>
+                </a:rPr>
+                <a:t>to</a:t>
+              </a:r>
+              <a:r>
+                <a:rPr lang="zh-CN" altLang="en-US" sz="1000" dirty="0">
+                  <a:solidFill>
+                    <a:schemeClr val="accent4">
+                      <a:lumMod val="75000"/>
+                    </a:schemeClr>
+                  </a:solidFill>
+                </a:rPr>
+                <a:t> </a:t>
+              </a:r>
+              <a:r>
+                <a:rPr lang="en-US" altLang="zh-CN" sz="1000" dirty="0">
+                  <a:solidFill>
+                    <a:schemeClr val="accent4">
+                      <a:lumMod val="75000"/>
+                    </a:schemeClr>
+                  </a:solidFill>
+                </a:rPr>
+                <a:t>author’s</a:t>
+              </a:r>
+              <a:r>
+                <a:rPr lang="zh-CN" altLang="en-US" sz="1000" dirty="0">
+                  <a:solidFill>
+                    <a:schemeClr val="accent4">
+                      <a:lumMod val="75000"/>
+                    </a:schemeClr>
+                  </a:solidFill>
+                </a:rPr>
+                <a:t> </a:t>
+              </a:r>
+              <a:r>
+                <a:rPr lang="en-US" altLang="zh-CN" sz="1000" dirty="0">
+                  <a:solidFill>
+                    <a:schemeClr val="accent4">
+                      <a:lumMod val="75000"/>
+                    </a:schemeClr>
+                  </a:solidFill>
+                </a:rPr>
+                <a:t>page</a:t>
+              </a:r>
+              <a:endParaRPr lang="en-SG" sz="1000" dirty="0">
+                <a:solidFill>
+                  <a:schemeClr val="accent4">
+                    <a:lumMod val="75000"/>
+                  </a:schemeClr>
+                </a:solidFill>
+              </a:endParaRPr>
+            </a:p>
+          </p:txBody>
+        </p:sp>
+      </p:grpSp>
+      <p:sp>
+        <p:nvSpPr>
+          <p:cNvPr id="60" name="Oval 59">
+            <a:extLst>
+              <a:ext uri="{FF2B5EF4-FFF2-40B4-BE49-F238E27FC236}">
+                <a16:creationId xmlns:a16="http://schemas.microsoft.com/office/drawing/2014/main" id="{83841894-E3CA-EB43-8F34-D5E1B9E4D403}"/>
+              </a:ext>
+            </a:extLst>
+          </p:cNvPr>
+          <p:cNvSpPr/>
+          <p:nvPr/>
+        </p:nvSpPr>
+        <p:spPr>
+          <a:xfrm>
+            <a:off x="3405955" y="3138233"/>
+            <a:ext cx="147081" cy="143858"/>
+          </a:xfrm>
+          <a:prstGeom prst="ellipse">
+            <a:avLst/>
+          </a:prstGeom>
+          <a:noFill/>
+          <a:ln w="9525" cap="flat" cmpd="sng" algn="ctr">
+            <a:solidFill>
+              <a:schemeClr val="accent1"/>
+            </a:solidFill>
+            <a:prstDash val="solid"/>
+            <a:round/>
+            <a:headEnd type="none" w="med" len="med"/>
+            <a:tailEnd type="none" w="med" len="med"/>
+          </a:ln>
+        </p:spPr>
+        <p:style>
+          <a:lnRef idx="0">
+            <a:scrgbClr r="0" g="0" b="0"/>
+          </a:lnRef>
+          <a:fillRef idx="0">
+            <a:scrgbClr r="0" g="0" b="0"/>
+          </a:fillRef>
+          <a:effectRef idx="0">
+            <a:scrgbClr r="0" g="0" b="0"/>
+          </a:effectRef>
+          <a:fontRef idx="minor">
+            <a:schemeClr val="accent1"/>
+          </a:fontRef>
+        </p:style>
+        <p:txBody>
+          <a:bodyPr rtlCol="0" anchor="ctr"/>
+          <a:lstStyle/>
+          <a:p>
+            <a:pPr algn="ctr"/>
+            <a:endParaRPr lang="en-SG"/>
+          </a:p>
+        </p:txBody>
+      </p:sp>
+      <p:sp>
+        <p:nvSpPr>
+          <p:cNvPr id="61" name="Arrow: Right 26">
+            <a:extLst>
+              <a:ext uri="{FF2B5EF4-FFF2-40B4-BE49-F238E27FC236}">
+                <a16:creationId xmlns:a16="http://schemas.microsoft.com/office/drawing/2014/main" id="{2FEE036E-9ED7-0446-BEDE-DB6E04BF8324}"/>
+              </a:ext>
+            </a:extLst>
+          </p:cNvPr>
+          <p:cNvSpPr/>
+          <p:nvPr/>
+        </p:nvSpPr>
+        <p:spPr>
+          <a:xfrm rot="12225628">
+            <a:off x="3242639" y="3093964"/>
+            <a:ext cx="142378" cy="66676"/>
+          </a:xfrm>
+          <a:prstGeom prst="rightArrow">
+            <a:avLst/>
+          </a:prstGeom>
+          <a:solidFill>
+            <a:schemeClr val="accent1"/>
+          </a:solidFill>
+          <a:ln>
+            <a:solidFill>
+              <a:srgbClr val="002060"/>
+            </a:solidFill>
+          </a:ln>
+        </p:spPr>
+        <p:style>
+          <a:lnRef idx="2">
+            <a:schemeClr val="accent2">
+              <a:shade val="50000"/>
+            </a:schemeClr>
+          </a:lnRef>
+          <a:fillRef idx="1">
+            <a:schemeClr val="accent2"/>
+          </a:fillRef>
+          <a:effectRef idx="0">
+            <a:schemeClr val="accent2"/>
+          </a:effectRef>
+          <a:fontRef idx="minor">
+            <a:schemeClr val="lt1"/>
+          </a:fontRef>
+        </p:style>
+        <p:txBody>
+          <a:bodyPr rtlCol="0" anchor="ctr"/>
+          <a:lstStyle/>
+          <a:p>
+            <a:pPr algn="ctr"/>
+            <a:endParaRPr lang="en-SG"/>
+          </a:p>
+        </p:txBody>
+      </p:sp>
+      <p:sp>
+        <p:nvSpPr>
+          <p:cNvPr id="62" name="TextBox 61">
+            <a:extLst>
+              <a:ext uri="{FF2B5EF4-FFF2-40B4-BE49-F238E27FC236}">
+                <a16:creationId xmlns:a16="http://schemas.microsoft.com/office/drawing/2014/main" id="{D7EDCE94-CB52-7E4E-9F7B-09618674F44D}"/>
+              </a:ext>
+            </a:extLst>
+          </p:cNvPr>
+          <p:cNvSpPr txBox="1"/>
+          <p:nvPr/>
+        </p:nvSpPr>
+        <p:spPr>
+          <a:xfrm>
+            <a:off x="1643150" y="2954822"/>
+            <a:ext cx="1640785" cy="246221"/>
+          </a:xfrm>
+          <a:prstGeom prst="rect">
+            <a:avLst/>
+          </a:prstGeom>
+          <a:noFill/>
+        </p:spPr>
+        <p:txBody>
+          <a:bodyPr wrap="square" rtlCol="0">
+            <a:spAutoFit/>
+          </a:bodyPr>
+          <a:lstStyle/>
+          <a:p>
+            <a:pPr algn="r"/>
+            <a:r>
+              <a:rPr lang="en-US" sz="1000" dirty="0">
+                <a:solidFill>
+                  <a:schemeClr val="accent1"/>
+                </a:solidFill>
+              </a:rPr>
+              <a:t>Merge</a:t>
+            </a:r>
+            <a:r>
+              <a:rPr lang="zh-CN" altLang="en-US" sz="1000" dirty="0">
+                <a:solidFill>
+                  <a:schemeClr val="accent1"/>
+                </a:solidFill>
+              </a:rPr>
+              <a:t> </a:t>
+            </a:r>
+            <a:r>
+              <a:rPr lang="en-US" altLang="zh-CN" sz="1000" dirty="0">
+                <a:solidFill>
+                  <a:schemeClr val="accent1"/>
+                </a:solidFill>
+              </a:rPr>
+              <a:t>group</a:t>
+            </a:r>
+            <a:endParaRPr lang="en-SG" sz="1000" dirty="0">
+              <a:solidFill>
+                <a:schemeClr val="accent1"/>
+              </a:solidFill>
+            </a:endParaRPr>
+          </a:p>
+        </p:txBody>
+      </p:sp>
     </p:spTree>
     <p:extLst>
       <p:ext uri="{BB962C8B-B14F-4D97-AF65-F5344CB8AC3E}">

</xml_diff>